<commit_message>
inserting examples for persist epoch races and strand persistency
</commit_message>
<xml_diff>
--- a/proposal/defense.pptx
+++ b/proposal/defense.pptx
@@ -38,14 +38,14 @@
     <p:sldId id="1152" r:id="rId26"/>
     <p:sldId id="1150" r:id="rId27"/>
     <p:sldId id="1160" r:id="rId28"/>
-    <p:sldId id="1161" r:id="rId29"/>
-    <p:sldId id="1156" r:id="rId30"/>
-    <p:sldId id="1157" r:id="rId31"/>
-    <p:sldId id="1158" r:id="rId32"/>
-    <p:sldId id="1159" r:id="rId33"/>
-    <p:sldId id="1154" r:id="rId34"/>
-    <p:sldId id="1155" r:id="rId35"/>
-    <p:sldId id="1162" r:id="rId36"/>
+    <p:sldId id="1156" r:id="rId29"/>
+    <p:sldId id="1157" r:id="rId30"/>
+    <p:sldId id="1158" r:id="rId31"/>
+    <p:sldId id="1159" r:id="rId32"/>
+    <p:sldId id="1154" r:id="rId33"/>
+    <p:sldId id="1155" r:id="rId34"/>
+    <p:sldId id="1162" r:id="rId35"/>
+    <p:sldId id="1166" r:id="rId36"/>
     <p:sldId id="1132" r:id="rId37"/>
     <p:sldId id="1163" r:id="rId38"/>
     <p:sldId id="1164" r:id="rId39"/>
@@ -5809,14 +5809,7 @@
                 <a:latin typeface="Calibri" pitchFamily="34" charset="0"/>
                 <a:cs typeface="Calibri" pitchFamily="34" charset="0"/>
               </a:rPr>
-              <a:t> </a:t>
-            </a:r>
-            <a:r>
-              <a:rPr lang="en-US" sz="800" baseline="0" dirty="0" smtClean="0">
-                <a:latin typeface="Calibri" pitchFamily="34" charset="0"/>
-                <a:cs typeface="Calibri" pitchFamily="34" charset="0"/>
-              </a:rPr>
-              <a:t>Steven </a:t>
+              <a:t> Steven </a:t>
             </a:r>
             <a:r>
               <a:rPr lang="en-US" sz="800" baseline="0" dirty="0" err="1" smtClean="0">
@@ -9038,12 +9031,16 @@
           <a:p>
             <a:pPr lvl="1"/>
             <a:r>
-              <a:rPr lang="en-US" dirty="0" smtClean="0"/>
-              <a:t>Suggests that </a:t>
+              <a:rPr lang="en-US" dirty="0"/>
+              <a:t>P</a:t>
             </a:r>
             <a:r>
               <a:rPr lang="en-US" i="1" dirty="0" smtClean="0"/>
-              <a:t>persist ordering critical path</a:t>
+              <a:t>ersist order </a:t>
+            </a:r>
+            <a:r>
+              <a:rPr lang="en-US" i="1" dirty="0" smtClean="0"/>
+              <a:t>critical path</a:t>
             </a:r>
             <a:r>
               <a:rPr lang="en-US" dirty="0" smtClean="0"/>
@@ -9186,7 +9183,15 @@
           <a:p>
             <a:r>
               <a:rPr lang="en-US" dirty="0" smtClean="0"/>
-              <a:t>All models use SC as underlying consistency model</a:t>
+              <a:t>All models use SC </a:t>
+            </a:r>
+            <a:r>
+              <a:rPr lang="en-US" dirty="0" smtClean="0"/>
+              <a:t>as </a:t>
+            </a:r>
+            <a:r>
+              <a:rPr lang="en-US" dirty="0" smtClean="0"/>
+              <a:t>consistency model</a:t>
             </a:r>
           </a:p>
           <a:p>
@@ -9205,8 +9210,24 @@
           </a:p>
           <a:p>
             <a:r>
+              <a:rPr lang="en-US" dirty="0"/>
+              <a:t>S</a:t>
+            </a:r>
+            <a:r>
               <a:rPr lang="en-US" dirty="0" smtClean="0"/>
-              <a:t>Each successively relaxes persistency to improve persist concurrency and reduce critical path</a:t>
+              <a:t>uccessively relax </a:t>
+            </a:r>
+            <a:r>
+              <a:rPr lang="en-US" dirty="0" smtClean="0"/>
+              <a:t>persistency to improve persist </a:t>
+            </a:r>
+            <a:r>
+              <a:rPr lang="en-US" dirty="0" smtClean="0"/>
+              <a:t>concurrency/reduce </a:t>
+            </a:r>
+            <a:r>
+              <a:rPr lang="en-US" dirty="0" smtClean="0"/>
+              <a:t>critical path</a:t>
             </a:r>
           </a:p>
         </p:txBody>
@@ -9312,14 +9333,39 @@
           <a:p>
             <a:r>
               <a:rPr lang="en-US" dirty="0" smtClean="0"/>
-              <a:t>Any memory state that might be observed by the recovery observer processor under SC is an allowable persistent state</a:t>
-            </a:r>
-          </a:p>
-          <a:p>
+              <a:t>Any </a:t>
+            </a:r>
             <a:r>
               <a:rPr lang="en-US" dirty="0" smtClean="0"/>
-              <a:t>Equivalent: any two stores guaranteed to be ordered w.r.t. recovery observer implies the associated persists also ordered</a:t>
-            </a:r>
+              <a:t>volatile memory </a:t>
+            </a:r>
+            <a:r>
+              <a:rPr lang="en-US" dirty="0" smtClean="0"/>
+              <a:t>state that might be observed by the recovery observer processor under SC is an allowable persistent state</a:t>
+            </a:r>
+          </a:p>
+          <a:p>
+            <a:r>
+              <a:rPr lang="en-US" dirty="0" smtClean="0"/>
+              <a:t>Equivalent: </a:t>
+            </a:r>
+            <a:r>
+              <a:rPr lang="en-US" dirty="0"/>
+              <a:t>t</a:t>
+            </a:r>
+            <a:r>
+              <a:rPr lang="en-US" dirty="0" smtClean="0"/>
+              <a:t>wo </a:t>
+            </a:r>
+            <a:r>
+              <a:rPr lang="en-US" dirty="0" smtClean="0"/>
+              <a:t>stores guaranteed to be ordered w.r.t. recovery observer </a:t>
+            </a:r>
+            <a:r>
+              <a:rPr lang="en-US" dirty="0" smtClean="0"/>
+              <a:t>implies ordered persists</a:t>
+            </a:r>
+            <a:endParaRPr lang="en-US" dirty="0" smtClean="0"/>
           </a:p>
           <a:p>
             <a:r>
@@ -9420,11 +9466,7 @@
           <a:p>
             <a:r>
               <a:rPr lang="en-US" dirty="0" smtClean="0"/>
-              <a:t>Strict </a:t>
-            </a:r>
-            <a:r>
-              <a:rPr lang="en-US" dirty="0" smtClean="0"/>
-              <a:t>persistency queue</a:t>
+              <a:t>Strict persistency queue</a:t>
             </a:r>
             <a:endParaRPr lang="en-US" dirty="0"/>
           </a:p>
@@ -14035,7 +14077,11 @@
           <a:p>
             <a:r>
               <a:rPr lang="en-US" dirty="0" smtClean="0"/>
-              <a:t>Strict persistency implementation</a:t>
+              <a:t>Strict persistency </a:t>
+            </a:r>
+            <a:r>
+              <a:rPr lang="en-US" dirty="0" smtClean="0"/>
+              <a:t>implementations</a:t>
             </a:r>
             <a:endParaRPr lang="en-US" dirty="0"/>
           </a:p>
@@ -15054,7 +15100,7 @@
         <p:spPr>
           <a:xfrm>
             <a:off x="4933148" y="2816932"/>
-            <a:ext cx="3275256" cy="1323439"/>
+            <a:ext cx="3179075" cy="1323439"/>
           </a:xfrm>
           <a:prstGeom prst="rect">
             <a:avLst/>
@@ -15092,8 +15138,29 @@
                   <a:srgbClr val="FF0000"/>
                 </a:solidFill>
               </a:rPr>
-              <a:t>Epochs aren’t transactions!</a:t>
-            </a:r>
+              <a:t>Epochs aren’t </a:t>
+            </a:r>
+            <a:r>
+              <a:rPr lang="en-US" b="0" i="1" dirty="0" err="1" smtClean="0">
+                <a:solidFill>
+                  <a:srgbClr val="FF0000"/>
+                </a:solidFill>
+              </a:rPr>
+              <a:t>serializable</a:t>
+            </a:r>
+            <a:r>
+              <a:rPr lang="en-US" b="0" i="1" dirty="0" smtClean="0">
+                <a:solidFill>
+                  <a:srgbClr val="FF0000"/>
+                </a:solidFill>
+              </a:rPr>
+              <a:t>!</a:t>
+            </a:r>
+            <a:endParaRPr lang="en-US" b="0" i="1" dirty="0" smtClean="0">
+              <a:solidFill>
+                <a:srgbClr val="FF0000"/>
+              </a:solidFill>
+            </a:endParaRPr>
           </a:p>
         </p:txBody>
       </p:sp>
@@ -15112,7 +15179,7 @@
             <a:avLst/>
           </a:prstGeom>
           <a:solidFill>
-            <a:srgbClr val="FF0000"/>
+            <a:schemeClr val="tx1"/>
           </a:solidFill>
           <a:ln w="9525" cap="flat" cmpd="sng" algn="ctr">
             <a:solidFill>
@@ -15287,14 +15354,7 @@
                 <a:latin typeface="Courier New" panose="02070309020205020404" pitchFamily="49" charset="0"/>
                 <a:cs typeface="Courier New" panose="02070309020205020404" pitchFamily="49" charset="0"/>
               </a:rPr>
-              <a:t>Insert(entry, length</a:t>
-            </a:r>
-            <a:r>
-              <a:rPr lang="en-US" sz="2400" b="0" dirty="0" smtClean="0">
-                <a:latin typeface="Courier New" panose="02070309020205020404" pitchFamily="49" charset="0"/>
-                <a:cs typeface="Courier New" panose="02070309020205020404" pitchFamily="49" charset="0"/>
-              </a:rPr>
-              <a:t>):</a:t>
+              <a:t>Insert(entry, length):</a:t>
             </a:r>
           </a:p>
           <a:p>
@@ -15486,14 +15546,7 @@
                 <a:latin typeface="Courier New" panose="02070309020205020404" pitchFamily="49" charset="0"/>
                 <a:cs typeface="Courier New" panose="02070309020205020404" pitchFamily="49" charset="0"/>
               </a:rPr>
-              <a:t>(length</a:t>
-            </a:r>
-            <a:r>
-              <a:rPr lang="en-US" sz="2400" b="0" dirty="0" smtClean="0">
-                <a:latin typeface="Courier New" panose="02070309020205020404" pitchFamily="49" charset="0"/>
-                <a:cs typeface="Courier New" panose="02070309020205020404" pitchFamily="49" charset="0"/>
-              </a:rPr>
-              <a:t>)</a:t>
+              <a:t>(length)</a:t>
             </a:r>
           </a:p>
           <a:p>
@@ -15641,11 +15694,6 @@
               </a:rPr>
               <a:t>epoch races</a:t>
             </a:r>
-            <a:endParaRPr lang="en-US" sz="2400" b="0" dirty="0" smtClean="0">
-              <a:solidFill>
-                <a:srgbClr val="FF0000"/>
-              </a:solidFill>
-            </a:endParaRPr>
           </a:p>
         </p:txBody>
       </p:sp>
@@ -15707,11 +15755,6 @@
               </a:rPr>
               <a:t>not persist before data</a:t>
             </a:r>
-            <a:endParaRPr lang="en-US" sz="2400" b="0" dirty="0" smtClean="0">
-              <a:solidFill>
-                <a:srgbClr val="FF0000"/>
-              </a:solidFill>
-            </a:endParaRPr>
           </a:p>
         </p:txBody>
       </p:sp>
@@ -21809,7 +21852,73 @@
           <a:bodyPr/>
           <a:lstStyle/>
           <a:p>
-            <a:endParaRPr lang="en-US"/>
+            <a:r>
+              <a:rPr lang="en-US" dirty="0" smtClean="0"/>
+              <a:t>Persist </a:t>
+            </a:r>
+            <a:r>
+              <a:rPr lang="en-US" i="1" dirty="0" smtClean="0"/>
+              <a:t>A</a:t>
+            </a:r>
+            <a:r>
+              <a:rPr lang="en-US" dirty="0" smtClean="0"/>
+              <a:t> ordered before persist </a:t>
+            </a:r>
+            <a:r>
+              <a:rPr lang="en-US" i="1" dirty="0" smtClean="0"/>
+              <a:t>B</a:t>
+            </a:r>
+            <a:r>
+              <a:rPr lang="en-US" dirty="0" smtClean="0"/>
+              <a:t> if:</a:t>
+            </a:r>
+          </a:p>
+          <a:p>
+            <a:pPr lvl="1"/>
+            <a:r>
+              <a:rPr lang="en-US" dirty="0" smtClean="0"/>
+              <a:t>O</a:t>
+            </a:r>
+            <a:r>
+              <a:rPr lang="en-US" dirty="0" smtClean="0"/>
+              <a:t>bserve </a:t>
+            </a:r>
+            <a:r>
+              <a:rPr lang="en-US" i="1" dirty="0" smtClean="0"/>
+              <a:t>A</a:t>
+            </a:r>
+            <a:r>
+              <a:rPr lang="en-US" dirty="0" smtClean="0"/>
+              <a:t> persisted prior to barrier preceding </a:t>
+            </a:r>
+            <a:r>
+              <a:rPr lang="en-US" i="1" dirty="0" smtClean="0"/>
+              <a:t>B</a:t>
+            </a:r>
+          </a:p>
+          <a:p>
+            <a:pPr lvl="1"/>
+            <a:r>
+              <a:rPr lang="en-US" dirty="0" smtClean="0"/>
+              <a:t>Or </a:t>
+            </a:r>
+            <a:r>
+              <a:rPr lang="en-US" i="1" dirty="0" smtClean="0"/>
+              <a:t>A</a:t>
+            </a:r>
+            <a:r>
+              <a:rPr lang="en-US" dirty="0" smtClean="0"/>
+              <a:t> and </a:t>
+            </a:r>
+            <a:r>
+              <a:rPr lang="en-US" i="1" dirty="0" smtClean="0"/>
+              <a:t>B</a:t>
+            </a:r>
+            <a:r>
+              <a:rPr lang="en-US" dirty="0" smtClean="0"/>
+              <a:t> are to the same address</a:t>
+            </a:r>
+            <a:endParaRPr lang="en-US" dirty="0"/>
           </a:p>
         </p:txBody>
       </p:sp>
@@ -21834,6 +21943,345 @@
               <a:t>26</a:t>
             </a:fld>
             <a:endParaRPr lang="en-US" dirty="0"/>
+          </a:p>
+        </p:txBody>
+      </p:sp>
+      <p:sp>
+        <p:nvSpPr>
+          <p:cNvPr id="5" name="TextBox 4"/>
+          <p:cNvSpPr txBox="1"/>
+          <p:nvPr/>
+        </p:nvSpPr>
+        <p:spPr>
+          <a:xfrm>
+            <a:off x="179512" y="3032956"/>
+            <a:ext cx="1338828" cy="1631216"/>
+          </a:xfrm>
+          <a:prstGeom prst="rect">
+            <a:avLst/>
+          </a:prstGeom>
+          <a:noFill/>
+        </p:spPr>
+        <p:txBody>
+          <a:bodyPr wrap="none" rtlCol="0">
+            <a:spAutoFit/>
+          </a:bodyPr>
+          <a:lstStyle/>
+          <a:p>
+            <a:pPr algn="l"/>
+            <a:r>
+              <a:rPr lang="en-US" dirty="0" smtClean="0"/>
+              <a:t>Thread 1:</a:t>
+            </a:r>
+          </a:p>
+          <a:p>
+            <a:pPr algn="l"/>
+            <a:r>
+              <a:rPr lang="en-US" b="0" dirty="0" smtClean="0"/>
+              <a:t>Persist A</a:t>
+            </a:r>
+          </a:p>
+          <a:p>
+            <a:pPr algn="l"/>
+            <a:r>
+              <a:rPr lang="en-US" b="0" i="1" dirty="0" smtClean="0"/>
+              <a:t>Barrier</a:t>
+            </a:r>
+            <a:endParaRPr lang="en-US" b="0" dirty="0" smtClean="0"/>
+          </a:p>
+          <a:p>
+            <a:pPr algn="l"/>
+            <a:r>
+              <a:rPr lang="en-US" b="0" dirty="0" smtClean="0"/>
+              <a:t>Persist B</a:t>
+            </a:r>
+          </a:p>
+          <a:p>
+            <a:pPr algn="l"/>
+            <a:r>
+              <a:rPr lang="en-US" b="0" dirty="0" smtClean="0"/>
+              <a:t>Store V</a:t>
+            </a:r>
+            <a:endParaRPr lang="en-US" b="0" dirty="0"/>
+          </a:p>
+        </p:txBody>
+      </p:sp>
+      <p:sp>
+        <p:nvSpPr>
+          <p:cNvPr id="6" name="TextBox 5"/>
+          <p:cNvSpPr txBox="1"/>
+          <p:nvPr/>
+        </p:nvSpPr>
+        <p:spPr>
+          <a:xfrm>
+            <a:off x="1554344" y="3037148"/>
+            <a:ext cx="1338828" cy="3170099"/>
+          </a:xfrm>
+          <a:prstGeom prst="rect">
+            <a:avLst/>
+          </a:prstGeom>
+          <a:noFill/>
+        </p:spPr>
+        <p:txBody>
+          <a:bodyPr wrap="none" rtlCol="0">
+            <a:spAutoFit/>
+          </a:bodyPr>
+          <a:lstStyle/>
+          <a:p>
+            <a:pPr algn="l"/>
+            <a:r>
+              <a:rPr lang="en-US" dirty="0" smtClean="0"/>
+              <a:t>Thread 2:</a:t>
+            </a:r>
+          </a:p>
+          <a:p>
+            <a:pPr algn="l"/>
+            <a:endParaRPr lang="en-US" b="0" dirty="0"/>
+          </a:p>
+          <a:p>
+            <a:pPr algn="l"/>
+            <a:endParaRPr lang="en-US" b="0" dirty="0" smtClean="0"/>
+          </a:p>
+          <a:p>
+            <a:pPr algn="l"/>
+            <a:endParaRPr lang="en-US" b="0" dirty="0"/>
+          </a:p>
+          <a:p>
+            <a:pPr algn="l"/>
+            <a:endParaRPr lang="en-US" b="0" dirty="0" smtClean="0"/>
+          </a:p>
+          <a:p>
+            <a:pPr algn="l"/>
+            <a:r>
+              <a:rPr lang="en-US" b="0" dirty="0" smtClean="0"/>
+              <a:t>Read V</a:t>
+            </a:r>
+          </a:p>
+          <a:p>
+            <a:pPr algn="l"/>
+            <a:r>
+              <a:rPr lang="en-US" b="0" dirty="0" smtClean="0"/>
+              <a:t>Persist B’</a:t>
+            </a:r>
+          </a:p>
+          <a:p>
+            <a:pPr algn="l"/>
+            <a:r>
+              <a:rPr lang="en-US" b="0" dirty="0" smtClean="0"/>
+              <a:t>Persist C</a:t>
+            </a:r>
+          </a:p>
+          <a:p>
+            <a:pPr algn="l"/>
+            <a:r>
+              <a:rPr lang="en-US" b="0" i="1" dirty="0" smtClean="0"/>
+              <a:t>Barrier</a:t>
+            </a:r>
+            <a:endParaRPr lang="en-US" b="0" dirty="0" smtClean="0"/>
+          </a:p>
+          <a:p>
+            <a:pPr algn="l"/>
+            <a:r>
+              <a:rPr lang="en-US" b="0" dirty="0" smtClean="0"/>
+              <a:t>Persist D</a:t>
+            </a:r>
+          </a:p>
+        </p:txBody>
+      </p:sp>
+      <p:sp>
+        <p:nvSpPr>
+          <p:cNvPr id="7" name="Right Arrow 6"/>
+          <p:cNvSpPr/>
+          <p:nvPr/>
+        </p:nvSpPr>
+        <p:spPr bwMode="auto">
+          <a:xfrm rot="1652981">
+            <a:off x="1173255" y="4485894"/>
+            <a:ext cx="406937" cy="164428"/>
+          </a:xfrm>
+          <a:prstGeom prst="rightArrow">
+            <a:avLst/>
+          </a:prstGeom>
+          <a:solidFill>
+            <a:schemeClr val="tx1"/>
+          </a:solidFill>
+          <a:ln w="9525" cap="flat" cmpd="sng" algn="ctr">
+            <a:solidFill>
+              <a:schemeClr val="tx1"/>
+            </a:solidFill>
+            <a:prstDash val="solid"/>
+            <a:round/>
+            <a:headEnd type="none" w="med" len="med"/>
+            <a:tailEnd type="none" w="med" len="med"/>
+          </a:ln>
+          <a:effectLst/>
+        </p:spPr>
+        <p:txBody>
+          <a:bodyPr vert="horz" wrap="square" lIns="91440" tIns="45720" rIns="91440" bIns="45720" numCol="1" rtlCol="0" anchor="t" anchorCtr="0" compatLnSpc="1">
+            <a:prstTxWarp prst="textNoShape">
+              <a:avLst/>
+            </a:prstTxWarp>
+          </a:bodyPr>
+          <a:lstStyle/>
+          <a:p>
+            <a:pPr marL="0" marR="0" indent="0" algn="l" defTabSz="914400" rtl="0" eaLnBrk="0" fontAlgn="base" latinLnBrk="0" hangingPunct="0">
+              <a:lnSpc>
+                <a:spcPct val="100000"/>
+              </a:lnSpc>
+              <a:spcBef>
+                <a:spcPct val="0"/>
+              </a:spcBef>
+              <a:spcAft>
+                <a:spcPct val="0"/>
+              </a:spcAft>
+              <a:buClrTx/>
+              <a:buSzTx/>
+              <a:buFontTx/>
+              <a:buNone/>
+              <a:tabLst/>
+            </a:pPr>
+            <a:endParaRPr kumimoji="0" lang="en-US" sz="2400" b="0" i="0" u="none" strike="noStrike" cap="none" normalizeH="0" baseline="0" smtClean="0">
+              <a:ln>
+                <a:noFill/>
+              </a:ln>
+              <a:solidFill>
+                <a:schemeClr val="tx1"/>
+              </a:solidFill>
+              <a:effectLst/>
+              <a:latin typeface="Arial" charset="0"/>
+              <a:ea typeface="ＭＳ Ｐゴシック" charset="-128"/>
+            </a:endParaRPr>
+          </a:p>
+        </p:txBody>
+      </p:sp>
+      <p:sp>
+        <p:nvSpPr>
+          <p:cNvPr id="8" name="TextBox 7"/>
+          <p:cNvSpPr txBox="1"/>
+          <p:nvPr/>
+        </p:nvSpPr>
+        <p:spPr>
+          <a:xfrm>
+            <a:off x="3239076" y="3037148"/>
+            <a:ext cx="3745192" cy="1938992"/>
+          </a:xfrm>
+          <a:prstGeom prst="rect">
+            <a:avLst/>
+          </a:prstGeom>
+          <a:noFill/>
+        </p:spPr>
+        <p:txBody>
+          <a:bodyPr wrap="none" rtlCol="0">
+            <a:spAutoFit/>
+          </a:bodyPr>
+          <a:lstStyle/>
+          <a:p>
+            <a:pPr algn="l"/>
+            <a:r>
+              <a:rPr lang="en-US" dirty="0" smtClean="0"/>
+              <a:t>Ordering constraints:</a:t>
+            </a:r>
+          </a:p>
+          <a:p>
+            <a:pPr algn="l"/>
+            <a:r>
+              <a:rPr lang="en-US" b="0" dirty="0" smtClean="0"/>
+              <a:t>A before B</a:t>
+            </a:r>
+          </a:p>
+          <a:p>
+            <a:pPr algn="l"/>
+            <a:r>
+              <a:rPr lang="en-US" b="0" dirty="0" smtClean="0"/>
+              <a:t>B’ before D</a:t>
+            </a:r>
+          </a:p>
+          <a:p>
+            <a:pPr algn="l"/>
+            <a:r>
+              <a:rPr lang="en-US" b="0" dirty="0" smtClean="0"/>
+              <a:t>C before D</a:t>
+            </a:r>
+          </a:p>
+          <a:p>
+            <a:pPr algn="l"/>
+            <a:r>
+              <a:rPr lang="en-US" b="0" dirty="0" smtClean="0"/>
+              <a:t>B before B’ (cache coherence)</a:t>
+            </a:r>
+          </a:p>
+          <a:p>
+            <a:pPr algn="l"/>
+            <a:r>
+              <a:rPr lang="en-US" b="0" dirty="0" smtClean="0"/>
+              <a:t>A before D (through V)</a:t>
+            </a:r>
+            <a:endParaRPr lang="en-US" b="0" dirty="0"/>
+          </a:p>
+        </p:txBody>
+      </p:sp>
+      <p:sp>
+        <p:nvSpPr>
+          <p:cNvPr id="9" name="TextBox 8"/>
+          <p:cNvSpPr txBox="1"/>
+          <p:nvPr/>
+        </p:nvSpPr>
+        <p:spPr>
+          <a:xfrm>
+            <a:off x="7146443" y="3037148"/>
+            <a:ext cx="1922321" cy="1938992"/>
+          </a:xfrm>
+          <a:prstGeom prst="rect">
+            <a:avLst/>
+          </a:prstGeom>
+          <a:noFill/>
+        </p:spPr>
+        <p:txBody>
+          <a:bodyPr wrap="none" rtlCol="0">
+            <a:spAutoFit/>
+          </a:bodyPr>
+          <a:lstStyle/>
+          <a:p>
+            <a:pPr algn="l"/>
+            <a:r>
+              <a:rPr lang="en-US" dirty="0" smtClean="0"/>
+              <a:t>No constraint:</a:t>
+            </a:r>
+          </a:p>
+          <a:p>
+            <a:pPr algn="l"/>
+            <a:r>
+              <a:rPr lang="en-US" b="0" dirty="0" smtClean="0"/>
+              <a:t>A and B’</a:t>
+            </a:r>
+          </a:p>
+          <a:p>
+            <a:pPr algn="l"/>
+            <a:r>
+              <a:rPr lang="en-US" b="0" dirty="0" smtClean="0"/>
+              <a:t>A and C</a:t>
+            </a:r>
+          </a:p>
+          <a:p>
+            <a:pPr algn="l"/>
+            <a:r>
+              <a:rPr lang="en-US" b="0" dirty="0" smtClean="0"/>
+              <a:t>B and C</a:t>
+            </a:r>
+          </a:p>
+          <a:p>
+            <a:pPr algn="l"/>
+            <a:r>
+              <a:rPr lang="en-US" b="0" dirty="0" smtClean="0"/>
+              <a:t>B and D</a:t>
+            </a:r>
+          </a:p>
+          <a:p>
+            <a:pPr algn="l"/>
+            <a:r>
+              <a:rPr lang="en-US" b="0" dirty="0" smtClean="0"/>
+              <a:t>B’ and C</a:t>
+            </a:r>
           </a:p>
         </p:txBody>
       </p:sp>
@@ -21891,28 +22339,21 @@
           <a:p>
             <a:r>
               <a:rPr lang="en-US" dirty="0" smtClean="0"/>
-              <a:t>Enforcing order with PER</a:t>
+              <a:t>Epoch</a:t>
+            </a:r>
+            <a:r>
+              <a:rPr lang="en-US" baseline="0" dirty="0" smtClean="0"/>
+              <a:t> persistency queue, 2</a:t>
+            </a:r>
+            <a:r>
+              <a:rPr lang="en-US" baseline="30000" dirty="0" smtClean="0"/>
+              <a:t>nd</a:t>
+            </a:r>
+            <a:r>
+              <a:rPr lang="en-US" baseline="0" dirty="0" smtClean="0"/>
+              <a:t> attempt</a:t>
             </a:r>
             <a:endParaRPr lang="en-US" dirty="0"/>
-          </a:p>
-        </p:txBody>
-      </p:sp>
-      <p:sp>
-        <p:nvSpPr>
-          <p:cNvPr id="3" name="Content Placeholder 2"/>
-          <p:cNvSpPr>
-            <a:spLocks noGrp="1"/>
-          </p:cNvSpPr>
-          <p:nvPr>
-            <p:ph idx="1"/>
-          </p:nvPr>
-        </p:nvSpPr>
-        <p:spPr/>
-        <p:txBody>
-          <a:bodyPr/>
-          <a:lstStyle/>
-          <a:p>
-            <a:endParaRPr lang="en-US"/>
           </a:p>
         </p:txBody>
       </p:sp>
@@ -21935,102 +22376,6 @@
               <a:rPr lang="en-US" smtClean="0"/>
               <a:pPr/>
               <a:t>27</a:t>
-            </a:fld>
-            <a:endParaRPr lang="en-US" dirty="0"/>
-          </a:p>
-        </p:txBody>
-      </p:sp>
-    </p:spTree>
-    <p:extLst>
-      <p:ext uri="{BB962C8B-B14F-4D97-AF65-F5344CB8AC3E}">
-        <p14:creationId xmlns:p14="http://schemas.microsoft.com/office/powerpoint/2010/main" val="3052932129"/>
-      </p:ext>
-    </p:extLst>
-  </p:cSld>
-  <p:clrMapOvr>
-    <a:masterClrMapping/>
-  </p:clrMapOvr>
-  <p:timing>
-    <p:tnLst>
-      <p:par>
-        <p:cTn id="1" dur="indefinite" restart="never" nodeType="tmRoot"/>
-      </p:par>
-    </p:tnLst>
-  </p:timing>
-</p:sld>
-</file>
-
-<file path=ppt/slides/slide28.xml><?xml version="1.0" encoding="utf-8"?>
-<p:sld xmlns:a="http://schemas.openxmlformats.org/drawingml/2006/main" xmlns:r="http://schemas.openxmlformats.org/officeDocument/2006/relationships" xmlns:p="http://schemas.openxmlformats.org/presentationml/2006/main">
-  <p:cSld>
-    <p:spTree>
-      <p:nvGrpSpPr>
-        <p:cNvPr id="1" name=""/>
-        <p:cNvGrpSpPr/>
-        <p:nvPr/>
-      </p:nvGrpSpPr>
-      <p:grpSpPr>
-        <a:xfrm>
-          <a:off x="0" y="0"/>
-          <a:ext cx="0" cy="0"/>
-          <a:chOff x="0" y="0"/>
-          <a:chExt cx="0" cy="0"/>
-        </a:xfrm>
-      </p:grpSpPr>
-      <p:sp>
-        <p:nvSpPr>
-          <p:cNvPr id="2" name="Title 1"/>
-          <p:cNvSpPr>
-            <a:spLocks noGrp="1"/>
-          </p:cNvSpPr>
-          <p:nvPr>
-            <p:ph type="title"/>
-          </p:nvPr>
-        </p:nvSpPr>
-        <p:spPr/>
-        <p:txBody>
-          <a:bodyPr/>
-          <a:lstStyle/>
-          <a:p>
-            <a:r>
-              <a:rPr lang="en-US" dirty="0" smtClean="0"/>
-              <a:t>Epoch</a:t>
-            </a:r>
-            <a:r>
-              <a:rPr lang="en-US" baseline="0" dirty="0" smtClean="0"/>
-              <a:t> persistency queue, 2</a:t>
-            </a:r>
-            <a:r>
-              <a:rPr lang="en-US" baseline="30000" dirty="0" smtClean="0"/>
-              <a:t>nd</a:t>
-            </a:r>
-            <a:r>
-              <a:rPr lang="en-US" baseline="0" dirty="0" smtClean="0"/>
-              <a:t> attempt</a:t>
-            </a:r>
-            <a:endParaRPr lang="en-US" dirty="0"/>
-          </a:p>
-        </p:txBody>
-      </p:sp>
-      <p:sp>
-        <p:nvSpPr>
-          <p:cNvPr id="4" name="Slide Number Placeholder 3"/>
-          <p:cNvSpPr>
-            <a:spLocks noGrp="1"/>
-          </p:cNvSpPr>
-          <p:nvPr>
-            <p:ph type="sldNum" sz="quarter" idx="4"/>
-          </p:nvPr>
-        </p:nvSpPr>
-        <p:spPr/>
-        <p:txBody>
-          <a:bodyPr/>
-          <a:lstStyle/>
-          <a:p>
-            <a:fld id="{24EAD923-3004-4A31-84C7-9B440B785588}" type="slidenum">
-              <a:rPr lang="en-US" smtClean="0"/>
-              <a:pPr/>
-              <a:t>28</a:t>
             </a:fld>
             <a:endParaRPr lang="en-US" dirty="0"/>
           </a:p>
@@ -22064,14 +22409,7 @@
                 <a:latin typeface="Courier New" panose="02070309020205020404" pitchFamily="49" charset="0"/>
                 <a:cs typeface="Courier New" panose="02070309020205020404" pitchFamily="49" charset="0"/>
               </a:rPr>
-              <a:t>Insert(entry, length</a:t>
-            </a:r>
-            <a:r>
-              <a:rPr lang="en-US" sz="2400" b="0" dirty="0" smtClean="0">
-                <a:latin typeface="Courier New" panose="02070309020205020404" pitchFamily="49" charset="0"/>
-                <a:cs typeface="Courier New" panose="02070309020205020404" pitchFamily="49" charset="0"/>
-              </a:rPr>
-              <a:t>):</a:t>
+              <a:t>Insert(entry, length):</a:t>
             </a:r>
           </a:p>
           <a:p>
@@ -22097,10 +22435,6 @@
               </a:rPr>
               <a:t>()</a:t>
             </a:r>
-            <a:endParaRPr lang="en-US" sz="2400" b="0" dirty="0" smtClean="0">
-              <a:latin typeface="Courier New" panose="02070309020205020404" pitchFamily="49" charset="0"/>
-              <a:cs typeface="Courier New" panose="02070309020205020404" pitchFamily="49" charset="0"/>
-            </a:endParaRPr>
           </a:p>
           <a:p>
             <a:pPr algn="l"/>
@@ -22243,14 +22577,7 @@
                 <a:latin typeface="Courier New" panose="02070309020205020404" pitchFamily="49" charset="0"/>
                 <a:cs typeface="Courier New" panose="02070309020205020404" pitchFamily="49" charset="0"/>
               </a:rPr>
-              <a:t>(length</a:t>
-            </a:r>
-            <a:r>
-              <a:rPr lang="en-US" sz="2400" b="0" dirty="0" smtClean="0">
-                <a:latin typeface="Courier New" panose="02070309020205020404" pitchFamily="49" charset="0"/>
-                <a:cs typeface="Courier New" panose="02070309020205020404" pitchFamily="49" charset="0"/>
-              </a:rPr>
-              <a:t>)</a:t>
+              <a:t>(length)</a:t>
             </a:r>
           </a:p>
           <a:p>
@@ -22334,10 +22661,6 @@
               </a:rPr>
               <a:t>()</a:t>
             </a:r>
-            <a:endParaRPr lang="en-US" sz="2400" b="0" dirty="0">
-              <a:latin typeface="Courier New" panose="02070309020205020404" pitchFamily="49" charset="0"/>
-              <a:cs typeface="Courier New" panose="02070309020205020404" pitchFamily="49" charset="0"/>
-            </a:endParaRPr>
           </a:p>
         </p:txBody>
       </p:sp>
@@ -22521,7 +22844,7 @@
 </p:sld>
 </file>
 
-<file path=ppt/slides/slide29.xml><?xml version="1.0" encoding="utf-8"?>
+<file path=ppt/slides/slide28.xml><?xml version="1.0" encoding="utf-8"?>
 <p:sld xmlns:a="http://schemas.openxmlformats.org/drawingml/2006/main" xmlns:r="http://schemas.openxmlformats.org/officeDocument/2006/relationships" xmlns:p="http://schemas.openxmlformats.org/presentationml/2006/main">
   <p:cSld>
     <p:spTree>
@@ -22757,7 +23080,7 @@
             <a:fld id="{24EAD923-3004-4A31-84C7-9B440B785588}" type="slidenum">
               <a:rPr lang="en-US" smtClean="0"/>
               <a:pPr/>
-              <a:t>29</a:t>
+              <a:t>28</a:t>
             </a:fld>
             <a:endParaRPr lang="en-US" dirty="0"/>
           </a:p>
@@ -24652,575 +24975,7 @@
 </p:sld>
 </file>
 
-<file path=ppt/slides/slide3.xml><?xml version="1.0" encoding="utf-8"?>
-<p:sld xmlns:a="http://schemas.openxmlformats.org/drawingml/2006/main" xmlns:r="http://schemas.openxmlformats.org/officeDocument/2006/relationships" xmlns:p="http://schemas.openxmlformats.org/presentationml/2006/main">
-  <p:cSld>
-    <p:spTree>
-      <p:nvGrpSpPr>
-        <p:cNvPr id="1" name=""/>
-        <p:cNvGrpSpPr/>
-        <p:nvPr/>
-      </p:nvGrpSpPr>
-      <p:grpSpPr>
-        <a:xfrm>
-          <a:off x="0" y="0"/>
-          <a:ext cx="0" cy="0"/>
-          <a:chOff x="0" y="0"/>
-          <a:chExt cx="0" cy="0"/>
-        </a:xfrm>
-      </p:grpSpPr>
-      <p:sp>
-        <p:nvSpPr>
-          <p:cNvPr id="2" name="Title 1"/>
-          <p:cNvSpPr>
-            <a:spLocks noGrp="1"/>
-          </p:cNvSpPr>
-          <p:nvPr>
-            <p:ph type="title"/>
-          </p:nvPr>
-        </p:nvSpPr>
-        <p:spPr/>
-        <p:txBody>
-          <a:bodyPr/>
-          <a:lstStyle/>
-          <a:p>
-            <a:r>
-              <a:rPr lang="en-US" dirty="0" smtClean="0"/>
-              <a:t>NVRAM recovery</a:t>
-            </a:r>
-            <a:endParaRPr lang="en-US" dirty="0"/>
-          </a:p>
-        </p:txBody>
-      </p:sp>
-      <p:sp>
-        <p:nvSpPr>
-          <p:cNvPr id="4" name="Slide Number Placeholder 3"/>
-          <p:cNvSpPr>
-            <a:spLocks noGrp="1"/>
-          </p:cNvSpPr>
-          <p:nvPr>
-            <p:ph type="sldNum" sz="quarter" idx="4"/>
-          </p:nvPr>
-        </p:nvSpPr>
-        <p:spPr/>
-        <p:txBody>
-          <a:bodyPr/>
-          <a:lstStyle/>
-          <a:p>
-            <a:fld id="{24EAD923-3004-4A31-84C7-9B440B785588}" type="slidenum">
-              <a:rPr lang="en-US" smtClean="0"/>
-              <a:pPr/>
-              <a:t>3</a:t>
-            </a:fld>
-            <a:endParaRPr lang="en-US" dirty="0"/>
-          </a:p>
-        </p:txBody>
-      </p:sp>
-      <p:pic>
-        <p:nvPicPr>
-          <p:cNvPr id="11266" name="Picture 2" descr="http://upload.wikimedia.org/wikipedia/commons/6/62/Intel_CPU_Pentium_4_640_Prescott_bottom.jpg"/>
-          <p:cNvPicPr>
-            <a:picLocks noChangeAspect="1" noChangeArrowheads="1"/>
-          </p:cNvPicPr>
-          <p:nvPr/>
-        </p:nvPicPr>
-        <p:blipFill>
-          <a:blip r:embed="rId2" cstate="print">
-            <a:extLst>
-              <a:ext uri="{28A0092B-C50C-407E-A947-70E740481C1C}">
-                <a14:useLocalDpi xmlns:a14="http://schemas.microsoft.com/office/drawing/2010/main" val="0"/>
-              </a:ext>
-            </a:extLst>
-          </a:blip>
-          <a:srcRect/>
-          <a:stretch>
-            <a:fillRect/>
-          </a:stretch>
-        </p:blipFill>
-        <p:spPr bwMode="auto">
-          <a:xfrm>
-            <a:off x="827584" y="1559044"/>
-            <a:ext cx="2867298" cy="1905960"/>
-          </a:xfrm>
-          <a:prstGeom prst="rect">
-            <a:avLst/>
-          </a:prstGeom>
-          <a:noFill/>
-          <a:extLst>
-            <a:ext uri="{909E8E84-426E-40DD-AFC4-6F175D3DCCD1}">
-              <a14:hiddenFill xmlns:a14="http://schemas.microsoft.com/office/drawing/2010/main">
-                <a:solidFill>
-                  <a:srgbClr val="FFFFFF"/>
-                </a:solidFill>
-              </a14:hiddenFill>
-            </a:ext>
-          </a:extLst>
-        </p:spPr>
-      </p:pic>
-      <p:pic>
-        <p:nvPicPr>
-          <p:cNvPr id="10" name="Picture 6" descr="http://cdn.eteknix.com/wp-content/uploads/2011/11/RAM.jpg"/>
-          <p:cNvPicPr>
-            <a:picLocks noChangeAspect="1" noChangeArrowheads="1"/>
-          </p:cNvPicPr>
-          <p:nvPr/>
-        </p:nvPicPr>
-        <p:blipFill>
-          <a:blip r:embed="rId3">
-            <a:extLst>
-              <a:ext uri="{28A0092B-C50C-407E-A947-70E740481C1C}">
-                <a14:useLocalDpi xmlns:a14="http://schemas.microsoft.com/office/drawing/2010/main" val="0"/>
-              </a:ext>
-            </a:extLst>
-          </a:blip>
-          <a:srcRect/>
-          <a:stretch>
-            <a:fillRect/>
-          </a:stretch>
-        </p:blipFill>
-        <p:spPr bwMode="auto">
-          <a:xfrm>
-            <a:off x="5400092" y="1232756"/>
-            <a:ext cx="3610016" cy="2760600"/>
-          </a:xfrm>
-          <a:prstGeom prst="rect">
-            <a:avLst/>
-          </a:prstGeom>
-          <a:noFill/>
-          <a:extLst>
-            <a:ext uri="{909E8E84-426E-40DD-AFC4-6F175D3DCCD1}">
-              <a14:hiddenFill xmlns:a14="http://schemas.microsoft.com/office/drawing/2010/main">
-                <a:solidFill>
-                  <a:srgbClr val="FFFFFF"/>
-                </a:solidFill>
-              </a14:hiddenFill>
-            </a:ext>
-          </a:extLst>
-        </p:spPr>
-      </p:pic>
-      <p:sp>
-        <p:nvSpPr>
-          <p:cNvPr id="7" name="Right Arrow 6"/>
-          <p:cNvSpPr/>
-          <p:nvPr/>
-        </p:nvSpPr>
-        <p:spPr bwMode="auto">
-          <a:xfrm>
-            <a:off x="3514862" y="1909798"/>
-            <a:ext cx="1237158" cy="547094"/>
-          </a:xfrm>
-          <a:prstGeom prst="rightArrow">
-            <a:avLst/>
-          </a:prstGeom>
-          <a:solidFill>
-            <a:schemeClr val="accent1"/>
-          </a:solidFill>
-          <a:ln w="9525" cap="flat" cmpd="sng" algn="ctr">
-            <a:solidFill>
-              <a:schemeClr val="tx1"/>
-            </a:solidFill>
-            <a:prstDash val="solid"/>
-            <a:round/>
-            <a:headEnd type="none" w="med" len="med"/>
-            <a:tailEnd type="none" w="med" len="med"/>
-          </a:ln>
-          <a:effectLst/>
-        </p:spPr>
-        <p:txBody>
-          <a:bodyPr vert="horz" wrap="square" lIns="91440" tIns="45720" rIns="91440" bIns="45720" numCol="1" rtlCol="0" anchor="ctr" anchorCtr="0" compatLnSpc="1">
-            <a:prstTxWarp prst="textNoShape">
-              <a:avLst/>
-            </a:prstTxWarp>
-          </a:bodyPr>
-          <a:lstStyle/>
-          <a:p>
-            <a:pPr marL="0" marR="0" indent="0" defTabSz="914400" rtl="0" eaLnBrk="0" fontAlgn="base" latinLnBrk="0" hangingPunct="0">
-              <a:lnSpc>
-                <a:spcPct val="100000"/>
-              </a:lnSpc>
-              <a:spcBef>
-                <a:spcPct val="0"/>
-              </a:spcBef>
-              <a:spcAft>
-                <a:spcPct val="0"/>
-              </a:spcAft>
-              <a:buClrTx/>
-              <a:buSzTx/>
-              <a:buFontTx/>
-              <a:buNone/>
-              <a:tabLst/>
-            </a:pPr>
-            <a:endParaRPr kumimoji="0" lang="en-US" sz="2400" b="0" i="0" u="none" strike="noStrike" cap="none" normalizeH="0" baseline="0" dirty="0" smtClean="0">
-              <a:ln>
-                <a:noFill/>
-              </a:ln>
-              <a:solidFill>
-                <a:schemeClr val="tx1"/>
-              </a:solidFill>
-              <a:effectLst/>
-              <a:latin typeface="Arial" charset="0"/>
-              <a:ea typeface="ＭＳ Ｐゴシック" charset="-128"/>
-            </a:endParaRPr>
-          </a:p>
-        </p:txBody>
-      </p:sp>
-      <p:sp>
-        <p:nvSpPr>
-          <p:cNvPr id="8" name="TextBox 7"/>
-          <p:cNvSpPr txBox="1"/>
-          <p:nvPr/>
-        </p:nvSpPr>
-        <p:spPr>
-          <a:xfrm>
-            <a:off x="3851920" y="1480718"/>
-            <a:ext cx="2387385" cy="400110"/>
-          </a:xfrm>
-          <a:prstGeom prst="rect">
-            <a:avLst/>
-          </a:prstGeom>
-          <a:noFill/>
-        </p:spPr>
-        <p:txBody>
-          <a:bodyPr wrap="none" rtlCol="0">
-            <a:spAutoFit/>
-          </a:bodyPr>
-          <a:lstStyle/>
-          <a:p>
-            <a:r>
-              <a:rPr lang="en-US" dirty="0" smtClean="0">
-                <a:solidFill>
-                  <a:srgbClr val="FF0000"/>
-                </a:solidFill>
-              </a:rPr>
-              <a:t>Writes unordered!</a:t>
-            </a:r>
-            <a:endParaRPr lang="en-US" dirty="0">
-              <a:solidFill>
-                <a:srgbClr val="FF0000"/>
-              </a:solidFill>
-            </a:endParaRPr>
-          </a:p>
-        </p:txBody>
-      </p:sp>
-      <p:sp>
-        <p:nvSpPr>
-          <p:cNvPr id="11" name="Right Arrow 10"/>
-          <p:cNvSpPr/>
-          <p:nvPr/>
-        </p:nvSpPr>
-        <p:spPr bwMode="auto">
-          <a:xfrm>
-            <a:off x="4133441" y="2339509"/>
-            <a:ext cx="1237158" cy="547094"/>
-          </a:xfrm>
-          <a:prstGeom prst="rightArrow">
-            <a:avLst/>
-          </a:prstGeom>
-          <a:solidFill>
-            <a:schemeClr val="accent1"/>
-          </a:solidFill>
-          <a:ln w="9525" cap="flat" cmpd="sng" algn="ctr">
-            <a:solidFill>
-              <a:schemeClr val="tx1"/>
-            </a:solidFill>
-            <a:prstDash val="solid"/>
-            <a:round/>
-            <a:headEnd type="none" w="med" len="med"/>
-            <a:tailEnd type="none" w="med" len="med"/>
-          </a:ln>
-          <a:effectLst/>
-        </p:spPr>
-        <p:txBody>
-          <a:bodyPr vert="horz" wrap="square" lIns="91440" tIns="45720" rIns="91440" bIns="45720" numCol="1" rtlCol="0" anchor="ctr" anchorCtr="0" compatLnSpc="1">
-            <a:prstTxWarp prst="textNoShape">
-              <a:avLst/>
-            </a:prstTxWarp>
-          </a:bodyPr>
-          <a:lstStyle/>
-          <a:p>
-            <a:pPr marL="0" marR="0" indent="0" defTabSz="914400" rtl="0" eaLnBrk="0" fontAlgn="base" latinLnBrk="0" hangingPunct="0">
-              <a:lnSpc>
-                <a:spcPct val="100000"/>
-              </a:lnSpc>
-              <a:spcBef>
-                <a:spcPct val="0"/>
-              </a:spcBef>
-              <a:spcAft>
-                <a:spcPct val="0"/>
-              </a:spcAft>
-              <a:buClrTx/>
-              <a:buSzTx/>
-              <a:buFontTx/>
-              <a:buNone/>
-              <a:tabLst/>
-            </a:pPr>
-            <a:r>
-              <a:rPr lang="en-US" sz="2400" b="0" dirty="0" smtClean="0">
-                <a:ea typeface="ＭＳ Ｐゴシック" charset="-128"/>
-              </a:rPr>
-              <a:t>writes</a:t>
-            </a:r>
-            <a:endParaRPr kumimoji="0" lang="en-US" sz="2400" b="0" i="0" u="none" strike="noStrike" cap="none" normalizeH="0" baseline="0" dirty="0" smtClean="0">
-              <a:ln>
-                <a:noFill/>
-              </a:ln>
-              <a:solidFill>
-                <a:schemeClr val="tx1"/>
-              </a:solidFill>
-              <a:effectLst/>
-              <a:latin typeface="Arial" charset="0"/>
-              <a:ea typeface="ＭＳ Ｐゴシック" charset="-128"/>
-            </a:endParaRPr>
-          </a:p>
-        </p:txBody>
-      </p:sp>
-      <p:sp>
-        <p:nvSpPr>
-          <p:cNvPr id="13" name="Right Arrow 12"/>
-          <p:cNvSpPr/>
-          <p:nvPr/>
-        </p:nvSpPr>
-        <p:spPr bwMode="auto">
-          <a:xfrm>
-            <a:off x="3724375" y="2780928"/>
-            <a:ext cx="1237158" cy="547094"/>
-          </a:xfrm>
-          <a:prstGeom prst="rightArrow">
-            <a:avLst/>
-          </a:prstGeom>
-          <a:solidFill>
-            <a:schemeClr val="accent1"/>
-          </a:solidFill>
-          <a:ln w="9525" cap="flat" cmpd="sng" algn="ctr">
-            <a:solidFill>
-              <a:schemeClr val="tx1"/>
-            </a:solidFill>
-            <a:prstDash val="solid"/>
-            <a:round/>
-            <a:headEnd type="none" w="med" len="med"/>
-            <a:tailEnd type="none" w="med" len="med"/>
-          </a:ln>
-          <a:effectLst/>
-        </p:spPr>
-        <p:txBody>
-          <a:bodyPr vert="horz" wrap="square" lIns="91440" tIns="45720" rIns="91440" bIns="45720" numCol="1" rtlCol="0" anchor="ctr" anchorCtr="0" compatLnSpc="1">
-            <a:prstTxWarp prst="textNoShape">
-              <a:avLst/>
-            </a:prstTxWarp>
-          </a:bodyPr>
-          <a:lstStyle/>
-          <a:p>
-            <a:pPr marL="0" marR="0" indent="0" defTabSz="914400" rtl="0" eaLnBrk="0" fontAlgn="base" latinLnBrk="0" hangingPunct="0">
-              <a:lnSpc>
-                <a:spcPct val="100000"/>
-              </a:lnSpc>
-              <a:spcBef>
-                <a:spcPct val="0"/>
-              </a:spcBef>
-              <a:spcAft>
-                <a:spcPct val="0"/>
-              </a:spcAft>
-              <a:buClrTx/>
-              <a:buSzTx/>
-              <a:buFontTx/>
-              <a:buNone/>
-              <a:tabLst/>
-            </a:pPr>
-            <a:endParaRPr kumimoji="0" lang="en-US" sz="2400" b="0" i="0" u="none" strike="noStrike" cap="none" normalizeH="0" baseline="0" dirty="0" smtClean="0">
-              <a:ln>
-                <a:noFill/>
-              </a:ln>
-              <a:solidFill>
-                <a:schemeClr val="tx1"/>
-              </a:solidFill>
-              <a:effectLst/>
-              <a:latin typeface="Arial" charset="0"/>
-              <a:ea typeface="ＭＳ Ｐゴシック" charset="-128"/>
-            </a:endParaRPr>
-          </a:p>
-        </p:txBody>
-      </p:sp>
-      <p:sp>
-        <p:nvSpPr>
-          <p:cNvPr id="16" name="Content Placeholder 2"/>
-          <p:cNvSpPr>
-            <a:spLocks noGrp="1"/>
-          </p:cNvSpPr>
-          <p:nvPr>
-            <p:ph idx="1"/>
-          </p:nvPr>
-        </p:nvSpPr>
-        <p:spPr>
-          <a:xfrm>
-            <a:off x="457200" y="3645024"/>
-            <a:ext cx="8229600" cy="2337123"/>
-          </a:xfrm>
-        </p:spPr>
-        <p:txBody>
-          <a:bodyPr/>
-          <a:lstStyle/>
-          <a:p>
-            <a:r>
-              <a:rPr lang="en-US" dirty="0" smtClean="0"/>
-              <a:t>Must constrain write order for recovery</a:t>
-            </a:r>
-          </a:p>
-          <a:p>
-            <a:r>
-              <a:rPr lang="en-US" dirty="0" smtClean="0"/>
-              <a:t>Cache eviction reorders writes to memory</a:t>
-            </a:r>
-          </a:p>
-          <a:p>
-            <a:r>
-              <a:rPr lang="en-US" dirty="0" smtClean="0"/>
-              <a:t>Enforcing program order writes incurs </a:t>
-            </a:r>
-            <a:r>
-              <a:rPr lang="en-US" b="1" dirty="0" smtClean="0">
-                <a:solidFill>
-                  <a:srgbClr val="FF0000"/>
-                </a:solidFill>
-              </a:rPr>
-              <a:t>30x</a:t>
-            </a:r>
-            <a:r>
-              <a:rPr lang="en-US" dirty="0" smtClean="0"/>
-              <a:t> slowdown over instruction execution rate.</a:t>
-            </a:r>
-          </a:p>
-        </p:txBody>
-      </p:sp>
-      <p:sp>
-        <p:nvSpPr>
-          <p:cNvPr id="17" name="TextBox 16"/>
-          <p:cNvSpPr txBox="1"/>
-          <p:nvPr/>
-        </p:nvSpPr>
-        <p:spPr>
-          <a:xfrm>
-            <a:off x="5714" y="5919663"/>
-            <a:ext cx="9132628" cy="461665"/>
-          </a:xfrm>
-          <a:prstGeom prst="rect">
-            <a:avLst/>
-          </a:prstGeom>
-          <a:noFill/>
-        </p:spPr>
-        <p:txBody>
-          <a:bodyPr wrap="none" rtlCol="0">
-            <a:spAutoFit/>
-          </a:bodyPr>
-          <a:lstStyle/>
-          <a:p>
-            <a:r>
-              <a:rPr lang="en-US" sz="2400" b="0" i="1" dirty="0" smtClean="0">
-                <a:solidFill>
-                  <a:srgbClr val="FF0909"/>
-                </a:solidFill>
-              </a:rPr>
-              <a:t>Must constrain writes for correctness, but reorder for performance</a:t>
-            </a:r>
-            <a:endParaRPr lang="en-US" sz="2400" b="0" i="1" dirty="0">
-              <a:solidFill>
-                <a:srgbClr val="FF0909"/>
-              </a:solidFill>
-            </a:endParaRPr>
-          </a:p>
-        </p:txBody>
-      </p:sp>
-    </p:spTree>
-    <p:extLst>
-      <p:ext uri="{BB962C8B-B14F-4D97-AF65-F5344CB8AC3E}">
-        <p14:creationId xmlns:p14="http://schemas.microsoft.com/office/powerpoint/2010/main" val="3248928663"/>
-      </p:ext>
-    </p:extLst>
-  </p:cSld>
-  <p:clrMapOvr>
-    <a:masterClrMapping/>
-  </p:clrMapOvr>
-  <p:timing>
-    <p:tnLst>
-      <p:par>
-        <p:cTn id="1" dur="indefinite" restart="never" nodeType="tmRoot">
-          <p:childTnLst>
-            <p:seq concurrent="1" nextAc="seek">
-              <p:cTn id="2" dur="indefinite" nodeType="mainSeq">
-                <p:childTnLst>
-                  <p:par>
-                    <p:cTn id="3" fill="hold">
-                      <p:stCondLst>
-                        <p:cond delay="indefinite"/>
-                      </p:stCondLst>
-                      <p:childTnLst>
-                        <p:par>
-                          <p:cTn id="4" fill="hold">
-                            <p:stCondLst>
-                              <p:cond delay="0"/>
-                            </p:stCondLst>
-                            <p:childTnLst>
-                              <p:par>
-                                <p:cTn id="5" presetID="1" presetClass="entr" presetSubtype="0" fill="hold" grpId="0" nodeType="clickEffect">
-                                  <p:stCondLst>
-                                    <p:cond delay="0"/>
-                                  </p:stCondLst>
-                                  <p:childTnLst>
-                                    <p:set>
-                                      <p:cBhvr>
-                                        <p:cTn id="6" dur="1" fill="hold">
-                                          <p:stCondLst>
-                                            <p:cond delay="0"/>
-                                          </p:stCondLst>
-                                        </p:cTn>
-                                        <p:tgtEl>
-                                          <p:spTgt spid="17"/>
-                                        </p:tgtEl>
-                                        <p:attrNameLst>
-                                          <p:attrName>style.visibility</p:attrName>
-                                        </p:attrNameLst>
-                                      </p:cBhvr>
-                                      <p:to>
-                                        <p:strVal val="visible"/>
-                                      </p:to>
-                                    </p:set>
-                                  </p:childTnLst>
-                                </p:cTn>
-                              </p:par>
-                            </p:childTnLst>
-                          </p:cTn>
-                        </p:par>
-                      </p:childTnLst>
-                    </p:cTn>
-                  </p:par>
-                </p:childTnLst>
-              </p:cTn>
-              <p:prevCondLst>
-                <p:cond evt="onPrev" delay="0">
-                  <p:tgtEl>
-                    <p:sldTgt/>
-                  </p:tgtEl>
-                </p:cond>
-              </p:prevCondLst>
-              <p:nextCondLst>
-                <p:cond evt="onNext" delay="0">
-                  <p:tgtEl>
-                    <p:sldTgt/>
-                  </p:tgtEl>
-                </p:cond>
-              </p:nextCondLst>
-            </p:seq>
-          </p:childTnLst>
-        </p:cTn>
-      </p:par>
-    </p:tnLst>
-    <p:bldLst>
-      <p:bldP spid="17" grpId="0"/>
-    </p:bldLst>
-  </p:timing>
-</p:sld>
-</file>
-
-<file path=ppt/slides/slide30.xml><?xml version="1.0" encoding="utf-8"?>
+<file path=ppt/slides/slide29.xml><?xml version="1.0" encoding="utf-8"?>
 <p:sld xmlns:a="http://schemas.openxmlformats.org/drawingml/2006/main" xmlns:r="http://schemas.openxmlformats.org/officeDocument/2006/relationships" xmlns:p="http://schemas.openxmlformats.org/presentationml/2006/main">
   <p:cSld>
     <p:spTree>
@@ -25456,7 +25211,7 @@
             <a:fld id="{24EAD923-3004-4A31-84C7-9B440B785588}" type="slidenum">
               <a:rPr lang="en-US" smtClean="0"/>
               <a:pPr/>
-              <a:t>30</a:t>
+              <a:t>29</a:t>
             </a:fld>
             <a:endParaRPr lang="en-US" dirty="0"/>
           </a:p>
@@ -27351,7 +27106,575 @@
 </p:sld>
 </file>
 
-<file path=ppt/slides/slide31.xml><?xml version="1.0" encoding="utf-8"?>
+<file path=ppt/slides/slide3.xml><?xml version="1.0" encoding="utf-8"?>
+<p:sld xmlns:a="http://schemas.openxmlformats.org/drawingml/2006/main" xmlns:r="http://schemas.openxmlformats.org/officeDocument/2006/relationships" xmlns:p="http://schemas.openxmlformats.org/presentationml/2006/main">
+  <p:cSld>
+    <p:spTree>
+      <p:nvGrpSpPr>
+        <p:cNvPr id="1" name=""/>
+        <p:cNvGrpSpPr/>
+        <p:nvPr/>
+      </p:nvGrpSpPr>
+      <p:grpSpPr>
+        <a:xfrm>
+          <a:off x="0" y="0"/>
+          <a:ext cx="0" cy="0"/>
+          <a:chOff x="0" y="0"/>
+          <a:chExt cx="0" cy="0"/>
+        </a:xfrm>
+      </p:grpSpPr>
+      <p:sp>
+        <p:nvSpPr>
+          <p:cNvPr id="2" name="Title 1"/>
+          <p:cNvSpPr>
+            <a:spLocks noGrp="1"/>
+          </p:cNvSpPr>
+          <p:nvPr>
+            <p:ph type="title"/>
+          </p:nvPr>
+        </p:nvSpPr>
+        <p:spPr/>
+        <p:txBody>
+          <a:bodyPr/>
+          <a:lstStyle/>
+          <a:p>
+            <a:r>
+              <a:rPr lang="en-US" dirty="0" smtClean="0"/>
+              <a:t>NVRAM recovery</a:t>
+            </a:r>
+            <a:endParaRPr lang="en-US" dirty="0"/>
+          </a:p>
+        </p:txBody>
+      </p:sp>
+      <p:sp>
+        <p:nvSpPr>
+          <p:cNvPr id="4" name="Slide Number Placeholder 3"/>
+          <p:cNvSpPr>
+            <a:spLocks noGrp="1"/>
+          </p:cNvSpPr>
+          <p:nvPr>
+            <p:ph type="sldNum" sz="quarter" idx="4"/>
+          </p:nvPr>
+        </p:nvSpPr>
+        <p:spPr/>
+        <p:txBody>
+          <a:bodyPr/>
+          <a:lstStyle/>
+          <a:p>
+            <a:fld id="{24EAD923-3004-4A31-84C7-9B440B785588}" type="slidenum">
+              <a:rPr lang="en-US" smtClean="0"/>
+              <a:pPr/>
+              <a:t>3</a:t>
+            </a:fld>
+            <a:endParaRPr lang="en-US" dirty="0"/>
+          </a:p>
+        </p:txBody>
+      </p:sp>
+      <p:pic>
+        <p:nvPicPr>
+          <p:cNvPr id="11266" name="Picture 2" descr="http://upload.wikimedia.org/wikipedia/commons/6/62/Intel_CPU_Pentium_4_640_Prescott_bottom.jpg"/>
+          <p:cNvPicPr>
+            <a:picLocks noChangeAspect="1" noChangeArrowheads="1"/>
+          </p:cNvPicPr>
+          <p:nvPr/>
+        </p:nvPicPr>
+        <p:blipFill>
+          <a:blip r:embed="rId2" cstate="print">
+            <a:extLst>
+              <a:ext uri="{28A0092B-C50C-407E-A947-70E740481C1C}">
+                <a14:useLocalDpi xmlns:a14="http://schemas.microsoft.com/office/drawing/2010/main" val="0"/>
+              </a:ext>
+            </a:extLst>
+          </a:blip>
+          <a:srcRect/>
+          <a:stretch>
+            <a:fillRect/>
+          </a:stretch>
+        </p:blipFill>
+        <p:spPr bwMode="auto">
+          <a:xfrm>
+            <a:off x="827584" y="1559044"/>
+            <a:ext cx="2867298" cy="1905960"/>
+          </a:xfrm>
+          <a:prstGeom prst="rect">
+            <a:avLst/>
+          </a:prstGeom>
+          <a:noFill/>
+          <a:extLst>
+            <a:ext uri="{909E8E84-426E-40DD-AFC4-6F175D3DCCD1}">
+              <a14:hiddenFill xmlns:a14="http://schemas.microsoft.com/office/drawing/2010/main">
+                <a:solidFill>
+                  <a:srgbClr val="FFFFFF"/>
+                </a:solidFill>
+              </a14:hiddenFill>
+            </a:ext>
+          </a:extLst>
+        </p:spPr>
+      </p:pic>
+      <p:pic>
+        <p:nvPicPr>
+          <p:cNvPr id="10" name="Picture 6" descr="http://cdn.eteknix.com/wp-content/uploads/2011/11/RAM.jpg"/>
+          <p:cNvPicPr>
+            <a:picLocks noChangeAspect="1" noChangeArrowheads="1"/>
+          </p:cNvPicPr>
+          <p:nvPr/>
+        </p:nvPicPr>
+        <p:blipFill>
+          <a:blip r:embed="rId3">
+            <a:extLst>
+              <a:ext uri="{28A0092B-C50C-407E-A947-70E740481C1C}">
+                <a14:useLocalDpi xmlns:a14="http://schemas.microsoft.com/office/drawing/2010/main" val="0"/>
+              </a:ext>
+            </a:extLst>
+          </a:blip>
+          <a:srcRect/>
+          <a:stretch>
+            <a:fillRect/>
+          </a:stretch>
+        </p:blipFill>
+        <p:spPr bwMode="auto">
+          <a:xfrm>
+            <a:off x="5400092" y="1232756"/>
+            <a:ext cx="3610016" cy="2760600"/>
+          </a:xfrm>
+          <a:prstGeom prst="rect">
+            <a:avLst/>
+          </a:prstGeom>
+          <a:noFill/>
+          <a:extLst>
+            <a:ext uri="{909E8E84-426E-40DD-AFC4-6F175D3DCCD1}">
+              <a14:hiddenFill xmlns:a14="http://schemas.microsoft.com/office/drawing/2010/main">
+                <a:solidFill>
+                  <a:srgbClr val="FFFFFF"/>
+                </a:solidFill>
+              </a14:hiddenFill>
+            </a:ext>
+          </a:extLst>
+        </p:spPr>
+      </p:pic>
+      <p:sp>
+        <p:nvSpPr>
+          <p:cNvPr id="7" name="Right Arrow 6"/>
+          <p:cNvSpPr/>
+          <p:nvPr/>
+        </p:nvSpPr>
+        <p:spPr bwMode="auto">
+          <a:xfrm>
+            <a:off x="3514862" y="1909798"/>
+            <a:ext cx="1237158" cy="547094"/>
+          </a:xfrm>
+          <a:prstGeom prst="rightArrow">
+            <a:avLst/>
+          </a:prstGeom>
+          <a:solidFill>
+            <a:schemeClr val="accent1"/>
+          </a:solidFill>
+          <a:ln w="9525" cap="flat" cmpd="sng" algn="ctr">
+            <a:solidFill>
+              <a:schemeClr val="tx1"/>
+            </a:solidFill>
+            <a:prstDash val="solid"/>
+            <a:round/>
+            <a:headEnd type="none" w="med" len="med"/>
+            <a:tailEnd type="none" w="med" len="med"/>
+          </a:ln>
+          <a:effectLst/>
+        </p:spPr>
+        <p:txBody>
+          <a:bodyPr vert="horz" wrap="square" lIns="91440" tIns="45720" rIns="91440" bIns="45720" numCol="1" rtlCol="0" anchor="ctr" anchorCtr="0" compatLnSpc="1">
+            <a:prstTxWarp prst="textNoShape">
+              <a:avLst/>
+            </a:prstTxWarp>
+          </a:bodyPr>
+          <a:lstStyle/>
+          <a:p>
+            <a:pPr marL="0" marR="0" indent="0" defTabSz="914400" rtl="0" eaLnBrk="0" fontAlgn="base" latinLnBrk="0" hangingPunct="0">
+              <a:lnSpc>
+                <a:spcPct val="100000"/>
+              </a:lnSpc>
+              <a:spcBef>
+                <a:spcPct val="0"/>
+              </a:spcBef>
+              <a:spcAft>
+                <a:spcPct val="0"/>
+              </a:spcAft>
+              <a:buClrTx/>
+              <a:buSzTx/>
+              <a:buFontTx/>
+              <a:buNone/>
+              <a:tabLst/>
+            </a:pPr>
+            <a:endParaRPr kumimoji="0" lang="en-US" sz="2400" b="0" i="0" u="none" strike="noStrike" cap="none" normalizeH="0" baseline="0" dirty="0" smtClean="0">
+              <a:ln>
+                <a:noFill/>
+              </a:ln>
+              <a:solidFill>
+                <a:schemeClr val="tx1"/>
+              </a:solidFill>
+              <a:effectLst/>
+              <a:latin typeface="Arial" charset="0"/>
+              <a:ea typeface="ＭＳ Ｐゴシック" charset="-128"/>
+            </a:endParaRPr>
+          </a:p>
+        </p:txBody>
+      </p:sp>
+      <p:sp>
+        <p:nvSpPr>
+          <p:cNvPr id="8" name="TextBox 7"/>
+          <p:cNvSpPr txBox="1"/>
+          <p:nvPr/>
+        </p:nvSpPr>
+        <p:spPr>
+          <a:xfrm>
+            <a:off x="3851920" y="1480718"/>
+            <a:ext cx="2387385" cy="400110"/>
+          </a:xfrm>
+          <a:prstGeom prst="rect">
+            <a:avLst/>
+          </a:prstGeom>
+          <a:noFill/>
+        </p:spPr>
+        <p:txBody>
+          <a:bodyPr wrap="none" rtlCol="0">
+            <a:spAutoFit/>
+          </a:bodyPr>
+          <a:lstStyle/>
+          <a:p>
+            <a:r>
+              <a:rPr lang="en-US" dirty="0" smtClean="0">
+                <a:solidFill>
+                  <a:srgbClr val="FF0000"/>
+                </a:solidFill>
+              </a:rPr>
+              <a:t>Writes unordered!</a:t>
+            </a:r>
+            <a:endParaRPr lang="en-US" dirty="0">
+              <a:solidFill>
+                <a:srgbClr val="FF0000"/>
+              </a:solidFill>
+            </a:endParaRPr>
+          </a:p>
+        </p:txBody>
+      </p:sp>
+      <p:sp>
+        <p:nvSpPr>
+          <p:cNvPr id="11" name="Right Arrow 10"/>
+          <p:cNvSpPr/>
+          <p:nvPr/>
+        </p:nvSpPr>
+        <p:spPr bwMode="auto">
+          <a:xfrm>
+            <a:off x="4133441" y="2339509"/>
+            <a:ext cx="1237158" cy="547094"/>
+          </a:xfrm>
+          <a:prstGeom prst="rightArrow">
+            <a:avLst/>
+          </a:prstGeom>
+          <a:solidFill>
+            <a:schemeClr val="accent1"/>
+          </a:solidFill>
+          <a:ln w="9525" cap="flat" cmpd="sng" algn="ctr">
+            <a:solidFill>
+              <a:schemeClr val="tx1"/>
+            </a:solidFill>
+            <a:prstDash val="solid"/>
+            <a:round/>
+            <a:headEnd type="none" w="med" len="med"/>
+            <a:tailEnd type="none" w="med" len="med"/>
+          </a:ln>
+          <a:effectLst/>
+        </p:spPr>
+        <p:txBody>
+          <a:bodyPr vert="horz" wrap="square" lIns="91440" tIns="45720" rIns="91440" bIns="45720" numCol="1" rtlCol="0" anchor="ctr" anchorCtr="0" compatLnSpc="1">
+            <a:prstTxWarp prst="textNoShape">
+              <a:avLst/>
+            </a:prstTxWarp>
+          </a:bodyPr>
+          <a:lstStyle/>
+          <a:p>
+            <a:pPr marL="0" marR="0" indent="0" defTabSz="914400" rtl="0" eaLnBrk="0" fontAlgn="base" latinLnBrk="0" hangingPunct="0">
+              <a:lnSpc>
+                <a:spcPct val="100000"/>
+              </a:lnSpc>
+              <a:spcBef>
+                <a:spcPct val="0"/>
+              </a:spcBef>
+              <a:spcAft>
+                <a:spcPct val="0"/>
+              </a:spcAft>
+              <a:buClrTx/>
+              <a:buSzTx/>
+              <a:buFontTx/>
+              <a:buNone/>
+              <a:tabLst/>
+            </a:pPr>
+            <a:r>
+              <a:rPr lang="en-US" sz="2400" b="0" dirty="0" smtClean="0">
+                <a:ea typeface="ＭＳ Ｐゴシック" charset="-128"/>
+              </a:rPr>
+              <a:t>writes</a:t>
+            </a:r>
+            <a:endParaRPr kumimoji="0" lang="en-US" sz="2400" b="0" i="0" u="none" strike="noStrike" cap="none" normalizeH="0" baseline="0" dirty="0" smtClean="0">
+              <a:ln>
+                <a:noFill/>
+              </a:ln>
+              <a:solidFill>
+                <a:schemeClr val="tx1"/>
+              </a:solidFill>
+              <a:effectLst/>
+              <a:latin typeface="Arial" charset="0"/>
+              <a:ea typeface="ＭＳ Ｐゴシック" charset="-128"/>
+            </a:endParaRPr>
+          </a:p>
+        </p:txBody>
+      </p:sp>
+      <p:sp>
+        <p:nvSpPr>
+          <p:cNvPr id="13" name="Right Arrow 12"/>
+          <p:cNvSpPr/>
+          <p:nvPr/>
+        </p:nvSpPr>
+        <p:spPr bwMode="auto">
+          <a:xfrm>
+            <a:off x="3724375" y="2780928"/>
+            <a:ext cx="1237158" cy="547094"/>
+          </a:xfrm>
+          <a:prstGeom prst="rightArrow">
+            <a:avLst/>
+          </a:prstGeom>
+          <a:solidFill>
+            <a:schemeClr val="accent1"/>
+          </a:solidFill>
+          <a:ln w="9525" cap="flat" cmpd="sng" algn="ctr">
+            <a:solidFill>
+              <a:schemeClr val="tx1"/>
+            </a:solidFill>
+            <a:prstDash val="solid"/>
+            <a:round/>
+            <a:headEnd type="none" w="med" len="med"/>
+            <a:tailEnd type="none" w="med" len="med"/>
+          </a:ln>
+          <a:effectLst/>
+        </p:spPr>
+        <p:txBody>
+          <a:bodyPr vert="horz" wrap="square" lIns="91440" tIns="45720" rIns="91440" bIns="45720" numCol="1" rtlCol="0" anchor="ctr" anchorCtr="0" compatLnSpc="1">
+            <a:prstTxWarp prst="textNoShape">
+              <a:avLst/>
+            </a:prstTxWarp>
+          </a:bodyPr>
+          <a:lstStyle/>
+          <a:p>
+            <a:pPr marL="0" marR="0" indent="0" defTabSz="914400" rtl="0" eaLnBrk="0" fontAlgn="base" latinLnBrk="0" hangingPunct="0">
+              <a:lnSpc>
+                <a:spcPct val="100000"/>
+              </a:lnSpc>
+              <a:spcBef>
+                <a:spcPct val="0"/>
+              </a:spcBef>
+              <a:spcAft>
+                <a:spcPct val="0"/>
+              </a:spcAft>
+              <a:buClrTx/>
+              <a:buSzTx/>
+              <a:buFontTx/>
+              <a:buNone/>
+              <a:tabLst/>
+            </a:pPr>
+            <a:endParaRPr kumimoji="0" lang="en-US" sz="2400" b="0" i="0" u="none" strike="noStrike" cap="none" normalizeH="0" baseline="0" dirty="0" smtClean="0">
+              <a:ln>
+                <a:noFill/>
+              </a:ln>
+              <a:solidFill>
+                <a:schemeClr val="tx1"/>
+              </a:solidFill>
+              <a:effectLst/>
+              <a:latin typeface="Arial" charset="0"/>
+              <a:ea typeface="ＭＳ Ｐゴシック" charset="-128"/>
+            </a:endParaRPr>
+          </a:p>
+        </p:txBody>
+      </p:sp>
+      <p:sp>
+        <p:nvSpPr>
+          <p:cNvPr id="16" name="Content Placeholder 2"/>
+          <p:cNvSpPr>
+            <a:spLocks noGrp="1"/>
+          </p:cNvSpPr>
+          <p:nvPr>
+            <p:ph idx="1"/>
+          </p:nvPr>
+        </p:nvSpPr>
+        <p:spPr>
+          <a:xfrm>
+            <a:off x="457200" y="3645024"/>
+            <a:ext cx="8229600" cy="2337123"/>
+          </a:xfrm>
+        </p:spPr>
+        <p:txBody>
+          <a:bodyPr/>
+          <a:lstStyle/>
+          <a:p>
+            <a:r>
+              <a:rPr lang="en-US" dirty="0" smtClean="0"/>
+              <a:t>Must constrain write order for recovery</a:t>
+            </a:r>
+          </a:p>
+          <a:p>
+            <a:r>
+              <a:rPr lang="en-US" dirty="0" smtClean="0"/>
+              <a:t>Cache eviction reorders writes to memory</a:t>
+            </a:r>
+          </a:p>
+          <a:p>
+            <a:r>
+              <a:rPr lang="en-US" dirty="0" smtClean="0"/>
+              <a:t>Enforcing program order writes incurs </a:t>
+            </a:r>
+            <a:r>
+              <a:rPr lang="en-US" b="1" dirty="0" smtClean="0">
+                <a:solidFill>
+                  <a:srgbClr val="FF0000"/>
+                </a:solidFill>
+              </a:rPr>
+              <a:t>30x</a:t>
+            </a:r>
+            <a:r>
+              <a:rPr lang="en-US" dirty="0" smtClean="0"/>
+              <a:t> slowdown over instruction execution rate.</a:t>
+            </a:r>
+          </a:p>
+        </p:txBody>
+      </p:sp>
+      <p:sp>
+        <p:nvSpPr>
+          <p:cNvPr id="17" name="TextBox 16"/>
+          <p:cNvSpPr txBox="1"/>
+          <p:nvPr/>
+        </p:nvSpPr>
+        <p:spPr>
+          <a:xfrm>
+            <a:off x="5714" y="5919663"/>
+            <a:ext cx="9132628" cy="461665"/>
+          </a:xfrm>
+          <a:prstGeom prst="rect">
+            <a:avLst/>
+          </a:prstGeom>
+          <a:noFill/>
+        </p:spPr>
+        <p:txBody>
+          <a:bodyPr wrap="none" rtlCol="0">
+            <a:spAutoFit/>
+          </a:bodyPr>
+          <a:lstStyle/>
+          <a:p>
+            <a:r>
+              <a:rPr lang="en-US" sz="2400" b="0" i="1" dirty="0" smtClean="0">
+                <a:solidFill>
+                  <a:srgbClr val="FF0909"/>
+                </a:solidFill>
+              </a:rPr>
+              <a:t>Must constrain writes for correctness, but reorder for performance</a:t>
+            </a:r>
+            <a:endParaRPr lang="en-US" sz="2400" b="0" i="1" dirty="0">
+              <a:solidFill>
+                <a:srgbClr val="FF0909"/>
+              </a:solidFill>
+            </a:endParaRPr>
+          </a:p>
+        </p:txBody>
+      </p:sp>
+    </p:spTree>
+    <p:extLst>
+      <p:ext uri="{BB962C8B-B14F-4D97-AF65-F5344CB8AC3E}">
+        <p14:creationId xmlns:p14="http://schemas.microsoft.com/office/powerpoint/2010/main" val="3248928663"/>
+      </p:ext>
+    </p:extLst>
+  </p:cSld>
+  <p:clrMapOvr>
+    <a:masterClrMapping/>
+  </p:clrMapOvr>
+  <p:timing>
+    <p:tnLst>
+      <p:par>
+        <p:cTn id="1" dur="indefinite" restart="never" nodeType="tmRoot">
+          <p:childTnLst>
+            <p:seq concurrent="1" nextAc="seek">
+              <p:cTn id="2" dur="indefinite" nodeType="mainSeq">
+                <p:childTnLst>
+                  <p:par>
+                    <p:cTn id="3" fill="hold">
+                      <p:stCondLst>
+                        <p:cond delay="indefinite"/>
+                      </p:stCondLst>
+                      <p:childTnLst>
+                        <p:par>
+                          <p:cTn id="4" fill="hold">
+                            <p:stCondLst>
+                              <p:cond delay="0"/>
+                            </p:stCondLst>
+                            <p:childTnLst>
+                              <p:par>
+                                <p:cTn id="5" presetID="1" presetClass="entr" presetSubtype="0" fill="hold" grpId="0" nodeType="clickEffect">
+                                  <p:stCondLst>
+                                    <p:cond delay="0"/>
+                                  </p:stCondLst>
+                                  <p:childTnLst>
+                                    <p:set>
+                                      <p:cBhvr>
+                                        <p:cTn id="6" dur="1" fill="hold">
+                                          <p:stCondLst>
+                                            <p:cond delay="0"/>
+                                          </p:stCondLst>
+                                        </p:cTn>
+                                        <p:tgtEl>
+                                          <p:spTgt spid="17"/>
+                                        </p:tgtEl>
+                                        <p:attrNameLst>
+                                          <p:attrName>style.visibility</p:attrName>
+                                        </p:attrNameLst>
+                                      </p:cBhvr>
+                                      <p:to>
+                                        <p:strVal val="visible"/>
+                                      </p:to>
+                                    </p:set>
+                                  </p:childTnLst>
+                                </p:cTn>
+                              </p:par>
+                            </p:childTnLst>
+                          </p:cTn>
+                        </p:par>
+                      </p:childTnLst>
+                    </p:cTn>
+                  </p:par>
+                </p:childTnLst>
+              </p:cTn>
+              <p:prevCondLst>
+                <p:cond evt="onPrev" delay="0">
+                  <p:tgtEl>
+                    <p:sldTgt/>
+                  </p:tgtEl>
+                </p:cond>
+              </p:prevCondLst>
+              <p:nextCondLst>
+                <p:cond evt="onNext" delay="0">
+                  <p:tgtEl>
+                    <p:sldTgt/>
+                  </p:tgtEl>
+                </p:cond>
+              </p:nextCondLst>
+            </p:seq>
+          </p:childTnLst>
+        </p:cTn>
+      </p:par>
+    </p:tnLst>
+    <p:bldLst>
+      <p:bldP spid="17" grpId="0"/>
+    </p:bldLst>
+  </p:timing>
+</p:sld>
+</file>
+
+<file path=ppt/slides/slide30.xml><?xml version="1.0" encoding="utf-8"?>
 <p:sld xmlns:a="http://schemas.openxmlformats.org/drawingml/2006/main" xmlns:r="http://schemas.openxmlformats.org/officeDocument/2006/relationships" xmlns:p="http://schemas.openxmlformats.org/presentationml/2006/main">
   <p:cSld>
     <p:spTree>
@@ -27587,7 +27910,7 @@
             <a:fld id="{24EAD923-3004-4A31-84C7-9B440B785588}" type="slidenum">
               <a:rPr lang="en-US" smtClean="0"/>
               <a:pPr/>
-              <a:t>31</a:t>
+              <a:t>30</a:t>
             </a:fld>
             <a:endParaRPr lang="en-US" dirty="0"/>
           </a:p>
@@ -29657,6 +29980,141 @@
 </p:sld>
 </file>
 
+<file path=ppt/slides/slide31.xml><?xml version="1.0" encoding="utf-8"?>
+<p:sld xmlns:a="http://schemas.openxmlformats.org/drawingml/2006/main" xmlns:r="http://schemas.openxmlformats.org/officeDocument/2006/relationships" xmlns:p="http://schemas.openxmlformats.org/presentationml/2006/main">
+  <p:cSld>
+    <p:spTree>
+      <p:nvGrpSpPr>
+        <p:cNvPr id="1" name=""/>
+        <p:cNvGrpSpPr/>
+        <p:nvPr/>
+      </p:nvGrpSpPr>
+      <p:grpSpPr>
+        <a:xfrm>
+          <a:off x="0" y="0"/>
+          <a:ext cx="0" cy="0"/>
+          <a:chOff x="0" y="0"/>
+          <a:chExt cx="0" cy="0"/>
+        </a:xfrm>
+      </p:grpSpPr>
+      <p:sp>
+        <p:nvSpPr>
+          <p:cNvPr id="2" name="Title 1"/>
+          <p:cNvSpPr>
+            <a:spLocks noGrp="1"/>
+          </p:cNvSpPr>
+          <p:nvPr>
+            <p:ph type="title"/>
+          </p:nvPr>
+        </p:nvSpPr>
+        <p:spPr/>
+        <p:txBody>
+          <a:bodyPr/>
+          <a:lstStyle/>
+          <a:p>
+            <a:r>
+              <a:rPr lang="en-US" dirty="0" smtClean="0"/>
+              <a:t>Epoch persistency implementation</a:t>
+            </a:r>
+            <a:endParaRPr lang="en-US" dirty="0"/>
+          </a:p>
+        </p:txBody>
+      </p:sp>
+      <p:sp>
+        <p:nvSpPr>
+          <p:cNvPr id="3" name="Content Placeholder 2"/>
+          <p:cNvSpPr>
+            <a:spLocks noGrp="1"/>
+          </p:cNvSpPr>
+          <p:nvPr>
+            <p:ph idx="1"/>
+          </p:nvPr>
+        </p:nvSpPr>
+        <p:spPr/>
+        <p:txBody>
+          <a:bodyPr/>
+          <a:lstStyle/>
+          <a:p>
+            <a:r>
+              <a:rPr lang="en-US" dirty="0" smtClean="0"/>
+              <a:t>Similar to BPFS (see paper/dissertation)</a:t>
+            </a:r>
+          </a:p>
+          <a:p>
+            <a:r>
+              <a:rPr lang="en-US" dirty="0" smtClean="0"/>
+              <a:t>Queue persists from each thread, record persist barriers, only enforce order at barriers</a:t>
+            </a:r>
+          </a:p>
+          <a:p>
+            <a:r>
+              <a:rPr lang="en-US" dirty="0" smtClean="0"/>
+              <a:t>Persistent </a:t>
+            </a:r>
+            <a:r>
+              <a:rPr lang="en-US" dirty="0" err="1" smtClean="0"/>
+              <a:t>BulkSC</a:t>
+            </a:r>
+            <a:r>
+              <a:rPr lang="en-US" dirty="0" smtClean="0"/>
+              <a:t> (transactions)</a:t>
+            </a:r>
+            <a:endParaRPr lang="en-US" dirty="0"/>
+          </a:p>
+          <a:p>
+            <a:pPr lvl="1"/>
+            <a:r>
+              <a:rPr lang="en-US" dirty="0" smtClean="0"/>
+              <a:t>Use persist barrier knowledge to optimize persistent transactions and intelligently place transaction boundaries</a:t>
+            </a:r>
+            <a:endParaRPr lang="en-US" dirty="0"/>
+          </a:p>
+        </p:txBody>
+      </p:sp>
+      <p:sp>
+        <p:nvSpPr>
+          <p:cNvPr id="4" name="Slide Number Placeholder 3"/>
+          <p:cNvSpPr>
+            <a:spLocks noGrp="1"/>
+          </p:cNvSpPr>
+          <p:nvPr>
+            <p:ph type="sldNum" sz="quarter" idx="4"/>
+          </p:nvPr>
+        </p:nvSpPr>
+        <p:spPr/>
+        <p:txBody>
+          <a:bodyPr/>
+          <a:lstStyle/>
+          <a:p>
+            <a:fld id="{24EAD923-3004-4A31-84C7-9B440B785588}" type="slidenum">
+              <a:rPr lang="en-US" smtClean="0"/>
+              <a:pPr/>
+              <a:t>31</a:t>
+            </a:fld>
+            <a:endParaRPr lang="en-US" dirty="0"/>
+          </a:p>
+        </p:txBody>
+      </p:sp>
+    </p:spTree>
+    <p:extLst>
+      <p:ext uri="{BB962C8B-B14F-4D97-AF65-F5344CB8AC3E}">
+        <p14:creationId xmlns:p14="http://schemas.microsoft.com/office/powerpoint/2010/main" val="211024748"/>
+      </p:ext>
+    </p:extLst>
+  </p:cSld>
+  <p:clrMapOvr>
+    <a:masterClrMapping/>
+  </p:clrMapOvr>
+  <p:timing>
+    <p:tnLst>
+      <p:par>
+        <p:cTn id="1" dur="indefinite" restart="never" nodeType="tmRoot"/>
+      </p:par>
+    </p:tnLst>
+  </p:timing>
+</p:sld>
+</file>
+
 <file path=ppt/slides/slide32.xml><?xml version="1.0" encoding="utf-8"?>
 <p:sld xmlns:a="http://schemas.openxmlformats.org/drawingml/2006/main" xmlns:r="http://schemas.openxmlformats.org/officeDocument/2006/relationships" xmlns:p="http://schemas.openxmlformats.org/presentationml/2006/main">
   <p:cSld>
@@ -29691,7 +30149,7 @@
           <a:p>
             <a:r>
               <a:rPr lang="en-US" dirty="0" smtClean="0"/>
-              <a:t>Epoch persistency implementation</a:t>
+              <a:t>Strand persistency</a:t>
             </a:r>
             <a:endParaRPr lang="en-US" dirty="0"/>
           </a:p>
@@ -29714,35 +30172,65 @@
           <a:p>
             <a:r>
               <a:rPr lang="en-US" dirty="0" smtClean="0"/>
-              <a:t>Similar to BPFS (see paper/dissertation)</a:t>
+              <a:t>Motivation: epochs only allow adjacent persists on same thread or persists in racing epochs to be labeled concurrent</a:t>
             </a:r>
           </a:p>
           <a:p>
             <a:r>
               <a:rPr lang="en-US" dirty="0" smtClean="0"/>
-              <a:t>Queue persists from each thread, record persist barriers, only enforce order at barriers</a:t>
-            </a:r>
-          </a:p>
-          <a:p>
+              <a:t>Divide execution into </a:t>
+            </a:r>
+            <a:r>
+              <a:rPr lang="en-US" i="1" dirty="0" smtClean="0"/>
+              <a:t>strands</a:t>
+            </a:r>
+            <a:endParaRPr lang="en-US" dirty="0" smtClean="0"/>
+          </a:p>
+          <a:p>
+            <a:pPr lvl="1"/>
+            <a:r>
+              <a:rPr lang="en-US" i="1" dirty="0" err="1" smtClean="0"/>
+              <a:t>NewStrand</a:t>
+            </a:r>
             <a:r>
               <a:rPr lang="en-US" dirty="0" smtClean="0"/>
-              <a:t>Persistent </a:t>
-            </a:r>
+              <a:t> begins a strand</a:t>
+            </a:r>
+          </a:p>
+          <a:p>
+            <a:pPr lvl="1"/>
+            <a:r>
+              <a:rPr lang="en-US" dirty="0" smtClean="0"/>
+              <a:t>Strands execute in order on a thread, but from perspective of persistency are independent.</a:t>
+            </a:r>
+          </a:p>
+          <a:p>
+            <a:pPr lvl="1"/>
             <a:r>
               <a:rPr lang="en-US" dirty="0" err="1" smtClean="0"/>
-              <a:t>BulkSC</a:t>
+              <a:t>Equiv</a:t>
             </a:r>
             <a:r>
               <a:rPr lang="en-US" dirty="0" smtClean="0"/>
-              <a:t> (transactions)</a:t>
-            </a:r>
-            <a:endParaRPr lang="en-US" dirty="0"/>
+              <a:t>: a new strand </a:t>
+            </a:r>
+            <a:r>
+              <a:rPr lang="en-US" i="1" dirty="0" smtClean="0"/>
+              <a:t>clears persist dependences</a:t>
+            </a:r>
+            <a:endParaRPr lang="en-US" dirty="0" smtClean="0"/>
           </a:p>
           <a:p>
             <a:pPr lvl="1"/>
             <a:r>
               <a:rPr lang="en-US" dirty="0" smtClean="0"/>
-              <a:t>Use persist barrier knowledge to optimize persistent transactions and intelligently place transaction boundaries</a:t>
+              <a:t>Races/conflicts introduce order between strands</a:t>
+            </a:r>
+          </a:p>
+          <a:p>
+            <a:r>
+              <a:rPr lang="en-US" dirty="0" smtClean="0"/>
+              <a:t>Epoch pers. orders persists within strands</a:t>
             </a:r>
             <a:endParaRPr lang="en-US" dirty="0"/>
           </a:p>
@@ -29775,7 +30263,7 @@
     </p:spTree>
     <p:extLst>
       <p:ext uri="{BB962C8B-B14F-4D97-AF65-F5344CB8AC3E}">
-        <p14:creationId xmlns:p14="http://schemas.microsoft.com/office/powerpoint/2010/main" val="211024748"/>
+        <p14:creationId xmlns:p14="http://schemas.microsoft.com/office/powerpoint/2010/main" val="762893566"/>
       </p:ext>
     </p:extLst>
   </p:cSld>
@@ -29826,88 +30314,7 @@
           <a:p>
             <a:r>
               <a:rPr lang="en-US" dirty="0" smtClean="0"/>
-              <a:t>Strand persistency</a:t>
-            </a:r>
-            <a:endParaRPr lang="en-US" dirty="0"/>
-          </a:p>
-        </p:txBody>
-      </p:sp>
-      <p:sp>
-        <p:nvSpPr>
-          <p:cNvPr id="3" name="Content Placeholder 2"/>
-          <p:cNvSpPr>
-            <a:spLocks noGrp="1"/>
-          </p:cNvSpPr>
-          <p:nvPr>
-            <p:ph idx="1"/>
-          </p:nvPr>
-        </p:nvSpPr>
-        <p:spPr/>
-        <p:txBody>
-          <a:bodyPr/>
-          <a:lstStyle/>
-          <a:p>
-            <a:r>
-              <a:rPr lang="en-US" dirty="0" smtClean="0"/>
-              <a:t>Motivation: epochs only allow adjacent persists on same thread or persists in racing epochs to be labeled concurrent</a:t>
-            </a:r>
-          </a:p>
-          <a:p>
-            <a:r>
-              <a:rPr lang="en-US" dirty="0" smtClean="0"/>
-              <a:t>Divide execution into </a:t>
-            </a:r>
-            <a:r>
-              <a:rPr lang="en-US" i="1" dirty="0" smtClean="0"/>
-              <a:t>strands</a:t>
-            </a:r>
-            <a:endParaRPr lang="en-US" dirty="0" smtClean="0"/>
-          </a:p>
-          <a:p>
-            <a:pPr lvl="1"/>
-            <a:r>
-              <a:rPr lang="en-US" i="1" dirty="0" err="1" smtClean="0"/>
-              <a:t>NewStrand</a:t>
-            </a:r>
-            <a:r>
-              <a:rPr lang="en-US" dirty="0" smtClean="0"/>
-              <a:t> begins a strand</a:t>
-            </a:r>
-          </a:p>
-          <a:p>
-            <a:pPr lvl="1"/>
-            <a:r>
-              <a:rPr lang="en-US" dirty="0" smtClean="0"/>
-              <a:t>Strands execute in order on a thread, but from perspective of persistency are independent.</a:t>
-            </a:r>
-          </a:p>
-          <a:p>
-            <a:pPr lvl="1"/>
-            <a:r>
-              <a:rPr lang="en-US" dirty="0" err="1" smtClean="0"/>
-              <a:t>Equiv</a:t>
-            </a:r>
-            <a:r>
-              <a:rPr lang="en-US" dirty="0" smtClean="0"/>
-              <a:t>: a new strand </a:t>
-            </a:r>
-            <a:r>
-              <a:rPr lang="en-US" i="1" dirty="0" smtClean="0"/>
-              <a:t>clears persist dependences</a:t>
-            </a:r>
-            <a:endParaRPr lang="en-US" dirty="0" smtClean="0"/>
-          </a:p>
-          <a:p>
-            <a:pPr lvl="1"/>
-            <a:r>
-              <a:rPr lang="en-US" dirty="0" smtClean="0"/>
-              <a:t>Races/conflicts introduce order between strands</a:t>
-            </a:r>
-          </a:p>
-          <a:p>
-            <a:r>
-              <a:rPr lang="en-US" dirty="0" smtClean="0"/>
-              <a:t>Epoch pers. orders persists within strands</a:t>
+              <a:t>Strand examples</a:t>
             </a:r>
             <a:endParaRPr lang="en-US" dirty="0"/>
           </a:p>
@@ -29937,10 +30344,831 @@
           </a:p>
         </p:txBody>
       </p:sp>
+      <p:sp>
+        <p:nvSpPr>
+          <p:cNvPr id="5" name="TextBox 4"/>
+          <p:cNvSpPr txBox="1"/>
+          <p:nvPr/>
+        </p:nvSpPr>
+        <p:spPr>
+          <a:xfrm>
+            <a:off x="1234506" y="5919663"/>
+            <a:ext cx="6675225" cy="461665"/>
+          </a:xfrm>
+          <a:prstGeom prst="rect">
+            <a:avLst/>
+          </a:prstGeom>
+          <a:noFill/>
+        </p:spPr>
+        <p:txBody>
+          <a:bodyPr wrap="none" rtlCol="0">
+            <a:spAutoFit/>
+          </a:bodyPr>
+          <a:lstStyle/>
+          <a:p>
+            <a:r>
+              <a:rPr lang="en-US" sz="2400" b="0" i="1" dirty="0" smtClean="0">
+                <a:solidFill>
+                  <a:srgbClr val="FF0909"/>
+                </a:solidFill>
+              </a:rPr>
+              <a:t>Strands </a:t>
+            </a:r>
+            <a:r>
+              <a:rPr lang="en-US" sz="2400" b="0" i="1" dirty="0" smtClean="0">
+                <a:solidFill>
+                  <a:srgbClr val="FF0909"/>
+                </a:solidFill>
+              </a:rPr>
+              <a:t>allow precise persist constraint labeling</a:t>
+            </a:r>
+            <a:endParaRPr lang="en-US" sz="2400" b="0" i="1" dirty="0">
+              <a:solidFill>
+                <a:srgbClr val="FF0909"/>
+              </a:solidFill>
+            </a:endParaRPr>
+          </a:p>
+        </p:txBody>
+      </p:sp>
+      <p:sp>
+        <p:nvSpPr>
+          <p:cNvPr id="6" name="Rectangle 5"/>
+          <p:cNvSpPr/>
+          <p:nvPr/>
+        </p:nvSpPr>
+        <p:spPr bwMode="auto">
+          <a:xfrm>
+            <a:off x="856464" y="2316324"/>
+            <a:ext cx="756084" cy="756084"/>
+          </a:xfrm>
+          <a:prstGeom prst="rect">
+            <a:avLst/>
+          </a:prstGeom>
+          <a:solidFill>
+            <a:schemeClr val="accent1"/>
+          </a:solidFill>
+          <a:ln w="9525" cap="flat" cmpd="sng" algn="ctr">
+            <a:solidFill>
+              <a:schemeClr val="tx1"/>
+            </a:solidFill>
+            <a:prstDash val="solid"/>
+            <a:round/>
+            <a:headEnd type="none" w="med" len="med"/>
+            <a:tailEnd type="none" w="med" len="med"/>
+          </a:ln>
+          <a:effectLst/>
+        </p:spPr>
+        <p:txBody>
+          <a:bodyPr vert="horz" wrap="square" lIns="91440" tIns="45720" rIns="91440" bIns="45720" numCol="1" rtlCol="0" anchor="ctr" anchorCtr="0" compatLnSpc="1">
+            <a:prstTxWarp prst="textNoShape">
+              <a:avLst/>
+            </a:prstTxWarp>
+          </a:bodyPr>
+          <a:lstStyle/>
+          <a:p>
+            <a:pPr marL="0" marR="0" indent="0" defTabSz="914400" rtl="0" eaLnBrk="0" fontAlgn="base" latinLnBrk="0" hangingPunct="0">
+              <a:lnSpc>
+                <a:spcPct val="100000"/>
+              </a:lnSpc>
+              <a:spcBef>
+                <a:spcPct val="0"/>
+              </a:spcBef>
+              <a:spcAft>
+                <a:spcPct val="0"/>
+              </a:spcAft>
+              <a:buClrTx/>
+              <a:buSzTx/>
+              <a:buFontTx/>
+              <a:buNone/>
+              <a:tabLst/>
+            </a:pPr>
+            <a:r>
+              <a:rPr kumimoji="0" lang="en-US" sz="2400" b="0" i="0" u="none" strike="noStrike" cap="none" normalizeH="0" baseline="0" dirty="0" smtClean="0">
+                <a:ln>
+                  <a:noFill/>
+                </a:ln>
+                <a:solidFill>
+                  <a:schemeClr val="tx1"/>
+                </a:solidFill>
+                <a:effectLst/>
+                <a:latin typeface="Arial" charset="0"/>
+                <a:ea typeface="ＭＳ Ｐゴシック" charset="-128"/>
+              </a:rPr>
+              <a:t>A</a:t>
+            </a:r>
+            <a:endParaRPr kumimoji="0" lang="en-US" sz="2400" b="0" i="0" u="none" strike="noStrike" cap="none" normalizeH="0" baseline="0" dirty="0" smtClean="0">
+              <a:ln>
+                <a:noFill/>
+              </a:ln>
+              <a:solidFill>
+                <a:schemeClr val="tx1"/>
+              </a:solidFill>
+              <a:effectLst/>
+              <a:latin typeface="Arial" charset="0"/>
+              <a:ea typeface="ＭＳ Ｐゴシック" charset="-128"/>
+            </a:endParaRPr>
+          </a:p>
+        </p:txBody>
+      </p:sp>
+      <p:sp>
+        <p:nvSpPr>
+          <p:cNvPr id="7" name="Rectangle 6"/>
+          <p:cNvSpPr/>
+          <p:nvPr/>
+        </p:nvSpPr>
+        <p:spPr bwMode="auto">
+          <a:xfrm>
+            <a:off x="2015716" y="2316324"/>
+            <a:ext cx="756084" cy="756084"/>
+          </a:xfrm>
+          <a:prstGeom prst="rect">
+            <a:avLst/>
+          </a:prstGeom>
+          <a:solidFill>
+            <a:schemeClr val="accent1"/>
+          </a:solidFill>
+          <a:ln w="9525" cap="flat" cmpd="sng" algn="ctr">
+            <a:solidFill>
+              <a:schemeClr val="tx1"/>
+            </a:solidFill>
+            <a:prstDash val="solid"/>
+            <a:round/>
+            <a:headEnd type="none" w="med" len="med"/>
+            <a:tailEnd type="none" w="med" len="med"/>
+          </a:ln>
+          <a:effectLst/>
+        </p:spPr>
+        <p:txBody>
+          <a:bodyPr vert="horz" wrap="square" lIns="91440" tIns="45720" rIns="91440" bIns="45720" numCol="1" rtlCol="0" anchor="ctr" anchorCtr="0" compatLnSpc="1">
+            <a:prstTxWarp prst="textNoShape">
+              <a:avLst/>
+            </a:prstTxWarp>
+          </a:bodyPr>
+          <a:lstStyle/>
+          <a:p>
+            <a:pPr marL="0" marR="0" indent="0" defTabSz="914400" rtl="0" eaLnBrk="0" fontAlgn="base" latinLnBrk="0" hangingPunct="0">
+              <a:lnSpc>
+                <a:spcPct val="100000"/>
+              </a:lnSpc>
+              <a:spcBef>
+                <a:spcPct val="0"/>
+              </a:spcBef>
+              <a:spcAft>
+                <a:spcPct val="0"/>
+              </a:spcAft>
+              <a:buClrTx/>
+              <a:buSzTx/>
+              <a:buFontTx/>
+              <a:buNone/>
+              <a:tabLst/>
+            </a:pPr>
+            <a:r>
+              <a:rPr lang="en-US" sz="2400" b="0" dirty="0">
+                <a:ea typeface="ＭＳ Ｐゴシック" charset="-128"/>
+              </a:rPr>
+              <a:t>B</a:t>
+            </a:r>
+            <a:endParaRPr kumimoji="0" lang="en-US" sz="2400" b="0" i="0" u="none" strike="noStrike" cap="none" normalizeH="0" baseline="0" dirty="0" smtClean="0">
+              <a:ln>
+                <a:noFill/>
+              </a:ln>
+              <a:solidFill>
+                <a:schemeClr val="tx1"/>
+              </a:solidFill>
+              <a:effectLst/>
+              <a:latin typeface="Arial" charset="0"/>
+              <a:ea typeface="ＭＳ Ｐゴシック" charset="-128"/>
+            </a:endParaRPr>
+          </a:p>
+        </p:txBody>
+      </p:sp>
+      <p:sp>
+        <p:nvSpPr>
+          <p:cNvPr id="8" name="Rectangle 7"/>
+          <p:cNvSpPr/>
+          <p:nvPr/>
+        </p:nvSpPr>
+        <p:spPr bwMode="auto">
+          <a:xfrm>
+            <a:off x="856464" y="3655857"/>
+            <a:ext cx="756084" cy="756084"/>
+          </a:xfrm>
+          <a:prstGeom prst="rect">
+            <a:avLst/>
+          </a:prstGeom>
+          <a:solidFill>
+            <a:schemeClr val="accent1"/>
+          </a:solidFill>
+          <a:ln w="9525" cap="flat" cmpd="sng" algn="ctr">
+            <a:solidFill>
+              <a:schemeClr val="tx1"/>
+            </a:solidFill>
+            <a:prstDash val="solid"/>
+            <a:round/>
+            <a:headEnd type="none" w="med" len="med"/>
+            <a:tailEnd type="none" w="med" len="med"/>
+          </a:ln>
+          <a:effectLst/>
+        </p:spPr>
+        <p:txBody>
+          <a:bodyPr vert="horz" wrap="square" lIns="91440" tIns="45720" rIns="91440" bIns="45720" numCol="1" rtlCol="0" anchor="ctr" anchorCtr="0" compatLnSpc="1">
+            <a:prstTxWarp prst="textNoShape">
+              <a:avLst/>
+            </a:prstTxWarp>
+          </a:bodyPr>
+          <a:lstStyle/>
+          <a:p>
+            <a:pPr marL="0" marR="0" indent="0" defTabSz="914400" rtl="0" eaLnBrk="0" fontAlgn="base" latinLnBrk="0" hangingPunct="0">
+              <a:lnSpc>
+                <a:spcPct val="100000"/>
+              </a:lnSpc>
+              <a:spcBef>
+                <a:spcPct val="0"/>
+              </a:spcBef>
+              <a:spcAft>
+                <a:spcPct val="0"/>
+              </a:spcAft>
+              <a:buClrTx/>
+              <a:buSzTx/>
+              <a:buFontTx/>
+              <a:buNone/>
+              <a:tabLst/>
+            </a:pPr>
+            <a:r>
+              <a:rPr lang="en-US" sz="2400" b="0" dirty="0">
+                <a:ea typeface="ＭＳ Ｐゴシック" charset="-128"/>
+              </a:rPr>
+              <a:t>C</a:t>
+            </a:r>
+            <a:endParaRPr kumimoji="0" lang="en-US" sz="2400" b="0" i="0" u="none" strike="noStrike" cap="none" normalizeH="0" baseline="0" dirty="0" smtClean="0">
+              <a:ln>
+                <a:noFill/>
+              </a:ln>
+              <a:solidFill>
+                <a:schemeClr val="tx1"/>
+              </a:solidFill>
+              <a:effectLst/>
+              <a:latin typeface="Arial" charset="0"/>
+              <a:ea typeface="ＭＳ Ｐゴシック" charset="-128"/>
+            </a:endParaRPr>
+          </a:p>
+        </p:txBody>
+      </p:sp>
+      <p:sp>
+        <p:nvSpPr>
+          <p:cNvPr id="9" name="TextBox 8"/>
+          <p:cNvSpPr txBox="1"/>
+          <p:nvPr/>
+        </p:nvSpPr>
+        <p:spPr>
+          <a:xfrm rot="16200000">
+            <a:off x="1396980" y="1494902"/>
+            <a:ext cx="526105" cy="584775"/>
+          </a:xfrm>
+          <a:prstGeom prst="rect">
+            <a:avLst/>
+          </a:prstGeom>
+          <a:noFill/>
+        </p:spPr>
+        <p:txBody>
+          <a:bodyPr wrap="none" rtlCol="0">
+            <a:spAutoFit/>
+          </a:bodyPr>
+          <a:lstStyle/>
+          <a:p>
+            <a:r>
+              <a:rPr lang="en-US" sz="3200" dirty="0" smtClean="0"/>
+              <a:t>...</a:t>
+            </a:r>
+            <a:endParaRPr lang="en-US" sz="3200" dirty="0"/>
+          </a:p>
+        </p:txBody>
+      </p:sp>
+      <p:sp>
+        <p:nvSpPr>
+          <p:cNvPr id="12" name="Right Arrow 11"/>
+          <p:cNvSpPr/>
+          <p:nvPr/>
+        </p:nvSpPr>
+        <p:spPr bwMode="auto">
+          <a:xfrm rot="5400000">
+            <a:off x="994109" y="3242313"/>
+            <a:ext cx="512568" cy="242635"/>
+          </a:xfrm>
+          <a:prstGeom prst="rightArrow">
+            <a:avLst/>
+          </a:prstGeom>
+          <a:solidFill>
+            <a:schemeClr val="tx1"/>
+          </a:solidFill>
+          <a:ln w="9525" cap="flat" cmpd="sng" algn="ctr">
+            <a:solidFill>
+              <a:schemeClr val="tx1"/>
+            </a:solidFill>
+            <a:prstDash val="solid"/>
+            <a:round/>
+            <a:headEnd type="none" w="med" len="med"/>
+            <a:tailEnd type="none" w="med" len="med"/>
+          </a:ln>
+          <a:effectLst/>
+        </p:spPr>
+        <p:txBody>
+          <a:bodyPr vert="horz" wrap="square" lIns="91440" tIns="45720" rIns="91440" bIns="45720" numCol="1" rtlCol="0" anchor="t" anchorCtr="0" compatLnSpc="1">
+            <a:prstTxWarp prst="textNoShape">
+              <a:avLst/>
+            </a:prstTxWarp>
+          </a:bodyPr>
+          <a:lstStyle/>
+          <a:p>
+            <a:pPr marL="0" marR="0" indent="0" algn="l" defTabSz="914400" rtl="0" eaLnBrk="0" fontAlgn="base" latinLnBrk="0" hangingPunct="0">
+              <a:lnSpc>
+                <a:spcPct val="100000"/>
+              </a:lnSpc>
+              <a:spcBef>
+                <a:spcPct val="0"/>
+              </a:spcBef>
+              <a:spcAft>
+                <a:spcPct val="0"/>
+              </a:spcAft>
+              <a:buClrTx/>
+              <a:buSzTx/>
+              <a:buFontTx/>
+              <a:buNone/>
+              <a:tabLst/>
+            </a:pPr>
+            <a:endParaRPr kumimoji="0" lang="en-US" sz="2400" b="0" i="0" u="none" strike="noStrike" cap="none" normalizeH="0" baseline="0" smtClean="0">
+              <a:ln>
+                <a:noFill/>
+              </a:ln>
+              <a:solidFill>
+                <a:schemeClr val="tx1"/>
+              </a:solidFill>
+              <a:effectLst/>
+              <a:latin typeface="Arial" charset="0"/>
+              <a:ea typeface="ＭＳ Ｐゴシック" charset="-128"/>
+            </a:endParaRPr>
+          </a:p>
+        </p:txBody>
+      </p:sp>
+      <p:sp>
+        <p:nvSpPr>
+          <p:cNvPr id="13" name="TextBox 12"/>
+          <p:cNvSpPr txBox="1"/>
+          <p:nvPr/>
+        </p:nvSpPr>
+        <p:spPr>
+          <a:xfrm>
+            <a:off x="4141922" y="1812268"/>
+            <a:ext cx="970138" cy="400110"/>
+          </a:xfrm>
+          <a:prstGeom prst="rect">
+            <a:avLst/>
+          </a:prstGeom>
+          <a:noFill/>
+        </p:spPr>
+        <p:txBody>
+          <a:bodyPr wrap="none" rtlCol="0">
+            <a:spAutoFit/>
+          </a:bodyPr>
+          <a:lstStyle/>
+          <a:p>
+            <a:r>
+              <a:rPr lang="en-US" dirty="0" smtClean="0"/>
+              <a:t>Epoch</a:t>
+            </a:r>
+            <a:endParaRPr lang="en-US" dirty="0"/>
+          </a:p>
+        </p:txBody>
+      </p:sp>
+      <p:sp>
+        <p:nvSpPr>
+          <p:cNvPr id="14" name="TextBox 13"/>
+          <p:cNvSpPr txBox="1"/>
+          <p:nvPr/>
+        </p:nvSpPr>
+        <p:spPr>
+          <a:xfrm>
+            <a:off x="3437873" y="2460340"/>
+            <a:ext cx="954107" cy="1323439"/>
+          </a:xfrm>
+          <a:prstGeom prst="rect">
+            <a:avLst/>
+          </a:prstGeom>
+          <a:noFill/>
+        </p:spPr>
+        <p:txBody>
+          <a:bodyPr wrap="none" rtlCol="0">
+            <a:spAutoFit/>
+          </a:bodyPr>
+          <a:lstStyle/>
+          <a:p>
+            <a:pPr algn="l"/>
+            <a:r>
+              <a:rPr lang="en-US" b="0" dirty="0" smtClean="0"/>
+              <a:t>A</a:t>
+            </a:r>
+          </a:p>
+          <a:p>
+            <a:pPr algn="l"/>
+            <a:r>
+              <a:rPr lang="en-US" b="0" i="1" dirty="0" smtClean="0"/>
+              <a:t>Barrier</a:t>
+            </a:r>
+          </a:p>
+          <a:p>
+            <a:pPr algn="l"/>
+            <a:r>
+              <a:rPr lang="en-US" b="0" dirty="0" smtClean="0"/>
+              <a:t>B</a:t>
+            </a:r>
+          </a:p>
+          <a:p>
+            <a:pPr algn="l"/>
+            <a:r>
+              <a:rPr lang="en-US" b="0" dirty="0"/>
+              <a:t>C</a:t>
+            </a:r>
+          </a:p>
+        </p:txBody>
+      </p:sp>
+      <p:sp>
+        <p:nvSpPr>
+          <p:cNvPr id="15" name="TextBox 14"/>
+          <p:cNvSpPr txBox="1"/>
+          <p:nvPr/>
+        </p:nvSpPr>
+        <p:spPr>
+          <a:xfrm>
+            <a:off x="4986045" y="2444807"/>
+            <a:ext cx="954107" cy="1323439"/>
+          </a:xfrm>
+          <a:prstGeom prst="rect">
+            <a:avLst/>
+          </a:prstGeom>
+          <a:noFill/>
+        </p:spPr>
+        <p:txBody>
+          <a:bodyPr wrap="none" rtlCol="0">
+            <a:spAutoFit/>
+          </a:bodyPr>
+          <a:lstStyle/>
+          <a:p>
+            <a:pPr algn="l"/>
+            <a:r>
+              <a:rPr lang="en-US" b="0" dirty="0" smtClean="0"/>
+              <a:t>A</a:t>
+            </a:r>
+          </a:p>
+          <a:p>
+            <a:pPr algn="l"/>
+            <a:r>
+              <a:rPr lang="en-US" b="0" dirty="0"/>
+              <a:t>B</a:t>
+            </a:r>
+            <a:endParaRPr lang="en-US" b="0" dirty="0" smtClean="0"/>
+          </a:p>
+          <a:p>
+            <a:pPr algn="l"/>
+            <a:r>
+              <a:rPr lang="en-US" b="0" i="1" dirty="0" smtClean="0"/>
+              <a:t>Barrier</a:t>
+            </a:r>
+          </a:p>
+          <a:p>
+            <a:pPr algn="l"/>
+            <a:r>
+              <a:rPr lang="en-US" b="0" dirty="0"/>
+              <a:t>C</a:t>
+            </a:r>
+          </a:p>
+        </p:txBody>
+      </p:sp>
+      <p:sp>
+        <p:nvSpPr>
+          <p:cNvPr id="16" name="TextBox 15"/>
+          <p:cNvSpPr txBox="1"/>
+          <p:nvPr/>
+        </p:nvSpPr>
+        <p:spPr>
+          <a:xfrm>
+            <a:off x="3095836" y="4260540"/>
+            <a:ext cx="3204356" cy="707886"/>
+          </a:xfrm>
+          <a:prstGeom prst="rect">
+            <a:avLst/>
+          </a:prstGeom>
+          <a:noFill/>
+        </p:spPr>
+        <p:txBody>
+          <a:bodyPr wrap="square" rtlCol="0">
+            <a:spAutoFit/>
+          </a:bodyPr>
+          <a:lstStyle/>
+          <a:p>
+            <a:pPr algn="l"/>
+            <a:r>
+              <a:rPr lang="en-US" b="0" dirty="0" smtClean="0"/>
+              <a:t>Extra constraint introduced between B and C</a:t>
+            </a:r>
+            <a:endParaRPr lang="en-US" b="0" dirty="0"/>
+          </a:p>
+        </p:txBody>
+      </p:sp>
+      <p:sp>
+        <p:nvSpPr>
+          <p:cNvPr id="17" name="TextBox 16"/>
+          <p:cNvSpPr txBox="1"/>
+          <p:nvPr/>
+        </p:nvSpPr>
+        <p:spPr>
+          <a:xfrm>
+            <a:off x="4375732" y="2964396"/>
+            <a:ext cx="412292" cy="400110"/>
+          </a:xfrm>
+          <a:prstGeom prst="rect">
+            <a:avLst/>
+          </a:prstGeom>
+          <a:noFill/>
+        </p:spPr>
+        <p:txBody>
+          <a:bodyPr wrap="none" rtlCol="0">
+            <a:spAutoFit/>
+          </a:bodyPr>
+          <a:lstStyle/>
+          <a:p>
+            <a:r>
+              <a:rPr lang="en-US" b="0" dirty="0" smtClean="0"/>
+              <a:t>or</a:t>
+            </a:r>
+            <a:endParaRPr lang="en-US" b="0" dirty="0"/>
+          </a:p>
+        </p:txBody>
+      </p:sp>
+      <p:sp>
+        <p:nvSpPr>
+          <p:cNvPr id="18" name="TextBox 17"/>
+          <p:cNvSpPr txBox="1"/>
+          <p:nvPr/>
+        </p:nvSpPr>
+        <p:spPr>
+          <a:xfrm>
+            <a:off x="7150664" y="1777308"/>
+            <a:ext cx="997389" cy="400110"/>
+          </a:xfrm>
+          <a:prstGeom prst="rect">
+            <a:avLst/>
+          </a:prstGeom>
+          <a:noFill/>
+        </p:spPr>
+        <p:txBody>
+          <a:bodyPr wrap="none" rtlCol="0">
+            <a:spAutoFit/>
+          </a:bodyPr>
+          <a:lstStyle/>
+          <a:p>
+            <a:r>
+              <a:rPr lang="en-US" dirty="0" smtClean="0"/>
+              <a:t>Strand</a:t>
+            </a:r>
+            <a:endParaRPr lang="en-US" dirty="0"/>
+          </a:p>
+        </p:txBody>
+      </p:sp>
+      <p:sp>
+        <p:nvSpPr>
+          <p:cNvPr id="19" name="TextBox 18"/>
+          <p:cNvSpPr txBox="1"/>
+          <p:nvPr/>
+        </p:nvSpPr>
+        <p:spPr>
+          <a:xfrm>
+            <a:off x="7114200" y="2444807"/>
+            <a:ext cx="1454244" cy="1938992"/>
+          </a:xfrm>
+          <a:prstGeom prst="rect">
+            <a:avLst/>
+          </a:prstGeom>
+          <a:noFill/>
+        </p:spPr>
+        <p:txBody>
+          <a:bodyPr wrap="none" rtlCol="0">
+            <a:spAutoFit/>
+          </a:bodyPr>
+          <a:lstStyle/>
+          <a:p>
+            <a:pPr algn="l"/>
+            <a:r>
+              <a:rPr lang="en-US" b="0" i="1" dirty="0" err="1" smtClean="0"/>
+              <a:t>NewStrand</a:t>
+            </a:r>
+            <a:endParaRPr lang="en-US" b="0" i="1" dirty="0" smtClean="0"/>
+          </a:p>
+          <a:p>
+            <a:pPr algn="l"/>
+            <a:r>
+              <a:rPr lang="en-US" b="0" dirty="0" smtClean="0"/>
+              <a:t>A</a:t>
+            </a:r>
+          </a:p>
+          <a:p>
+            <a:pPr algn="l"/>
+            <a:r>
+              <a:rPr lang="en-US" b="0" i="1" dirty="0" smtClean="0"/>
+              <a:t>Barrier</a:t>
+            </a:r>
+          </a:p>
+          <a:p>
+            <a:pPr algn="l"/>
+            <a:r>
+              <a:rPr lang="en-US" b="0" dirty="0" smtClean="0"/>
+              <a:t>C</a:t>
+            </a:r>
+            <a:endParaRPr lang="en-US" b="0" dirty="0" smtClean="0"/>
+          </a:p>
+          <a:p>
+            <a:pPr algn="l"/>
+            <a:r>
+              <a:rPr lang="en-US" b="0" i="1" dirty="0" err="1" smtClean="0"/>
+              <a:t>NewStrand</a:t>
+            </a:r>
+            <a:endParaRPr lang="en-US" b="0" i="1" dirty="0" smtClean="0"/>
+          </a:p>
+          <a:p>
+            <a:pPr algn="l"/>
+            <a:r>
+              <a:rPr lang="en-US" b="0" dirty="0" smtClean="0"/>
+              <a:t>B</a:t>
+            </a:r>
+            <a:endParaRPr lang="en-US" b="0" dirty="0"/>
+          </a:p>
+        </p:txBody>
+      </p:sp>
+      <p:sp>
+        <p:nvSpPr>
+          <p:cNvPr id="21" name="Right Arrow 20"/>
+          <p:cNvSpPr/>
+          <p:nvPr/>
+        </p:nvSpPr>
+        <p:spPr bwMode="auto">
+          <a:xfrm rot="1120445">
+            <a:off x="1612667" y="2662958"/>
+            <a:ext cx="389996" cy="145653"/>
+          </a:xfrm>
+          <a:prstGeom prst="rightArrow">
+            <a:avLst/>
+          </a:prstGeom>
+          <a:solidFill>
+            <a:srgbClr val="FF0000"/>
+          </a:solidFill>
+          <a:ln w="9525" cap="flat" cmpd="sng" algn="ctr">
+            <a:solidFill>
+              <a:schemeClr val="tx1"/>
+            </a:solidFill>
+            <a:prstDash val="solid"/>
+            <a:round/>
+            <a:headEnd type="none" w="med" len="med"/>
+            <a:tailEnd type="none" w="med" len="med"/>
+          </a:ln>
+          <a:effectLst/>
+        </p:spPr>
+        <p:txBody>
+          <a:bodyPr vert="horz" wrap="square" lIns="91440" tIns="45720" rIns="91440" bIns="45720" numCol="1" rtlCol="0" anchor="t" anchorCtr="0" compatLnSpc="1">
+            <a:prstTxWarp prst="textNoShape">
+              <a:avLst/>
+            </a:prstTxWarp>
+          </a:bodyPr>
+          <a:lstStyle/>
+          <a:p>
+            <a:pPr marL="0" marR="0" indent="0" algn="l" defTabSz="914400" rtl="0" eaLnBrk="0" fontAlgn="base" latinLnBrk="0" hangingPunct="0">
+              <a:lnSpc>
+                <a:spcPct val="100000"/>
+              </a:lnSpc>
+              <a:spcBef>
+                <a:spcPct val="0"/>
+              </a:spcBef>
+              <a:spcAft>
+                <a:spcPct val="0"/>
+              </a:spcAft>
+              <a:buClrTx/>
+              <a:buSzTx/>
+              <a:buFontTx/>
+              <a:buNone/>
+              <a:tabLst/>
+            </a:pPr>
+            <a:endParaRPr kumimoji="0" lang="en-US" sz="2400" b="0" i="0" u="none" strike="noStrike" cap="none" normalizeH="0" baseline="0" smtClean="0">
+              <a:ln>
+                <a:noFill/>
+              </a:ln>
+              <a:solidFill>
+                <a:schemeClr val="tx1"/>
+              </a:solidFill>
+              <a:effectLst/>
+              <a:latin typeface="Arial" charset="0"/>
+              <a:ea typeface="ＭＳ Ｐゴシック" charset="-128"/>
+            </a:endParaRPr>
+          </a:p>
+        </p:txBody>
+      </p:sp>
+      <p:sp>
+        <p:nvSpPr>
+          <p:cNvPr id="22" name="Right Arrow 21"/>
+          <p:cNvSpPr/>
+          <p:nvPr/>
+        </p:nvSpPr>
+        <p:spPr bwMode="auto">
+          <a:xfrm rot="7947763">
+            <a:off x="1680193" y="3321619"/>
+            <a:ext cx="380810" cy="136564"/>
+          </a:xfrm>
+          <a:prstGeom prst="rightArrow">
+            <a:avLst/>
+          </a:prstGeom>
+          <a:solidFill>
+            <a:srgbClr val="FF0000"/>
+          </a:solidFill>
+          <a:ln w="9525" cap="flat" cmpd="sng" algn="ctr">
+            <a:solidFill>
+              <a:schemeClr val="tx1"/>
+            </a:solidFill>
+            <a:prstDash val="solid"/>
+            <a:round/>
+            <a:headEnd type="none" w="med" len="med"/>
+            <a:tailEnd type="none" w="med" len="med"/>
+          </a:ln>
+          <a:effectLst/>
+        </p:spPr>
+        <p:txBody>
+          <a:bodyPr vert="horz" wrap="square" lIns="91440" tIns="45720" rIns="91440" bIns="45720" numCol="1" rtlCol="0" anchor="t" anchorCtr="0" compatLnSpc="1">
+            <a:prstTxWarp prst="textNoShape">
+              <a:avLst/>
+            </a:prstTxWarp>
+          </a:bodyPr>
+          <a:lstStyle/>
+          <a:p>
+            <a:pPr marL="0" marR="0" indent="0" algn="l" defTabSz="914400" rtl="0" eaLnBrk="0" fontAlgn="base" latinLnBrk="0" hangingPunct="0">
+              <a:lnSpc>
+                <a:spcPct val="100000"/>
+              </a:lnSpc>
+              <a:spcBef>
+                <a:spcPct val="0"/>
+              </a:spcBef>
+              <a:spcAft>
+                <a:spcPct val="0"/>
+              </a:spcAft>
+              <a:buClrTx/>
+              <a:buSzTx/>
+              <a:buFontTx/>
+              <a:buNone/>
+              <a:tabLst/>
+            </a:pPr>
+            <a:endParaRPr kumimoji="0" lang="en-US" sz="2400" b="0" i="0" u="none" strike="noStrike" cap="none" normalizeH="0" baseline="0" smtClean="0">
+              <a:ln>
+                <a:noFill/>
+              </a:ln>
+              <a:solidFill>
+                <a:schemeClr val="tx1"/>
+              </a:solidFill>
+              <a:effectLst/>
+              <a:latin typeface="Arial" charset="0"/>
+              <a:ea typeface="ＭＳ Ｐゴシック" charset="-128"/>
+            </a:endParaRPr>
+          </a:p>
+        </p:txBody>
+      </p:sp>
+      <p:sp>
+        <p:nvSpPr>
+          <p:cNvPr id="23" name="TextBox 22"/>
+          <p:cNvSpPr txBox="1"/>
+          <p:nvPr/>
+        </p:nvSpPr>
+        <p:spPr>
+          <a:xfrm rot="16200000">
+            <a:off x="1396980" y="4709764"/>
+            <a:ext cx="526105" cy="584775"/>
+          </a:xfrm>
+          <a:prstGeom prst="rect">
+            <a:avLst/>
+          </a:prstGeom>
+          <a:noFill/>
+        </p:spPr>
+        <p:txBody>
+          <a:bodyPr wrap="none" rtlCol="0">
+            <a:spAutoFit/>
+          </a:bodyPr>
+          <a:lstStyle/>
+          <a:p>
+            <a:r>
+              <a:rPr lang="en-US" sz="3200" dirty="0" smtClean="0"/>
+              <a:t>...</a:t>
+            </a:r>
+            <a:endParaRPr lang="en-US" sz="3200" dirty="0"/>
+          </a:p>
+        </p:txBody>
+      </p:sp>
     </p:spTree>
     <p:extLst>
       <p:ext uri="{BB962C8B-B14F-4D97-AF65-F5344CB8AC3E}">
-        <p14:creationId xmlns:p14="http://schemas.microsoft.com/office/powerpoint/2010/main" val="762893566"/>
+        <p14:creationId xmlns:p14="http://schemas.microsoft.com/office/powerpoint/2010/main" val="965881764"/>
       </p:ext>
     </p:extLst>
   </p:cSld>
@@ -29950,9 +31178,80 @@
   <p:timing>
     <p:tnLst>
       <p:par>
-        <p:cTn id="1" dur="indefinite" restart="never" nodeType="tmRoot"/>
+        <p:cTn id="1" dur="indefinite" restart="never" nodeType="tmRoot">
+          <p:childTnLst>
+            <p:seq concurrent="1" nextAc="seek">
+              <p:cTn id="2" dur="indefinite" nodeType="mainSeq">
+                <p:childTnLst>
+                  <p:par>
+                    <p:cTn id="3" fill="hold">
+                      <p:stCondLst>
+                        <p:cond delay="indefinite"/>
+                      </p:stCondLst>
+                      <p:childTnLst>
+                        <p:par>
+                          <p:cTn id="4" fill="hold">
+                            <p:stCondLst>
+                              <p:cond delay="0"/>
+                            </p:stCondLst>
+                            <p:childTnLst>
+                              <p:par>
+                                <p:cTn id="5" presetID="1" presetClass="entr" presetSubtype="0" fill="hold" grpId="0" nodeType="clickEffect">
+                                  <p:stCondLst>
+                                    <p:cond delay="0"/>
+                                  </p:stCondLst>
+                                  <p:childTnLst>
+                                    <p:set>
+                                      <p:cBhvr>
+                                        <p:cTn id="6" dur="1" fill="hold">
+                                          <p:stCondLst>
+                                            <p:cond delay="0"/>
+                                          </p:stCondLst>
+                                        </p:cTn>
+                                        <p:tgtEl>
+                                          <p:spTgt spid="5"/>
+                                        </p:tgtEl>
+                                        <p:attrNameLst>
+                                          <p:attrName>style.visibility</p:attrName>
+                                        </p:attrNameLst>
+                                      </p:cBhvr>
+                                      <p:to>
+                                        <p:strVal val="visible"/>
+                                      </p:to>
+                                    </p:set>
+                                  </p:childTnLst>
+                                </p:cTn>
+                              </p:par>
+                            </p:childTnLst>
+                          </p:cTn>
+                        </p:par>
+                      </p:childTnLst>
+                    </p:cTn>
+                  </p:par>
+                </p:childTnLst>
+              </p:cTn>
+              <p:prevCondLst>
+                <p:cond evt="onPrev" delay="0">
+                  <p:tgtEl>
+                    <p:sldTgt/>
+                  </p:tgtEl>
+                </p:cond>
+              </p:prevCondLst>
+              <p:nextCondLst>
+                <p:cond evt="onNext" delay="0">
+                  <p:tgtEl>
+                    <p:sldTgt/>
+                  </p:tgtEl>
+                </p:cond>
+              </p:nextCondLst>
+            </p:seq>
+          </p:childTnLst>
+        </p:cTn>
       </p:par>
     </p:tnLst>
+    <p:bldLst>
+      <p:bldP spid="5" grpId="0"/>
+    </p:bldLst>
   </p:timing>
 </p:sld>
 </file>
@@ -29991,9 +31290,65 @@
           <a:p>
             <a:r>
               <a:rPr lang="en-US" dirty="0" smtClean="0"/>
-              <a:t>Strand examples</a:t>
+              <a:t>Perfect constraint labeling</a:t>
             </a:r>
             <a:endParaRPr lang="en-US" dirty="0"/>
+          </a:p>
+        </p:txBody>
+      </p:sp>
+      <p:sp>
+        <p:nvSpPr>
+          <p:cNvPr id="3" name="Content Placeholder 2"/>
+          <p:cNvSpPr>
+            <a:spLocks noGrp="1"/>
+          </p:cNvSpPr>
+          <p:nvPr>
+            <p:ph idx="1"/>
+          </p:nvPr>
+        </p:nvSpPr>
+        <p:spPr/>
+        <p:txBody>
+          <a:bodyPr/>
+          <a:lstStyle/>
+          <a:p>
+            <a:r>
+              <a:rPr lang="en-US" dirty="0" smtClean="0"/>
+              <a:t>Strands can perfectly label constraints</a:t>
+            </a:r>
+          </a:p>
+          <a:p>
+            <a:r>
+              <a:rPr lang="en-US" dirty="0" smtClean="0"/>
+              <a:t>For each persist:</a:t>
+            </a:r>
+          </a:p>
+          <a:p>
+            <a:pPr lvl="1"/>
+            <a:r>
+              <a:rPr lang="en-US" dirty="0" smtClean="0"/>
+              <a:t>New strand</a:t>
+            </a:r>
+          </a:p>
+          <a:p>
+            <a:pPr lvl="1"/>
+            <a:r>
+              <a:rPr lang="en-US" dirty="0" smtClean="0"/>
+              <a:t>Read all addresses persist depends on</a:t>
+            </a:r>
+          </a:p>
+          <a:p>
+            <a:pPr lvl="1"/>
+            <a:r>
+              <a:rPr lang="en-US" dirty="0" smtClean="0"/>
+              <a:t>Barrier</a:t>
+            </a:r>
+          </a:p>
+          <a:p>
+            <a:pPr lvl="1"/>
+            <a:r>
+              <a:rPr lang="en-US" dirty="0" smtClean="0"/>
+              <a:t>Persist</a:t>
+            </a:r>
           </a:p>
         </p:txBody>
       </p:sp>
@@ -30029,8 +31384,8 @@
         </p:nvSpPr>
         <p:spPr>
           <a:xfrm>
-            <a:off x="1234506" y="5919663"/>
-            <a:ext cx="6675225" cy="461665"/>
+            <a:off x="248671" y="5919663"/>
+            <a:ext cx="8646919" cy="461665"/>
           </a:xfrm>
           <a:prstGeom prst="rect">
             <a:avLst/>
@@ -30049,7 +31404,7 @@
                   <a:srgbClr val="FF0909"/>
                 </a:solidFill>
               </a:rPr>
-              <a:t>Strands allow precise persist constraint labeling</a:t>
+              <a:t>Minimal persist dependences (additional instructions required)</a:t>
             </a:r>
             <a:endParaRPr lang="en-US" sz="2400" b="0" i="1" dirty="0">
               <a:solidFill>
@@ -30062,7 +31417,7 @@
     </p:spTree>
     <p:extLst>
       <p:ext uri="{BB962C8B-B14F-4D97-AF65-F5344CB8AC3E}">
-        <p14:creationId xmlns:p14="http://schemas.microsoft.com/office/powerpoint/2010/main" val="965881764"/>
+        <p14:creationId xmlns:p14="http://schemas.microsoft.com/office/powerpoint/2010/main" val="3497077760"/>
       </p:ext>
     </p:extLst>
   </p:cSld>
@@ -30188,11 +31543,7 @@
             </a:r>
             <a:r>
               <a:rPr lang="en-US" baseline="0" dirty="0" smtClean="0"/>
-              <a:t> </a:t>
-            </a:r>
-            <a:r>
-              <a:rPr lang="en-US" baseline="0" dirty="0" smtClean="0"/>
-              <a:t>persistency queue</a:t>
+              <a:t> persistency queue</a:t>
             </a:r>
             <a:endParaRPr lang="en-US" dirty="0"/>
           </a:p>

</xml_diff>

<commit_message>
new epoch persistency persist ordering explanation.  Look at race types individually.
</commit_message>
<xml_diff>
--- a/proposal/defense.pptx
+++ b/proposal/defense.pptx
@@ -6,10 +6,10 @@
     <p:sldMasterId id="2147483673" r:id="rId2"/>
   </p:sldMasterIdLst>
   <p:notesMasterIdLst>
-    <p:notesMasterId r:id="rId47"/>
+    <p:notesMasterId r:id="rId48"/>
   </p:notesMasterIdLst>
   <p:handoutMasterIdLst>
-    <p:handoutMasterId r:id="rId48"/>
+    <p:handoutMasterId r:id="rId49"/>
   </p:handoutMasterIdLst>
   <p:sldIdLst>
     <p:sldId id="866" r:id="rId3"/>
@@ -38,24 +38,25 @@
     <p:sldId id="1152" r:id="rId26"/>
     <p:sldId id="1150" r:id="rId27"/>
     <p:sldId id="1160" r:id="rId28"/>
-    <p:sldId id="1156" r:id="rId29"/>
-    <p:sldId id="1157" r:id="rId30"/>
-    <p:sldId id="1158" r:id="rId31"/>
-    <p:sldId id="1159" r:id="rId32"/>
-    <p:sldId id="1154" r:id="rId33"/>
-    <p:sldId id="1155" r:id="rId34"/>
-    <p:sldId id="1162" r:id="rId35"/>
-    <p:sldId id="1166" r:id="rId36"/>
-    <p:sldId id="1132" r:id="rId37"/>
-    <p:sldId id="1163" r:id="rId38"/>
-    <p:sldId id="1164" r:id="rId39"/>
-    <p:sldId id="1165" r:id="rId40"/>
-    <p:sldId id="1134" r:id="rId41"/>
-    <p:sldId id="1135" r:id="rId42"/>
-    <p:sldId id="1136" r:id="rId43"/>
-    <p:sldId id="1137" r:id="rId44"/>
-    <p:sldId id="1138" r:id="rId45"/>
-    <p:sldId id="1146" r:id="rId46"/>
+    <p:sldId id="1167" r:id="rId29"/>
+    <p:sldId id="1156" r:id="rId30"/>
+    <p:sldId id="1157" r:id="rId31"/>
+    <p:sldId id="1158" r:id="rId32"/>
+    <p:sldId id="1159" r:id="rId33"/>
+    <p:sldId id="1154" r:id="rId34"/>
+    <p:sldId id="1155" r:id="rId35"/>
+    <p:sldId id="1162" r:id="rId36"/>
+    <p:sldId id="1166" r:id="rId37"/>
+    <p:sldId id="1132" r:id="rId38"/>
+    <p:sldId id="1163" r:id="rId39"/>
+    <p:sldId id="1164" r:id="rId40"/>
+    <p:sldId id="1165" r:id="rId41"/>
+    <p:sldId id="1134" r:id="rId42"/>
+    <p:sldId id="1135" r:id="rId43"/>
+    <p:sldId id="1136" r:id="rId44"/>
+    <p:sldId id="1137" r:id="rId45"/>
+    <p:sldId id="1138" r:id="rId46"/>
+    <p:sldId id="1146" r:id="rId47"/>
   </p:sldIdLst>
   <p:sldSz cx="9144000" cy="6858000" type="screen4x3"/>
   <p:notesSz cx="6997700" cy="9271000"/>
@@ -7197,7 +7198,7 @@
               <a:t>Focus on </a:t>
             </a:r>
             <a:r>
-              <a:rPr lang="en-US" b="1" dirty="0" smtClean="0">
+              <a:rPr lang="en-US" b="1" i="1" dirty="0" smtClean="0">
                 <a:solidFill>
                   <a:srgbClr val="FF0000"/>
                 </a:solidFill>
@@ -9036,11 +9037,7 @@
             </a:r>
             <a:r>
               <a:rPr lang="en-US" i="1" dirty="0" smtClean="0"/>
-              <a:t>ersist order </a:t>
-            </a:r>
-            <a:r>
-              <a:rPr lang="en-US" i="1" dirty="0" smtClean="0"/>
-              <a:t>critical path</a:t>
+              <a:t>ersist order critical path</a:t>
             </a:r>
             <a:r>
               <a:rPr lang="en-US" dirty="0" smtClean="0"/>
@@ -9070,15 +9067,13 @@
             </a:r>
             <a:r>
               <a:rPr lang="en-US" dirty="0" smtClean="0"/>
-              <a:t> (persist only last value) if no ordering constraints violated</a:t>
-            </a:r>
-          </a:p>
-          <a:p>
+              <a:t> (persist only last value) if no ordering constraints </a:t>
+            </a:r>
             <a:r>
               <a:rPr lang="en-US" dirty="0" smtClean="0"/>
-              <a:t>Goal: create models to minimize critical path</a:t>
-            </a:r>
-            <a:endParaRPr lang="en-US" dirty="0"/>
+              <a:t>violated</a:t>
+            </a:r>
+            <a:endParaRPr lang="en-US" dirty="0" smtClean="0"/>
           </a:p>
         </p:txBody>
       </p:sp>
@@ -9106,6 +9101,44 @@
           </a:p>
         </p:txBody>
       </p:sp>
+      <p:sp>
+        <p:nvSpPr>
+          <p:cNvPr id="5" name="TextBox 4"/>
+          <p:cNvSpPr txBox="1"/>
+          <p:nvPr/>
+        </p:nvSpPr>
+        <p:spPr>
+          <a:xfrm>
+            <a:off x="1458893" y="5919663"/>
+            <a:ext cx="6226384" cy="461665"/>
+          </a:xfrm>
+          <a:prstGeom prst="rect">
+            <a:avLst/>
+          </a:prstGeom>
+          <a:noFill/>
+        </p:spPr>
+        <p:txBody>
+          <a:bodyPr wrap="none" rtlCol="0">
+            <a:spAutoFit/>
+          </a:bodyPr>
+          <a:lstStyle/>
+          <a:p>
+            <a:r>
+              <a:rPr lang="en-US" sz="2400" b="0" i="1" dirty="0" smtClean="0">
+                <a:solidFill>
+                  <a:srgbClr val="FF0909"/>
+                </a:solidFill>
+              </a:rPr>
+              <a:t>Goal: create models to minimize critical path</a:t>
+            </a:r>
+            <a:endParaRPr lang="en-US" sz="2400" b="0" i="1" dirty="0">
+              <a:solidFill>
+                <a:srgbClr val="FF0909"/>
+              </a:solidFill>
+            </a:endParaRPr>
+          </a:p>
+        </p:txBody>
+      </p:sp>
     </p:spTree>
     <p:extLst>
       <p:ext uri="{BB962C8B-B14F-4D97-AF65-F5344CB8AC3E}">
@@ -9119,9 +9152,80 @@
   <p:timing>
     <p:tnLst>
       <p:par>
-        <p:cTn id="1" dur="indefinite" restart="never" nodeType="tmRoot"/>
+        <p:cTn id="1" dur="indefinite" restart="never" nodeType="tmRoot">
+          <p:childTnLst>
+            <p:seq concurrent="1" nextAc="seek">
+              <p:cTn id="2" dur="indefinite" nodeType="mainSeq">
+                <p:childTnLst>
+                  <p:par>
+                    <p:cTn id="3" fill="hold">
+                      <p:stCondLst>
+                        <p:cond delay="indefinite"/>
+                      </p:stCondLst>
+                      <p:childTnLst>
+                        <p:par>
+                          <p:cTn id="4" fill="hold">
+                            <p:stCondLst>
+                              <p:cond delay="0"/>
+                            </p:stCondLst>
+                            <p:childTnLst>
+                              <p:par>
+                                <p:cTn id="5" presetID="1" presetClass="entr" presetSubtype="0" fill="hold" grpId="0" nodeType="clickEffect">
+                                  <p:stCondLst>
+                                    <p:cond delay="0"/>
+                                  </p:stCondLst>
+                                  <p:childTnLst>
+                                    <p:set>
+                                      <p:cBhvr>
+                                        <p:cTn id="6" dur="1" fill="hold">
+                                          <p:stCondLst>
+                                            <p:cond delay="0"/>
+                                          </p:stCondLst>
+                                        </p:cTn>
+                                        <p:tgtEl>
+                                          <p:spTgt spid="5"/>
+                                        </p:tgtEl>
+                                        <p:attrNameLst>
+                                          <p:attrName>style.visibility</p:attrName>
+                                        </p:attrNameLst>
+                                      </p:cBhvr>
+                                      <p:to>
+                                        <p:strVal val="visible"/>
+                                      </p:to>
+                                    </p:set>
+                                  </p:childTnLst>
+                                </p:cTn>
+                              </p:par>
+                            </p:childTnLst>
+                          </p:cTn>
+                        </p:par>
+                      </p:childTnLst>
+                    </p:cTn>
+                  </p:par>
+                </p:childTnLst>
+              </p:cTn>
+              <p:prevCondLst>
+                <p:cond evt="onPrev" delay="0">
+                  <p:tgtEl>
+                    <p:sldTgt/>
+                  </p:tgtEl>
+                </p:cond>
+              </p:prevCondLst>
+              <p:nextCondLst>
+                <p:cond evt="onNext" delay="0">
+                  <p:tgtEl>
+                    <p:sldTgt/>
+                  </p:tgtEl>
+                </p:cond>
+              </p:nextCondLst>
+            </p:seq>
+          </p:childTnLst>
+        </p:cTn>
       </p:par>
     </p:tnLst>
+    <p:bldLst>
+      <p:bldP spid="5" grpId="0"/>
+    </p:bldLst>
   </p:timing>
 </p:sld>
 </file>
@@ -9183,15 +9287,7 @@
           <a:p>
             <a:r>
               <a:rPr lang="en-US" dirty="0" smtClean="0"/>
-              <a:t>All models use SC </a:t>
-            </a:r>
-            <a:r>
-              <a:rPr lang="en-US" dirty="0" smtClean="0"/>
-              <a:t>as </a:t>
-            </a:r>
-            <a:r>
-              <a:rPr lang="en-US" dirty="0" smtClean="0"/>
-              <a:t>consistency model</a:t>
+              <a:t>All models use SC as consistency model</a:t>
             </a:r>
           </a:p>
           <a:p>
@@ -9215,19 +9311,7 @@
             </a:r>
             <a:r>
               <a:rPr lang="en-US" dirty="0" smtClean="0"/>
-              <a:t>uccessively relax </a:t>
-            </a:r>
-            <a:r>
-              <a:rPr lang="en-US" dirty="0" smtClean="0"/>
-              <a:t>persistency to improve persist </a:t>
-            </a:r>
-            <a:r>
-              <a:rPr lang="en-US" dirty="0" smtClean="0"/>
-              <a:t>concurrency/reduce </a:t>
-            </a:r>
-            <a:r>
-              <a:rPr lang="en-US" dirty="0" smtClean="0"/>
-              <a:t>critical path</a:t>
+              <a:t>uccessively relax persistency to improve persist concurrency/reduce critical path</a:t>
             </a:r>
           </a:p>
         </p:txBody>
@@ -9310,7 +9394,11 @@
           <a:p>
             <a:r>
               <a:rPr lang="en-US" dirty="0" smtClean="0"/>
-              <a:t>Strict persistency</a:t>
+              <a:t>Model 1: strict </a:t>
+            </a:r>
+            <a:r>
+              <a:rPr lang="en-US" dirty="0" smtClean="0"/>
+              <a:t>persistency</a:t>
             </a:r>
             <a:endParaRPr lang="en-US" dirty="0"/>
           </a:p>
@@ -9333,15 +9421,7 @@
           <a:p>
             <a:r>
               <a:rPr lang="en-US" dirty="0" smtClean="0"/>
-              <a:t>Any </a:t>
-            </a:r>
-            <a:r>
-              <a:rPr lang="en-US" dirty="0" smtClean="0"/>
-              <a:t>volatile memory </a:t>
-            </a:r>
-            <a:r>
-              <a:rPr lang="en-US" dirty="0" smtClean="0"/>
-              <a:t>state that might be observed by the recovery observer processor under SC is an allowable persistent state</a:t>
+              <a:t>Any volatile memory state that might be observed by the recovery observer processor under SC is an allowable persistent state</a:t>
             </a:r>
           </a:p>
           <a:p>
@@ -9355,17 +9435,8 @@
             </a:r>
             <a:r>
               <a:rPr lang="en-US" dirty="0" smtClean="0"/>
-              <a:t>wo </a:t>
-            </a:r>
-            <a:r>
-              <a:rPr lang="en-US" dirty="0" smtClean="0"/>
-              <a:t>stores guaranteed to be ordered w.r.t. recovery observer </a:t>
-            </a:r>
-            <a:r>
-              <a:rPr lang="en-US" dirty="0" smtClean="0"/>
-              <a:t>implies ordered persists</a:t>
-            </a:r>
-            <a:endParaRPr lang="en-US" dirty="0" smtClean="0"/>
+              <a:t>wo stores guaranteed to be ordered w.r.t. recovery observer implies ordered persists</a:t>
+            </a:r>
           </a:p>
           <a:p>
             <a:r>
@@ -14077,11 +14148,7 @@
           <a:p>
             <a:r>
               <a:rPr lang="en-US" dirty="0" smtClean="0"/>
-              <a:t>Strict persistency </a:t>
-            </a:r>
-            <a:r>
-              <a:rPr lang="en-US" dirty="0" smtClean="0"/>
-              <a:t>implementations</a:t>
+              <a:t>Strict persistency implementations</a:t>
             </a:r>
             <a:endParaRPr lang="en-US" dirty="0"/>
           </a:p>
@@ -14769,7 +14836,15 @@
           <a:p>
             <a:r>
               <a:rPr lang="en-US" dirty="0" smtClean="0"/>
-              <a:t>Epoch persistency</a:t>
+              <a:t>Model 2: e</a:t>
+            </a:r>
+            <a:r>
+              <a:rPr lang="en-US" dirty="0" smtClean="0"/>
+              <a:t>poch </a:t>
+            </a:r>
+            <a:r>
+              <a:rPr lang="en-US" dirty="0" smtClean="0"/>
+              <a:t>persistency</a:t>
             </a:r>
             <a:endParaRPr lang="en-US" dirty="0"/>
           </a:p>
@@ -15043,8 +15118,8 @@
         </p:nvSpPr>
         <p:spPr>
           <a:xfrm>
-            <a:off x="2771800" y="2528899"/>
-            <a:ext cx="1253868" cy="2246769"/>
+            <a:off x="2764586" y="2528899"/>
+            <a:ext cx="1268297" cy="2246769"/>
           </a:xfrm>
           <a:prstGeom prst="rect">
             <a:avLst/>
@@ -15074,8 +15149,13 @@
           <a:p>
             <a:r>
               <a:rPr lang="en-US" b="0" dirty="0" smtClean="0"/>
-              <a:t>Read B</a:t>
-            </a:r>
+              <a:t>Read </a:t>
+            </a:r>
+            <a:r>
+              <a:rPr lang="en-US" b="0" dirty="0" smtClean="0"/>
+              <a:t>A</a:t>
+            </a:r>
+            <a:endParaRPr lang="en-US" b="0" dirty="0" smtClean="0"/>
           </a:p>
           <a:p>
             <a:r>
@@ -15086,8 +15166,13 @@
           <a:p>
             <a:r>
               <a:rPr lang="en-US" b="0" dirty="0" smtClean="0"/>
-              <a:t>Persist C</a:t>
-            </a:r>
+              <a:t>Persist </a:t>
+            </a:r>
+            <a:r>
+              <a:rPr lang="en-US" b="0" dirty="0" smtClean="0"/>
+              <a:t>B’</a:t>
+            </a:r>
+            <a:endParaRPr lang="en-US" b="0" dirty="0" smtClean="0"/>
           </a:p>
         </p:txBody>
       </p:sp>
@@ -15116,14 +15201,30 @@
             <a:pPr algn="l"/>
             <a:r>
               <a:rPr lang="en-US" b="0" dirty="0" smtClean="0"/>
-              <a:t>Can C persist before A?</a:t>
+              <a:t>Can </a:t>
+            </a:r>
+            <a:r>
+              <a:rPr lang="en-US" b="0" dirty="0" smtClean="0"/>
+              <a:t>B’ </a:t>
+            </a:r>
+            <a:r>
+              <a:rPr lang="en-US" b="0" dirty="0" smtClean="0"/>
+              <a:t>persist before A?</a:t>
             </a:r>
           </a:p>
           <a:p>
             <a:pPr algn="l"/>
             <a:r>
               <a:rPr lang="en-US" b="0" dirty="0" smtClean="0"/>
-              <a:t>Can C persist before B?</a:t>
+              <a:t>Can </a:t>
+            </a:r>
+            <a:r>
+              <a:rPr lang="en-US" b="0" dirty="0" smtClean="0"/>
+              <a:t>B’ </a:t>
+            </a:r>
+            <a:r>
+              <a:rPr lang="en-US" b="0" dirty="0" smtClean="0"/>
+              <a:t>persist before B?</a:t>
             </a:r>
           </a:p>
           <a:p>
@@ -15156,11 +15257,6 @@
               </a:rPr>
               <a:t>!</a:t>
             </a:r>
-            <a:endParaRPr lang="en-US" b="0" i="1" dirty="0" smtClean="0">
-              <a:solidFill>
-                <a:srgbClr val="FF0000"/>
-              </a:solidFill>
-            </a:endParaRPr>
           </a:p>
         </p:txBody>
       </p:sp>
@@ -15172,7 +15268,7 @@
         </p:nvSpPr>
         <p:spPr bwMode="auto">
           <a:xfrm rot="1652981">
-            <a:off x="2526791" y="3603124"/>
+            <a:off x="2637940" y="3297762"/>
             <a:ext cx="406937" cy="164428"/>
           </a:xfrm>
           <a:prstGeom prst="rightArrow">
@@ -21831,7 +21927,7 @@
           <a:p>
             <a:r>
               <a:rPr lang="en-US" dirty="0" smtClean="0"/>
-              <a:t>Defining PER behavior</a:t>
+              <a:t>PER persist ordering</a:t>
             </a:r>
             <a:endParaRPr lang="en-US" dirty="0"/>
           </a:p>
@@ -21876,47 +21972,51 @@
           <a:p>
             <a:pPr lvl="1"/>
             <a:r>
-              <a:rPr lang="en-US" dirty="0" smtClean="0"/>
-              <a:t>O</a:t>
-            </a:r>
-            <a:r>
-              <a:rPr lang="en-US" dirty="0" smtClean="0"/>
-              <a:t>bserve </a:t>
-            </a:r>
-            <a:r>
               <a:rPr lang="en-US" i="1" dirty="0" smtClean="0"/>
               <a:t>A</a:t>
             </a:r>
             <a:r>
               <a:rPr lang="en-US" dirty="0" smtClean="0"/>
-              <a:t> persisted prior to barrier preceding </a:t>
+              <a:t> </a:t>
+            </a:r>
+            <a:r>
+              <a:rPr lang="en-US" dirty="0" smtClean="0"/>
+              <a:t>and </a:t>
             </a:r>
             <a:r>
               <a:rPr lang="en-US" i="1" dirty="0" smtClean="0"/>
               <a:t>B</a:t>
             </a:r>
+            <a:r>
+              <a:rPr lang="en-US" dirty="0" smtClean="0"/>
+              <a:t> are to the same </a:t>
+            </a:r>
+            <a:r>
+              <a:rPr lang="en-US" dirty="0" smtClean="0"/>
+              <a:t>address (even if epochs race)</a:t>
+            </a:r>
           </a:p>
           <a:p>
             <a:pPr lvl="1"/>
             <a:r>
               <a:rPr lang="en-US" dirty="0" smtClean="0"/>
-              <a:t>Or </a:t>
+              <a:t>Race in epoch </a:t>
             </a:r>
             <a:r>
               <a:rPr lang="en-US" i="1" dirty="0" smtClean="0"/>
-              <a:t>A</a:t>
+              <a:t>after</a:t>
             </a:r>
             <a:r>
               <a:rPr lang="en-US" dirty="0" smtClean="0"/>
-              <a:t> and </a:t>
+              <a:t> A and in epoch </a:t>
             </a:r>
             <a:r>
               <a:rPr lang="en-US" i="1" dirty="0" smtClean="0"/>
-              <a:t>B</a:t>
+              <a:t>prior to</a:t>
             </a:r>
             <a:r>
               <a:rPr lang="en-US" dirty="0" smtClean="0"/>
-              <a:t> are to the same address</a:t>
+              <a:t> B</a:t>
             </a:r>
             <a:endParaRPr lang="en-US" dirty="0"/>
           </a:p>
@@ -21943,345 +22043,6 @@
               <a:t>26</a:t>
             </a:fld>
             <a:endParaRPr lang="en-US" dirty="0"/>
-          </a:p>
-        </p:txBody>
-      </p:sp>
-      <p:sp>
-        <p:nvSpPr>
-          <p:cNvPr id="5" name="TextBox 4"/>
-          <p:cNvSpPr txBox="1"/>
-          <p:nvPr/>
-        </p:nvSpPr>
-        <p:spPr>
-          <a:xfrm>
-            <a:off x="179512" y="3032956"/>
-            <a:ext cx="1338828" cy="1631216"/>
-          </a:xfrm>
-          <a:prstGeom prst="rect">
-            <a:avLst/>
-          </a:prstGeom>
-          <a:noFill/>
-        </p:spPr>
-        <p:txBody>
-          <a:bodyPr wrap="none" rtlCol="0">
-            <a:spAutoFit/>
-          </a:bodyPr>
-          <a:lstStyle/>
-          <a:p>
-            <a:pPr algn="l"/>
-            <a:r>
-              <a:rPr lang="en-US" dirty="0" smtClean="0"/>
-              <a:t>Thread 1:</a:t>
-            </a:r>
-          </a:p>
-          <a:p>
-            <a:pPr algn="l"/>
-            <a:r>
-              <a:rPr lang="en-US" b="0" dirty="0" smtClean="0"/>
-              <a:t>Persist A</a:t>
-            </a:r>
-          </a:p>
-          <a:p>
-            <a:pPr algn="l"/>
-            <a:r>
-              <a:rPr lang="en-US" b="0" i="1" dirty="0" smtClean="0"/>
-              <a:t>Barrier</a:t>
-            </a:r>
-            <a:endParaRPr lang="en-US" b="0" dirty="0" smtClean="0"/>
-          </a:p>
-          <a:p>
-            <a:pPr algn="l"/>
-            <a:r>
-              <a:rPr lang="en-US" b="0" dirty="0" smtClean="0"/>
-              <a:t>Persist B</a:t>
-            </a:r>
-          </a:p>
-          <a:p>
-            <a:pPr algn="l"/>
-            <a:r>
-              <a:rPr lang="en-US" b="0" dirty="0" smtClean="0"/>
-              <a:t>Store V</a:t>
-            </a:r>
-            <a:endParaRPr lang="en-US" b="0" dirty="0"/>
-          </a:p>
-        </p:txBody>
-      </p:sp>
-      <p:sp>
-        <p:nvSpPr>
-          <p:cNvPr id="6" name="TextBox 5"/>
-          <p:cNvSpPr txBox="1"/>
-          <p:nvPr/>
-        </p:nvSpPr>
-        <p:spPr>
-          <a:xfrm>
-            <a:off x="1554344" y="3037148"/>
-            <a:ext cx="1338828" cy="3170099"/>
-          </a:xfrm>
-          <a:prstGeom prst="rect">
-            <a:avLst/>
-          </a:prstGeom>
-          <a:noFill/>
-        </p:spPr>
-        <p:txBody>
-          <a:bodyPr wrap="none" rtlCol="0">
-            <a:spAutoFit/>
-          </a:bodyPr>
-          <a:lstStyle/>
-          <a:p>
-            <a:pPr algn="l"/>
-            <a:r>
-              <a:rPr lang="en-US" dirty="0" smtClean="0"/>
-              <a:t>Thread 2:</a:t>
-            </a:r>
-          </a:p>
-          <a:p>
-            <a:pPr algn="l"/>
-            <a:endParaRPr lang="en-US" b="0" dirty="0"/>
-          </a:p>
-          <a:p>
-            <a:pPr algn="l"/>
-            <a:endParaRPr lang="en-US" b="0" dirty="0" smtClean="0"/>
-          </a:p>
-          <a:p>
-            <a:pPr algn="l"/>
-            <a:endParaRPr lang="en-US" b="0" dirty="0"/>
-          </a:p>
-          <a:p>
-            <a:pPr algn="l"/>
-            <a:endParaRPr lang="en-US" b="0" dirty="0" smtClean="0"/>
-          </a:p>
-          <a:p>
-            <a:pPr algn="l"/>
-            <a:r>
-              <a:rPr lang="en-US" b="0" dirty="0" smtClean="0"/>
-              <a:t>Read V</a:t>
-            </a:r>
-          </a:p>
-          <a:p>
-            <a:pPr algn="l"/>
-            <a:r>
-              <a:rPr lang="en-US" b="0" dirty="0" smtClean="0"/>
-              <a:t>Persist B’</a:t>
-            </a:r>
-          </a:p>
-          <a:p>
-            <a:pPr algn="l"/>
-            <a:r>
-              <a:rPr lang="en-US" b="0" dirty="0" smtClean="0"/>
-              <a:t>Persist C</a:t>
-            </a:r>
-          </a:p>
-          <a:p>
-            <a:pPr algn="l"/>
-            <a:r>
-              <a:rPr lang="en-US" b="0" i="1" dirty="0" smtClean="0"/>
-              <a:t>Barrier</a:t>
-            </a:r>
-            <a:endParaRPr lang="en-US" b="0" dirty="0" smtClean="0"/>
-          </a:p>
-          <a:p>
-            <a:pPr algn="l"/>
-            <a:r>
-              <a:rPr lang="en-US" b="0" dirty="0" smtClean="0"/>
-              <a:t>Persist D</a:t>
-            </a:r>
-          </a:p>
-        </p:txBody>
-      </p:sp>
-      <p:sp>
-        <p:nvSpPr>
-          <p:cNvPr id="7" name="Right Arrow 6"/>
-          <p:cNvSpPr/>
-          <p:nvPr/>
-        </p:nvSpPr>
-        <p:spPr bwMode="auto">
-          <a:xfrm rot="1652981">
-            <a:off x="1173255" y="4485894"/>
-            <a:ext cx="406937" cy="164428"/>
-          </a:xfrm>
-          <a:prstGeom prst="rightArrow">
-            <a:avLst/>
-          </a:prstGeom>
-          <a:solidFill>
-            <a:schemeClr val="tx1"/>
-          </a:solidFill>
-          <a:ln w="9525" cap="flat" cmpd="sng" algn="ctr">
-            <a:solidFill>
-              <a:schemeClr val="tx1"/>
-            </a:solidFill>
-            <a:prstDash val="solid"/>
-            <a:round/>
-            <a:headEnd type="none" w="med" len="med"/>
-            <a:tailEnd type="none" w="med" len="med"/>
-          </a:ln>
-          <a:effectLst/>
-        </p:spPr>
-        <p:txBody>
-          <a:bodyPr vert="horz" wrap="square" lIns="91440" tIns="45720" rIns="91440" bIns="45720" numCol="1" rtlCol="0" anchor="t" anchorCtr="0" compatLnSpc="1">
-            <a:prstTxWarp prst="textNoShape">
-              <a:avLst/>
-            </a:prstTxWarp>
-          </a:bodyPr>
-          <a:lstStyle/>
-          <a:p>
-            <a:pPr marL="0" marR="0" indent="0" algn="l" defTabSz="914400" rtl="0" eaLnBrk="0" fontAlgn="base" latinLnBrk="0" hangingPunct="0">
-              <a:lnSpc>
-                <a:spcPct val="100000"/>
-              </a:lnSpc>
-              <a:spcBef>
-                <a:spcPct val="0"/>
-              </a:spcBef>
-              <a:spcAft>
-                <a:spcPct val="0"/>
-              </a:spcAft>
-              <a:buClrTx/>
-              <a:buSzTx/>
-              <a:buFontTx/>
-              <a:buNone/>
-              <a:tabLst/>
-            </a:pPr>
-            <a:endParaRPr kumimoji="0" lang="en-US" sz="2400" b="0" i="0" u="none" strike="noStrike" cap="none" normalizeH="0" baseline="0" smtClean="0">
-              <a:ln>
-                <a:noFill/>
-              </a:ln>
-              <a:solidFill>
-                <a:schemeClr val="tx1"/>
-              </a:solidFill>
-              <a:effectLst/>
-              <a:latin typeface="Arial" charset="0"/>
-              <a:ea typeface="ＭＳ Ｐゴシック" charset="-128"/>
-            </a:endParaRPr>
-          </a:p>
-        </p:txBody>
-      </p:sp>
-      <p:sp>
-        <p:nvSpPr>
-          <p:cNvPr id="8" name="TextBox 7"/>
-          <p:cNvSpPr txBox="1"/>
-          <p:nvPr/>
-        </p:nvSpPr>
-        <p:spPr>
-          <a:xfrm>
-            <a:off x="3239076" y="3037148"/>
-            <a:ext cx="3745192" cy="1938992"/>
-          </a:xfrm>
-          <a:prstGeom prst="rect">
-            <a:avLst/>
-          </a:prstGeom>
-          <a:noFill/>
-        </p:spPr>
-        <p:txBody>
-          <a:bodyPr wrap="none" rtlCol="0">
-            <a:spAutoFit/>
-          </a:bodyPr>
-          <a:lstStyle/>
-          <a:p>
-            <a:pPr algn="l"/>
-            <a:r>
-              <a:rPr lang="en-US" dirty="0" smtClean="0"/>
-              <a:t>Ordering constraints:</a:t>
-            </a:r>
-          </a:p>
-          <a:p>
-            <a:pPr algn="l"/>
-            <a:r>
-              <a:rPr lang="en-US" b="0" dirty="0" smtClean="0"/>
-              <a:t>A before B</a:t>
-            </a:r>
-          </a:p>
-          <a:p>
-            <a:pPr algn="l"/>
-            <a:r>
-              <a:rPr lang="en-US" b="0" dirty="0" smtClean="0"/>
-              <a:t>B’ before D</a:t>
-            </a:r>
-          </a:p>
-          <a:p>
-            <a:pPr algn="l"/>
-            <a:r>
-              <a:rPr lang="en-US" b="0" dirty="0" smtClean="0"/>
-              <a:t>C before D</a:t>
-            </a:r>
-          </a:p>
-          <a:p>
-            <a:pPr algn="l"/>
-            <a:r>
-              <a:rPr lang="en-US" b="0" dirty="0" smtClean="0"/>
-              <a:t>B before B’ (cache coherence)</a:t>
-            </a:r>
-          </a:p>
-          <a:p>
-            <a:pPr algn="l"/>
-            <a:r>
-              <a:rPr lang="en-US" b="0" dirty="0" smtClean="0"/>
-              <a:t>A before D (through V)</a:t>
-            </a:r>
-            <a:endParaRPr lang="en-US" b="0" dirty="0"/>
-          </a:p>
-        </p:txBody>
-      </p:sp>
-      <p:sp>
-        <p:nvSpPr>
-          <p:cNvPr id="9" name="TextBox 8"/>
-          <p:cNvSpPr txBox="1"/>
-          <p:nvPr/>
-        </p:nvSpPr>
-        <p:spPr>
-          <a:xfrm>
-            <a:off x="7146443" y="3037148"/>
-            <a:ext cx="1922321" cy="1938992"/>
-          </a:xfrm>
-          <a:prstGeom prst="rect">
-            <a:avLst/>
-          </a:prstGeom>
-          <a:noFill/>
-        </p:spPr>
-        <p:txBody>
-          <a:bodyPr wrap="none" rtlCol="0">
-            <a:spAutoFit/>
-          </a:bodyPr>
-          <a:lstStyle/>
-          <a:p>
-            <a:pPr algn="l"/>
-            <a:r>
-              <a:rPr lang="en-US" dirty="0" smtClean="0"/>
-              <a:t>No constraint:</a:t>
-            </a:r>
-          </a:p>
-          <a:p>
-            <a:pPr algn="l"/>
-            <a:r>
-              <a:rPr lang="en-US" b="0" dirty="0" smtClean="0"/>
-              <a:t>A and B’</a:t>
-            </a:r>
-          </a:p>
-          <a:p>
-            <a:pPr algn="l"/>
-            <a:r>
-              <a:rPr lang="en-US" b="0" dirty="0" smtClean="0"/>
-              <a:t>A and C</a:t>
-            </a:r>
-          </a:p>
-          <a:p>
-            <a:pPr algn="l"/>
-            <a:r>
-              <a:rPr lang="en-US" b="0" dirty="0" smtClean="0"/>
-              <a:t>B and C</a:t>
-            </a:r>
-          </a:p>
-          <a:p>
-            <a:pPr algn="l"/>
-            <a:r>
-              <a:rPr lang="en-US" b="0" dirty="0" smtClean="0"/>
-              <a:t>B and D</a:t>
-            </a:r>
-          </a:p>
-          <a:p>
-            <a:pPr algn="l"/>
-            <a:r>
-              <a:rPr lang="en-US" b="0" dirty="0" smtClean="0"/>
-              <a:t>B’ and C</a:t>
-            </a:r>
           </a:p>
         </p:txBody>
       </p:sp>
@@ -22339,19 +22100,7 @@
           <a:p>
             <a:r>
               <a:rPr lang="en-US" dirty="0" smtClean="0"/>
-              <a:t>Epoch</a:t>
-            </a:r>
-            <a:r>
-              <a:rPr lang="en-US" baseline="0" dirty="0" smtClean="0"/>
-              <a:t> persistency queue, 2</a:t>
-            </a:r>
-            <a:r>
-              <a:rPr lang="en-US" baseline="30000" dirty="0" smtClean="0"/>
-              <a:t>nd</a:t>
-            </a:r>
-            <a:r>
-              <a:rPr lang="en-US" baseline="0" dirty="0" smtClean="0"/>
-              <a:t> attempt</a:t>
+              <a:t>PER persist ordering</a:t>
             </a:r>
             <a:endParaRPr lang="en-US" dirty="0"/>
           </a:p>
@@ -22376,6 +22125,953 @@
               <a:rPr lang="en-US" smtClean="0"/>
               <a:pPr/>
               <a:t>27</a:t>
+            </a:fld>
+            <a:endParaRPr lang="en-US" dirty="0"/>
+          </a:p>
+        </p:txBody>
+      </p:sp>
+      <p:grpSp>
+        <p:nvGrpSpPr>
+          <p:cNvPr id="18" name="Group 17"/>
+          <p:cNvGrpSpPr/>
+          <p:nvPr/>
+        </p:nvGrpSpPr>
+        <p:grpSpPr>
+          <a:xfrm>
+            <a:off x="287524" y="3789040"/>
+            <a:ext cx="3664914" cy="2691011"/>
+            <a:chOff x="359532" y="1268760"/>
+            <a:chExt cx="3664914" cy="2691011"/>
+          </a:xfrm>
+        </p:grpSpPr>
+        <p:grpSp>
+          <p:nvGrpSpPr>
+            <p:cNvPr id="12" name="Group 11"/>
+            <p:cNvGrpSpPr/>
+            <p:nvPr/>
+          </p:nvGrpSpPr>
+          <p:grpSpPr>
+            <a:xfrm>
+              <a:off x="359532" y="1713002"/>
+              <a:ext cx="3664914" cy="2246769"/>
+              <a:chOff x="416745" y="1568986"/>
+              <a:chExt cx="3664914" cy="2246769"/>
+            </a:xfrm>
+          </p:grpSpPr>
+          <p:sp>
+            <p:nvSpPr>
+              <p:cNvPr id="5" name="TextBox 4"/>
+              <p:cNvSpPr txBox="1"/>
+              <p:nvPr/>
+            </p:nvSpPr>
+            <p:spPr>
+              <a:xfrm>
+                <a:off x="416745" y="1568986"/>
+                <a:ext cx="3664914" cy="2246769"/>
+              </a:xfrm>
+              <a:prstGeom prst="rect">
+                <a:avLst/>
+              </a:prstGeom>
+              <a:noFill/>
+            </p:spPr>
+            <p:txBody>
+              <a:bodyPr wrap="none" rtlCol="0">
+                <a:spAutoFit/>
+              </a:bodyPr>
+              <a:lstStyle/>
+              <a:p>
+                <a:pPr algn="l"/>
+                <a:r>
+                  <a:rPr lang="en-US" dirty="0" smtClean="0"/>
+                  <a:t>Thread 1:</a:t>
+                </a:r>
+                <a:r>
+                  <a:rPr lang="en-US" b="0" dirty="0" smtClean="0"/>
+                  <a:t> A | B C</a:t>
+                </a:r>
+              </a:p>
+              <a:p>
+                <a:pPr algn="l"/>
+                <a:r>
+                  <a:rPr lang="en-US" dirty="0" smtClean="0"/>
+                  <a:t>Thread 2:</a:t>
+                </a:r>
+                <a:r>
+                  <a:rPr lang="en-US" b="0" dirty="0" smtClean="0"/>
+                  <a:t>                  </a:t>
+                </a:r>
+                <a:r>
+                  <a:rPr lang="en-US" b="0" dirty="0"/>
+                  <a:t> </a:t>
+                </a:r>
+                <a:r>
+                  <a:rPr lang="en-US" b="0" dirty="0" smtClean="0"/>
+                  <a:t>C’ D | E</a:t>
+                </a:r>
+              </a:p>
+              <a:p>
+                <a:pPr algn="l"/>
+                <a:endParaRPr lang="en-US" b="0" dirty="0"/>
+              </a:p>
+              <a:p>
+                <a:pPr algn="l"/>
+                <a:r>
+                  <a:rPr lang="en-US" b="0" dirty="0" smtClean="0"/>
+                  <a:t>A before E (race and barriers)</a:t>
+                </a:r>
+              </a:p>
+              <a:p>
+                <a:pPr algn="l"/>
+                <a:r>
+                  <a:rPr lang="en-US" b="0" dirty="0" smtClean="0"/>
+                  <a:t>C before C’ (cache coherence)</a:t>
+                </a:r>
+              </a:p>
+              <a:p>
+                <a:pPr algn="l"/>
+                <a:r>
+                  <a:rPr lang="en-US" b="0" dirty="0" smtClean="0"/>
+                  <a:t>A before C’ (transitivity)</a:t>
+                </a:r>
+              </a:p>
+              <a:p>
+                <a:pPr algn="l"/>
+                <a:r>
+                  <a:rPr lang="en-US" b="0" dirty="0" smtClean="0"/>
+                  <a:t>C before E (transitivity)</a:t>
+                </a:r>
+                <a:endParaRPr lang="en-US" dirty="0"/>
+              </a:p>
+            </p:txBody>
+          </p:sp>
+          <p:sp>
+            <p:nvSpPr>
+              <p:cNvPr id="8" name="Right Arrow 7"/>
+              <p:cNvSpPr/>
+              <p:nvPr/>
+            </p:nvSpPr>
+            <p:spPr bwMode="auto">
+              <a:xfrm rot="1652981">
+                <a:off x="2534728" y="1798869"/>
+                <a:ext cx="406937" cy="164428"/>
+              </a:xfrm>
+              <a:prstGeom prst="rightArrow">
+                <a:avLst/>
+              </a:prstGeom>
+              <a:solidFill>
+                <a:schemeClr val="tx1"/>
+              </a:solidFill>
+              <a:ln w="9525" cap="flat" cmpd="sng" algn="ctr">
+                <a:solidFill>
+                  <a:schemeClr val="tx1"/>
+                </a:solidFill>
+                <a:prstDash val="solid"/>
+                <a:round/>
+                <a:headEnd type="none" w="med" len="med"/>
+                <a:tailEnd type="none" w="med" len="med"/>
+              </a:ln>
+              <a:effectLst/>
+            </p:spPr>
+            <p:txBody>
+              <a:bodyPr vert="horz" wrap="square" lIns="91440" tIns="45720" rIns="91440" bIns="45720" numCol="1" rtlCol="0" anchor="t" anchorCtr="0" compatLnSpc="1">
+                <a:prstTxWarp prst="textNoShape">
+                  <a:avLst/>
+                </a:prstTxWarp>
+              </a:bodyPr>
+              <a:lstStyle/>
+              <a:p>
+                <a:pPr marL="0" marR="0" indent="0" algn="l" defTabSz="914400" rtl="0" eaLnBrk="0" fontAlgn="base" latinLnBrk="0" hangingPunct="0">
+                  <a:lnSpc>
+                    <a:spcPct val="100000"/>
+                  </a:lnSpc>
+                  <a:spcBef>
+                    <a:spcPct val="0"/>
+                  </a:spcBef>
+                  <a:spcAft>
+                    <a:spcPct val="0"/>
+                  </a:spcAft>
+                  <a:buClrTx/>
+                  <a:buSzTx/>
+                  <a:buFontTx/>
+                  <a:buNone/>
+                  <a:tabLst/>
+                </a:pPr>
+                <a:endParaRPr kumimoji="0" lang="en-US" sz="2400" b="0" i="0" u="none" strike="noStrike" cap="none" normalizeH="0" baseline="0" smtClean="0">
+                  <a:ln>
+                    <a:noFill/>
+                  </a:ln>
+                  <a:solidFill>
+                    <a:schemeClr val="tx1"/>
+                  </a:solidFill>
+                  <a:effectLst/>
+                  <a:latin typeface="Arial" charset="0"/>
+                  <a:ea typeface="ＭＳ Ｐゴシック" charset="-128"/>
+                </a:endParaRPr>
+              </a:p>
+            </p:txBody>
+          </p:sp>
+        </p:grpSp>
+        <p:sp>
+          <p:nvSpPr>
+            <p:cNvPr id="14" name="TextBox 13"/>
+            <p:cNvSpPr txBox="1"/>
+            <p:nvPr/>
+          </p:nvSpPr>
+          <p:spPr>
+            <a:xfrm>
+              <a:off x="1130641" y="1268760"/>
+              <a:ext cx="2122697" cy="400110"/>
+            </a:xfrm>
+            <a:prstGeom prst="rect">
+              <a:avLst/>
+            </a:prstGeom>
+            <a:noFill/>
+          </p:spPr>
+          <p:txBody>
+            <a:bodyPr wrap="none" rtlCol="0">
+              <a:spAutoFit/>
+            </a:bodyPr>
+            <a:lstStyle/>
+            <a:p>
+              <a:r>
+                <a:rPr lang="en-US" dirty="0" err="1" smtClean="0"/>
+                <a:t>Persist</a:t>
+              </a:r>
+              <a:r>
+                <a:rPr lang="en-US" dirty="0" err="1" smtClean="0">
+                  <a:sym typeface="Wingdings" panose="05000000000000000000" pitchFamily="2" charset="2"/>
+                </a:rPr>
+                <a:t>Persist</a:t>
+              </a:r>
+              <a:endParaRPr lang="en-US" dirty="0"/>
+            </a:p>
+          </p:txBody>
+        </p:sp>
+      </p:grpSp>
+      <p:grpSp>
+        <p:nvGrpSpPr>
+          <p:cNvPr id="19" name="Group 18"/>
+          <p:cNvGrpSpPr/>
+          <p:nvPr/>
+        </p:nvGrpSpPr>
+        <p:grpSpPr>
+          <a:xfrm>
+            <a:off x="287524" y="1340768"/>
+            <a:ext cx="4057521" cy="2116272"/>
+            <a:chOff x="4730811" y="1227946"/>
+            <a:chExt cx="4057521" cy="2116272"/>
+          </a:xfrm>
+        </p:grpSpPr>
+        <p:grpSp>
+          <p:nvGrpSpPr>
+            <p:cNvPr id="13" name="Group 12"/>
+            <p:cNvGrpSpPr/>
+            <p:nvPr/>
+          </p:nvGrpSpPr>
+          <p:grpSpPr>
+            <a:xfrm>
+              <a:off x="4730811" y="1713002"/>
+              <a:ext cx="4057521" cy="1631216"/>
+              <a:chOff x="4788024" y="1568986"/>
+              <a:chExt cx="4057521" cy="1631216"/>
+            </a:xfrm>
+          </p:grpSpPr>
+          <p:sp>
+            <p:nvSpPr>
+              <p:cNvPr id="6" name="TextBox 5"/>
+              <p:cNvSpPr txBox="1"/>
+              <p:nvPr/>
+            </p:nvSpPr>
+            <p:spPr>
+              <a:xfrm>
+                <a:off x="4788024" y="1568986"/>
+                <a:ext cx="4057521" cy="1631216"/>
+              </a:xfrm>
+              <a:prstGeom prst="rect">
+                <a:avLst/>
+              </a:prstGeom>
+              <a:noFill/>
+            </p:spPr>
+            <p:txBody>
+              <a:bodyPr wrap="none" rtlCol="0">
+                <a:spAutoFit/>
+              </a:bodyPr>
+              <a:lstStyle/>
+              <a:p>
+                <a:pPr algn="l"/>
+                <a:r>
+                  <a:rPr lang="en-US" dirty="0" smtClean="0"/>
+                  <a:t>Thread 1:</a:t>
+                </a:r>
+                <a:r>
+                  <a:rPr lang="en-US" b="0" dirty="0" smtClean="0"/>
+                  <a:t> A | B C</a:t>
+                </a:r>
+              </a:p>
+              <a:p>
+                <a:pPr algn="l"/>
+                <a:r>
+                  <a:rPr lang="en-US" dirty="0" smtClean="0"/>
+                  <a:t>Thread 2:</a:t>
+                </a:r>
+                <a:r>
+                  <a:rPr lang="en-US" b="0" dirty="0" smtClean="0"/>
+                  <a:t>                   load C D | E</a:t>
+                </a:r>
+              </a:p>
+              <a:p>
+                <a:pPr algn="l"/>
+                <a:endParaRPr lang="en-US" b="0" dirty="0"/>
+              </a:p>
+              <a:p>
+                <a:pPr algn="l"/>
+                <a:r>
+                  <a:rPr lang="en-US" b="0" dirty="0" smtClean="0"/>
+                  <a:t>A before E (race and barriers)</a:t>
+                </a:r>
+                <a:endParaRPr lang="en-US" b="0" dirty="0"/>
+              </a:p>
+              <a:p>
+                <a:pPr algn="l"/>
+                <a:r>
+                  <a:rPr lang="en-US" b="0" i="1" dirty="0" smtClean="0">
+                    <a:solidFill>
+                      <a:srgbClr val="FF0000"/>
+                    </a:solidFill>
+                  </a:rPr>
+                  <a:t>Not</a:t>
+                </a:r>
+                <a:r>
+                  <a:rPr lang="en-US" b="0" dirty="0" smtClean="0">
+                    <a:solidFill>
+                      <a:srgbClr val="FF0000"/>
+                    </a:solidFill>
+                  </a:rPr>
+                  <a:t> C before E</a:t>
+                </a:r>
+                <a:endParaRPr lang="en-US" i="1" dirty="0">
+                  <a:solidFill>
+                    <a:srgbClr val="FF0000"/>
+                  </a:solidFill>
+                </a:endParaRPr>
+              </a:p>
+            </p:txBody>
+          </p:sp>
+          <p:sp>
+            <p:nvSpPr>
+              <p:cNvPr id="10" name="Right Arrow 9"/>
+              <p:cNvSpPr/>
+              <p:nvPr/>
+            </p:nvSpPr>
+            <p:spPr bwMode="auto">
+              <a:xfrm rot="1652981">
+                <a:off x="6912148" y="1798868"/>
+                <a:ext cx="406937" cy="164428"/>
+              </a:xfrm>
+              <a:prstGeom prst="rightArrow">
+                <a:avLst/>
+              </a:prstGeom>
+              <a:solidFill>
+                <a:schemeClr val="tx1"/>
+              </a:solidFill>
+              <a:ln w="9525" cap="flat" cmpd="sng" algn="ctr">
+                <a:solidFill>
+                  <a:schemeClr val="tx1"/>
+                </a:solidFill>
+                <a:prstDash val="solid"/>
+                <a:round/>
+                <a:headEnd type="none" w="med" len="med"/>
+                <a:tailEnd type="none" w="med" len="med"/>
+              </a:ln>
+              <a:effectLst/>
+            </p:spPr>
+            <p:txBody>
+              <a:bodyPr vert="horz" wrap="square" lIns="91440" tIns="45720" rIns="91440" bIns="45720" numCol="1" rtlCol="0" anchor="t" anchorCtr="0" compatLnSpc="1">
+                <a:prstTxWarp prst="textNoShape">
+                  <a:avLst/>
+                </a:prstTxWarp>
+              </a:bodyPr>
+              <a:lstStyle/>
+              <a:p>
+                <a:pPr marL="0" marR="0" indent="0" algn="l" defTabSz="914400" rtl="0" eaLnBrk="0" fontAlgn="base" latinLnBrk="0" hangingPunct="0">
+                  <a:lnSpc>
+                    <a:spcPct val="100000"/>
+                  </a:lnSpc>
+                  <a:spcBef>
+                    <a:spcPct val="0"/>
+                  </a:spcBef>
+                  <a:spcAft>
+                    <a:spcPct val="0"/>
+                  </a:spcAft>
+                  <a:buClrTx/>
+                  <a:buSzTx/>
+                  <a:buFontTx/>
+                  <a:buNone/>
+                  <a:tabLst/>
+                </a:pPr>
+                <a:endParaRPr kumimoji="0" lang="en-US" sz="2400" b="0" i="0" u="none" strike="noStrike" cap="none" normalizeH="0" baseline="0" smtClean="0">
+                  <a:ln>
+                    <a:noFill/>
+                  </a:ln>
+                  <a:solidFill>
+                    <a:schemeClr val="tx1"/>
+                  </a:solidFill>
+                  <a:effectLst/>
+                  <a:latin typeface="Arial" charset="0"/>
+                  <a:ea typeface="ＭＳ Ｐゴシック" charset="-128"/>
+                </a:endParaRPr>
+              </a:p>
+            </p:txBody>
+          </p:sp>
+        </p:grpSp>
+        <p:sp>
+          <p:nvSpPr>
+            <p:cNvPr id="15" name="TextBox 14"/>
+            <p:cNvSpPr txBox="1"/>
+            <p:nvPr/>
+          </p:nvSpPr>
+          <p:spPr>
+            <a:xfrm>
+              <a:off x="5783182" y="1227946"/>
+              <a:ext cx="1952779" cy="400110"/>
+            </a:xfrm>
+            <a:prstGeom prst="rect">
+              <a:avLst/>
+            </a:prstGeom>
+            <a:noFill/>
+          </p:spPr>
+          <p:txBody>
+            <a:bodyPr wrap="none" rtlCol="0">
+              <a:spAutoFit/>
+            </a:bodyPr>
+            <a:lstStyle/>
+            <a:p>
+              <a:r>
+                <a:rPr lang="en-US" dirty="0" err="1" smtClean="0"/>
+                <a:t>Persist</a:t>
+              </a:r>
+              <a:r>
+                <a:rPr lang="en-US" dirty="0" err="1" smtClean="0">
+                  <a:sym typeface="Wingdings" panose="05000000000000000000" pitchFamily="2" charset="2"/>
+                </a:rPr>
+                <a:t>Load</a:t>
+              </a:r>
+              <a:endParaRPr lang="en-US" dirty="0"/>
+            </a:p>
+          </p:txBody>
+        </p:sp>
+      </p:grpSp>
+      <p:grpSp>
+        <p:nvGrpSpPr>
+          <p:cNvPr id="17" name="Group 16"/>
+          <p:cNvGrpSpPr/>
+          <p:nvPr/>
+        </p:nvGrpSpPr>
+        <p:grpSpPr>
+          <a:xfrm>
+            <a:off x="4721883" y="1340768"/>
+            <a:ext cx="4206601" cy="1719483"/>
+            <a:chOff x="2329437" y="4581128"/>
+            <a:chExt cx="4206601" cy="1719483"/>
+          </a:xfrm>
+        </p:grpSpPr>
+        <p:grpSp>
+          <p:nvGrpSpPr>
+            <p:cNvPr id="11" name="Group 10"/>
+            <p:cNvGrpSpPr/>
+            <p:nvPr/>
+          </p:nvGrpSpPr>
+          <p:grpSpPr>
+            <a:xfrm>
+              <a:off x="2329437" y="4977172"/>
+              <a:ext cx="4206601" cy="1323439"/>
+              <a:chOff x="416744" y="3753036"/>
+              <a:chExt cx="4206601" cy="1323439"/>
+            </a:xfrm>
+          </p:grpSpPr>
+          <p:sp>
+            <p:nvSpPr>
+              <p:cNvPr id="7" name="TextBox 6"/>
+              <p:cNvSpPr txBox="1"/>
+              <p:nvPr/>
+            </p:nvSpPr>
+            <p:spPr>
+              <a:xfrm>
+                <a:off x="416744" y="3753036"/>
+                <a:ext cx="4206601" cy="1323439"/>
+              </a:xfrm>
+              <a:prstGeom prst="rect">
+                <a:avLst/>
+              </a:prstGeom>
+              <a:noFill/>
+            </p:spPr>
+            <p:txBody>
+              <a:bodyPr wrap="none" rtlCol="0">
+                <a:spAutoFit/>
+              </a:bodyPr>
+              <a:lstStyle/>
+              <a:p>
+                <a:pPr algn="l"/>
+                <a:r>
+                  <a:rPr lang="en-US" dirty="0" smtClean="0"/>
+                  <a:t>Thread 1:</a:t>
+                </a:r>
+                <a:r>
+                  <a:rPr lang="en-US" b="0" dirty="0" smtClean="0"/>
+                  <a:t> A | B   load C</a:t>
+                </a:r>
+              </a:p>
+              <a:p>
+                <a:pPr algn="l"/>
+                <a:r>
+                  <a:rPr lang="en-US" dirty="0" smtClean="0"/>
+                  <a:t>Thread 2:</a:t>
+                </a:r>
+                <a:r>
+                  <a:rPr lang="en-US" b="0" dirty="0" smtClean="0"/>
+                  <a:t>                             C D | E</a:t>
+                </a:r>
+              </a:p>
+              <a:p>
+                <a:pPr algn="l"/>
+                <a:endParaRPr lang="en-US" b="0" dirty="0"/>
+              </a:p>
+              <a:p>
+                <a:pPr algn="l"/>
+                <a:r>
+                  <a:rPr lang="en-US" b="0" dirty="0" smtClean="0"/>
+                  <a:t>A before E (race and barriers)</a:t>
+                </a:r>
+                <a:endParaRPr lang="en-US" dirty="0"/>
+              </a:p>
+            </p:txBody>
+          </p:sp>
+          <p:sp>
+            <p:nvSpPr>
+              <p:cNvPr id="9" name="Right Arrow 8"/>
+              <p:cNvSpPr/>
+              <p:nvPr/>
+            </p:nvSpPr>
+            <p:spPr bwMode="auto">
+              <a:xfrm rot="1652981">
+                <a:off x="3218803" y="4017842"/>
+                <a:ext cx="406937" cy="164428"/>
+              </a:xfrm>
+              <a:prstGeom prst="rightArrow">
+                <a:avLst/>
+              </a:prstGeom>
+              <a:solidFill>
+                <a:schemeClr val="tx1"/>
+              </a:solidFill>
+              <a:ln w="9525" cap="flat" cmpd="sng" algn="ctr">
+                <a:solidFill>
+                  <a:schemeClr val="tx1"/>
+                </a:solidFill>
+                <a:prstDash val="solid"/>
+                <a:round/>
+                <a:headEnd type="none" w="med" len="med"/>
+                <a:tailEnd type="none" w="med" len="med"/>
+              </a:ln>
+              <a:effectLst/>
+            </p:spPr>
+            <p:txBody>
+              <a:bodyPr vert="horz" wrap="square" lIns="91440" tIns="45720" rIns="91440" bIns="45720" numCol="1" rtlCol="0" anchor="t" anchorCtr="0" compatLnSpc="1">
+                <a:prstTxWarp prst="textNoShape">
+                  <a:avLst/>
+                </a:prstTxWarp>
+              </a:bodyPr>
+              <a:lstStyle/>
+              <a:p>
+                <a:pPr marL="0" marR="0" indent="0" algn="l" defTabSz="914400" rtl="0" eaLnBrk="0" fontAlgn="base" latinLnBrk="0" hangingPunct="0">
+                  <a:lnSpc>
+                    <a:spcPct val="100000"/>
+                  </a:lnSpc>
+                  <a:spcBef>
+                    <a:spcPct val="0"/>
+                  </a:spcBef>
+                  <a:spcAft>
+                    <a:spcPct val="0"/>
+                  </a:spcAft>
+                  <a:buClrTx/>
+                  <a:buSzTx/>
+                  <a:buFontTx/>
+                  <a:buNone/>
+                  <a:tabLst/>
+                </a:pPr>
+                <a:endParaRPr kumimoji="0" lang="en-US" sz="2400" b="0" i="0" u="none" strike="noStrike" cap="none" normalizeH="0" baseline="0" smtClean="0">
+                  <a:ln>
+                    <a:noFill/>
+                  </a:ln>
+                  <a:solidFill>
+                    <a:schemeClr val="tx1"/>
+                  </a:solidFill>
+                  <a:effectLst/>
+                  <a:latin typeface="Arial" charset="0"/>
+                  <a:ea typeface="ＭＳ Ｐゴシック" charset="-128"/>
+                </a:endParaRPr>
+              </a:p>
+            </p:txBody>
+          </p:sp>
+        </p:grpSp>
+        <p:sp>
+          <p:nvSpPr>
+            <p:cNvPr id="16" name="TextBox 15"/>
+            <p:cNvSpPr txBox="1"/>
+            <p:nvPr/>
+          </p:nvSpPr>
+          <p:spPr>
+            <a:xfrm>
+              <a:off x="3456344" y="4581128"/>
+              <a:ext cx="1952779" cy="400110"/>
+            </a:xfrm>
+            <a:prstGeom prst="rect">
+              <a:avLst/>
+            </a:prstGeom>
+            <a:noFill/>
+          </p:spPr>
+          <p:txBody>
+            <a:bodyPr wrap="none" rtlCol="0">
+              <a:spAutoFit/>
+            </a:bodyPr>
+            <a:lstStyle/>
+            <a:p>
+              <a:r>
+                <a:rPr lang="en-US" dirty="0" err="1" smtClean="0"/>
+                <a:t>Load</a:t>
+              </a:r>
+              <a:r>
+                <a:rPr lang="en-US" dirty="0" err="1" smtClean="0">
+                  <a:sym typeface="Wingdings" panose="05000000000000000000" pitchFamily="2" charset="2"/>
+                </a:rPr>
+                <a:t>Persist</a:t>
+              </a:r>
+              <a:endParaRPr lang="en-US" dirty="0"/>
+            </a:p>
+          </p:txBody>
+        </p:sp>
+      </p:grpSp>
+      <p:grpSp>
+        <p:nvGrpSpPr>
+          <p:cNvPr id="20" name="Group 19"/>
+          <p:cNvGrpSpPr/>
+          <p:nvPr/>
+        </p:nvGrpSpPr>
+        <p:grpSpPr>
+          <a:xfrm>
+            <a:off x="4724108" y="3789040"/>
+            <a:ext cx="3557641" cy="1767681"/>
+            <a:chOff x="359532" y="1268760"/>
+            <a:chExt cx="3557641" cy="1767681"/>
+          </a:xfrm>
+        </p:grpSpPr>
+        <p:grpSp>
+          <p:nvGrpSpPr>
+            <p:cNvPr id="21" name="Group 20"/>
+            <p:cNvGrpSpPr/>
+            <p:nvPr/>
+          </p:nvGrpSpPr>
+          <p:grpSpPr>
+            <a:xfrm>
+              <a:off x="359532" y="1713002"/>
+              <a:ext cx="3557641" cy="1323439"/>
+              <a:chOff x="416745" y="1568986"/>
+              <a:chExt cx="3557641" cy="1323439"/>
+            </a:xfrm>
+          </p:grpSpPr>
+          <p:sp>
+            <p:nvSpPr>
+              <p:cNvPr id="23" name="TextBox 22"/>
+              <p:cNvSpPr txBox="1"/>
+              <p:nvPr/>
+            </p:nvSpPr>
+            <p:spPr>
+              <a:xfrm>
+                <a:off x="416745" y="1568986"/>
+                <a:ext cx="3557641" cy="1323439"/>
+              </a:xfrm>
+              <a:prstGeom prst="rect">
+                <a:avLst/>
+              </a:prstGeom>
+              <a:noFill/>
+            </p:spPr>
+            <p:txBody>
+              <a:bodyPr wrap="none" rtlCol="0">
+                <a:spAutoFit/>
+              </a:bodyPr>
+              <a:lstStyle/>
+              <a:p>
+                <a:pPr algn="l"/>
+                <a:r>
+                  <a:rPr lang="en-US" dirty="0" smtClean="0"/>
+                  <a:t>Thread 1:</a:t>
+                </a:r>
+                <a:r>
+                  <a:rPr lang="en-US" b="0" dirty="0" smtClean="0"/>
+                  <a:t> A | B C</a:t>
+                </a:r>
+              </a:p>
+              <a:p>
+                <a:pPr algn="l"/>
+                <a:r>
+                  <a:rPr lang="en-US" dirty="0" smtClean="0"/>
+                  <a:t>Thread 2:</a:t>
+                </a:r>
+                <a:r>
+                  <a:rPr lang="en-US" b="0" dirty="0" smtClean="0"/>
+                  <a:t>                  </a:t>
+                </a:r>
+                <a:r>
+                  <a:rPr lang="en-US" b="0" dirty="0"/>
+                  <a:t> </a:t>
+                </a:r>
+                <a:r>
+                  <a:rPr lang="en-US" b="0" dirty="0" smtClean="0"/>
+                  <a:t>C D | E</a:t>
+                </a:r>
+              </a:p>
+              <a:p>
+                <a:pPr algn="l"/>
+                <a:endParaRPr lang="en-US" b="0" dirty="0"/>
+              </a:p>
+              <a:p>
+                <a:pPr algn="l"/>
+                <a:r>
+                  <a:rPr lang="en-US" b="0" dirty="0" smtClean="0"/>
+                  <a:t>A before E (race and barriers)</a:t>
+                </a:r>
+              </a:p>
+            </p:txBody>
+          </p:sp>
+          <p:sp>
+            <p:nvSpPr>
+              <p:cNvPr id="24" name="Right Arrow 23"/>
+              <p:cNvSpPr/>
+              <p:nvPr/>
+            </p:nvSpPr>
+            <p:spPr bwMode="auto">
+              <a:xfrm rot="1652981">
+                <a:off x="2534728" y="1798869"/>
+                <a:ext cx="406937" cy="164428"/>
+              </a:xfrm>
+              <a:prstGeom prst="rightArrow">
+                <a:avLst/>
+              </a:prstGeom>
+              <a:solidFill>
+                <a:schemeClr val="tx1"/>
+              </a:solidFill>
+              <a:ln w="9525" cap="flat" cmpd="sng" algn="ctr">
+                <a:solidFill>
+                  <a:schemeClr val="tx1"/>
+                </a:solidFill>
+                <a:prstDash val="solid"/>
+                <a:round/>
+                <a:headEnd type="none" w="med" len="med"/>
+                <a:tailEnd type="none" w="med" len="med"/>
+              </a:ln>
+              <a:effectLst/>
+            </p:spPr>
+            <p:txBody>
+              <a:bodyPr vert="horz" wrap="square" lIns="91440" tIns="45720" rIns="91440" bIns="45720" numCol="1" rtlCol="0" anchor="t" anchorCtr="0" compatLnSpc="1">
+                <a:prstTxWarp prst="textNoShape">
+                  <a:avLst/>
+                </a:prstTxWarp>
+              </a:bodyPr>
+              <a:lstStyle/>
+              <a:p>
+                <a:pPr marL="0" marR="0" indent="0" algn="l" defTabSz="914400" rtl="0" eaLnBrk="0" fontAlgn="base" latinLnBrk="0" hangingPunct="0">
+                  <a:lnSpc>
+                    <a:spcPct val="100000"/>
+                  </a:lnSpc>
+                  <a:spcBef>
+                    <a:spcPct val="0"/>
+                  </a:spcBef>
+                  <a:spcAft>
+                    <a:spcPct val="0"/>
+                  </a:spcAft>
+                  <a:buClrTx/>
+                  <a:buSzTx/>
+                  <a:buFontTx/>
+                  <a:buNone/>
+                  <a:tabLst/>
+                </a:pPr>
+                <a:endParaRPr kumimoji="0" lang="en-US" sz="2400" b="0" i="0" u="none" strike="noStrike" cap="none" normalizeH="0" baseline="0" smtClean="0">
+                  <a:ln>
+                    <a:noFill/>
+                  </a:ln>
+                  <a:solidFill>
+                    <a:schemeClr val="tx1"/>
+                  </a:solidFill>
+                  <a:effectLst/>
+                  <a:latin typeface="Arial" charset="0"/>
+                  <a:ea typeface="ＭＳ Ｐゴシック" charset="-128"/>
+                </a:endParaRPr>
+              </a:p>
+            </p:txBody>
+          </p:sp>
+        </p:grpSp>
+        <p:sp>
+          <p:nvSpPr>
+            <p:cNvPr id="22" name="TextBox 21"/>
+            <p:cNvSpPr txBox="1"/>
+            <p:nvPr/>
+          </p:nvSpPr>
+          <p:spPr>
+            <a:xfrm>
+              <a:off x="1388721" y="1268760"/>
+              <a:ext cx="1606530" cy="400110"/>
+            </a:xfrm>
+            <a:prstGeom prst="rect">
+              <a:avLst/>
+            </a:prstGeom>
+            <a:noFill/>
+          </p:spPr>
+          <p:txBody>
+            <a:bodyPr wrap="none" rtlCol="0">
+              <a:spAutoFit/>
+            </a:bodyPr>
+            <a:lstStyle/>
+            <a:p>
+              <a:r>
+                <a:rPr lang="en-US" dirty="0" smtClean="0">
+                  <a:sym typeface="Wingdings" panose="05000000000000000000" pitchFamily="2" charset="2"/>
+                </a:rPr>
+                <a:t>C is volatile</a:t>
+              </a:r>
+              <a:endParaRPr lang="en-US" dirty="0"/>
+            </a:p>
+          </p:txBody>
+        </p:sp>
+      </p:grpSp>
+      <p:sp>
+        <p:nvSpPr>
+          <p:cNvPr id="25" name="TextBox 24"/>
+          <p:cNvSpPr txBox="1"/>
+          <p:nvPr/>
+        </p:nvSpPr>
+        <p:spPr>
+          <a:xfrm>
+            <a:off x="4319972" y="5817458"/>
+            <a:ext cx="4464496" cy="707886"/>
+          </a:xfrm>
+          <a:prstGeom prst="rect">
+            <a:avLst/>
+          </a:prstGeom>
+          <a:noFill/>
+        </p:spPr>
+        <p:txBody>
+          <a:bodyPr wrap="square" rtlCol="0">
+            <a:spAutoFit/>
+          </a:bodyPr>
+          <a:lstStyle/>
+          <a:p>
+            <a:pPr algn="l"/>
+            <a:r>
+              <a:rPr lang="en-US" b="0" i="1" dirty="0" smtClean="0">
+                <a:solidFill>
+                  <a:srgbClr val="FF0000"/>
+                </a:solidFill>
+              </a:rPr>
+              <a:t>PER orders persists outside of racing epochs, except for cache coherence</a:t>
+            </a:r>
+            <a:endParaRPr lang="en-US" b="0" i="1" dirty="0">
+              <a:solidFill>
+                <a:srgbClr val="FF0000"/>
+              </a:solidFill>
+            </a:endParaRPr>
+          </a:p>
+        </p:txBody>
+      </p:sp>
+    </p:spTree>
+    <p:extLst>
+      <p:ext uri="{BB962C8B-B14F-4D97-AF65-F5344CB8AC3E}">
+        <p14:creationId xmlns:p14="http://schemas.microsoft.com/office/powerpoint/2010/main" val="2623669425"/>
+      </p:ext>
+    </p:extLst>
+  </p:cSld>
+  <p:clrMapOvr>
+    <a:masterClrMapping/>
+  </p:clrMapOvr>
+  <p:timing>
+    <p:tnLst>
+      <p:par>
+        <p:cTn id="1" dur="indefinite" restart="never" nodeType="tmRoot"/>
+      </p:par>
+    </p:tnLst>
+  </p:timing>
+</p:sld>
+</file>
+
+<file path=ppt/slides/slide28.xml><?xml version="1.0" encoding="utf-8"?>
+<p:sld xmlns:a="http://schemas.openxmlformats.org/drawingml/2006/main" xmlns:r="http://schemas.openxmlformats.org/officeDocument/2006/relationships" xmlns:p="http://schemas.openxmlformats.org/presentationml/2006/main">
+  <p:cSld>
+    <p:spTree>
+      <p:nvGrpSpPr>
+        <p:cNvPr id="1" name=""/>
+        <p:cNvGrpSpPr/>
+        <p:nvPr/>
+      </p:nvGrpSpPr>
+      <p:grpSpPr>
+        <a:xfrm>
+          <a:off x="0" y="0"/>
+          <a:ext cx="0" cy="0"/>
+          <a:chOff x="0" y="0"/>
+          <a:chExt cx="0" cy="0"/>
+        </a:xfrm>
+      </p:grpSpPr>
+      <p:sp>
+        <p:nvSpPr>
+          <p:cNvPr id="2" name="Title 1"/>
+          <p:cNvSpPr>
+            <a:spLocks noGrp="1"/>
+          </p:cNvSpPr>
+          <p:nvPr>
+            <p:ph type="title"/>
+          </p:nvPr>
+        </p:nvSpPr>
+        <p:spPr/>
+        <p:txBody>
+          <a:bodyPr/>
+          <a:lstStyle/>
+          <a:p>
+            <a:r>
+              <a:rPr lang="en-US" dirty="0" smtClean="0"/>
+              <a:t>Epoch</a:t>
+            </a:r>
+            <a:r>
+              <a:rPr lang="en-US" baseline="0" dirty="0" smtClean="0"/>
+              <a:t> persistency queue, 2</a:t>
+            </a:r>
+            <a:r>
+              <a:rPr lang="en-US" baseline="30000" dirty="0" smtClean="0"/>
+              <a:t>nd</a:t>
+            </a:r>
+            <a:r>
+              <a:rPr lang="en-US" baseline="0" dirty="0" smtClean="0"/>
+              <a:t> attempt</a:t>
+            </a:r>
+            <a:endParaRPr lang="en-US" dirty="0"/>
+          </a:p>
+        </p:txBody>
+      </p:sp>
+      <p:sp>
+        <p:nvSpPr>
+          <p:cNvPr id="4" name="Slide Number Placeholder 3"/>
+          <p:cNvSpPr>
+            <a:spLocks noGrp="1"/>
+          </p:cNvSpPr>
+          <p:nvPr>
+            <p:ph type="sldNum" sz="quarter" idx="4"/>
+          </p:nvPr>
+        </p:nvSpPr>
+        <p:spPr/>
+        <p:txBody>
+          <a:bodyPr/>
+          <a:lstStyle/>
+          <a:p>
+            <a:fld id="{24EAD923-3004-4A31-84C7-9B440B785588}" type="slidenum">
+              <a:rPr lang="en-US" smtClean="0"/>
+              <a:pPr/>
+              <a:t>28</a:t>
             </a:fld>
             <a:endParaRPr lang="en-US" dirty="0"/>
           </a:p>
@@ -22844,7 +23540,7 @@
 </p:sld>
 </file>
 
-<file path=ppt/slides/slide28.xml><?xml version="1.0" encoding="utf-8"?>
+<file path=ppt/slides/slide29.xml><?xml version="1.0" encoding="utf-8"?>
 <p:sld xmlns:a="http://schemas.openxmlformats.org/drawingml/2006/main" xmlns:r="http://schemas.openxmlformats.org/officeDocument/2006/relationships" xmlns:p="http://schemas.openxmlformats.org/presentationml/2006/main">
   <p:cSld>
     <p:spTree>
@@ -23080,7 +23776,7 @@
             <a:fld id="{24EAD923-3004-4A31-84C7-9B440B785588}" type="slidenum">
               <a:rPr lang="en-US" smtClean="0"/>
               <a:pPr/>
-              <a:t>28</a:t>
+              <a:t>29</a:t>
             </a:fld>
             <a:endParaRPr lang="en-US" dirty="0"/>
           </a:p>
@@ -24975,7 +25671,575 @@
 </p:sld>
 </file>
 
-<file path=ppt/slides/slide29.xml><?xml version="1.0" encoding="utf-8"?>
+<file path=ppt/slides/slide3.xml><?xml version="1.0" encoding="utf-8"?>
+<p:sld xmlns:a="http://schemas.openxmlformats.org/drawingml/2006/main" xmlns:r="http://schemas.openxmlformats.org/officeDocument/2006/relationships" xmlns:p="http://schemas.openxmlformats.org/presentationml/2006/main">
+  <p:cSld>
+    <p:spTree>
+      <p:nvGrpSpPr>
+        <p:cNvPr id="1" name=""/>
+        <p:cNvGrpSpPr/>
+        <p:nvPr/>
+      </p:nvGrpSpPr>
+      <p:grpSpPr>
+        <a:xfrm>
+          <a:off x="0" y="0"/>
+          <a:ext cx="0" cy="0"/>
+          <a:chOff x="0" y="0"/>
+          <a:chExt cx="0" cy="0"/>
+        </a:xfrm>
+      </p:grpSpPr>
+      <p:sp>
+        <p:nvSpPr>
+          <p:cNvPr id="2" name="Title 1"/>
+          <p:cNvSpPr>
+            <a:spLocks noGrp="1"/>
+          </p:cNvSpPr>
+          <p:nvPr>
+            <p:ph type="title"/>
+          </p:nvPr>
+        </p:nvSpPr>
+        <p:spPr/>
+        <p:txBody>
+          <a:bodyPr/>
+          <a:lstStyle/>
+          <a:p>
+            <a:r>
+              <a:rPr lang="en-US" dirty="0" smtClean="0"/>
+              <a:t>NVRAM recovery</a:t>
+            </a:r>
+            <a:endParaRPr lang="en-US" dirty="0"/>
+          </a:p>
+        </p:txBody>
+      </p:sp>
+      <p:sp>
+        <p:nvSpPr>
+          <p:cNvPr id="4" name="Slide Number Placeholder 3"/>
+          <p:cNvSpPr>
+            <a:spLocks noGrp="1"/>
+          </p:cNvSpPr>
+          <p:nvPr>
+            <p:ph type="sldNum" sz="quarter" idx="4"/>
+          </p:nvPr>
+        </p:nvSpPr>
+        <p:spPr/>
+        <p:txBody>
+          <a:bodyPr/>
+          <a:lstStyle/>
+          <a:p>
+            <a:fld id="{24EAD923-3004-4A31-84C7-9B440B785588}" type="slidenum">
+              <a:rPr lang="en-US" smtClean="0"/>
+              <a:pPr/>
+              <a:t>3</a:t>
+            </a:fld>
+            <a:endParaRPr lang="en-US" dirty="0"/>
+          </a:p>
+        </p:txBody>
+      </p:sp>
+      <p:pic>
+        <p:nvPicPr>
+          <p:cNvPr id="11266" name="Picture 2" descr="http://upload.wikimedia.org/wikipedia/commons/6/62/Intel_CPU_Pentium_4_640_Prescott_bottom.jpg"/>
+          <p:cNvPicPr>
+            <a:picLocks noChangeAspect="1" noChangeArrowheads="1"/>
+          </p:cNvPicPr>
+          <p:nvPr/>
+        </p:nvPicPr>
+        <p:blipFill>
+          <a:blip r:embed="rId2" cstate="print">
+            <a:extLst>
+              <a:ext uri="{28A0092B-C50C-407E-A947-70E740481C1C}">
+                <a14:useLocalDpi xmlns:a14="http://schemas.microsoft.com/office/drawing/2010/main" val="0"/>
+              </a:ext>
+            </a:extLst>
+          </a:blip>
+          <a:srcRect/>
+          <a:stretch>
+            <a:fillRect/>
+          </a:stretch>
+        </p:blipFill>
+        <p:spPr bwMode="auto">
+          <a:xfrm>
+            <a:off x="827584" y="1559044"/>
+            <a:ext cx="2867298" cy="1905960"/>
+          </a:xfrm>
+          <a:prstGeom prst="rect">
+            <a:avLst/>
+          </a:prstGeom>
+          <a:noFill/>
+          <a:extLst>
+            <a:ext uri="{909E8E84-426E-40DD-AFC4-6F175D3DCCD1}">
+              <a14:hiddenFill xmlns:a14="http://schemas.microsoft.com/office/drawing/2010/main">
+                <a:solidFill>
+                  <a:srgbClr val="FFFFFF"/>
+                </a:solidFill>
+              </a14:hiddenFill>
+            </a:ext>
+          </a:extLst>
+        </p:spPr>
+      </p:pic>
+      <p:pic>
+        <p:nvPicPr>
+          <p:cNvPr id="10" name="Picture 6" descr="http://cdn.eteknix.com/wp-content/uploads/2011/11/RAM.jpg"/>
+          <p:cNvPicPr>
+            <a:picLocks noChangeAspect="1" noChangeArrowheads="1"/>
+          </p:cNvPicPr>
+          <p:nvPr/>
+        </p:nvPicPr>
+        <p:blipFill>
+          <a:blip r:embed="rId3">
+            <a:extLst>
+              <a:ext uri="{28A0092B-C50C-407E-A947-70E740481C1C}">
+                <a14:useLocalDpi xmlns:a14="http://schemas.microsoft.com/office/drawing/2010/main" val="0"/>
+              </a:ext>
+            </a:extLst>
+          </a:blip>
+          <a:srcRect/>
+          <a:stretch>
+            <a:fillRect/>
+          </a:stretch>
+        </p:blipFill>
+        <p:spPr bwMode="auto">
+          <a:xfrm>
+            <a:off x="5400092" y="1232756"/>
+            <a:ext cx="3610016" cy="2760600"/>
+          </a:xfrm>
+          <a:prstGeom prst="rect">
+            <a:avLst/>
+          </a:prstGeom>
+          <a:noFill/>
+          <a:extLst>
+            <a:ext uri="{909E8E84-426E-40DD-AFC4-6F175D3DCCD1}">
+              <a14:hiddenFill xmlns:a14="http://schemas.microsoft.com/office/drawing/2010/main">
+                <a:solidFill>
+                  <a:srgbClr val="FFFFFF"/>
+                </a:solidFill>
+              </a14:hiddenFill>
+            </a:ext>
+          </a:extLst>
+        </p:spPr>
+      </p:pic>
+      <p:sp>
+        <p:nvSpPr>
+          <p:cNvPr id="7" name="Right Arrow 6"/>
+          <p:cNvSpPr/>
+          <p:nvPr/>
+        </p:nvSpPr>
+        <p:spPr bwMode="auto">
+          <a:xfrm>
+            <a:off x="3514862" y="1909798"/>
+            <a:ext cx="1237158" cy="547094"/>
+          </a:xfrm>
+          <a:prstGeom prst="rightArrow">
+            <a:avLst/>
+          </a:prstGeom>
+          <a:solidFill>
+            <a:schemeClr val="accent1"/>
+          </a:solidFill>
+          <a:ln w="9525" cap="flat" cmpd="sng" algn="ctr">
+            <a:solidFill>
+              <a:schemeClr val="tx1"/>
+            </a:solidFill>
+            <a:prstDash val="solid"/>
+            <a:round/>
+            <a:headEnd type="none" w="med" len="med"/>
+            <a:tailEnd type="none" w="med" len="med"/>
+          </a:ln>
+          <a:effectLst/>
+        </p:spPr>
+        <p:txBody>
+          <a:bodyPr vert="horz" wrap="square" lIns="91440" tIns="45720" rIns="91440" bIns="45720" numCol="1" rtlCol="0" anchor="ctr" anchorCtr="0" compatLnSpc="1">
+            <a:prstTxWarp prst="textNoShape">
+              <a:avLst/>
+            </a:prstTxWarp>
+          </a:bodyPr>
+          <a:lstStyle/>
+          <a:p>
+            <a:pPr marL="0" marR="0" indent="0" defTabSz="914400" rtl="0" eaLnBrk="0" fontAlgn="base" latinLnBrk="0" hangingPunct="0">
+              <a:lnSpc>
+                <a:spcPct val="100000"/>
+              </a:lnSpc>
+              <a:spcBef>
+                <a:spcPct val="0"/>
+              </a:spcBef>
+              <a:spcAft>
+                <a:spcPct val="0"/>
+              </a:spcAft>
+              <a:buClrTx/>
+              <a:buSzTx/>
+              <a:buFontTx/>
+              <a:buNone/>
+              <a:tabLst/>
+            </a:pPr>
+            <a:endParaRPr kumimoji="0" lang="en-US" sz="2400" b="0" i="0" u="none" strike="noStrike" cap="none" normalizeH="0" baseline="0" dirty="0" smtClean="0">
+              <a:ln>
+                <a:noFill/>
+              </a:ln>
+              <a:solidFill>
+                <a:schemeClr val="tx1"/>
+              </a:solidFill>
+              <a:effectLst/>
+              <a:latin typeface="Arial" charset="0"/>
+              <a:ea typeface="ＭＳ Ｐゴシック" charset="-128"/>
+            </a:endParaRPr>
+          </a:p>
+        </p:txBody>
+      </p:sp>
+      <p:sp>
+        <p:nvSpPr>
+          <p:cNvPr id="8" name="TextBox 7"/>
+          <p:cNvSpPr txBox="1"/>
+          <p:nvPr/>
+        </p:nvSpPr>
+        <p:spPr>
+          <a:xfrm>
+            <a:off x="3851920" y="1480718"/>
+            <a:ext cx="2387385" cy="400110"/>
+          </a:xfrm>
+          <a:prstGeom prst="rect">
+            <a:avLst/>
+          </a:prstGeom>
+          <a:noFill/>
+        </p:spPr>
+        <p:txBody>
+          <a:bodyPr wrap="none" rtlCol="0">
+            <a:spAutoFit/>
+          </a:bodyPr>
+          <a:lstStyle/>
+          <a:p>
+            <a:r>
+              <a:rPr lang="en-US" dirty="0" smtClean="0">
+                <a:solidFill>
+                  <a:srgbClr val="FF0000"/>
+                </a:solidFill>
+              </a:rPr>
+              <a:t>Writes unordered!</a:t>
+            </a:r>
+            <a:endParaRPr lang="en-US" dirty="0">
+              <a:solidFill>
+                <a:srgbClr val="FF0000"/>
+              </a:solidFill>
+            </a:endParaRPr>
+          </a:p>
+        </p:txBody>
+      </p:sp>
+      <p:sp>
+        <p:nvSpPr>
+          <p:cNvPr id="11" name="Right Arrow 10"/>
+          <p:cNvSpPr/>
+          <p:nvPr/>
+        </p:nvSpPr>
+        <p:spPr bwMode="auto">
+          <a:xfrm>
+            <a:off x="4133441" y="2339509"/>
+            <a:ext cx="1237158" cy="547094"/>
+          </a:xfrm>
+          <a:prstGeom prst="rightArrow">
+            <a:avLst/>
+          </a:prstGeom>
+          <a:solidFill>
+            <a:schemeClr val="accent1"/>
+          </a:solidFill>
+          <a:ln w="9525" cap="flat" cmpd="sng" algn="ctr">
+            <a:solidFill>
+              <a:schemeClr val="tx1"/>
+            </a:solidFill>
+            <a:prstDash val="solid"/>
+            <a:round/>
+            <a:headEnd type="none" w="med" len="med"/>
+            <a:tailEnd type="none" w="med" len="med"/>
+          </a:ln>
+          <a:effectLst/>
+        </p:spPr>
+        <p:txBody>
+          <a:bodyPr vert="horz" wrap="square" lIns="91440" tIns="45720" rIns="91440" bIns="45720" numCol="1" rtlCol="0" anchor="ctr" anchorCtr="0" compatLnSpc="1">
+            <a:prstTxWarp prst="textNoShape">
+              <a:avLst/>
+            </a:prstTxWarp>
+          </a:bodyPr>
+          <a:lstStyle/>
+          <a:p>
+            <a:pPr marL="0" marR="0" indent="0" defTabSz="914400" rtl="0" eaLnBrk="0" fontAlgn="base" latinLnBrk="0" hangingPunct="0">
+              <a:lnSpc>
+                <a:spcPct val="100000"/>
+              </a:lnSpc>
+              <a:spcBef>
+                <a:spcPct val="0"/>
+              </a:spcBef>
+              <a:spcAft>
+                <a:spcPct val="0"/>
+              </a:spcAft>
+              <a:buClrTx/>
+              <a:buSzTx/>
+              <a:buFontTx/>
+              <a:buNone/>
+              <a:tabLst/>
+            </a:pPr>
+            <a:r>
+              <a:rPr lang="en-US" sz="2400" b="0" dirty="0" smtClean="0">
+                <a:ea typeface="ＭＳ Ｐゴシック" charset="-128"/>
+              </a:rPr>
+              <a:t>writes</a:t>
+            </a:r>
+            <a:endParaRPr kumimoji="0" lang="en-US" sz="2400" b="0" i="0" u="none" strike="noStrike" cap="none" normalizeH="0" baseline="0" dirty="0" smtClean="0">
+              <a:ln>
+                <a:noFill/>
+              </a:ln>
+              <a:solidFill>
+                <a:schemeClr val="tx1"/>
+              </a:solidFill>
+              <a:effectLst/>
+              <a:latin typeface="Arial" charset="0"/>
+              <a:ea typeface="ＭＳ Ｐゴシック" charset="-128"/>
+            </a:endParaRPr>
+          </a:p>
+        </p:txBody>
+      </p:sp>
+      <p:sp>
+        <p:nvSpPr>
+          <p:cNvPr id="13" name="Right Arrow 12"/>
+          <p:cNvSpPr/>
+          <p:nvPr/>
+        </p:nvSpPr>
+        <p:spPr bwMode="auto">
+          <a:xfrm>
+            <a:off x="3724375" y="2780928"/>
+            <a:ext cx="1237158" cy="547094"/>
+          </a:xfrm>
+          <a:prstGeom prst="rightArrow">
+            <a:avLst/>
+          </a:prstGeom>
+          <a:solidFill>
+            <a:schemeClr val="accent1"/>
+          </a:solidFill>
+          <a:ln w="9525" cap="flat" cmpd="sng" algn="ctr">
+            <a:solidFill>
+              <a:schemeClr val="tx1"/>
+            </a:solidFill>
+            <a:prstDash val="solid"/>
+            <a:round/>
+            <a:headEnd type="none" w="med" len="med"/>
+            <a:tailEnd type="none" w="med" len="med"/>
+          </a:ln>
+          <a:effectLst/>
+        </p:spPr>
+        <p:txBody>
+          <a:bodyPr vert="horz" wrap="square" lIns="91440" tIns="45720" rIns="91440" bIns="45720" numCol="1" rtlCol="0" anchor="ctr" anchorCtr="0" compatLnSpc="1">
+            <a:prstTxWarp prst="textNoShape">
+              <a:avLst/>
+            </a:prstTxWarp>
+          </a:bodyPr>
+          <a:lstStyle/>
+          <a:p>
+            <a:pPr marL="0" marR="0" indent="0" defTabSz="914400" rtl="0" eaLnBrk="0" fontAlgn="base" latinLnBrk="0" hangingPunct="0">
+              <a:lnSpc>
+                <a:spcPct val="100000"/>
+              </a:lnSpc>
+              <a:spcBef>
+                <a:spcPct val="0"/>
+              </a:spcBef>
+              <a:spcAft>
+                <a:spcPct val="0"/>
+              </a:spcAft>
+              <a:buClrTx/>
+              <a:buSzTx/>
+              <a:buFontTx/>
+              <a:buNone/>
+              <a:tabLst/>
+            </a:pPr>
+            <a:endParaRPr kumimoji="0" lang="en-US" sz="2400" b="0" i="0" u="none" strike="noStrike" cap="none" normalizeH="0" baseline="0" dirty="0" smtClean="0">
+              <a:ln>
+                <a:noFill/>
+              </a:ln>
+              <a:solidFill>
+                <a:schemeClr val="tx1"/>
+              </a:solidFill>
+              <a:effectLst/>
+              <a:latin typeface="Arial" charset="0"/>
+              <a:ea typeface="ＭＳ Ｐゴシック" charset="-128"/>
+            </a:endParaRPr>
+          </a:p>
+        </p:txBody>
+      </p:sp>
+      <p:sp>
+        <p:nvSpPr>
+          <p:cNvPr id="16" name="Content Placeholder 2"/>
+          <p:cNvSpPr>
+            <a:spLocks noGrp="1"/>
+          </p:cNvSpPr>
+          <p:nvPr>
+            <p:ph idx="1"/>
+          </p:nvPr>
+        </p:nvSpPr>
+        <p:spPr>
+          <a:xfrm>
+            <a:off x="457200" y="3645024"/>
+            <a:ext cx="8229600" cy="2337123"/>
+          </a:xfrm>
+        </p:spPr>
+        <p:txBody>
+          <a:bodyPr/>
+          <a:lstStyle/>
+          <a:p>
+            <a:r>
+              <a:rPr lang="en-US" dirty="0" smtClean="0"/>
+              <a:t>Must constrain write order for recovery</a:t>
+            </a:r>
+          </a:p>
+          <a:p>
+            <a:r>
+              <a:rPr lang="en-US" dirty="0" smtClean="0"/>
+              <a:t>Cache eviction reorders writes to memory</a:t>
+            </a:r>
+          </a:p>
+          <a:p>
+            <a:r>
+              <a:rPr lang="en-US" dirty="0" smtClean="0"/>
+              <a:t>Enforcing program order writes incurs </a:t>
+            </a:r>
+            <a:r>
+              <a:rPr lang="en-US" b="1" dirty="0" smtClean="0">
+                <a:solidFill>
+                  <a:srgbClr val="FF0000"/>
+                </a:solidFill>
+              </a:rPr>
+              <a:t>30x</a:t>
+            </a:r>
+            <a:r>
+              <a:rPr lang="en-US" dirty="0" smtClean="0"/>
+              <a:t> slowdown over instruction execution rate.</a:t>
+            </a:r>
+          </a:p>
+        </p:txBody>
+      </p:sp>
+      <p:sp>
+        <p:nvSpPr>
+          <p:cNvPr id="17" name="TextBox 16"/>
+          <p:cNvSpPr txBox="1"/>
+          <p:nvPr/>
+        </p:nvSpPr>
+        <p:spPr>
+          <a:xfrm>
+            <a:off x="5714" y="5919663"/>
+            <a:ext cx="9132628" cy="461665"/>
+          </a:xfrm>
+          <a:prstGeom prst="rect">
+            <a:avLst/>
+          </a:prstGeom>
+          <a:noFill/>
+        </p:spPr>
+        <p:txBody>
+          <a:bodyPr wrap="none" rtlCol="0">
+            <a:spAutoFit/>
+          </a:bodyPr>
+          <a:lstStyle/>
+          <a:p>
+            <a:r>
+              <a:rPr lang="en-US" sz="2400" b="0" i="1" dirty="0" smtClean="0">
+                <a:solidFill>
+                  <a:srgbClr val="FF0909"/>
+                </a:solidFill>
+              </a:rPr>
+              <a:t>Must constrain writes for correctness, but reorder for performance</a:t>
+            </a:r>
+            <a:endParaRPr lang="en-US" sz="2400" b="0" i="1" dirty="0">
+              <a:solidFill>
+                <a:srgbClr val="FF0909"/>
+              </a:solidFill>
+            </a:endParaRPr>
+          </a:p>
+        </p:txBody>
+      </p:sp>
+    </p:spTree>
+    <p:extLst>
+      <p:ext uri="{BB962C8B-B14F-4D97-AF65-F5344CB8AC3E}">
+        <p14:creationId xmlns:p14="http://schemas.microsoft.com/office/powerpoint/2010/main" val="3248928663"/>
+      </p:ext>
+    </p:extLst>
+  </p:cSld>
+  <p:clrMapOvr>
+    <a:masterClrMapping/>
+  </p:clrMapOvr>
+  <p:timing>
+    <p:tnLst>
+      <p:par>
+        <p:cTn id="1" dur="indefinite" restart="never" nodeType="tmRoot">
+          <p:childTnLst>
+            <p:seq concurrent="1" nextAc="seek">
+              <p:cTn id="2" dur="indefinite" nodeType="mainSeq">
+                <p:childTnLst>
+                  <p:par>
+                    <p:cTn id="3" fill="hold">
+                      <p:stCondLst>
+                        <p:cond delay="indefinite"/>
+                      </p:stCondLst>
+                      <p:childTnLst>
+                        <p:par>
+                          <p:cTn id="4" fill="hold">
+                            <p:stCondLst>
+                              <p:cond delay="0"/>
+                            </p:stCondLst>
+                            <p:childTnLst>
+                              <p:par>
+                                <p:cTn id="5" presetID="1" presetClass="entr" presetSubtype="0" fill="hold" grpId="0" nodeType="clickEffect">
+                                  <p:stCondLst>
+                                    <p:cond delay="0"/>
+                                  </p:stCondLst>
+                                  <p:childTnLst>
+                                    <p:set>
+                                      <p:cBhvr>
+                                        <p:cTn id="6" dur="1" fill="hold">
+                                          <p:stCondLst>
+                                            <p:cond delay="0"/>
+                                          </p:stCondLst>
+                                        </p:cTn>
+                                        <p:tgtEl>
+                                          <p:spTgt spid="17"/>
+                                        </p:tgtEl>
+                                        <p:attrNameLst>
+                                          <p:attrName>style.visibility</p:attrName>
+                                        </p:attrNameLst>
+                                      </p:cBhvr>
+                                      <p:to>
+                                        <p:strVal val="visible"/>
+                                      </p:to>
+                                    </p:set>
+                                  </p:childTnLst>
+                                </p:cTn>
+                              </p:par>
+                            </p:childTnLst>
+                          </p:cTn>
+                        </p:par>
+                      </p:childTnLst>
+                    </p:cTn>
+                  </p:par>
+                </p:childTnLst>
+              </p:cTn>
+              <p:prevCondLst>
+                <p:cond evt="onPrev" delay="0">
+                  <p:tgtEl>
+                    <p:sldTgt/>
+                  </p:tgtEl>
+                </p:cond>
+              </p:prevCondLst>
+              <p:nextCondLst>
+                <p:cond evt="onNext" delay="0">
+                  <p:tgtEl>
+                    <p:sldTgt/>
+                  </p:tgtEl>
+                </p:cond>
+              </p:nextCondLst>
+            </p:seq>
+          </p:childTnLst>
+        </p:cTn>
+      </p:par>
+    </p:tnLst>
+    <p:bldLst>
+      <p:bldP spid="17" grpId="0"/>
+    </p:bldLst>
+  </p:timing>
+</p:sld>
+</file>
+
+<file path=ppt/slides/slide30.xml><?xml version="1.0" encoding="utf-8"?>
 <p:sld xmlns:a="http://schemas.openxmlformats.org/drawingml/2006/main" xmlns:r="http://schemas.openxmlformats.org/officeDocument/2006/relationships" xmlns:p="http://schemas.openxmlformats.org/presentationml/2006/main">
   <p:cSld>
     <p:spTree>
@@ -25211,7 +26475,7 @@
             <a:fld id="{24EAD923-3004-4A31-84C7-9B440B785588}" type="slidenum">
               <a:rPr lang="en-US" smtClean="0"/>
               <a:pPr/>
-              <a:t>29</a:t>
+              <a:t>30</a:t>
             </a:fld>
             <a:endParaRPr lang="en-US" dirty="0"/>
           </a:p>
@@ -27106,575 +28370,7 @@
 </p:sld>
 </file>
 
-<file path=ppt/slides/slide3.xml><?xml version="1.0" encoding="utf-8"?>
-<p:sld xmlns:a="http://schemas.openxmlformats.org/drawingml/2006/main" xmlns:r="http://schemas.openxmlformats.org/officeDocument/2006/relationships" xmlns:p="http://schemas.openxmlformats.org/presentationml/2006/main">
-  <p:cSld>
-    <p:spTree>
-      <p:nvGrpSpPr>
-        <p:cNvPr id="1" name=""/>
-        <p:cNvGrpSpPr/>
-        <p:nvPr/>
-      </p:nvGrpSpPr>
-      <p:grpSpPr>
-        <a:xfrm>
-          <a:off x="0" y="0"/>
-          <a:ext cx="0" cy="0"/>
-          <a:chOff x="0" y="0"/>
-          <a:chExt cx="0" cy="0"/>
-        </a:xfrm>
-      </p:grpSpPr>
-      <p:sp>
-        <p:nvSpPr>
-          <p:cNvPr id="2" name="Title 1"/>
-          <p:cNvSpPr>
-            <a:spLocks noGrp="1"/>
-          </p:cNvSpPr>
-          <p:nvPr>
-            <p:ph type="title"/>
-          </p:nvPr>
-        </p:nvSpPr>
-        <p:spPr/>
-        <p:txBody>
-          <a:bodyPr/>
-          <a:lstStyle/>
-          <a:p>
-            <a:r>
-              <a:rPr lang="en-US" dirty="0" smtClean="0"/>
-              <a:t>NVRAM recovery</a:t>
-            </a:r>
-            <a:endParaRPr lang="en-US" dirty="0"/>
-          </a:p>
-        </p:txBody>
-      </p:sp>
-      <p:sp>
-        <p:nvSpPr>
-          <p:cNvPr id="4" name="Slide Number Placeholder 3"/>
-          <p:cNvSpPr>
-            <a:spLocks noGrp="1"/>
-          </p:cNvSpPr>
-          <p:nvPr>
-            <p:ph type="sldNum" sz="quarter" idx="4"/>
-          </p:nvPr>
-        </p:nvSpPr>
-        <p:spPr/>
-        <p:txBody>
-          <a:bodyPr/>
-          <a:lstStyle/>
-          <a:p>
-            <a:fld id="{24EAD923-3004-4A31-84C7-9B440B785588}" type="slidenum">
-              <a:rPr lang="en-US" smtClean="0"/>
-              <a:pPr/>
-              <a:t>3</a:t>
-            </a:fld>
-            <a:endParaRPr lang="en-US" dirty="0"/>
-          </a:p>
-        </p:txBody>
-      </p:sp>
-      <p:pic>
-        <p:nvPicPr>
-          <p:cNvPr id="11266" name="Picture 2" descr="http://upload.wikimedia.org/wikipedia/commons/6/62/Intel_CPU_Pentium_4_640_Prescott_bottom.jpg"/>
-          <p:cNvPicPr>
-            <a:picLocks noChangeAspect="1" noChangeArrowheads="1"/>
-          </p:cNvPicPr>
-          <p:nvPr/>
-        </p:nvPicPr>
-        <p:blipFill>
-          <a:blip r:embed="rId2" cstate="print">
-            <a:extLst>
-              <a:ext uri="{28A0092B-C50C-407E-A947-70E740481C1C}">
-                <a14:useLocalDpi xmlns:a14="http://schemas.microsoft.com/office/drawing/2010/main" val="0"/>
-              </a:ext>
-            </a:extLst>
-          </a:blip>
-          <a:srcRect/>
-          <a:stretch>
-            <a:fillRect/>
-          </a:stretch>
-        </p:blipFill>
-        <p:spPr bwMode="auto">
-          <a:xfrm>
-            <a:off x="827584" y="1559044"/>
-            <a:ext cx="2867298" cy="1905960"/>
-          </a:xfrm>
-          <a:prstGeom prst="rect">
-            <a:avLst/>
-          </a:prstGeom>
-          <a:noFill/>
-          <a:extLst>
-            <a:ext uri="{909E8E84-426E-40DD-AFC4-6F175D3DCCD1}">
-              <a14:hiddenFill xmlns:a14="http://schemas.microsoft.com/office/drawing/2010/main">
-                <a:solidFill>
-                  <a:srgbClr val="FFFFFF"/>
-                </a:solidFill>
-              </a14:hiddenFill>
-            </a:ext>
-          </a:extLst>
-        </p:spPr>
-      </p:pic>
-      <p:pic>
-        <p:nvPicPr>
-          <p:cNvPr id="10" name="Picture 6" descr="http://cdn.eteknix.com/wp-content/uploads/2011/11/RAM.jpg"/>
-          <p:cNvPicPr>
-            <a:picLocks noChangeAspect="1" noChangeArrowheads="1"/>
-          </p:cNvPicPr>
-          <p:nvPr/>
-        </p:nvPicPr>
-        <p:blipFill>
-          <a:blip r:embed="rId3">
-            <a:extLst>
-              <a:ext uri="{28A0092B-C50C-407E-A947-70E740481C1C}">
-                <a14:useLocalDpi xmlns:a14="http://schemas.microsoft.com/office/drawing/2010/main" val="0"/>
-              </a:ext>
-            </a:extLst>
-          </a:blip>
-          <a:srcRect/>
-          <a:stretch>
-            <a:fillRect/>
-          </a:stretch>
-        </p:blipFill>
-        <p:spPr bwMode="auto">
-          <a:xfrm>
-            <a:off x="5400092" y="1232756"/>
-            <a:ext cx="3610016" cy="2760600"/>
-          </a:xfrm>
-          <a:prstGeom prst="rect">
-            <a:avLst/>
-          </a:prstGeom>
-          <a:noFill/>
-          <a:extLst>
-            <a:ext uri="{909E8E84-426E-40DD-AFC4-6F175D3DCCD1}">
-              <a14:hiddenFill xmlns:a14="http://schemas.microsoft.com/office/drawing/2010/main">
-                <a:solidFill>
-                  <a:srgbClr val="FFFFFF"/>
-                </a:solidFill>
-              </a14:hiddenFill>
-            </a:ext>
-          </a:extLst>
-        </p:spPr>
-      </p:pic>
-      <p:sp>
-        <p:nvSpPr>
-          <p:cNvPr id="7" name="Right Arrow 6"/>
-          <p:cNvSpPr/>
-          <p:nvPr/>
-        </p:nvSpPr>
-        <p:spPr bwMode="auto">
-          <a:xfrm>
-            <a:off x="3514862" y="1909798"/>
-            <a:ext cx="1237158" cy="547094"/>
-          </a:xfrm>
-          <a:prstGeom prst="rightArrow">
-            <a:avLst/>
-          </a:prstGeom>
-          <a:solidFill>
-            <a:schemeClr val="accent1"/>
-          </a:solidFill>
-          <a:ln w="9525" cap="flat" cmpd="sng" algn="ctr">
-            <a:solidFill>
-              <a:schemeClr val="tx1"/>
-            </a:solidFill>
-            <a:prstDash val="solid"/>
-            <a:round/>
-            <a:headEnd type="none" w="med" len="med"/>
-            <a:tailEnd type="none" w="med" len="med"/>
-          </a:ln>
-          <a:effectLst/>
-        </p:spPr>
-        <p:txBody>
-          <a:bodyPr vert="horz" wrap="square" lIns="91440" tIns="45720" rIns="91440" bIns="45720" numCol="1" rtlCol="0" anchor="ctr" anchorCtr="0" compatLnSpc="1">
-            <a:prstTxWarp prst="textNoShape">
-              <a:avLst/>
-            </a:prstTxWarp>
-          </a:bodyPr>
-          <a:lstStyle/>
-          <a:p>
-            <a:pPr marL="0" marR="0" indent="0" defTabSz="914400" rtl="0" eaLnBrk="0" fontAlgn="base" latinLnBrk="0" hangingPunct="0">
-              <a:lnSpc>
-                <a:spcPct val="100000"/>
-              </a:lnSpc>
-              <a:spcBef>
-                <a:spcPct val="0"/>
-              </a:spcBef>
-              <a:spcAft>
-                <a:spcPct val="0"/>
-              </a:spcAft>
-              <a:buClrTx/>
-              <a:buSzTx/>
-              <a:buFontTx/>
-              <a:buNone/>
-              <a:tabLst/>
-            </a:pPr>
-            <a:endParaRPr kumimoji="0" lang="en-US" sz="2400" b="0" i="0" u="none" strike="noStrike" cap="none" normalizeH="0" baseline="0" dirty="0" smtClean="0">
-              <a:ln>
-                <a:noFill/>
-              </a:ln>
-              <a:solidFill>
-                <a:schemeClr val="tx1"/>
-              </a:solidFill>
-              <a:effectLst/>
-              <a:latin typeface="Arial" charset="0"/>
-              <a:ea typeface="ＭＳ Ｐゴシック" charset="-128"/>
-            </a:endParaRPr>
-          </a:p>
-        </p:txBody>
-      </p:sp>
-      <p:sp>
-        <p:nvSpPr>
-          <p:cNvPr id="8" name="TextBox 7"/>
-          <p:cNvSpPr txBox="1"/>
-          <p:nvPr/>
-        </p:nvSpPr>
-        <p:spPr>
-          <a:xfrm>
-            <a:off x="3851920" y="1480718"/>
-            <a:ext cx="2387385" cy="400110"/>
-          </a:xfrm>
-          <a:prstGeom prst="rect">
-            <a:avLst/>
-          </a:prstGeom>
-          <a:noFill/>
-        </p:spPr>
-        <p:txBody>
-          <a:bodyPr wrap="none" rtlCol="0">
-            <a:spAutoFit/>
-          </a:bodyPr>
-          <a:lstStyle/>
-          <a:p>
-            <a:r>
-              <a:rPr lang="en-US" dirty="0" smtClean="0">
-                <a:solidFill>
-                  <a:srgbClr val="FF0000"/>
-                </a:solidFill>
-              </a:rPr>
-              <a:t>Writes unordered!</a:t>
-            </a:r>
-            <a:endParaRPr lang="en-US" dirty="0">
-              <a:solidFill>
-                <a:srgbClr val="FF0000"/>
-              </a:solidFill>
-            </a:endParaRPr>
-          </a:p>
-        </p:txBody>
-      </p:sp>
-      <p:sp>
-        <p:nvSpPr>
-          <p:cNvPr id="11" name="Right Arrow 10"/>
-          <p:cNvSpPr/>
-          <p:nvPr/>
-        </p:nvSpPr>
-        <p:spPr bwMode="auto">
-          <a:xfrm>
-            <a:off x="4133441" y="2339509"/>
-            <a:ext cx="1237158" cy="547094"/>
-          </a:xfrm>
-          <a:prstGeom prst="rightArrow">
-            <a:avLst/>
-          </a:prstGeom>
-          <a:solidFill>
-            <a:schemeClr val="accent1"/>
-          </a:solidFill>
-          <a:ln w="9525" cap="flat" cmpd="sng" algn="ctr">
-            <a:solidFill>
-              <a:schemeClr val="tx1"/>
-            </a:solidFill>
-            <a:prstDash val="solid"/>
-            <a:round/>
-            <a:headEnd type="none" w="med" len="med"/>
-            <a:tailEnd type="none" w="med" len="med"/>
-          </a:ln>
-          <a:effectLst/>
-        </p:spPr>
-        <p:txBody>
-          <a:bodyPr vert="horz" wrap="square" lIns="91440" tIns="45720" rIns="91440" bIns="45720" numCol="1" rtlCol="0" anchor="ctr" anchorCtr="0" compatLnSpc="1">
-            <a:prstTxWarp prst="textNoShape">
-              <a:avLst/>
-            </a:prstTxWarp>
-          </a:bodyPr>
-          <a:lstStyle/>
-          <a:p>
-            <a:pPr marL="0" marR="0" indent="0" defTabSz="914400" rtl="0" eaLnBrk="0" fontAlgn="base" latinLnBrk="0" hangingPunct="0">
-              <a:lnSpc>
-                <a:spcPct val="100000"/>
-              </a:lnSpc>
-              <a:spcBef>
-                <a:spcPct val="0"/>
-              </a:spcBef>
-              <a:spcAft>
-                <a:spcPct val="0"/>
-              </a:spcAft>
-              <a:buClrTx/>
-              <a:buSzTx/>
-              <a:buFontTx/>
-              <a:buNone/>
-              <a:tabLst/>
-            </a:pPr>
-            <a:r>
-              <a:rPr lang="en-US" sz="2400" b="0" dirty="0" smtClean="0">
-                <a:ea typeface="ＭＳ Ｐゴシック" charset="-128"/>
-              </a:rPr>
-              <a:t>writes</a:t>
-            </a:r>
-            <a:endParaRPr kumimoji="0" lang="en-US" sz="2400" b="0" i="0" u="none" strike="noStrike" cap="none" normalizeH="0" baseline="0" dirty="0" smtClean="0">
-              <a:ln>
-                <a:noFill/>
-              </a:ln>
-              <a:solidFill>
-                <a:schemeClr val="tx1"/>
-              </a:solidFill>
-              <a:effectLst/>
-              <a:latin typeface="Arial" charset="0"/>
-              <a:ea typeface="ＭＳ Ｐゴシック" charset="-128"/>
-            </a:endParaRPr>
-          </a:p>
-        </p:txBody>
-      </p:sp>
-      <p:sp>
-        <p:nvSpPr>
-          <p:cNvPr id="13" name="Right Arrow 12"/>
-          <p:cNvSpPr/>
-          <p:nvPr/>
-        </p:nvSpPr>
-        <p:spPr bwMode="auto">
-          <a:xfrm>
-            <a:off x="3724375" y="2780928"/>
-            <a:ext cx="1237158" cy="547094"/>
-          </a:xfrm>
-          <a:prstGeom prst="rightArrow">
-            <a:avLst/>
-          </a:prstGeom>
-          <a:solidFill>
-            <a:schemeClr val="accent1"/>
-          </a:solidFill>
-          <a:ln w="9525" cap="flat" cmpd="sng" algn="ctr">
-            <a:solidFill>
-              <a:schemeClr val="tx1"/>
-            </a:solidFill>
-            <a:prstDash val="solid"/>
-            <a:round/>
-            <a:headEnd type="none" w="med" len="med"/>
-            <a:tailEnd type="none" w="med" len="med"/>
-          </a:ln>
-          <a:effectLst/>
-        </p:spPr>
-        <p:txBody>
-          <a:bodyPr vert="horz" wrap="square" lIns="91440" tIns="45720" rIns="91440" bIns="45720" numCol="1" rtlCol="0" anchor="ctr" anchorCtr="0" compatLnSpc="1">
-            <a:prstTxWarp prst="textNoShape">
-              <a:avLst/>
-            </a:prstTxWarp>
-          </a:bodyPr>
-          <a:lstStyle/>
-          <a:p>
-            <a:pPr marL="0" marR="0" indent="0" defTabSz="914400" rtl="0" eaLnBrk="0" fontAlgn="base" latinLnBrk="0" hangingPunct="0">
-              <a:lnSpc>
-                <a:spcPct val="100000"/>
-              </a:lnSpc>
-              <a:spcBef>
-                <a:spcPct val="0"/>
-              </a:spcBef>
-              <a:spcAft>
-                <a:spcPct val="0"/>
-              </a:spcAft>
-              <a:buClrTx/>
-              <a:buSzTx/>
-              <a:buFontTx/>
-              <a:buNone/>
-              <a:tabLst/>
-            </a:pPr>
-            <a:endParaRPr kumimoji="0" lang="en-US" sz="2400" b="0" i="0" u="none" strike="noStrike" cap="none" normalizeH="0" baseline="0" dirty="0" smtClean="0">
-              <a:ln>
-                <a:noFill/>
-              </a:ln>
-              <a:solidFill>
-                <a:schemeClr val="tx1"/>
-              </a:solidFill>
-              <a:effectLst/>
-              <a:latin typeface="Arial" charset="0"/>
-              <a:ea typeface="ＭＳ Ｐゴシック" charset="-128"/>
-            </a:endParaRPr>
-          </a:p>
-        </p:txBody>
-      </p:sp>
-      <p:sp>
-        <p:nvSpPr>
-          <p:cNvPr id="16" name="Content Placeholder 2"/>
-          <p:cNvSpPr>
-            <a:spLocks noGrp="1"/>
-          </p:cNvSpPr>
-          <p:nvPr>
-            <p:ph idx="1"/>
-          </p:nvPr>
-        </p:nvSpPr>
-        <p:spPr>
-          <a:xfrm>
-            <a:off x="457200" y="3645024"/>
-            <a:ext cx="8229600" cy="2337123"/>
-          </a:xfrm>
-        </p:spPr>
-        <p:txBody>
-          <a:bodyPr/>
-          <a:lstStyle/>
-          <a:p>
-            <a:r>
-              <a:rPr lang="en-US" dirty="0" smtClean="0"/>
-              <a:t>Must constrain write order for recovery</a:t>
-            </a:r>
-          </a:p>
-          <a:p>
-            <a:r>
-              <a:rPr lang="en-US" dirty="0" smtClean="0"/>
-              <a:t>Cache eviction reorders writes to memory</a:t>
-            </a:r>
-          </a:p>
-          <a:p>
-            <a:r>
-              <a:rPr lang="en-US" dirty="0" smtClean="0"/>
-              <a:t>Enforcing program order writes incurs </a:t>
-            </a:r>
-            <a:r>
-              <a:rPr lang="en-US" b="1" dirty="0" smtClean="0">
-                <a:solidFill>
-                  <a:srgbClr val="FF0000"/>
-                </a:solidFill>
-              </a:rPr>
-              <a:t>30x</a:t>
-            </a:r>
-            <a:r>
-              <a:rPr lang="en-US" dirty="0" smtClean="0"/>
-              <a:t> slowdown over instruction execution rate.</a:t>
-            </a:r>
-          </a:p>
-        </p:txBody>
-      </p:sp>
-      <p:sp>
-        <p:nvSpPr>
-          <p:cNvPr id="17" name="TextBox 16"/>
-          <p:cNvSpPr txBox="1"/>
-          <p:nvPr/>
-        </p:nvSpPr>
-        <p:spPr>
-          <a:xfrm>
-            <a:off x="5714" y="5919663"/>
-            <a:ext cx="9132628" cy="461665"/>
-          </a:xfrm>
-          <a:prstGeom prst="rect">
-            <a:avLst/>
-          </a:prstGeom>
-          <a:noFill/>
-        </p:spPr>
-        <p:txBody>
-          <a:bodyPr wrap="none" rtlCol="0">
-            <a:spAutoFit/>
-          </a:bodyPr>
-          <a:lstStyle/>
-          <a:p>
-            <a:r>
-              <a:rPr lang="en-US" sz="2400" b="0" i="1" dirty="0" smtClean="0">
-                <a:solidFill>
-                  <a:srgbClr val="FF0909"/>
-                </a:solidFill>
-              </a:rPr>
-              <a:t>Must constrain writes for correctness, but reorder for performance</a:t>
-            </a:r>
-            <a:endParaRPr lang="en-US" sz="2400" b="0" i="1" dirty="0">
-              <a:solidFill>
-                <a:srgbClr val="FF0909"/>
-              </a:solidFill>
-            </a:endParaRPr>
-          </a:p>
-        </p:txBody>
-      </p:sp>
-    </p:spTree>
-    <p:extLst>
-      <p:ext uri="{BB962C8B-B14F-4D97-AF65-F5344CB8AC3E}">
-        <p14:creationId xmlns:p14="http://schemas.microsoft.com/office/powerpoint/2010/main" val="3248928663"/>
-      </p:ext>
-    </p:extLst>
-  </p:cSld>
-  <p:clrMapOvr>
-    <a:masterClrMapping/>
-  </p:clrMapOvr>
-  <p:timing>
-    <p:tnLst>
-      <p:par>
-        <p:cTn id="1" dur="indefinite" restart="never" nodeType="tmRoot">
-          <p:childTnLst>
-            <p:seq concurrent="1" nextAc="seek">
-              <p:cTn id="2" dur="indefinite" nodeType="mainSeq">
-                <p:childTnLst>
-                  <p:par>
-                    <p:cTn id="3" fill="hold">
-                      <p:stCondLst>
-                        <p:cond delay="indefinite"/>
-                      </p:stCondLst>
-                      <p:childTnLst>
-                        <p:par>
-                          <p:cTn id="4" fill="hold">
-                            <p:stCondLst>
-                              <p:cond delay="0"/>
-                            </p:stCondLst>
-                            <p:childTnLst>
-                              <p:par>
-                                <p:cTn id="5" presetID="1" presetClass="entr" presetSubtype="0" fill="hold" grpId="0" nodeType="clickEffect">
-                                  <p:stCondLst>
-                                    <p:cond delay="0"/>
-                                  </p:stCondLst>
-                                  <p:childTnLst>
-                                    <p:set>
-                                      <p:cBhvr>
-                                        <p:cTn id="6" dur="1" fill="hold">
-                                          <p:stCondLst>
-                                            <p:cond delay="0"/>
-                                          </p:stCondLst>
-                                        </p:cTn>
-                                        <p:tgtEl>
-                                          <p:spTgt spid="17"/>
-                                        </p:tgtEl>
-                                        <p:attrNameLst>
-                                          <p:attrName>style.visibility</p:attrName>
-                                        </p:attrNameLst>
-                                      </p:cBhvr>
-                                      <p:to>
-                                        <p:strVal val="visible"/>
-                                      </p:to>
-                                    </p:set>
-                                  </p:childTnLst>
-                                </p:cTn>
-                              </p:par>
-                            </p:childTnLst>
-                          </p:cTn>
-                        </p:par>
-                      </p:childTnLst>
-                    </p:cTn>
-                  </p:par>
-                </p:childTnLst>
-              </p:cTn>
-              <p:prevCondLst>
-                <p:cond evt="onPrev" delay="0">
-                  <p:tgtEl>
-                    <p:sldTgt/>
-                  </p:tgtEl>
-                </p:cond>
-              </p:prevCondLst>
-              <p:nextCondLst>
-                <p:cond evt="onNext" delay="0">
-                  <p:tgtEl>
-                    <p:sldTgt/>
-                  </p:tgtEl>
-                </p:cond>
-              </p:nextCondLst>
-            </p:seq>
-          </p:childTnLst>
-        </p:cTn>
-      </p:par>
-    </p:tnLst>
-    <p:bldLst>
-      <p:bldP spid="17" grpId="0"/>
-    </p:bldLst>
-  </p:timing>
-</p:sld>
-</file>
-
-<file path=ppt/slides/slide30.xml><?xml version="1.0" encoding="utf-8"?>
+<file path=ppt/slides/slide31.xml><?xml version="1.0" encoding="utf-8"?>
 <p:sld xmlns:a="http://schemas.openxmlformats.org/drawingml/2006/main" xmlns:r="http://schemas.openxmlformats.org/officeDocument/2006/relationships" xmlns:p="http://schemas.openxmlformats.org/presentationml/2006/main">
   <p:cSld>
     <p:spTree>
@@ -27910,7 +28606,7 @@
             <a:fld id="{24EAD923-3004-4A31-84C7-9B440B785588}" type="slidenum">
               <a:rPr lang="en-US" smtClean="0"/>
               <a:pPr/>
-              <a:t>30</a:t>
+              <a:t>31</a:t>
             </a:fld>
             <a:endParaRPr lang="en-US" dirty="0"/>
           </a:p>
@@ -29980,141 +30676,6 @@
 </p:sld>
 </file>
 
-<file path=ppt/slides/slide31.xml><?xml version="1.0" encoding="utf-8"?>
-<p:sld xmlns:a="http://schemas.openxmlformats.org/drawingml/2006/main" xmlns:r="http://schemas.openxmlformats.org/officeDocument/2006/relationships" xmlns:p="http://schemas.openxmlformats.org/presentationml/2006/main">
-  <p:cSld>
-    <p:spTree>
-      <p:nvGrpSpPr>
-        <p:cNvPr id="1" name=""/>
-        <p:cNvGrpSpPr/>
-        <p:nvPr/>
-      </p:nvGrpSpPr>
-      <p:grpSpPr>
-        <a:xfrm>
-          <a:off x="0" y="0"/>
-          <a:ext cx="0" cy="0"/>
-          <a:chOff x="0" y="0"/>
-          <a:chExt cx="0" cy="0"/>
-        </a:xfrm>
-      </p:grpSpPr>
-      <p:sp>
-        <p:nvSpPr>
-          <p:cNvPr id="2" name="Title 1"/>
-          <p:cNvSpPr>
-            <a:spLocks noGrp="1"/>
-          </p:cNvSpPr>
-          <p:nvPr>
-            <p:ph type="title"/>
-          </p:nvPr>
-        </p:nvSpPr>
-        <p:spPr/>
-        <p:txBody>
-          <a:bodyPr/>
-          <a:lstStyle/>
-          <a:p>
-            <a:r>
-              <a:rPr lang="en-US" dirty="0" smtClean="0"/>
-              <a:t>Epoch persistency implementation</a:t>
-            </a:r>
-            <a:endParaRPr lang="en-US" dirty="0"/>
-          </a:p>
-        </p:txBody>
-      </p:sp>
-      <p:sp>
-        <p:nvSpPr>
-          <p:cNvPr id="3" name="Content Placeholder 2"/>
-          <p:cNvSpPr>
-            <a:spLocks noGrp="1"/>
-          </p:cNvSpPr>
-          <p:nvPr>
-            <p:ph idx="1"/>
-          </p:nvPr>
-        </p:nvSpPr>
-        <p:spPr/>
-        <p:txBody>
-          <a:bodyPr/>
-          <a:lstStyle/>
-          <a:p>
-            <a:r>
-              <a:rPr lang="en-US" dirty="0" smtClean="0"/>
-              <a:t>Similar to BPFS (see paper/dissertation)</a:t>
-            </a:r>
-          </a:p>
-          <a:p>
-            <a:r>
-              <a:rPr lang="en-US" dirty="0" smtClean="0"/>
-              <a:t>Queue persists from each thread, record persist barriers, only enforce order at barriers</a:t>
-            </a:r>
-          </a:p>
-          <a:p>
-            <a:r>
-              <a:rPr lang="en-US" dirty="0" smtClean="0"/>
-              <a:t>Persistent </a:t>
-            </a:r>
-            <a:r>
-              <a:rPr lang="en-US" dirty="0" err="1" smtClean="0"/>
-              <a:t>BulkSC</a:t>
-            </a:r>
-            <a:r>
-              <a:rPr lang="en-US" dirty="0" smtClean="0"/>
-              <a:t> (transactions)</a:t>
-            </a:r>
-            <a:endParaRPr lang="en-US" dirty="0"/>
-          </a:p>
-          <a:p>
-            <a:pPr lvl="1"/>
-            <a:r>
-              <a:rPr lang="en-US" dirty="0" smtClean="0"/>
-              <a:t>Use persist barrier knowledge to optimize persistent transactions and intelligently place transaction boundaries</a:t>
-            </a:r>
-            <a:endParaRPr lang="en-US" dirty="0"/>
-          </a:p>
-        </p:txBody>
-      </p:sp>
-      <p:sp>
-        <p:nvSpPr>
-          <p:cNvPr id="4" name="Slide Number Placeholder 3"/>
-          <p:cNvSpPr>
-            <a:spLocks noGrp="1"/>
-          </p:cNvSpPr>
-          <p:nvPr>
-            <p:ph type="sldNum" sz="quarter" idx="4"/>
-          </p:nvPr>
-        </p:nvSpPr>
-        <p:spPr/>
-        <p:txBody>
-          <a:bodyPr/>
-          <a:lstStyle/>
-          <a:p>
-            <a:fld id="{24EAD923-3004-4A31-84C7-9B440B785588}" type="slidenum">
-              <a:rPr lang="en-US" smtClean="0"/>
-              <a:pPr/>
-              <a:t>31</a:t>
-            </a:fld>
-            <a:endParaRPr lang="en-US" dirty="0"/>
-          </a:p>
-        </p:txBody>
-      </p:sp>
-    </p:spTree>
-    <p:extLst>
-      <p:ext uri="{BB962C8B-B14F-4D97-AF65-F5344CB8AC3E}">
-        <p14:creationId xmlns:p14="http://schemas.microsoft.com/office/powerpoint/2010/main" val="211024748"/>
-      </p:ext>
-    </p:extLst>
-  </p:cSld>
-  <p:clrMapOvr>
-    <a:masterClrMapping/>
-  </p:clrMapOvr>
-  <p:timing>
-    <p:tnLst>
-      <p:par>
-        <p:cTn id="1" dur="indefinite" restart="never" nodeType="tmRoot"/>
-      </p:par>
-    </p:tnLst>
-  </p:timing>
-</p:sld>
-</file>
-
 <file path=ppt/slides/slide32.xml><?xml version="1.0" encoding="utf-8"?>
 <p:sld xmlns:a="http://schemas.openxmlformats.org/drawingml/2006/main" xmlns:r="http://schemas.openxmlformats.org/officeDocument/2006/relationships" xmlns:p="http://schemas.openxmlformats.org/presentationml/2006/main">
   <p:cSld>
@@ -30149,7 +30710,7 @@
           <a:p>
             <a:r>
               <a:rPr lang="en-US" dirty="0" smtClean="0"/>
-              <a:t>Strand persistency</a:t>
+              <a:t>Epoch persistency implementation</a:t>
             </a:r>
             <a:endParaRPr lang="en-US" dirty="0"/>
           </a:p>
@@ -30172,65 +30733,35 @@
           <a:p>
             <a:r>
               <a:rPr lang="en-US" dirty="0" smtClean="0"/>
-              <a:t>Motivation: epochs only allow adjacent persists on same thread or persists in racing epochs to be labeled concurrent</a:t>
+              <a:t>Similar to BPFS (see paper/dissertation)</a:t>
             </a:r>
           </a:p>
           <a:p>
             <a:r>
               <a:rPr lang="en-US" dirty="0" smtClean="0"/>
-              <a:t>Divide execution into </a:t>
-            </a:r>
-            <a:r>
-              <a:rPr lang="en-US" i="1" dirty="0" smtClean="0"/>
-              <a:t>strands</a:t>
-            </a:r>
-            <a:endParaRPr lang="en-US" dirty="0" smtClean="0"/>
+              <a:t>Queue persists from each thread, record persist barriers, only enforce order at barriers</a:t>
+            </a:r>
+          </a:p>
+          <a:p>
+            <a:r>
+              <a:rPr lang="en-US" dirty="0" smtClean="0"/>
+              <a:t>Persistent </a:t>
+            </a:r>
+            <a:r>
+              <a:rPr lang="en-US" dirty="0" err="1" smtClean="0"/>
+              <a:t>BulkSC</a:t>
+            </a:r>
+            <a:r>
+              <a:rPr lang="en-US" dirty="0" smtClean="0"/>
+              <a:t> (transactions)</a:t>
+            </a:r>
+            <a:endParaRPr lang="en-US" dirty="0"/>
           </a:p>
           <a:p>
             <a:pPr lvl="1"/>
             <a:r>
-              <a:rPr lang="en-US" i="1" dirty="0" err="1" smtClean="0"/>
-              <a:t>NewStrand</a:t>
-            </a:r>
-            <a:r>
               <a:rPr lang="en-US" dirty="0" smtClean="0"/>
-              <a:t> begins a strand</a:t>
-            </a:r>
-          </a:p>
-          <a:p>
-            <a:pPr lvl="1"/>
-            <a:r>
-              <a:rPr lang="en-US" dirty="0" smtClean="0"/>
-              <a:t>Strands execute in order on a thread, but from perspective of persistency are independent.</a:t>
-            </a:r>
-          </a:p>
-          <a:p>
-            <a:pPr lvl="1"/>
-            <a:r>
-              <a:rPr lang="en-US" dirty="0" err="1" smtClean="0"/>
-              <a:t>Equiv</a:t>
-            </a:r>
-            <a:r>
-              <a:rPr lang="en-US" dirty="0" smtClean="0"/>
-              <a:t>: a new strand </a:t>
-            </a:r>
-            <a:r>
-              <a:rPr lang="en-US" i="1" dirty="0" smtClean="0"/>
-              <a:t>clears persist dependences</a:t>
-            </a:r>
-            <a:endParaRPr lang="en-US" dirty="0" smtClean="0"/>
-          </a:p>
-          <a:p>
-            <a:pPr lvl="1"/>
-            <a:r>
-              <a:rPr lang="en-US" dirty="0" smtClean="0"/>
-              <a:t>Races/conflicts introduce order between strands</a:t>
-            </a:r>
-          </a:p>
-          <a:p>
-            <a:r>
-              <a:rPr lang="en-US" dirty="0" smtClean="0"/>
-              <a:t>Epoch pers. orders persists within strands</a:t>
+              <a:t>Use persist barrier knowledge to optimize persistent transactions and intelligently place transaction boundaries</a:t>
             </a:r>
             <a:endParaRPr lang="en-US" dirty="0"/>
           </a:p>
@@ -30263,7 +30794,7 @@
     </p:spTree>
     <p:extLst>
       <p:ext uri="{BB962C8B-B14F-4D97-AF65-F5344CB8AC3E}">
-        <p14:creationId xmlns:p14="http://schemas.microsoft.com/office/powerpoint/2010/main" val="762893566"/>
+        <p14:creationId xmlns:p14="http://schemas.microsoft.com/office/powerpoint/2010/main" val="211024748"/>
       </p:ext>
     </p:extLst>
   </p:cSld>
@@ -30314,7 +30845,96 @@
           <a:p>
             <a:r>
               <a:rPr lang="en-US" dirty="0" smtClean="0"/>
-              <a:t>Strand examples</a:t>
+              <a:t>Model 3: s</a:t>
+            </a:r>
+            <a:r>
+              <a:rPr lang="en-US" dirty="0" smtClean="0"/>
+              <a:t>trand </a:t>
+            </a:r>
+            <a:r>
+              <a:rPr lang="en-US" dirty="0" smtClean="0"/>
+              <a:t>persistency</a:t>
+            </a:r>
+            <a:endParaRPr lang="en-US" dirty="0"/>
+          </a:p>
+        </p:txBody>
+      </p:sp>
+      <p:sp>
+        <p:nvSpPr>
+          <p:cNvPr id="3" name="Content Placeholder 2"/>
+          <p:cNvSpPr>
+            <a:spLocks noGrp="1"/>
+          </p:cNvSpPr>
+          <p:nvPr>
+            <p:ph idx="1"/>
+          </p:nvPr>
+        </p:nvSpPr>
+        <p:spPr/>
+        <p:txBody>
+          <a:bodyPr/>
+          <a:lstStyle/>
+          <a:p>
+            <a:r>
+              <a:rPr lang="en-US" dirty="0" smtClean="0"/>
+              <a:t>Motivation: epochs only allow adjacent persists on same thread or persists in racing epochs to be labeled concurrent</a:t>
+            </a:r>
+          </a:p>
+          <a:p>
+            <a:r>
+              <a:rPr lang="en-US" dirty="0" smtClean="0"/>
+              <a:t>Divide execution into </a:t>
+            </a:r>
+            <a:r>
+              <a:rPr lang="en-US" i="1" dirty="0" smtClean="0"/>
+              <a:t>strands</a:t>
+            </a:r>
+            <a:endParaRPr lang="en-US" dirty="0" smtClean="0"/>
+          </a:p>
+          <a:p>
+            <a:pPr lvl="1"/>
+            <a:r>
+              <a:rPr lang="en-US" i="1" dirty="0" err="1" smtClean="0"/>
+              <a:t>NewStrand</a:t>
+            </a:r>
+            <a:r>
+              <a:rPr lang="en-US" dirty="0" smtClean="0"/>
+              <a:t> begins a strand</a:t>
+            </a:r>
+          </a:p>
+          <a:p>
+            <a:pPr lvl="1"/>
+            <a:r>
+              <a:rPr lang="en-US" dirty="0" smtClean="0"/>
+              <a:t>Strands execute in order on a thread, but from perspective of persistency are independent.</a:t>
+            </a:r>
+          </a:p>
+          <a:p>
+            <a:pPr lvl="1"/>
+            <a:r>
+              <a:rPr lang="en-US" dirty="0" err="1" smtClean="0"/>
+              <a:t>Equiv</a:t>
+            </a:r>
+            <a:r>
+              <a:rPr lang="en-US" dirty="0" smtClean="0"/>
+              <a:t>: a new strand </a:t>
+            </a:r>
+            <a:r>
+              <a:rPr lang="en-US" i="1" dirty="0" smtClean="0"/>
+              <a:t>clears persist dependences</a:t>
+            </a:r>
+            <a:endParaRPr lang="en-US" dirty="0" smtClean="0"/>
+          </a:p>
+          <a:p>
+            <a:pPr lvl="1"/>
+            <a:r>
+              <a:rPr lang="en-US" dirty="0" smtClean="0"/>
+              <a:t>Races/conflicts introduce order between strands</a:t>
+            </a:r>
+          </a:p>
+          <a:p>
+            <a:r>
+              <a:rPr lang="en-US" dirty="0" smtClean="0"/>
+              <a:t>Epoch pers. orders persists within strands</a:t>
             </a:r>
             <a:endParaRPr lang="en-US" dirty="0"/>
           </a:p>
@@ -30339,6 +30959,90 @@
               <a:rPr lang="en-US" smtClean="0"/>
               <a:pPr/>
               <a:t>33</a:t>
+            </a:fld>
+            <a:endParaRPr lang="en-US" dirty="0"/>
+          </a:p>
+        </p:txBody>
+      </p:sp>
+    </p:spTree>
+    <p:extLst>
+      <p:ext uri="{BB962C8B-B14F-4D97-AF65-F5344CB8AC3E}">
+        <p14:creationId xmlns:p14="http://schemas.microsoft.com/office/powerpoint/2010/main" val="762893566"/>
+      </p:ext>
+    </p:extLst>
+  </p:cSld>
+  <p:clrMapOvr>
+    <a:masterClrMapping/>
+  </p:clrMapOvr>
+  <p:timing>
+    <p:tnLst>
+      <p:par>
+        <p:cTn id="1" dur="indefinite" restart="never" nodeType="tmRoot"/>
+      </p:par>
+    </p:tnLst>
+  </p:timing>
+</p:sld>
+</file>
+
+<file path=ppt/slides/slide34.xml><?xml version="1.0" encoding="utf-8"?>
+<p:sld xmlns:a="http://schemas.openxmlformats.org/drawingml/2006/main" xmlns:r="http://schemas.openxmlformats.org/officeDocument/2006/relationships" xmlns:p="http://schemas.openxmlformats.org/presentationml/2006/main">
+  <p:cSld>
+    <p:spTree>
+      <p:nvGrpSpPr>
+        <p:cNvPr id="1" name=""/>
+        <p:cNvGrpSpPr/>
+        <p:nvPr/>
+      </p:nvGrpSpPr>
+      <p:grpSpPr>
+        <a:xfrm>
+          <a:off x="0" y="0"/>
+          <a:ext cx="0" cy="0"/>
+          <a:chOff x="0" y="0"/>
+          <a:chExt cx="0" cy="0"/>
+        </a:xfrm>
+      </p:grpSpPr>
+      <p:sp>
+        <p:nvSpPr>
+          <p:cNvPr id="2" name="Title 1"/>
+          <p:cNvSpPr>
+            <a:spLocks noGrp="1"/>
+          </p:cNvSpPr>
+          <p:nvPr>
+            <p:ph type="title"/>
+          </p:nvPr>
+        </p:nvSpPr>
+        <p:spPr/>
+        <p:txBody>
+          <a:bodyPr/>
+          <a:lstStyle/>
+          <a:p>
+            <a:r>
+              <a:rPr lang="en-US" dirty="0" smtClean="0"/>
+              <a:t>Strand examples</a:t>
+            </a:r>
+            <a:endParaRPr lang="en-US" dirty="0"/>
+          </a:p>
+        </p:txBody>
+      </p:sp>
+      <p:sp>
+        <p:nvSpPr>
+          <p:cNvPr id="4" name="Slide Number Placeholder 3"/>
+          <p:cNvSpPr>
+            <a:spLocks noGrp="1"/>
+          </p:cNvSpPr>
+          <p:nvPr>
+            <p:ph type="sldNum" sz="quarter" idx="4"/>
+          </p:nvPr>
+        </p:nvSpPr>
+        <p:spPr/>
+        <p:txBody>
+          <a:bodyPr/>
+          <a:lstStyle/>
+          <a:p>
+            <a:fld id="{24EAD923-3004-4A31-84C7-9B440B785588}" type="slidenum">
+              <a:rPr lang="en-US" smtClean="0"/>
+              <a:pPr/>
+              <a:t>34</a:t>
             </a:fld>
             <a:endParaRPr lang="en-US" dirty="0"/>
           </a:p>
@@ -30372,15 +31076,7 @@
                   <a:srgbClr val="FF0909"/>
                 </a:solidFill>
               </a:rPr>
-              <a:t>Strands </a:t>
-            </a:r>
-            <a:r>
-              <a:rPr lang="en-US" sz="2400" b="0" i="1" dirty="0" smtClean="0">
-                <a:solidFill>
-                  <a:srgbClr val="FF0909"/>
-                </a:solidFill>
-              </a:rPr>
-              <a:t>allow precise persist constraint labeling</a:t>
+              <a:t>Strands allow precise persist constraint labeling</a:t>
             </a:r>
             <a:endParaRPr lang="en-US" sz="2400" b="0" i="1" dirty="0">
               <a:solidFill>
@@ -30456,17 +31152,6 @@
               </a:rPr>
               <a:t>A</a:t>
             </a:r>
-            <a:endParaRPr kumimoji="0" lang="en-US" sz="2400" b="0" i="0" u="none" strike="noStrike" cap="none" normalizeH="0" baseline="0" dirty="0" smtClean="0">
-              <a:ln>
-                <a:noFill/>
-              </a:ln>
-              <a:solidFill>
-                <a:schemeClr val="tx1"/>
-              </a:solidFill>
-              <a:effectLst/>
-              <a:latin typeface="Arial" charset="0"/>
-              <a:ea typeface="ＭＳ Ｐゴシック" charset="-128"/>
-            </a:endParaRPr>
           </a:p>
         </p:txBody>
       </p:sp>
@@ -30851,8 +31536,8 @@
         </p:nvSpPr>
         <p:spPr>
           <a:xfrm>
-            <a:off x="3095836" y="4260540"/>
-            <a:ext cx="3204356" cy="707886"/>
+            <a:off x="3491880" y="4077072"/>
+            <a:ext cx="2700300" cy="707886"/>
           </a:xfrm>
           <a:prstGeom prst="rect">
             <a:avLst/>
@@ -30868,7 +31553,7 @@
             <a:pPr algn="l"/>
             <a:r>
               <a:rPr lang="en-US" b="0" dirty="0" smtClean="0"/>
-              <a:t>Extra constraint introduced between B and C</a:t>
+              <a:t>B must be ordered with either A or C</a:t>
             </a:r>
             <a:endParaRPr lang="en-US" b="0" dirty="0"/>
           </a:p>
@@ -30983,7 +31668,6 @@
               <a:rPr lang="en-US" b="0" dirty="0" smtClean="0"/>
               <a:t>C</a:t>
             </a:r>
-            <a:endParaRPr lang="en-US" b="0" dirty="0" smtClean="0"/>
           </a:p>
           <a:p>
             <a:pPr algn="l"/>
@@ -31169,255 +31853,6 @@
     <p:extLst>
       <p:ext uri="{BB962C8B-B14F-4D97-AF65-F5344CB8AC3E}">
         <p14:creationId xmlns:p14="http://schemas.microsoft.com/office/powerpoint/2010/main" val="965881764"/>
-      </p:ext>
-    </p:extLst>
-  </p:cSld>
-  <p:clrMapOvr>
-    <a:masterClrMapping/>
-  </p:clrMapOvr>
-  <p:timing>
-    <p:tnLst>
-      <p:par>
-        <p:cTn id="1" dur="indefinite" restart="never" nodeType="tmRoot">
-          <p:childTnLst>
-            <p:seq concurrent="1" nextAc="seek">
-              <p:cTn id="2" dur="indefinite" nodeType="mainSeq">
-                <p:childTnLst>
-                  <p:par>
-                    <p:cTn id="3" fill="hold">
-                      <p:stCondLst>
-                        <p:cond delay="indefinite"/>
-                      </p:stCondLst>
-                      <p:childTnLst>
-                        <p:par>
-                          <p:cTn id="4" fill="hold">
-                            <p:stCondLst>
-                              <p:cond delay="0"/>
-                            </p:stCondLst>
-                            <p:childTnLst>
-                              <p:par>
-                                <p:cTn id="5" presetID="1" presetClass="entr" presetSubtype="0" fill="hold" grpId="0" nodeType="clickEffect">
-                                  <p:stCondLst>
-                                    <p:cond delay="0"/>
-                                  </p:stCondLst>
-                                  <p:childTnLst>
-                                    <p:set>
-                                      <p:cBhvr>
-                                        <p:cTn id="6" dur="1" fill="hold">
-                                          <p:stCondLst>
-                                            <p:cond delay="0"/>
-                                          </p:stCondLst>
-                                        </p:cTn>
-                                        <p:tgtEl>
-                                          <p:spTgt spid="5"/>
-                                        </p:tgtEl>
-                                        <p:attrNameLst>
-                                          <p:attrName>style.visibility</p:attrName>
-                                        </p:attrNameLst>
-                                      </p:cBhvr>
-                                      <p:to>
-                                        <p:strVal val="visible"/>
-                                      </p:to>
-                                    </p:set>
-                                  </p:childTnLst>
-                                </p:cTn>
-                              </p:par>
-                            </p:childTnLst>
-                          </p:cTn>
-                        </p:par>
-                      </p:childTnLst>
-                    </p:cTn>
-                  </p:par>
-                </p:childTnLst>
-              </p:cTn>
-              <p:prevCondLst>
-                <p:cond evt="onPrev" delay="0">
-                  <p:tgtEl>
-                    <p:sldTgt/>
-                  </p:tgtEl>
-                </p:cond>
-              </p:prevCondLst>
-              <p:nextCondLst>
-                <p:cond evt="onNext" delay="0">
-                  <p:tgtEl>
-                    <p:sldTgt/>
-                  </p:tgtEl>
-                </p:cond>
-              </p:nextCondLst>
-            </p:seq>
-          </p:childTnLst>
-        </p:cTn>
-      </p:par>
-    </p:tnLst>
-    <p:bldLst>
-      <p:bldP spid="5" grpId="0"/>
-    </p:bldLst>
-  </p:timing>
-</p:sld>
-</file>
-
-<file path=ppt/slides/slide34.xml><?xml version="1.0" encoding="utf-8"?>
-<p:sld xmlns:a="http://schemas.openxmlformats.org/drawingml/2006/main" xmlns:r="http://schemas.openxmlformats.org/officeDocument/2006/relationships" xmlns:p="http://schemas.openxmlformats.org/presentationml/2006/main">
-  <p:cSld>
-    <p:spTree>
-      <p:nvGrpSpPr>
-        <p:cNvPr id="1" name=""/>
-        <p:cNvGrpSpPr/>
-        <p:nvPr/>
-      </p:nvGrpSpPr>
-      <p:grpSpPr>
-        <a:xfrm>
-          <a:off x="0" y="0"/>
-          <a:ext cx="0" cy="0"/>
-          <a:chOff x="0" y="0"/>
-          <a:chExt cx="0" cy="0"/>
-        </a:xfrm>
-      </p:grpSpPr>
-      <p:sp>
-        <p:nvSpPr>
-          <p:cNvPr id="2" name="Title 1"/>
-          <p:cNvSpPr>
-            <a:spLocks noGrp="1"/>
-          </p:cNvSpPr>
-          <p:nvPr>
-            <p:ph type="title"/>
-          </p:nvPr>
-        </p:nvSpPr>
-        <p:spPr/>
-        <p:txBody>
-          <a:bodyPr/>
-          <a:lstStyle/>
-          <a:p>
-            <a:r>
-              <a:rPr lang="en-US" dirty="0" smtClean="0"/>
-              <a:t>Perfect constraint labeling</a:t>
-            </a:r>
-            <a:endParaRPr lang="en-US" dirty="0"/>
-          </a:p>
-        </p:txBody>
-      </p:sp>
-      <p:sp>
-        <p:nvSpPr>
-          <p:cNvPr id="3" name="Content Placeholder 2"/>
-          <p:cNvSpPr>
-            <a:spLocks noGrp="1"/>
-          </p:cNvSpPr>
-          <p:nvPr>
-            <p:ph idx="1"/>
-          </p:nvPr>
-        </p:nvSpPr>
-        <p:spPr/>
-        <p:txBody>
-          <a:bodyPr/>
-          <a:lstStyle/>
-          <a:p>
-            <a:r>
-              <a:rPr lang="en-US" dirty="0" smtClean="0"/>
-              <a:t>Strands can perfectly label constraints</a:t>
-            </a:r>
-          </a:p>
-          <a:p>
-            <a:r>
-              <a:rPr lang="en-US" dirty="0" smtClean="0"/>
-              <a:t>For each persist:</a:t>
-            </a:r>
-          </a:p>
-          <a:p>
-            <a:pPr lvl="1"/>
-            <a:r>
-              <a:rPr lang="en-US" dirty="0" smtClean="0"/>
-              <a:t>New strand</a:t>
-            </a:r>
-          </a:p>
-          <a:p>
-            <a:pPr lvl="1"/>
-            <a:r>
-              <a:rPr lang="en-US" dirty="0" smtClean="0"/>
-              <a:t>Read all addresses persist depends on</a:t>
-            </a:r>
-          </a:p>
-          <a:p>
-            <a:pPr lvl="1"/>
-            <a:r>
-              <a:rPr lang="en-US" dirty="0" smtClean="0"/>
-              <a:t>Barrier</a:t>
-            </a:r>
-          </a:p>
-          <a:p>
-            <a:pPr lvl="1"/>
-            <a:r>
-              <a:rPr lang="en-US" dirty="0" smtClean="0"/>
-              <a:t>Persist</a:t>
-            </a:r>
-          </a:p>
-        </p:txBody>
-      </p:sp>
-      <p:sp>
-        <p:nvSpPr>
-          <p:cNvPr id="4" name="Slide Number Placeholder 3"/>
-          <p:cNvSpPr>
-            <a:spLocks noGrp="1"/>
-          </p:cNvSpPr>
-          <p:nvPr>
-            <p:ph type="sldNum" sz="quarter" idx="4"/>
-          </p:nvPr>
-        </p:nvSpPr>
-        <p:spPr/>
-        <p:txBody>
-          <a:bodyPr/>
-          <a:lstStyle/>
-          <a:p>
-            <a:fld id="{24EAD923-3004-4A31-84C7-9B440B785588}" type="slidenum">
-              <a:rPr lang="en-US" smtClean="0"/>
-              <a:pPr/>
-              <a:t>34</a:t>
-            </a:fld>
-            <a:endParaRPr lang="en-US" dirty="0"/>
-          </a:p>
-        </p:txBody>
-      </p:sp>
-      <p:sp>
-        <p:nvSpPr>
-          <p:cNvPr id="5" name="TextBox 4"/>
-          <p:cNvSpPr txBox="1"/>
-          <p:nvPr/>
-        </p:nvSpPr>
-        <p:spPr>
-          <a:xfrm>
-            <a:off x="248671" y="5919663"/>
-            <a:ext cx="8646919" cy="461665"/>
-          </a:xfrm>
-          <a:prstGeom prst="rect">
-            <a:avLst/>
-          </a:prstGeom>
-          <a:noFill/>
-        </p:spPr>
-        <p:txBody>
-          <a:bodyPr wrap="none" rtlCol="0">
-            <a:spAutoFit/>
-          </a:bodyPr>
-          <a:lstStyle/>
-          <a:p>
-            <a:r>
-              <a:rPr lang="en-US" sz="2400" b="0" i="1" dirty="0" smtClean="0">
-                <a:solidFill>
-                  <a:srgbClr val="FF0909"/>
-                </a:solidFill>
-              </a:rPr>
-              <a:t>Minimal persist dependences (additional instructions required)</a:t>
-            </a:r>
-            <a:endParaRPr lang="en-US" sz="2400" b="0" i="1" dirty="0">
-              <a:solidFill>
-                <a:srgbClr val="FF0909"/>
-              </a:solidFill>
-            </a:endParaRPr>
-          </a:p>
-        </p:txBody>
-      </p:sp>
-    </p:spTree>
-    <p:extLst>
-      <p:ext uri="{BB962C8B-B14F-4D97-AF65-F5344CB8AC3E}">
-        <p14:creationId xmlns:p14="http://schemas.microsoft.com/office/powerpoint/2010/main" val="3497077760"/>
       </p:ext>
     </p:extLst>
   </p:cSld>
@@ -31539,13 +31974,69 @@
           <a:p>
             <a:r>
               <a:rPr lang="en-US" dirty="0" smtClean="0"/>
-              <a:t>Strand</a:t>
-            </a:r>
-            <a:r>
-              <a:rPr lang="en-US" baseline="0" dirty="0" smtClean="0"/>
-              <a:t> persistency queue</a:t>
+              <a:t>Perfect constraint labeling</a:t>
             </a:r>
             <a:endParaRPr lang="en-US" dirty="0"/>
+          </a:p>
+        </p:txBody>
+      </p:sp>
+      <p:sp>
+        <p:nvSpPr>
+          <p:cNvPr id="3" name="Content Placeholder 2"/>
+          <p:cNvSpPr>
+            <a:spLocks noGrp="1"/>
+          </p:cNvSpPr>
+          <p:nvPr>
+            <p:ph idx="1"/>
+          </p:nvPr>
+        </p:nvSpPr>
+        <p:spPr/>
+        <p:txBody>
+          <a:bodyPr/>
+          <a:lstStyle/>
+          <a:p>
+            <a:r>
+              <a:rPr lang="en-US" dirty="0" smtClean="0"/>
+              <a:t>For </a:t>
+            </a:r>
+            <a:r>
+              <a:rPr lang="en-US" dirty="0" smtClean="0"/>
+              <a:t>each persist:</a:t>
+            </a:r>
+          </a:p>
+          <a:p>
+            <a:pPr lvl="1"/>
+            <a:r>
+              <a:rPr lang="en-US" dirty="0" smtClean="0"/>
+              <a:t>New strand</a:t>
+            </a:r>
+          </a:p>
+          <a:p>
+            <a:pPr lvl="1"/>
+            <a:r>
+              <a:rPr lang="en-US" dirty="0" smtClean="0"/>
+              <a:t>Read all addresses persist depends on</a:t>
+            </a:r>
+          </a:p>
+          <a:p>
+            <a:pPr lvl="1"/>
+            <a:r>
+              <a:rPr lang="en-US" dirty="0" smtClean="0"/>
+              <a:t>Barrier</a:t>
+            </a:r>
+          </a:p>
+          <a:p>
+            <a:pPr lvl="1"/>
+            <a:r>
+              <a:rPr lang="en-US" dirty="0" smtClean="0"/>
+              <a:t>Persist</a:t>
+            </a:r>
+          </a:p>
+          <a:p>
+            <a:r>
+              <a:rPr lang="en-US" dirty="0" smtClean="0"/>
+              <a:t>Creates DAG of dependences.  Edge from each read to persist</a:t>
+            </a:r>
           </a:p>
         </p:txBody>
       </p:sp>
@@ -31568,6 +32059,211 @@
               <a:rPr lang="en-US" smtClean="0"/>
               <a:pPr/>
               <a:t>35</a:t>
+            </a:fld>
+            <a:endParaRPr lang="en-US" dirty="0"/>
+          </a:p>
+        </p:txBody>
+      </p:sp>
+      <p:sp>
+        <p:nvSpPr>
+          <p:cNvPr id="5" name="TextBox 4"/>
+          <p:cNvSpPr txBox="1"/>
+          <p:nvPr/>
+        </p:nvSpPr>
+        <p:spPr>
+          <a:xfrm>
+            <a:off x="103601" y="5919663"/>
+            <a:ext cx="8937063" cy="461665"/>
+          </a:xfrm>
+          <a:prstGeom prst="rect">
+            <a:avLst/>
+          </a:prstGeom>
+          <a:noFill/>
+        </p:spPr>
+        <p:txBody>
+          <a:bodyPr wrap="none" rtlCol="0">
+            <a:spAutoFit/>
+          </a:bodyPr>
+          <a:lstStyle/>
+          <a:p>
+            <a:r>
+              <a:rPr lang="en-US" sz="2400" b="0" i="1" dirty="0" smtClean="0">
+                <a:solidFill>
+                  <a:srgbClr val="FF0909"/>
+                </a:solidFill>
+              </a:rPr>
+              <a:t>Minimal persist dependences </a:t>
+            </a:r>
+            <a:r>
+              <a:rPr lang="en-US" sz="2400" b="0" i="1" dirty="0" smtClean="0">
+                <a:solidFill>
+                  <a:srgbClr val="FF0909"/>
+                </a:solidFill>
+              </a:rPr>
+              <a:t>(introduces additional instructions)</a:t>
+            </a:r>
+            <a:endParaRPr lang="en-US" sz="2400" b="0" i="1" dirty="0">
+              <a:solidFill>
+                <a:srgbClr val="FF0909"/>
+              </a:solidFill>
+            </a:endParaRPr>
+          </a:p>
+        </p:txBody>
+      </p:sp>
+    </p:spTree>
+    <p:extLst>
+      <p:ext uri="{BB962C8B-B14F-4D97-AF65-F5344CB8AC3E}">
+        <p14:creationId xmlns:p14="http://schemas.microsoft.com/office/powerpoint/2010/main" val="3497077760"/>
+      </p:ext>
+    </p:extLst>
+  </p:cSld>
+  <p:clrMapOvr>
+    <a:masterClrMapping/>
+  </p:clrMapOvr>
+  <p:timing>
+    <p:tnLst>
+      <p:par>
+        <p:cTn id="1" dur="indefinite" restart="never" nodeType="tmRoot">
+          <p:childTnLst>
+            <p:seq concurrent="1" nextAc="seek">
+              <p:cTn id="2" dur="indefinite" nodeType="mainSeq">
+                <p:childTnLst>
+                  <p:par>
+                    <p:cTn id="3" fill="hold">
+                      <p:stCondLst>
+                        <p:cond delay="indefinite"/>
+                      </p:stCondLst>
+                      <p:childTnLst>
+                        <p:par>
+                          <p:cTn id="4" fill="hold">
+                            <p:stCondLst>
+                              <p:cond delay="0"/>
+                            </p:stCondLst>
+                            <p:childTnLst>
+                              <p:par>
+                                <p:cTn id="5" presetID="1" presetClass="entr" presetSubtype="0" fill="hold" grpId="0" nodeType="clickEffect">
+                                  <p:stCondLst>
+                                    <p:cond delay="0"/>
+                                  </p:stCondLst>
+                                  <p:childTnLst>
+                                    <p:set>
+                                      <p:cBhvr>
+                                        <p:cTn id="6" dur="1" fill="hold">
+                                          <p:stCondLst>
+                                            <p:cond delay="0"/>
+                                          </p:stCondLst>
+                                        </p:cTn>
+                                        <p:tgtEl>
+                                          <p:spTgt spid="5"/>
+                                        </p:tgtEl>
+                                        <p:attrNameLst>
+                                          <p:attrName>style.visibility</p:attrName>
+                                        </p:attrNameLst>
+                                      </p:cBhvr>
+                                      <p:to>
+                                        <p:strVal val="visible"/>
+                                      </p:to>
+                                    </p:set>
+                                  </p:childTnLst>
+                                </p:cTn>
+                              </p:par>
+                            </p:childTnLst>
+                          </p:cTn>
+                        </p:par>
+                      </p:childTnLst>
+                    </p:cTn>
+                  </p:par>
+                </p:childTnLst>
+              </p:cTn>
+              <p:prevCondLst>
+                <p:cond evt="onPrev" delay="0">
+                  <p:tgtEl>
+                    <p:sldTgt/>
+                  </p:tgtEl>
+                </p:cond>
+              </p:prevCondLst>
+              <p:nextCondLst>
+                <p:cond evt="onNext" delay="0">
+                  <p:tgtEl>
+                    <p:sldTgt/>
+                  </p:tgtEl>
+                </p:cond>
+              </p:nextCondLst>
+            </p:seq>
+          </p:childTnLst>
+        </p:cTn>
+      </p:par>
+    </p:tnLst>
+    <p:bldLst>
+      <p:bldP spid="5" grpId="0"/>
+    </p:bldLst>
+  </p:timing>
+</p:sld>
+</file>
+
+<file path=ppt/slides/slide36.xml><?xml version="1.0" encoding="utf-8"?>
+<p:sld xmlns:a="http://schemas.openxmlformats.org/drawingml/2006/main" xmlns:r="http://schemas.openxmlformats.org/officeDocument/2006/relationships" xmlns:p="http://schemas.openxmlformats.org/presentationml/2006/main">
+  <p:cSld>
+    <p:spTree>
+      <p:nvGrpSpPr>
+        <p:cNvPr id="1" name=""/>
+        <p:cNvGrpSpPr/>
+        <p:nvPr/>
+      </p:nvGrpSpPr>
+      <p:grpSpPr>
+        <a:xfrm>
+          <a:off x="0" y="0"/>
+          <a:ext cx="0" cy="0"/>
+          <a:chOff x="0" y="0"/>
+          <a:chExt cx="0" cy="0"/>
+        </a:xfrm>
+      </p:grpSpPr>
+      <p:sp>
+        <p:nvSpPr>
+          <p:cNvPr id="2" name="Title 1"/>
+          <p:cNvSpPr>
+            <a:spLocks noGrp="1"/>
+          </p:cNvSpPr>
+          <p:nvPr>
+            <p:ph type="title"/>
+          </p:nvPr>
+        </p:nvSpPr>
+        <p:spPr/>
+        <p:txBody>
+          <a:bodyPr/>
+          <a:lstStyle/>
+          <a:p>
+            <a:r>
+              <a:rPr lang="en-US" dirty="0" smtClean="0"/>
+              <a:t>Strand</a:t>
+            </a:r>
+            <a:r>
+              <a:rPr lang="en-US" baseline="0" dirty="0" smtClean="0"/>
+              <a:t> persistency queue</a:t>
+            </a:r>
+            <a:endParaRPr lang="en-US" dirty="0"/>
+          </a:p>
+        </p:txBody>
+      </p:sp>
+      <p:sp>
+        <p:nvSpPr>
+          <p:cNvPr id="4" name="Slide Number Placeholder 3"/>
+          <p:cNvSpPr>
+            <a:spLocks noGrp="1"/>
+          </p:cNvSpPr>
+          <p:nvPr>
+            <p:ph type="sldNum" sz="quarter" idx="4"/>
+          </p:nvPr>
+        </p:nvSpPr>
+        <p:spPr/>
+        <p:txBody>
+          <a:bodyPr/>
+          <a:lstStyle/>
+          <a:p>
+            <a:fld id="{24EAD923-3004-4A31-84C7-9B440B785588}" type="slidenum">
+              <a:rPr lang="en-US" smtClean="0"/>
+              <a:pPr/>
+              <a:t>36</a:t>
             </a:fld>
             <a:endParaRPr lang="en-US" dirty="0"/>
           </a:p>
@@ -31930,7 +32626,7 @@
 </p:sld>
 </file>
 
-<file path=ppt/slides/slide36.xml><?xml version="1.0" encoding="utf-8"?>
+<file path=ppt/slides/slide37.xml><?xml version="1.0" encoding="utf-8"?>
 <p:sld xmlns:a="http://schemas.openxmlformats.org/drawingml/2006/main" xmlns:r="http://schemas.openxmlformats.org/officeDocument/2006/relationships" xmlns:p="http://schemas.openxmlformats.org/presentationml/2006/main">
   <p:cSld>
     <p:spTree>
@@ -32162,7 +32858,7 @@
             <a:fld id="{24EAD923-3004-4A31-84C7-9B440B785588}" type="slidenum">
               <a:rPr lang="en-US" smtClean="0"/>
               <a:pPr/>
-              <a:t>36</a:t>
+              <a:t>37</a:t>
             </a:fld>
             <a:endParaRPr lang="en-US" dirty="0"/>
           </a:p>
@@ -34123,7 +34819,7 @@
 </p:sld>
 </file>
 
-<file path=ppt/slides/slide37.xml><?xml version="1.0" encoding="utf-8"?>
+<file path=ppt/slides/slide38.xml><?xml version="1.0" encoding="utf-8"?>
 <p:sld xmlns:a="http://schemas.openxmlformats.org/drawingml/2006/main" xmlns:r="http://schemas.openxmlformats.org/officeDocument/2006/relationships" xmlns:p="http://schemas.openxmlformats.org/presentationml/2006/main">
   <p:cSld>
     <p:spTree>
@@ -34355,7 +35051,7 @@
             <a:fld id="{24EAD923-3004-4A31-84C7-9B440B785588}" type="slidenum">
               <a:rPr lang="en-US" smtClean="0"/>
               <a:pPr/>
-              <a:t>37</a:t>
+              <a:t>38</a:t>
             </a:fld>
             <a:endParaRPr lang="en-US" dirty="0"/>
           </a:p>
@@ -36316,7 +37012,7 @@
 </p:sld>
 </file>
 
-<file path=ppt/slides/slide38.xml><?xml version="1.0" encoding="utf-8"?>
+<file path=ppt/slides/slide39.xml><?xml version="1.0" encoding="utf-8"?>
 <p:sld xmlns:a="http://schemas.openxmlformats.org/drawingml/2006/main" xmlns:r="http://schemas.openxmlformats.org/officeDocument/2006/relationships" xmlns:p="http://schemas.openxmlformats.org/presentationml/2006/main">
   <p:cSld>
     <p:spTree>
@@ -36548,7 +37244,7 @@
             <a:fld id="{24EAD923-3004-4A31-84C7-9B440B785588}" type="slidenum">
               <a:rPr lang="en-US" smtClean="0"/>
               <a:pPr/>
-              <a:t>38</a:t>
+              <a:t>39</a:t>
             </a:fld>
             <a:endParaRPr lang="en-US" dirty="0"/>
           </a:p>
@@ -38552,136 +39248,6 @@
 </p:sld>
 </file>
 
-<file path=ppt/slides/slide39.xml><?xml version="1.0" encoding="utf-8"?>
-<p:sld xmlns:a="http://schemas.openxmlformats.org/drawingml/2006/main" xmlns:r="http://schemas.openxmlformats.org/officeDocument/2006/relationships" xmlns:p="http://schemas.openxmlformats.org/presentationml/2006/main">
-  <p:cSld>
-    <p:spTree>
-      <p:nvGrpSpPr>
-        <p:cNvPr id="1" name=""/>
-        <p:cNvGrpSpPr/>
-        <p:nvPr/>
-      </p:nvGrpSpPr>
-      <p:grpSpPr>
-        <a:xfrm>
-          <a:off x="0" y="0"/>
-          <a:ext cx="0" cy="0"/>
-          <a:chOff x="0" y="0"/>
-          <a:chExt cx="0" cy="0"/>
-        </a:xfrm>
-      </p:grpSpPr>
-      <p:sp>
-        <p:nvSpPr>
-          <p:cNvPr id="2" name="Title 1"/>
-          <p:cNvSpPr>
-            <a:spLocks noGrp="1"/>
-          </p:cNvSpPr>
-          <p:nvPr>
-            <p:ph type="title"/>
-          </p:nvPr>
-        </p:nvSpPr>
-        <p:spPr/>
-        <p:txBody>
-          <a:bodyPr/>
-          <a:lstStyle/>
-          <a:p>
-            <a:r>
-              <a:rPr lang="en-US" dirty="0" smtClean="0"/>
-              <a:t>Outline</a:t>
-            </a:r>
-            <a:endParaRPr lang="en-US" dirty="0"/>
-          </a:p>
-        </p:txBody>
-      </p:sp>
-      <p:sp>
-        <p:nvSpPr>
-          <p:cNvPr id="3" name="Content Placeholder 2"/>
-          <p:cNvSpPr>
-            <a:spLocks noGrp="1"/>
-          </p:cNvSpPr>
-          <p:nvPr>
-            <p:ph idx="1"/>
-          </p:nvPr>
-        </p:nvSpPr>
-        <p:spPr/>
-        <p:txBody>
-          <a:bodyPr/>
-          <a:lstStyle/>
-          <a:p>
-            <a:r>
-              <a:rPr lang="en-US" dirty="0" smtClean="0">
-                <a:solidFill>
-                  <a:schemeClr val="bg1">
-                    <a:lumMod val="75000"/>
-                  </a:schemeClr>
-                </a:solidFill>
-              </a:rPr>
-              <a:t>Define Memory Persistency</a:t>
-            </a:r>
-          </a:p>
-          <a:p>
-            <a:r>
-              <a:rPr lang="en-US" dirty="0" smtClean="0">
-                <a:solidFill>
-                  <a:schemeClr val="bg1">
-                    <a:lumMod val="75000"/>
-                  </a:schemeClr>
-                </a:solidFill>
-              </a:rPr>
-              <a:t>Persistency models</a:t>
-            </a:r>
-          </a:p>
-          <a:p>
-            <a:r>
-              <a:rPr lang="en-US" dirty="0" smtClean="0"/>
-              <a:t>Evaluation</a:t>
-            </a:r>
-          </a:p>
-        </p:txBody>
-      </p:sp>
-      <p:sp>
-        <p:nvSpPr>
-          <p:cNvPr id="4" name="Slide Number Placeholder 3"/>
-          <p:cNvSpPr>
-            <a:spLocks noGrp="1"/>
-          </p:cNvSpPr>
-          <p:nvPr>
-            <p:ph type="sldNum" sz="quarter" idx="4"/>
-          </p:nvPr>
-        </p:nvSpPr>
-        <p:spPr/>
-        <p:txBody>
-          <a:bodyPr/>
-          <a:lstStyle/>
-          <a:p>
-            <a:fld id="{24EAD923-3004-4A31-84C7-9B440B785588}" type="slidenum">
-              <a:rPr lang="en-US" smtClean="0"/>
-              <a:pPr/>
-              <a:t>39</a:t>
-            </a:fld>
-            <a:endParaRPr lang="en-US" dirty="0"/>
-          </a:p>
-        </p:txBody>
-      </p:sp>
-    </p:spTree>
-    <p:extLst>
-      <p:ext uri="{BB962C8B-B14F-4D97-AF65-F5344CB8AC3E}">
-        <p14:creationId xmlns:p14="http://schemas.microsoft.com/office/powerpoint/2010/main" val="2569151886"/>
-      </p:ext>
-    </p:extLst>
-  </p:cSld>
-  <p:clrMapOvr>
-    <a:masterClrMapping/>
-  </p:clrMapOvr>
-  <p:timing>
-    <p:tnLst>
-      <p:par>
-        <p:cTn id="1" dur="indefinite" restart="never" nodeType="tmRoot"/>
-      </p:par>
-    </p:tnLst>
-  </p:timing>
-</p:sld>
-</file>
-
 <file path=ppt/slides/slide4.xml><?xml version="1.0" encoding="utf-8"?>
 <p:sld xmlns:a="http://schemas.openxmlformats.org/drawingml/2006/main" xmlns:r="http://schemas.openxmlformats.org/officeDocument/2006/relationships" xmlns:p="http://schemas.openxmlformats.org/presentationml/2006/main">
   <p:cSld>
@@ -39569,7 +40135,7 @@
           <a:p>
             <a:r>
               <a:rPr lang="en-US" dirty="0" smtClean="0"/>
-              <a:t>Methodology</a:t>
+              <a:t>Outline</a:t>
             </a:r>
             <a:endParaRPr lang="en-US" dirty="0"/>
           </a:p>
@@ -39591,62 +40157,32 @@
           <a:lstStyle/>
           <a:p>
             <a:r>
+              <a:rPr lang="en-US" dirty="0" smtClean="0">
+                <a:solidFill>
+                  <a:schemeClr val="bg1">
+                    <a:lumMod val="75000"/>
+                  </a:schemeClr>
+                </a:solidFill>
+              </a:rPr>
+              <a:t>Define Memory Persistency</a:t>
+            </a:r>
+          </a:p>
+          <a:p>
+            <a:r>
+              <a:rPr lang="en-US" dirty="0" smtClean="0">
+                <a:solidFill>
+                  <a:schemeClr val="bg1">
+                    <a:lumMod val="75000"/>
+                  </a:schemeClr>
+                </a:solidFill>
+              </a:rPr>
+              <a:t>Persistency models</a:t>
+            </a:r>
+          </a:p>
+          <a:p>
+            <a:r>
               <a:rPr lang="en-US" dirty="0" smtClean="0"/>
-              <a:t>Produce SC memory trace of queue from PIN</a:t>
-            </a:r>
-          </a:p>
-          <a:p>
-            <a:r>
-              <a:rPr lang="en-US" dirty="0" smtClean="0"/>
-              <a:t>Annotate barriers, persistent </a:t>
-            </a:r>
-            <a:r>
-              <a:rPr lang="en-US" dirty="0" err="1" smtClean="0"/>
-              <a:t>malloc</a:t>
-            </a:r>
-            <a:r>
-              <a:rPr lang="en-US" dirty="0" smtClean="0"/>
-              <a:t>, etc.</a:t>
-            </a:r>
-          </a:p>
-          <a:p>
-            <a:r>
-              <a:rPr lang="en-US" dirty="0" smtClean="0"/>
-              <a:t>Simulate persist performance assuming persists are only cause of delay</a:t>
-            </a:r>
-          </a:p>
-          <a:p>
-            <a:pPr lvl="1"/>
-            <a:r>
-              <a:rPr lang="en-US" dirty="0" smtClean="0"/>
-              <a:t>No additional delays (infinite bandwidth, banks)</a:t>
-            </a:r>
-          </a:p>
-          <a:p>
-            <a:r>
-              <a:rPr lang="en-US" dirty="0" smtClean="0"/>
-              <a:t>Measure persist critical path</a:t>
-            </a:r>
-          </a:p>
-          <a:p>
-            <a:pPr lvl="1"/>
-            <a:r>
-              <a:rPr lang="en-US" dirty="0" smtClean="0"/>
-              <a:t>Dependences tracked at 8-byte granularity</a:t>
-            </a:r>
-          </a:p>
-          <a:p>
-            <a:pPr lvl="1"/>
-            <a:r>
-              <a:rPr lang="en-US" dirty="0" smtClean="0"/>
-              <a:t>Persists to same address coalesce if no constraints violated (assume atomic 8-byte persists)</a:t>
-            </a:r>
-          </a:p>
-          <a:p>
-            <a:pPr lvl="1"/>
-            <a:r>
-              <a:rPr lang="en-US" dirty="0" smtClean="0"/>
-              <a:t>Constraints determined by persistency model</a:t>
+              <a:t>Evaluation</a:t>
             </a:r>
           </a:p>
         </p:txBody>
@@ -39670,6 +40206,166 @@
               <a:rPr lang="en-US" smtClean="0"/>
               <a:pPr/>
               <a:t>40</a:t>
+            </a:fld>
+            <a:endParaRPr lang="en-US" dirty="0"/>
+          </a:p>
+        </p:txBody>
+      </p:sp>
+    </p:spTree>
+    <p:extLst>
+      <p:ext uri="{BB962C8B-B14F-4D97-AF65-F5344CB8AC3E}">
+        <p14:creationId xmlns:p14="http://schemas.microsoft.com/office/powerpoint/2010/main" val="2569151886"/>
+      </p:ext>
+    </p:extLst>
+  </p:cSld>
+  <p:clrMapOvr>
+    <a:masterClrMapping/>
+  </p:clrMapOvr>
+  <p:timing>
+    <p:tnLst>
+      <p:par>
+        <p:cTn id="1" dur="indefinite" restart="never" nodeType="tmRoot"/>
+      </p:par>
+    </p:tnLst>
+  </p:timing>
+</p:sld>
+</file>
+
+<file path=ppt/slides/slide41.xml><?xml version="1.0" encoding="utf-8"?>
+<p:sld xmlns:a="http://schemas.openxmlformats.org/drawingml/2006/main" xmlns:r="http://schemas.openxmlformats.org/officeDocument/2006/relationships" xmlns:p="http://schemas.openxmlformats.org/presentationml/2006/main">
+  <p:cSld>
+    <p:spTree>
+      <p:nvGrpSpPr>
+        <p:cNvPr id="1" name=""/>
+        <p:cNvGrpSpPr/>
+        <p:nvPr/>
+      </p:nvGrpSpPr>
+      <p:grpSpPr>
+        <a:xfrm>
+          <a:off x="0" y="0"/>
+          <a:ext cx="0" cy="0"/>
+          <a:chOff x="0" y="0"/>
+          <a:chExt cx="0" cy="0"/>
+        </a:xfrm>
+      </p:grpSpPr>
+      <p:sp>
+        <p:nvSpPr>
+          <p:cNvPr id="2" name="Title 1"/>
+          <p:cNvSpPr>
+            <a:spLocks noGrp="1"/>
+          </p:cNvSpPr>
+          <p:nvPr>
+            <p:ph type="title"/>
+          </p:nvPr>
+        </p:nvSpPr>
+        <p:spPr/>
+        <p:txBody>
+          <a:bodyPr/>
+          <a:lstStyle/>
+          <a:p>
+            <a:r>
+              <a:rPr lang="en-US" dirty="0" smtClean="0"/>
+              <a:t>Methodology</a:t>
+            </a:r>
+            <a:endParaRPr lang="en-US" dirty="0"/>
+          </a:p>
+        </p:txBody>
+      </p:sp>
+      <p:sp>
+        <p:nvSpPr>
+          <p:cNvPr id="3" name="Content Placeholder 2"/>
+          <p:cNvSpPr>
+            <a:spLocks noGrp="1"/>
+          </p:cNvSpPr>
+          <p:nvPr>
+            <p:ph idx="1"/>
+          </p:nvPr>
+        </p:nvSpPr>
+        <p:spPr/>
+        <p:txBody>
+          <a:bodyPr/>
+          <a:lstStyle/>
+          <a:p>
+            <a:r>
+              <a:rPr lang="en-US" dirty="0" smtClean="0"/>
+              <a:t>Produce SC memory trace of queue from PIN</a:t>
+            </a:r>
+          </a:p>
+          <a:p>
+            <a:r>
+              <a:rPr lang="en-US" dirty="0" smtClean="0"/>
+              <a:t>Annotate barriers, persistent </a:t>
+            </a:r>
+            <a:r>
+              <a:rPr lang="en-US" dirty="0" err="1" smtClean="0"/>
+              <a:t>malloc</a:t>
+            </a:r>
+            <a:r>
+              <a:rPr lang="en-US" dirty="0" smtClean="0"/>
+              <a:t>, etc.</a:t>
+            </a:r>
+          </a:p>
+          <a:p>
+            <a:r>
+              <a:rPr lang="en-US" dirty="0" smtClean="0"/>
+              <a:t>Simulate persist performance assuming persists are only cause of delay</a:t>
+            </a:r>
+          </a:p>
+          <a:p>
+            <a:pPr lvl="1"/>
+            <a:r>
+              <a:rPr lang="en-US" dirty="0" smtClean="0"/>
+              <a:t>No additional delays (infinite bandwidth, banks)</a:t>
+            </a:r>
+          </a:p>
+          <a:p>
+            <a:r>
+              <a:rPr lang="en-US" dirty="0" smtClean="0"/>
+              <a:t>Measure persist critical path</a:t>
+            </a:r>
+          </a:p>
+          <a:p>
+            <a:pPr lvl="1"/>
+            <a:r>
+              <a:rPr lang="en-US" dirty="0" smtClean="0"/>
+              <a:t>Dependences tracked at 8-byte granularity</a:t>
+            </a:r>
+          </a:p>
+          <a:p>
+            <a:pPr lvl="1"/>
+            <a:r>
+              <a:rPr lang="en-US" dirty="0" smtClean="0"/>
+              <a:t>Persists to same address coalesce if no constraints violated (assume atomic 8-byte persists)</a:t>
+            </a:r>
+          </a:p>
+          <a:p>
+            <a:pPr lvl="1"/>
+            <a:r>
+              <a:rPr lang="en-US" dirty="0" smtClean="0"/>
+              <a:t>Constraints determined by persistency model</a:t>
+            </a:r>
+          </a:p>
+        </p:txBody>
+      </p:sp>
+      <p:sp>
+        <p:nvSpPr>
+          <p:cNvPr id="4" name="Slide Number Placeholder 3"/>
+          <p:cNvSpPr>
+            <a:spLocks noGrp="1"/>
+          </p:cNvSpPr>
+          <p:nvPr>
+            <p:ph type="sldNum" sz="quarter" idx="4"/>
+          </p:nvPr>
+        </p:nvSpPr>
+        <p:spPr/>
+        <p:txBody>
+          <a:bodyPr/>
+          <a:lstStyle/>
+          <a:p>
+            <a:fld id="{24EAD923-3004-4A31-84C7-9B440B785588}" type="slidenum">
+              <a:rPr lang="en-US" smtClean="0"/>
+              <a:pPr/>
+              <a:t>41</a:t>
             </a:fld>
             <a:endParaRPr lang="en-US" dirty="0"/>
           </a:p>
@@ -39695,7 +40391,7 @@
 </p:sld>
 </file>
 
-<file path=ppt/slides/slide41.xml><?xml version="1.0" encoding="utf-8"?>
+<file path=ppt/slides/slide42.xml><?xml version="1.0" encoding="utf-8"?>
 <p:sld xmlns:a="http://schemas.openxmlformats.org/drawingml/2006/main" xmlns:r="http://schemas.openxmlformats.org/officeDocument/2006/relationships" xmlns:p="http://schemas.openxmlformats.org/presentationml/2006/main">
   <p:cSld>
     <p:spTree>
@@ -39777,7 +40473,7 @@
             <a:fld id="{24EAD923-3004-4A31-84C7-9B440B785588}" type="slidenum">
               <a:rPr lang="en-US" smtClean="0"/>
               <a:pPr/>
-              <a:t>41</a:t>
+              <a:t>42</a:t>
             </a:fld>
             <a:endParaRPr lang="en-US" dirty="0"/>
           </a:p>
@@ -39912,7 +40608,7 @@
 </p:sld>
 </file>
 
-<file path=ppt/slides/slide42.xml><?xml version="1.0" encoding="utf-8"?>
+<file path=ppt/slides/slide43.xml><?xml version="1.0" encoding="utf-8"?>
 <p:sld xmlns:a="http://schemas.openxmlformats.org/drawingml/2006/main" xmlns:r="http://schemas.openxmlformats.org/officeDocument/2006/relationships" xmlns:p="http://schemas.openxmlformats.org/presentationml/2006/main">
   <p:cSld>
     <p:spTree>
@@ -39994,7 +40690,7 @@
             <a:fld id="{24EAD923-3004-4A31-84C7-9B440B785588}" type="slidenum">
               <a:rPr lang="en-US" smtClean="0"/>
               <a:pPr/>
-              <a:t>42</a:t>
+              <a:t>43</a:t>
             </a:fld>
             <a:endParaRPr lang="en-US" dirty="0"/>
           </a:p>
@@ -40129,7 +40825,7 @@
 </p:sld>
 </file>
 
-<file path=ppt/slides/slide43.xml><?xml version="1.0" encoding="utf-8"?>
+<file path=ppt/slides/slide44.xml><?xml version="1.0" encoding="utf-8"?>
 <p:sld xmlns:a="http://schemas.openxmlformats.org/drawingml/2006/main" xmlns:r="http://schemas.openxmlformats.org/officeDocument/2006/relationships" xmlns:p="http://schemas.openxmlformats.org/presentationml/2006/main">
   <p:cSld>
     <p:spTree>
@@ -40234,7 +40930,7 @@
             <a:fld id="{24EAD923-3004-4A31-84C7-9B440B785588}" type="slidenum">
               <a:rPr lang="en-US" smtClean="0"/>
               <a:pPr/>
-              <a:t>43</a:t>
+              <a:t>44</a:t>
             </a:fld>
             <a:endParaRPr lang="en-US" dirty="0"/>
           </a:p>
@@ -40260,7 +40956,7 @@
 </p:sld>
 </file>
 
-<file path=ppt/slides/slide44.xml><?xml version="1.0" encoding="utf-8"?>
+<file path=ppt/slides/slide45.xml><?xml version="1.0" encoding="utf-8"?>
 <p:sld xmlns:a="http://schemas.openxmlformats.org/drawingml/2006/main" xmlns:r="http://schemas.openxmlformats.org/officeDocument/2006/relationships" xmlns:p="http://schemas.openxmlformats.org/presentationml/2006/main">
   <p:cSld>
     <p:spTree>
@@ -40492,7 +41188,7 @@
             <a:fld id="{24EAD923-3004-4A31-84C7-9B440B785588}" type="slidenum">
               <a:rPr lang="en-US" smtClean="0"/>
               <a:pPr/>
-              <a:t>44</a:t>
+              <a:t>45</a:t>
             </a:fld>
             <a:endParaRPr lang="en-US" dirty="0"/>
           </a:p>

</xml_diff>

<commit_message>
working on defense presentation
</commit_message>
<xml_diff>
--- a/proposal/defense.pptx
+++ b/proposal/defense.pptx
@@ -6,10 +6,10 @@
     <p:sldMasterId id="2147483673" r:id="rId2"/>
   </p:sldMasterIdLst>
   <p:notesMasterIdLst>
-    <p:notesMasterId r:id="rId48"/>
+    <p:notesMasterId r:id="rId60"/>
   </p:notesMasterIdLst>
   <p:handoutMasterIdLst>
-    <p:handoutMasterId r:id="rId49"/>
+    <p:handoutMasterId r:id="rId61"/>
   </p:handoutMasterIdLst>
   <p:sldIdLst>
     <p:sldId id="866" r:id="rId3"/>
@@ -52,11 +52,23 @@
     <p:sldId id="1164" r:id="rId40"/>
     <p:sldId id="1165" r:id="rId41"/>
     <p:sldId id="1134" r:id="rId42"/>
-    <p:sldId id="1135" r:id="rId43"/>
-    <p:sldId id="1136" r:id="rId44"/>
-    <p:sldId id="1137" r:id="rId45"/>
-    <p:sldId id="1138" r:id="rId46"/>
-    <p:sldId id="1146" r:id="rId47"/>
+    <p:sldId id="1178" r:id="rId43"/>
+    <p:sldId id="1179" r:id="rId44"/>
+    <p:sldId id="1180" r:id="rId45"/>
+    <p:sldId id="1136" r:id="rId46"/>
+    <p:sldId id="1137" r:id="rId47"/>
+    <p:sldId id="1173" r:id="rId48"/>
+    <p:sldId id="1174" r:id="rId49"/>
+    <p:sldId id="1138" r:id="rId50"/>
+    <p:sldId id="1170" r:id="rId51"/>
+    <p:sldId id="1168" r:id="rId52"/>
+    <p:sldId id="1175" r:id="rId53"/>
+    <p:sldId id="1176" r:id="rId54"/>
+    <p:sldId id="1177" r:id="rId55"/>
+    <p:sldId id="1169" r:id="rId56"/>
+    <p:sldId id="1171" r:id="rId57"/>
+    <p:sldId id="1172" r:id="rId58"/>
+    <p:sldId id="1146" r:id="rId59"/>
   </p:sldIdLst>
   <p:sldSz cx="9144000" cy="6858000" type="screen4x3"/>
   <p:notesSz cx="6997700" cy="9271000"/>
@@ -7174,8 +7186,9 @@
           <a:p>
             <a:r>
               <a:rPr lang="en-US" dirty="0" smtClean="0"/>
-              <a:t>Queue-holes</a:t>
-            </a:r>
+              <a:t>Queue-holes [IBM]</a:t>
+            </a:r>
+            <a:endParaRPr lang="en-US" dirty="0" smtClean="0"/>
           </a:p>
           <a:p>
             <a:pPr lvl="1"/>
@@ -9007,6 +9020,12 @@
           <a:p>
             <a:r>
               <a:rPr lang="en-US" dirty="0" smtClean="0"/>
+              <a:t>Assume all persists occur in-place (no logging)</a:t>
+            </a:r>
+          </a:p>
+          <a:p>
+            <a:r>
+              <a:rPr lang="en-US" dirty="0" smtClean="0"/>
               <a:t>Assume </a:t>
             </a:r>
             <a:r>
@@ -9067,13 +9086,8 @@
             </a:r>
             <a:r>
               <a:rPr lang="en-US" dirty="0" smtClean="0"/>
-              <a:t> (persist only last value) if no ordering constraints </a:t>
-            </a:r>
-            <a:r>
-              <a:rPr lang="en-US" dirty="0" smtClean="0"/>
-              <a:t>violated</a:t>
-            </a:r>
-            <a:endParaRPr lang="en-US" dirty="0" smtClean="0"/>
+              <a:t> (persist only last value) if no ordering constraints violated</a:t>
+            </a:r>
           </a:p>
         </p:txBody>
       </p:sp>
@@ -9394,11 +9408,7 @@
           <a:p>
             <a:r>
               <a:rPr lang="en-US" dirty="0" smtClean="0"/>
-              <a:t>Model 1: strict </a:t>
-            </a:r>
-            <a:r>
-              <a:rPr lang="en-US" dirty="0" smtClean="0"/>
-              <a:t>persistency</a:t>
+              <a:t>Model 1: strict persistency</a:t>
             </a:r>
             <a:endParaRPr lang="en-US" dirty="0"/>
           </a:p>
@@ -9797,8 +9807,13 @@
                   <a:srgbClr val="FF0000"/>
                 </a:solidFill>
               </a:rPr>
-              <a:t>Data persists before head without extra work</a:t>
-            </a:r>
+              <a:t>Lock serializes persists between threads</a:t>
+            </a:r>
+            <a:endParaRPr lang="en-US" sz="2400" b="0" dirty="0" smtClean="0">
+              <a:solidFill>
+                <a:srgbClr val="FF0000"/>
+              </a:solidFill>
+            </a:endParaRPr>
           </a:p>
         </p:txBody>
       </p:sp>
@@ -9831,7 +9846,15 @@
                   <a:srgbClr val="FF0000"/>
                 </a:solidFill>
               </a:rPr>
-              <a:t>Serializes persists of large entries to program order</a:t>
+              <a:t>Large entries persist in </a:t>
+            </a:r>
+            <a:r>
+              <a:rPr lang="en-US" sz="2400" b="0" dirty="0" smtClean="0">
+                <a:solidFill>
+                  <a:srgbClr val="FF0000"/>
+                </a:solidFill>
+              </a:rPr>
+              <a:t>program order</a:t>
             </a:r>
           </a:p>
         </p:txBody>
@@ -9845,7 +9868,7 @@
         <p:spPr>
           <a:xfrm>
             <a:off x="569548" y="2132856"/>
-            <a:ext cx="4248472" cy="830997"/>
+            <a:ext cx="4614520" cy="461665"/>
           </a:xfrm>
           <a:prstGeom prst="rect">
             <a:avLst/>
@@ -9865,8 +9888,13 @@
                   <a:srgbClr val="FF0000"/>
                 </a:solidFill>
               </a:rPr>
-              <a:t>Lock serializes persists between all insert calls</a:t>
-            </a:r>
+              <a:t>No code annotation necessary!</a:t>
+            </a:r>
+            <a:endParaRPr lang="en-US" sz="2400" b="0" dirty="0" smtClean="0">
+              <a:solidFill>
+                <a:srgbClr val="FF0000"/>
+              </a:solidFill>
+            </a:endParaRPr>
           </a:p>
         </p:txBody>
       </p:sp>
@@ -14836,15 +14864,7 @@
           <a:p>
             <a:r>
               <a:rPr lang="en-US" dirty="0" smtClean="0"/>
-              <a:t>Model 2: e</a:t>
-            </a:r>
-            <a:r>
-              <a:rPr lang="en-US" dirty="0" smtClean="0"/>
-              <a:t>poch </a:t>
-            </a:r>
-            <a:r>
-              <a:rPr lang="en-US" dirty="0" smtClean="0"/>
-              <a:t>persistency</a:t>
+              <a:t>Model 2: epoch persistency</a:t>
             </a:r>
             <a:endParaRPr lang="en-US" dirty="0"/>
           </a:p>
@@ -14891,8 +14911,19 @@
           <a:p>
             <a:r>
               <a:rPr lang="en-US" dirty="0" smtClean="0"/>
-              <a:t>Persists within each epoch are concurrent</a:t>
-            </a:r>
+              <a:t>Persists within each epoch are </a:t>
+            </a:r>
+            <a:r>
+              <a:rPr lang="en-US" dirty="0" smtClean="0"/>
+              <a:t>concurrent</a:t>
+            </a:r>
+          </a:p>
+          <a:p>
+            <a:r>
+              <a:rPr lang="en-US" dirty="0" smtClean="0"/>
+              <a:t>Data sharing continues to observer SC</a:t>
+            </a:r>
+            <a:endParaRPr lang="en-US" dirty="0" smtClean="0"/>
           </a:p>
           <a:p>
             <a:r>
@@ -15025,7 +15056,11 @@
           <a:p>
             <a:r>
               <a:rPr lang="en-US" dirty="0" smtClean="0"/>
-              <a:t>Persist epoch race: 2+ threads contain epochs that race (including synch. </a:t>
+              <a:t>Persist epoch race: 2+ threads contain epochs that race (including </a:t>
+            </a:r>
+            <a:r>
+              <a:rPr lang="en-US" dirty="0" smtClean="0"/>
+              <a:t>sync. </a:t>
             </a:r>
             <a:r>
               <a:rPr lang="en-US" dirty="0"/>
@@ -15085,24 +15120,28 @@
           </a:bodyPr>
           <a:lstStyle/>
           <a:p>
+            <a:pPr algn="l"/>
             <a:r>
               <a:rPr lang="en-US" dirty="0" smtClean="0"/>
               <a:t>Thread 1</a:t>
             </a:r>
           </a:p>
           <a:p>
+            <a:pPr algn="l"/>
             <a:r>
               <a:rPr lang="en-US" b="0" dirty="0" smtClean="0"/>
               <a:t>Persist A</a:t>
             </a:r>
           </a:p>
           <a:p>
+            <a:pPr algn="l"/>
             <a:r>
               <a:rPr lang="en-US" b="0" dirty="0" smtClean="0"/>
               <a:t>Persist B</a:t>
             </a:r>
           </a:p>
           <a:p>
+            <a:pPr algn="l"/>
             <a:r>
               <a:rPr lang="en-US" b="0" dirty="0" smtClean="0"/>
               <a:t>Barrier</a:t>
@@ -15119,7 +15158,7 @@
         <p:spPr>
           <a:xfrm>
             <a:off x="2764586" y="2528899"/>
-            <a:ext cx="1268297" cy="2246769"/>
+            <a:ext cx="1268296" cy="1938992"/>
           </a:xfrm>
           <a:prstGeom prst="rect">
             <a:avLst/>
@@ -15132,21 +15171,22 @@
           </a:bodyPr>
           <a:lstStyle/>
           <a:p>
+            <a:pPr algn="l"/>
             <a:r>
               <a:rPr lang="en-US" dirty="0" smtClean="0"/>
               <a:t>Thread 2</a:t>
             </a:r>
           </a:p>
           <a:p>
+            <a:pPr algn="l"/>
             <a:endParaRPr lang="en-US" b="0" dirty="0" smtClean="0"/>
           </a:p>
           <a:p>
+            <a:pPr algn="l"/>
             <a:endParaRPr lang="en-US" b="0" dirty="0" smtClean="0"/>
           </a:p>
           <a:p>
-            <a:endParaRPr lang="en-US" b="0" dirty="0" smtClean="0"/>
-          </a:p>
-          <a:p>
+            <a:pPr algn="l"/>
             <a:r>
               <a:rPr lang="en-US" b="0" dirty="0" smtClean="0"/>
               <a:t>Read </a:t>
@@ -15158,19 +15198,21 @@
             <a:endParaRPr lang="en-US" b="0" dirty="0" smtClean="0"/>
           </a:p>
           <a:p>
+            <a:pPr algn="l"/>
+            <a:r>
+              <a:rPr lang="en-US" b="0" dirty="0" smtClean="0"/>
+              <a:t>Persist B</a:t>
+            </a:r>
+            <a:r>
+              <a:rPr lang="en-US" b="0" dirty="0" smtClean="0"/>
+              <a:t>’</a:t>
+            </a:r>
+          </a:p>
+          <a:p>
+            <a:pPr algn="l"/>
             <a:r>
               <a:rPr lang="en-US" b="0" dirty="0" smtClean="0"/>
               <a:t>Barrier</a:t>
-            </a:r>
-          </a:p>
-          <a:p>
-            <a:r>
-              <a:rPr lang="en-US" b="0" dirty="0" smtClean="0"/>
-              <a:t>Persist </a:t>
-            </a:r>
-            <a:r>
-              <a:rPr lang="en-US" b="0" dirty="0" smtClean="0"/>
-              <a:t>B’</a:t>
             </a:r>
             <a:endParaRPr lang="en-US" b="0" dirty="0" smtClean="0"/>
           </a:p>
@@ -15201,30 +15243,14 @@
             <a:pPr algn="l"/>
             <a:r>
               <a:rPr lang="en-US" b="0" dirty="0" smtClean="0"/>
-              <a:t>Can </a:t>
-            </a:r>
+              <a:t>Can B’ persist before A?</a:t>
+            </a:r>
+          </a:p>
+          <a:p>
+            <a:pPr algn="l"/>
             <a:r>
               <a:rPr lang="en-US" b="0" dirty="0" smtClean="0"/>
-              <a:t>B’ </a:t>
-            </a:r>
-            <a:r>
-              <a:rPr lang="en-US" b="0" dirty="0" smtClean="0"/>
-              <a:t>persist before A?</a:t>
-            </a:r>
-          </a:p>
-          <a:p>
-            <a:pPr algn="l"/>
-            <a:r>
-              <a:rPr lang="en-US" b="0" dirty="0" smtClean="0"/>
-              <a:t>Can </a:t>
-            </a:r>
-            <a:r>
-              <a:rPr lang="en-US" b="0" dirty="0" smtClean="0"/>
-              <a:t>B’ </a:t>
-            </a:r>
-            <a:r>
-              <a:rPr lang="en-US" b="0" dirty="0" smtClean="0"/>
-              <a:t>persist before B?</a:t>
+              <a:t>Can B’ persist before B?</a:t>
             </a:r>
           </a:p>
           <a:p>
@@ -15268,7 +15294,7 @@
         </p:nvSpPr>
         <p:spPr bwMode="auto">
           <a:xfrm rot="1652981">
-            <a:off x="2637940" y="3297762"/>
+            <a:off x="2498723" y="3225754"/>
             <a:ext cx="406937" cy="164428"/>
           </a:xfrm>
           <a:prstGeom prst="rightArrow">
@@ -15738,6 +15764,83 @@
         <p:spPr>
           <a:xfrm>
             <a:off x="5004048" y="1736812"/>
+            <a:ext cx="4248472" cy="1569660"/>
+          </a:xfrm>
+          <a:prstGeom prst="rect">
+            <a:avLst/>
+          </a:prstGeom>
+          <a:noFill/>
+        </p:spPr>
+        <p:txBody>
+          <a:bodyPr wrap="square" rtlCol="0">
+            <a:spAutoFit/>
+          </a:bodyPr>
+          <a:lstStyle/>
+          <a:p>
+            <a:pPr algn="l"/>
+            <a:r>
+              <a:rPr lang="en-US" sz="2400" b="0" dirty="0" smtClean="0">
+                <a:solidFill>
+                  <a:srgbClr val="FF0000"/>
+                </a:solidFill>
+              </a:rPr>
+              <a:t>Surround lock/unlock with</a:t>
+            </a:r>
+            <a:br>
+              <a:rPr lang="en-US" sz="2400" b="0" dirty="0" smtClean="0">
+                <a:solidFill>
+                  <a:srgbClr val="FF0000"/>
+                </a:solidFill>
+              </a:rPr>
+            </a:br>
+            <a:r>
+              <a:rPr lang="en-US" sz="2400" b="0" dirty="0" smtClean="0">
+                <a:solidFill>
+                  <a:srgbClr val="FF0000"/>
+                </a:solidFill>
+              </a:rPr>
+              <a:t>barriers to prevent persist</a:t>
+            </a:r>
+            <a:br>
+              <a:rPr lang="en-US" sz="2400" b="0" dirty="0" smtClean="0">
+                <a:solidFill>
+                  <a:srgbClr val="FF0000"/>
+                </a:solidFill>
+              </a:rPr>
+            </a:br>
+            <a:r>
+              <a:rPr lang="en-US" sz="2400" b="0" dirty="0" smtClean="0">
+                <a:solidFill>
+                  <a:srgbClr val="FF0000"/>
+                </a:solidFill>
+              </a:rPr>
+              <a:t>epoch </a:t>
+            </a:r>
+            <a:r>
+              <a:rPr lang="en-US" sz="2400" b="0" dirty="0" smtClean="0">
+                <a:solidFill>
+                  <a:srgbClr val="FF0000"/>
+                </a:solidFill>
+              </a:rPr>
+              <a:t>races.  Serializes inserts</a:t>
+            </a:r>
+            <a:endParaRPr lang="en-US" sz="2400" b="0" dirty="0" smtClean="0">
+              <a:solidFill>
+                <a:srgbClr val="FF0000"/>
+              </a:solidFill>
+            </a:endParaRPr>
+          </a:p>
+        </p:txBody>
+      </p:sp>
+      <p:sp>
+        <p:nvSpPr>
+          <p:cNvPr id="8" name="TextBox 7"/>
+          <p:cNvSpPr txBox="1"/>
+          <p:nvPr/>
+        </p:nvSpPr>
+        <p:spPr>
+          <a:xfrm>
+            <a:off x="5004048" y="4759059"/>
             <a:ext cx="4248472" cy="1200329"/>
           </a:xfrm>
           <a:prstGeom prst="rect">
@@ -15758,70 +15861,6 @@
                   <a:srgbClr val="FF0000"/>
                 </a:solidFill>
               </a:rPr>
-              <a:t>Surround lock/unlock with</a:t>
-            </a:r>
-            <a:br>
-              <a:rPr lang="en-US" sz="2400" b="0" dirty="0" smtClean="0">
-                <a:solidFill>
-                  <a:srgbClr val="FF0000"/>
-                </a:solidFill>
-              </a:rPr>
-            </a:br>
-            <a:r>
-              <a:rPr lang="en-US" sz="2400" b="0" dirty="0" smtClean="0">
-                <a:solidFill>
-                  <a:srgbClr val="FF0000"/>
-                </a:solidFill>
-              </a:rPr>
-              <a:t>barriers to prevent persist</a:t>
-            </a:r>
-            <a:br>
-              <a:rPr lang="en-US" sz="2400" b="0" dirty="0" smtClean="0">
-                <a:solidFill>
-                  <a:srgbClr val="FF0000"/>
-                </a:solidFill>
-              </a:rPr>
-            </a:br>
-            <a:r>
-              <a:rPr lang="en-US" sz="2400" b="0" dirty="0" smtClean="0">
-                <a:solidFill>
-                  <a:srgbClr val="FF0000"/>
-                </a:solidFill>
-              </a:rPr>
-              <a:t>epoch races</a:t>
-            </a:r>
-          </a:p>
-        </p:txBody>
-      </p:sp>
-      <p:sp>
-        <p:nvSpPr>
-          <p:cNvPr id="8" name="TextBox 7"/>
-          <p:cNvSpPr txBox="1"/>
-          <p:nvPr/>
-        </p:nvSpPr>
-        <p:spPr>
-          <a:xfrm>
-            <a:off x="5004048" y="4759059"/>
-            <a:ext cx="4248472" cy="830997"/>
-          </a:xfrm>
-          <a:prstGeom prst="rect">
-            <a:avLst/>
-          </a:prstGeom>
-          <a:noFill/>
-        </p:spPr>
-        <p:txBody>
-          <a:bodyPr wrap="square" rtlCol="0">
-            <a:spAutoFit/>
-          </a:bodyPr>
-          <a:lstStyle/>
-          <a:p>
-            <a:pPr algn="l"/>
-            <a:r>
-              <a:rPr lang="en-US" sz="2400" b="0" dirty="0" smtClean="0">
-                <a:solidFill>
-                  <a:srgbClr val="FF0000"/>
-                </a:solidFill>
-              </a:rPr>
               <a:t>Barrier ensures </a:t>
             </a:r>
             <a:r>
@@ -15849,8 +15888,45 @@
                   <a:srgbClr val="FF0000"/>
                 </a:solidFill>
               </a:rPr>
-              <a:t>not persist before data</a:t>
-            </a:r>
+              <a:t>not persist before </a:t>
+            </a:r>
+            <a:r>
+              <a:rPr lang="en-US" sz="2400" b="0" i="1" dirty="0" smtClean="0">
+                <a:solidFill>
+                  <a:srgbClr val="FF0000"/>
+                </a:solidFill>
+              </a:rPr>
+              <a:t>data</a:t>
+            </a:r>
+            <a:r>
+              <a:rPr lang="en-US" sz="2400" b="0" dirty="0" smtClean="0">
+                <a:solidFill>
+                  <a:srgbClr val="FF0000"/>
+                </a:solidFill>
+              </a:rPr>
+              <a:t>, but </a:t>
+            </a:r>
+            <a:r>
+              <a:rPr lang="en-US" sz="2400" b="0" i="1" dirty="0" smtClean="0">
+                <a:solidFill>
+                  <a:srgbClr val="FF0000"/>
+                </a:solidFill>
+              </a:rPr>
+              <a:t>data</a:t>
+            </a:r>
+            <a:r>
+              <a:rPr lang="en-US" sz="2400" b="0" dirty="0" smtClean="0">
+                <a:solidFill>
+                  <a:srgbClr val="FF0000"/>
+                </a:solidFill>
+              </a:rPr>
+              <a:t> persists concurrently</a:t>
+            </a:r>
+            <a:endParaRPr lang="en-US" sz="2400" b="0" dirty="0" smtClean="0">
+              <a:solidFill>
+                <a:srgbClr val="FF0000"/>
+              </a:solidFill>
+            </a:endParaRPr>
           </a:p>
         </p:txBody>
       </p:sp>
@@ -21927,7 +22003,11 @@
           <a:p>
             <a:r>
               <a:rPr lang="en-US" dirty="0" smtClean="0"/>
-              <a:t>PER persist ordering</a:t>
+              <a:t>Epoch persistency </a:t>
+            </a:r>
+            <a:r>
+              <a:rPr lang="en-US" dirty="0" smtClean="0"/>
+              <a:t>ordering with PER</a:t>
             </a:r>
             <a:endParaRPr lang="en-US" dirty="0"/>
           </a:p>
@@ -21972,6 +22052,41 @@
           <a:p>
             <a:pPr lvl="1"/>
             <a:r>
+              <a:rPr lang="en-US" dirty="0" smtClean="0"/>
+              <a:t>Race (sync or data) </a:t>
+            </a:r>
+            <a:r>
+              <a:rPr lang="en-US" dirty="0" smtClean="0"/>
+              <a:t>in epoch </a:t>
+            </a:r>
+            <a:r>
+              <a:rPr lang="en-US" i="1" dirty="0" smtClean="0"/>
+              <a:t>after</a:t>
+            </a:r>
+            <a:r>
+              <a:rPr lang="en-US" dirty="0" smtClean="0"/>
+              <a:t> A and in epoch </a:t>
+            </a:r>
+            <a:r>
+              <a:rPr lang="en-US" i="1" dirty="0" smtClean="0"/>
+              <a:t>prior to</a:t>
+            </a:r>
+            <a:r>
+              <a:rPr lang="en-US" dirty="0" smtClean="0"/>
+              <a:t> </a:t>
+            </a:r>
+            <a:r>
+              <a:rPr lang="en-US" dirty="0" smtClean="0"/>
+              <a:t>B (same rule as in absence of PER)</a:t>
+            </a:r>
+          </a:p>
+          <a:p>
+            <a:pPr lvl="1"/>
+            <a:r>
+              <a:rPr lang="en-US" dirty="0" smtClean="0"/>
+              <a:t>Or </a:t>
+            </a:r>
+            <a:r>
               <a:rPr lang="en-US" i="1" dirty="0" smtClean="0"/>
               <a:t>A</a:t>
             </a:r>
@@ -21980,43 +22095,41 @@
               <a:t> </a:t>
             </a:r>
             <a:r>
+              <a:rPr lang="en-US" dirty="0"/>
+              <a:t>and </a:t>
+            </a:r>
+            <a:r>
+              <a:rPr lang="en-US" i="1" dirty="0"/>
+              <a:t>B</a:t>
+            </a:r>
+            <a:r>
+              <a:rPr lang="en-US" dirty="0"/>
+              <a:t> are to the same </a:t>
+            </a:r>
+            <a:r>
               <a:rPr lang="en-US" dirty="0" smtClean="0"/>
-              <a:t>and </a:t>
-            </a:r>
-            <a:r>
-              <a:rPr lang="en-US" i="1" dirty="0" smtClean="0"/>
-              <a:t>B</a:t>
-            </a:r>
-            <a:r>
+              <a:t>address</a:t>
+            </a:r>
+            <a:br>
               <a:rPr lang="en-US" dirty="0" smtClean="0"/>
-              <a:t> are to the same </a:t>
-            </a:r>
+            </a:br>
             <a:r>
               <a:rPr lang="en-US" dirty="0" smtClean="0"/>
-              <a:t>address (even if epochs race)</a:t>
-            </a:r>
-          </a:p>
-          <a:p>
-            <a:pPr lvl="1"/>
+              <a:t>(even </a:t>
+            </a:r>
+            <a:r>
+              <a:rPr lang="en-US" dirty="0"/>
+              <a:t>if epochs race</a:t>
+            </a:r>
             <a:r>
               <a:rPr lang="en-US" dirty="0" smtClean="0"/>
-              <a:t>Race in epoch </a:t>
-            </a:r>
-            <a:r>
-              <a:rPr lang="en-US" i="1" dirty="0" smtClean="0"/>
-              <a:t>after</a:t>
-            </a:r>
+              <a:t>)</a:t>
+            </a:r>
+          </a:p>
+          <a:p>
             <a:r>
               <a:rPr lang="en-US" dirty="0" smtClean="0"/>
-              <a:t> A and in epoch </a:t>
-            </a:r>
-            <a:r>
-              <a:rPr lang="en-US" i="1" dirty="0" smtClean="0"/>
-              <a:t>prior to</a:t>
-            </a:r>
-            <a:r>
-              <a:rPr lang="en-US" dirty="0" smtClean="0"/>
-              <a:t> B</a:t>
+              <a:t>Otherwise concurrent</a:t>
             </a:r>
             <a:endParaRPr lang="en-US" dirty="0"/>
           </a:p>
@@ -30845,15 +30958,7 @@
           <a:p>
             <a:r>
               <a:rPr lang="en-US" dirty="0" smtClean="0"/>
-              <a:t>Model 3: s</a:t>
-            </a:r>
-            <a:r>
-              <a:rPr lang="en-US" dirty="0" smtClean="0"/>
-              <a:t>trand </a:t>
-            </a:r>
-            <a:r>
-              <a:rPr lang="en-US" dirty="0" smtClean="0"/>
-              <a:t>persistency</a:t>
+              <a:t>Model 3: strand persistency</a:t>
             </a:r>
             <a:endParaRPr lang="en-US" dirty="0"/>
           </a:p>
@@ -31997,11 +32102,7 @@
           <a:p>
             <a:r>
               <a:rPr lang="en-US" dirty="0" smtClean="0"/>
-              <a:t>For </a:t>
-            </a:r>
-            <a:r>
-              <a:rPr lang="en-US" dirty="0" smtClean="0"/>
-              <a:t>each persist:</a:t>
+              <a:t>For each persist:</a:t>
             </a:r>
           </a:p>
           <a:p>
@@ -32092,15 +32193,7 @@
                   <a:srgbClr val="FF0909"/>
                 </a:solidFill>
               </a:rPr>
-              <a:t>Minimal persist dependences </a:t>
-            </a:r>
-            <a:r>
-              <a:rPr lang="en-US" sz="2400" b="0" i="1" dirty="0" smtClean="0">
-                <a:solidFill>
-                  <a:srgbClr val="FF0909"/>
-                </a:solidFill>
-              </a:rPr>
-              <a:t>(introduces additional instructions)</a:t>
+              <a:t>Minimal persist dependences (introduces additional instructions)</a:t>
             </a:r>
             <a:endParaRPr lang="en-US" sz="2400" b="0" i="1" dirty="0">
               <a:solidFill>
@@ -32503,14 +32596,14 @@
       </p:sp>
       <p:sp>
         <p:nvSpPr>
-          <p:cNvPr id="9" name="TextBox 8"/>
+          <p:cNvPr id="6" name="TextBox 5"/>
           <p:cNvSpPr txBox="1"/>
           <p:nvPr/>
         </p:nvSpPr>
         <p:spPr>
           <a:xfrm>
-            <a:off x="4860032" y="2002192"/>
-            <a:ext cx="4248472" cy="1200329"/>
+            <a:off x="823330" y="5919663"/>
+            <a:ext cx="7497565" cy="461665"/>
           </a:xfrm>
           <a:prstGeom prst="rect">
             <a:avLst/>
@@ -32518,20 +32611,24 @@
           <a:noFill/>
         </p:spPr>
         <p:txBody>
-          <a:bodyPr wrap="square" rtlCol="0">
+          <a:bodyPr wrap="none" rtlCol="0">
             <a:spAutoFit/>
           </a:bodyPr>
           <a:lstStyle/>
           <a:p>
-            <a:pPr algn="l"/>
-            <a:r>
-              <a:rPr lang="en-US" sz="2400" b="0" dirty="0" smtClean="0">
+            <a:r>
+              <a:rPr lang="en-US" sz="2400" b="0" i="1" dirty="0" smtClean="0">
                 <a:solidFill>
-                  <a:srgbClr val="FF0000"/>
+                  <a:srgbClr val="FF0909"/>
                 </a:solidFill>
               </a:rPr>
-              <a:t>Removes unnecessary dependences between insert operations</a:t>
-            </a:r>
+              <a:t>Removes unnecessary dependences between inserts</a:t>
+            </a:r>
+            <a:endParaRPr lang="en-US" sz="2400" b="0" i="1" dirty="0">
+              <a:solidFill>
+                <a:srgbClr val="FF0909"/>
+              </a:solidFill>
+            </a:endParaRPr>
           </a:p>
         </p:txBody>
       </p:sp>
@@ -32579,7 +32676,7 @@
                                           </p:stCondLst>
                                         </p:cTn>
                                         <p:tgtEl>
-                                          <p:spTgt spid="9"/>
+                                          <p:spTgt spid="6"/>
                                         </p:tgtEl>
                                         <p:attrNameLst>
                                           <p:attrName>style.visibility</p:attrName>
@@ -32620,7 +32717,7 @@
       </p:par>
     </p:tnLst>
     <p:bldLst>
-      <p:bldP spid="9" grpId="0"/>
+      <p:bldP spid="6" grpId="0"/>
     </p:bldLst>
   </p:timing>
 </p:sld>
@@ -40288,62 +40385,35 @@
           <a:p>
             <a:r>
               <a:rPr lang="en-US" dirty="0" smtClean="0"/>
-              <a:t>Produce SC memory trace of queue from PIN</a:t>
+              <a:t>Assume buffered NVRAM with infinite banks (no conflicts ever occur).  All persists occur in place (no logging; persists may coalesce)</a:t>
             </a:r>
           </a:p>
           <a:p>
             <a:r>
               <a:rPr lang="en-US" dirty="0" smtClean="0"/>
-              <a:t>Annotate barriers, persistent </a:t>
-            </a:r>
-            <a:r>
-              <a:rPr lang="en-US" dirty="0" err="1" smtClean="0"/>
-              <a:t>malloc</a:t>
-            </a:r>
+              <a:t>Either</a:t>
+            </a:r>
+          </a:p>
+          <a:p>
+            <a:pPr lvl="1"/>
             <a:r>
               <a:rPr lang="en-US" dirty="0" smtClean="0"/>
-              <a:t>, etc.</a:t>
-            </a:r>
-          </a:p>
-          <a:p>
+              <a:t>Persists drain faster than instruction execution rate; instructions limit performance</a:t>
+            </a:r>
+          </a:p>
+          <a:p>
+            <a:pPr lvl="1"/>
             <a:r>
               <a:rPr lang="en-US" dirty="0" smtClean="0"/>
-              <a:t>Simulate persist performance assuming persists are only cause of delay</a:t>
-            </a:r>
-          </a:p>
-          <a:p>
-            <a:pPr lvl="1"/>
+              <a:t>Persists drain slower than instruction execution rate; persist rate limits performance</a:t>
+            </a:r>
+          </a:p>
+          <a:p>
             <a:r>
               <a:rPr lang="en-US" dirty="0" smtClean="0"/>
-              <a:t>No additional delays (infinite bandwidth, banks)</a:t>
-            </a:r>
-          </a:p>
-          <a:p>
-            <a:r>
-              <a:rPr lang="en-US" dirty="0" smtClean="0"/>
-              <a:t>Measure persist critical path</a:t>
-            </a:r>
-          </a:p>
-          <a:p>
-            <a:pPr lvl="1"/>
-            <a:r>
-              <a:rPr lang="en-US" dirty="0" smtClean="0"/>
-              <a:t>Dependences tracked at 8-byte granularity</a:t>
-            </a:r>
-          </a:p>
-          <a:p>
-            <a:pPr lvl="1"/>
-            <a:r>
-              <a:rPr lang="en-US" dirty="0" smtClean="0"/>
-              <a:t>Persists to same address coalesce if no constraints violated (assume atomic 8-byte persists)</a:t>
-            </a:r>
-          </a:p>
-          <a:p>
-            <a:pPr lvl="1"/>
-            <a:r>
-              <a:rPr lang="en-US" dirty="0" smtClean="0"/>
-              <a:t>Constraints determined by persistency model</a:t>
-            </a:r>
+              <a:t>Determine slower of the two and resulting throughput</a:t>
+            </a:r>
+            <a:endParaRPr lang="en-US" dirty="0"/>
           </a:p>
         </p:txBody>
       </p:sp>
@@ -40374,7 +40444,7 @@
     </p:spTree>
     <p:extLst>
       <p:ext uri="{BB962C8B-B14F-4D97-AF65-F5344CB8AC3E}">
-        <p14:creationId xmlns:p14="http://schemas.microsoft.com/office/powerpoint/2010/main" val="2776800659"/>
+        <p14:creationId xmlns:p14="http://schemas.microsoft.com/office/powerpoint/2010/main" val="3049624431"/>
       </p:ext>
     </p:extLst>
   </p:cSld>
@@ -40408,9 +40478,327 @@
           <a:chExt cx="0" cy="0"/>
         </a:xfrm>
       </p:grpSpPr>
+      <p:sp>
+        <p:nvSpPr>
+          <p:cNvPr id="2" name="Title 1"/>
+          <p:cNvSpPr>
+            <a:spLocks noGrp="1"/>
+          </p:cNvSpPr>
+          <p:nvPr>
+            <p:ph type="title"/>
+          </p:nvPr>
+        </p:nvSpPr>
+        <p:spPr/>
+        <p:txBody>
+          <a:bodyPr/>
+          <a:lstStyle/>
+          <a:p>
+            <a:r>
+              <a:rPr lang="en-US" dirty="0" smtClean="0"/>
+              <a:t>Methodology</a:t>
+            </a:r>
+            <a:endParaRPr lang="en-US" dirty="0"/>
+          </a:p>
+        </p:txBody>
+      </p:sp>
+      <p:sp>
+        <p:nvSpPr>
+          <p:cNvPr id="3" name="Content Placeholder 2"/>
+          <p:cNvSpPr>
+            <a:spLocks noGrp="1"/>
+          </p:cNvSpPr>
+          <p:nvPr>
+            <p:ph idx="1"/>
+          </p:nvPr>
+        </p:nvSpPr>
+        <p:spPr/>
+        <p:txBody>
+          <a:bodyPr/>
+          <a:lstStyle/>
+          <a:p>
+            <a:r>
+              <a:rPr lang="en-US" dirty="0" smtClean="0"/>
+              <a:t>Measure execution rate on real server</a:t>
+            </a:r>
+          </a:p>
+          <a:p>
+            <a:pPr lvl="1"/>
+            <a:r>
+              <a:rPr lang="en-US" dirty="0" smtClean="0"/>
+              <a:t>2.4 GHz Xeon E5645</a:t>
+            </a:r>
+          </a:p>
+          <a:p>
+            <a:pPr lvl="1"/>
+            <a:r>
+              <a:rPr lang="en-US" dirty="0" smtClean="0"/>
+              <a:t>Use 1 and 8 threads to test concurrency</a:t>
+            </a:r>
+          </a:p>
+          <a:p>
+            <a:pPr lvl="1"/>
+            <a:r>
+              <a:rPr lang="en-US" dirty="0" smtClean="0"/>
+              <a:t>Pad to 64 bytes to remove false sharing</a:t>
+            </a:r>
+          </a:p>
+          <a:p>
+            <a:pPr lvl="1"/>
+            <a:r>
+              <a:rPr lang="en-US" dirty="0" smtClean="0"/>
+              <a:t>Repeatedly insert 100-byte entries as quickly as possible, reporting insert rate</a:t>
+            </a:r>
+            <a:endParaRPr lang="en-US" dirty="0"/>
+          </a:p>
+        </p:txBody>
+      </p:sp>
+      <p:sp>
+        <p:nvSpPr>
+          <p:cNvPr id="4" name="Slide Number Placeholder 3"/>
+          <p:cNvSpPr>
+            <a:spLocks noGrp="1"/>
+          </p:cNvSpPr>
+          <p:nvPr>
+            <p:ph type="sldNum" sz="quarter" idx="4"/>
+          </p:nvPr>
+        </p:nvSpPr>
+        <p:spPr/>
+        <p:txBody>
+          <a:bodyPr/>
+          <a:lstStyle/>
+          <a:p>
+            <a:fld id="{24EAD923-3004-4A31-84C7-9B440B785588}" type="slidenum">
+              <a:rPr lang="en-US" smtClean="0"/>
+              <a:pPr/>
+              <a:t>42</a:t>
+            </a:fld>
+            <a:endParaRPr lang="en-US" dirty="0"/>
+          </a:p>
+        </p:txBody>
+      </p:sp>
+    </p:spTree>
+    <p:extLst>
+      <p:ext uri="{BB962C8B-B14F-4D97-AF65-F5344CB8AC3E}">
+        <p14:creationId xmlns:p14="http://schemas.microsoft.com/office/powerpoint/2010/main" val="704140896"/>
+      </p:ext>
+    </p:extLst>
+  </p:cSld>
+  <p:clrMapOvr>
+    <a:masterClrMapping/>
+  </p:clrMapOvr>
+  <p:timing>
+    <p:tnLst>
+      <p:par>
+        <p:cTn id="1" dur="indefinite" restart="never" nodeType="tmRoot"/>
+      </p:par>
+    </p:tnLst>
+  </p:timing>
+</p:sld>
+</file>
+
+<file path=ppt/slides/slide43.xml><?xml version="1.0" encoding="utf-8"?>
+<p:sld xmlns:a="http://schemas.openxmlformats.org/drawingml/2006/main" xmlns:r="http://schemas.openxmlformats.org/officeDocument/2006/relationships" xmlns:p="http://schemas.openxmlformats.org/presentationml/2006/main">
+  <p:cSld>
+    <p:spTree>
+      <p:nvGrpSpPr>
+        <p:cNvPr id="1" name=""/>
+        <p:cNvGrpSpPr/>
+        <p:nvPr/>
+      </p:nvGrpSpPr>
+      <p:grpSpPr>
+        <a:xfrm>
+          <a:off x="0" y="0"/>
+          <a:ext cx="0" cy="0"/>
+          <a:chOff x="0" y="0"/>
+          <a:chExt cx="0" cy="0"/>
+        </a:xfrm>
+      </p:grpSpPr>
+      <p:sp>
+        <p:nvSpPr>
+          <p:cNvPr id="2" name="Title 1"/>
+          <p:cNvSpPr>
+            <a:spLocks noGrp="1"/>
+          </p:cNvSpPr>
+          <p:nvPr>
+            <p:ph type="title"/>
+          </p:nvPr>
+        </p:nvSpPr>
+        <p:spPr/>
+        <p:txBody>
+          <a:bodyPr/>
+          <a:lstStyle/>
+          <a:p>
+            <a:r>
+              <a:rPr lang="en-US" dirty="0" smtClean="0"/>
+              <a:t>Methodology</a:t>
+            </a:r>
+            <a:endParaRPr lang="en-US" dirty="0"/>
+          </a:p>
+        </p:txBody>
+      </p:sp>
+      <p:sp>
+        <p:nvSpPr>
+          <p:cNvPr id="3" name="Content Placeholder 2"/>
+          <p:cNvSpPr>
+            <a:spLocks noGrp="1"/>
+          </p:cNvSpPr>
+          <p:nvPr>
+            <p:ph idx="1"/>
+          </p:nvPr>
+        </p:nvSpPr>
+        <p:spPr/>
+        <p:txBody>
+          <a:bodyPr/>
+          <a:lstStyle/>
+          <a:p>
+            <a:r>
+              <a:rPr lang="en-US" dirty="0" smtClean="0"/>
+              <a:t>Measure persist rate via memory traces</a:t>
+            </a:r>
+          </a:p>
+          <a:p>
+            <a:pPr lvl="1"/>
+            <a:r>
+              <a:rPr lang="en-US" dirty="0"/>
+              <a:t>Produce SC memory </a:t>
+            </a:r>
+            <a:r>
+              <a:rPr lang="en-US" dirty="0" smtClean="0"/>
+              <a:t>trace </a:t>
+            </a:r>
+            <a:r>
+              <a:rPr lang="en-US" dirty="0"/>
+              <a:t>from PIN</a:t>
+            </a:r>
+          </a:p>
+          <a:p>
+            <a:pPr lvl="1"/>
+            <a:r>
+              <a:rPr lang="en-US" dirty="0"/>
+              <a:t>Annotate barriers, persistent </a:t>
+            </a:r>
+            <a:r>
+              <a:rPr lang="en-US" dirty="0" err="1"/>
+              <a:t>malloc</a:t>
+            </a:r>
+            <a:r>
+              <a:rPr lang="en-US" dirty="0"/>
+              <a:t>, etc</a:t>
+            </a:r>
+            <a:r>
+              <a:rPr lang="en-US" dirty="0" smtClean="0"/>
+              <a:t>.</a:t>
+            </a:r>
+          </a:p>
+          <a:p>
+            <a:r>
+              <a:rPr lang="en-US" dirty="0"/>
+              <a:t>P</a:t>
+            </a:r>
+            <a:r>
+              <a:rPr lang="en-US" dirty="0" smtClean="0"/>
+              <a:t>ersist critical path from simulation</a:t>
+            </a:r>
+          </a:p>
+          <a:p>
+            <a:pPr lvl="1"/>
+            <a:r>
+              <a:rPr lang="en-US" dirty="0" smtClean="0"/>
+              <a:t>Track persist dependences at variable granularity</a:t>
+            </a:r>
+          </a:p>
+          <a:p>
+            <a:pPr lvl="1"/>
+            <a:r>
+              <a:rPr lang="en-US" dirty="0" smtClean="0"/>
+              <a:t>Persists coalesce assuming variable atomic persist</a:t>
+            </a:r>
+          </a:p>
+          <a:p>
+            <a:pPr lvl="1"/>
+            <a:r>
+              <a:rPr lang="en-US" dirty="0" smtClean="0"/>
+              <a:t>(both 8 bytes by default)</a:t>
+            </a:r>
+          </a:p>
+          <a:p>
+            <a:pPr lvl="1"/>
+            <a:r>
+              <a:rPr lang="en-US" dirty="0" smtClean="0"/>
+              <a:t>Observe persist timing and dependences from persistency model</a:t>
+            </a:r>
+            <a:endParaRPr lang="en-US" dirty="0"/>
+          </a:p>
+          <a:p>
+            <a:pPr lvl="1"/>
+            <a:endParaRPr lang="en-US" dirty="0"/>
+          </a:p>
+        </p:txBody>
+      </p:sp>
+      <p:sp>
+        <p:nvSpPr>
+          <p:cNvPr id="4" name="Slide Number Placeholder 3"/>
+          <p:cNvSpPr>
+            <a:spLocks noGrp="1"/>
+          </p:cNvSpPr>
+          <p:nvPr>
+            <p:ph type="sldNum" sz="quarter" idx="4"/>
+          </p:nvPr>
+        </p:nvSpPr>
+        <p:spPr/>
+        <p:txBody>
+          <a:bodyPr/>
+          <a:lstStyle/>
+          <a:p>
+            <a:fld id="{24EAD923-3004-4A31-84C7-9B440B785588}" type="slidenum">
+              <a:rPr lang="en-US" smtClean="0"/>
+              <a:pPr/>
+              <a:t>43</a:t>
+            </a:fld>
+            <a:endParaRPr lang="en-US" dirty="0"/>
+          </a:p>
+        </p:txBody>
+      </p:sp>
+    </p:spTree>
+    <p:extLst>
+      <p:ext uri="{BB962C8B-B14F-4D97-AF65-F5344CB8AC3E}">
+        <p14:creationId xmlns:p14="http://schemas.microsoft.com/office/powerpoint/2010/main" val="128853429"/>
+      </p:ext>
+    </p:extLst>
+  </p:cSld>
+  <p:clrMapOvr>
+    <a:masterClrMapping/>
+  </p:clrMapOvr>
+  <p:timing>
+    <p:tnLst>
+      <p:par>
+        <p:cTn id="1" dur="indefinite" restart="never" nodeType="tmRoot"/>
+      </p:par>
+    </p:tnLst>
+  </p:timing>
+</p:sld>
+</file>
+
+<file path=ppt/slides/slide44.xml><?xml version="1.0" encoding="utf-8"?>
+<p:sld xmlns:a="http://schemas.openxmlformats.org/drawingml/2006/main" xmlns:r="http://schemas.openxmlformats.org/officeDocument/2006/relationships" xmlns:p="http://schemas.openxmlformats.org/presentationml/2006/main">
+  <p:cSld>
+    <p:spTree>
+      <p:nvGrpSpPr>
+        <p:cNvPr id="1" name=""/>
+        <p:cNvGrpSpPr/>
+        <p:nvPr/>
+      </p:nvGrpSpPr>
+      <p:grpSpPr>
+        <a:xfrm>
+          <a:off x="0" y="0"/>
+          <a:ext cx="0" cy="0"/>
+          <a:chOff x="0" y="0"/>
+          <a:chExt cx="0" cy="0"/>
+        </a:xfrm>
+      </p:grpSpPr>
       <p:pic>
         <p:nvPicPr>
-          <p:cNvPr id="6" name="Picture 5"/>
+          <p:cNvPr id="3" name="Picture 2"/>
           <p:cNvPicPr>
             <a:picLocks noChangeAspect="1"/>
           </p:cNvPicPr>
@@ -40424,7 +40812,7 @@
         </p:blipFill>
         <p:spPr>
           <a:xfrm>
-            <a:off x="1309499" y="1080299"/>
+            <a:off x="1309499" y="1044295"/>
             <a:ext cx="6525001" cy="5049001"/>
           </a:xfrm>
           <a:prstGeom prst="rect">
@@ -40473,7 +40861,7 @@
             <a:fld id="{24EAD923-3004-4A31-84C7-9B440B785588}" type="slidenum">
               <a:rPr lang="en-US" smtClean="0"/>
               <a:pPr/>
-              <a:t>42</a:t>
+              <a:t>44</a:t>
             </a:fld>
             <a:endParaRPr lang="en-US" dirty="0"/>
           </a:p>
@@ -40514,6 +40902,47 @@
                 <a:srgbClr val="FF0909"/>
               </a:solidFill>
             </a:endParaRPr>
+          </a:p>
+        </p:txBody>
+      </p:sp>
+      <p:sp>
+        <p:nvSpPr>
+          <p:cNvPr id="5" name="TextBox 4"/>
+          <p:cNvSpPr txBox="1"/>
+          <p:nvPr/>
+        </p:nvSpPr>
+        <p:spPr>
+          <a:xfrm>
+            <a:off x="6768244" y="1592796"/>
+            <a:ext cx="2736304" cy="1077218"/>
+          </a:xfrm>
+          <a:prstGeom prst="rect">
+            <a:avLst/>
+          </a:prstGeom>
+          <a:noFill/>
+        </p:spPr>
+        <p:txBody>
+          <a:bodyPr wrap="square" rtlCol="0">
+            <a:spAutoFit/>
+          </a:bodyPr>
+          <a:lstStyle/>
+          <a:p>
+            <a:pPr algn="l"/>
+            <a:r>
+              <a:rPr lang="en-US" sz="1600" b="0" dirty="0" smtClean="0"/>
+              <a:t>Line indicates instruction execution rate</a:t>
+            </a:r>
+          </a:p>
+          <a:p>
+            <a:pPr algn="l"/>
+            <a:endParaRPr lang="en-US" sz="1600" b="0" dirty="0"/>
+          </a:p>
+          <a:p>
+            <a:pPr algn="l"/>
+            <a:r>
+              <a:rPr lang="en-US" sz="1600" b="0" dirty="0" smtClean="0"/>
+              <a:t>Assumes 500ns persists</a:t>
+            </a:r>
           </a:p>
         </p:txBody>
       </p:sp>
@@ -40608,7 +41037,7 @@
 </p:sld>
 </file>
 
-<file path=ppt/slides/slide43.xml><?xml version="1.0" encoding="utf-8"?>
+<file path=ppt/slides/slide45.xml><?xml version="1.0" encoding="utf-8"?>
 <p:sld xmlns:a="http://schemas.openxmlformats.org/drawingml/2006/main" xmlns:r="http://schemas.openxmlformats.org/officeDocument/2006/relationships" xmlns:p="http://schemas.openxmlformats.org/presentationml/2006/main">
   <p:cSld>
     <p:spTree>
@@ -40627,7 +41056,7 @@
       </p:grpSpPr>
       <p:pic>
         <p:nvPicPr>
-          <p:cNvPr id="5" name="Picture 4"/>
+          <p:cNvPr id="3" name="Picture 2"/>
           <p:cNvPicPr>
             <a:picLocks noChangeAspect="1"/>
           </p:cNvPicPr>
@@ -40641,7 +41070,7 @@
         </p:blipFill>
         <p:spPr>
           <a:xfrm>
-            <a:off x="994124" y="904499"/>
+            <a:off x="994124" y="1008291"/>
             <a:ext cx="7155751" cy="5049001"/>
           </a:xfrm>
           <a:prstGeom prst="rect">
@@ -40690,7 +41119,7 @@
             <a:fld id="{24EAD923-3004-4A31-84C7-9B440B785588}" type="slidenum">
               <a:rPr lang="en-US" smtClean="0"/>
               <a:pPr/>
-              <a:t>43</a:t>
+              <a:t>45</a:t>
             </a:fld>
             <a:endParaRPr lang="en-US" dirty="0"/>
           </a:p>
@@ -40731,6 +41160,129 @@
                 <a:srgbClr val="FF0909"/>
               </a:solidFill>
             </a:endParaRPr>
+          </a:p>
+        </p:txBody>
+      </p:sp>
+      <p:sp>
+        <p:nvSpPr>
+          <p:cNvPr id="7" name="TextBox 6"/>
+          <p:cNvSpPr txBox="1"/>
+          <p:nvPr/>
+        </p:nvSpPr>
+        <p:spPr>
+          <a:xfrm>
+            <a:off x="2336150" y="2020778"/>
+            <a:ext cx="769763" cy="400110"/>
+          </a:xfrm>
+          <a:prstGeom prst="rect">
+            <a:avLst/>
+          </a:prstGeom>
+          <a:noFill/>
+        </p:spPr>
+        <p:txBody>
+          <a:bodyPr wrap="none" rtlCol="0">
+            <a:spAutoFit/>
+          </a:bodyPr>
+          <a:lstStyle/>
+          <a:p>
+            <a:pPr algn="l"/>
+            <a:r>
+              <a:rPr lang="en-US" b="0" dirty="0" smtClean="0"/>
+              <a:t>17ns</a:t>
+            </a:r>
+            <a:endParaRPr lang="en-US" b="0" dirty="0"/>
+          </a:p>
+        </p:txBody>
+      </p:sp>
+      <p:sp>
+        <p:nvSpPr>
+          <p:cNvPr id="8" name="TextBox 7"/>
+          <p:cNvSpPr txBox="1"/>
+          <p:nvPr/>
+        </p:nvSpPr>
+        <p:spPr>
+          <a:xfrm>
+            <a:off x="3527884" y="2020778"/>
+            <a:ext cx="864532" cy="400110"/>
+          </a:xfrm>
+          <a:prstGeom prst="rect">
+            <a:avLst/>
+          </a:prstGeom>
+          <a:noFill/>
+        </p:spPr>
+        <p:txBody>
+          <a:bodyPr wrap="none" rtlCol="0">
+            <a:spAutoFit/>
+          </a:bodyPr>
+          <a:lstStyle/>
+          <a:p>
+            <a:pPr algn="l"/>
+            <a:r>
+              <a:rPr lang="en-US" b="0" dirty="0" smtClean="0"/>
+              <a:t>119ns</a:t>
+            </a:r>
+            <a:endParaRPr lang="en-US" b="0" dirty="0"/>
+          </a:p>
+        </p:txBody>
+      </p:sp>
+      <p:sp>
+        <p:nvSpPr>
+          <p:cNvPr id="9" name="TextBox 8"/>
+          <p:cNvSpPr txBox="1"/>
+          <p:nvPr/>
+        </p:nvSpPr>
+        <p:spPr>
+          <a:xfrm>
+            <a:off x="5915991" y="2020778"/>
+            <a:ext cx="816249" cy="400110"/>
+          </a:xfrm>
+          <a:prstGeom prst="rect">
+            <a:avLst/>
+          </a:prstGeom>
+          <a:noFill/>
+        </p:spPr>
+        <p:txBody>
+          <a:bodyPr wrap="none" rtlCol="0">
+            <a:spAutoFit/>
+          </a:bodyPr>
+          <a:lstStyle/>
+          <a:p>
+            <a:pPr algn="l"/>
+            <a:r>
+              <a:rPr lang="en-US" b="0" dirty="0" smtClean="0"/>
+              <a:t>6.2µs</a:t>
+            </a:r>
+            <a:endParaRPr lang="en-US" b="0" dirty="0"/>
+          </a:p>
+        </p:txBody>
+      </p:sp>
+      <p:sp>
+        <p:nvSpPr>
+          <p:cNvPr id="10" name="TextBox 9"/>
+          <p:cNvSpPr txBox="1"/>
+          <p:nvPr/>
+        </p:nvSpPr>
+        <p:spPr>
+          <a:xfrm>
+            <a:off x="7272300" y="2747826"/>
+            <a:ext cx="2736304" cy="400110"/>
+          </a:xfrm>
+          <a:prstGeom prst="rect">
+            <a:avLst/>
+          </a:prstGeom>
+          <a:noFill/>
+        </p:spPr>
+        <p:txBody>
+          <a:bodyPr wrap="square" rtlCol="0">
+            <a:spAutoFit/>
+          </a:bodyPr>
+          <a:lstStyle/>
+          <a:p>
+            <a:pPr algn="l"/>
+            <a:r>
+              <a:rPr lang="en-US" b="0" dirty="0" smtClean="0"/>
+              <a:t>(1 Thread)</a:t>
+            </a:r>
           </a:p>
         </p:txBody>
       </p:sp>
@@ -40825,7 +41377,7 @@
 </p:sld>
 </file>
 
-<file path=ppt/slides/slide44.xml><?xml version="1.0" encoding="utf-8"?>
+<file path=ppt/slides/slide46.xml><?xml version="1.0" encoding="utf-8"?>
 <p:sld xmlns:a="http://schemas.openxmlformats.org/drawingml/2006/main" xmlns:r="http://schemas.openxmlformats.org/officeDocument/2006/relationships" xmlns:p="http://schemas.openxmlformats.org/presentationml/2006/main">
   <p:cSld>
     <p:spTree>
@@ -40842,6 +41394,30 @@
           <a:chExt cx="0" cy="0"/>
         </a:xfrm>
       </p:grpSpPr>
+      <p:pic>
+        <p:nvPicPr>
+          <p:cNvPr id="5" name="Picture 4"/>
+          <p:cNvPicPr>
+            <a:picLocks noChangeAspect="1"/>
+          </p:cNvPicPr>
+          <p:nvPr/>
+        </p:nvPicPr>
+        <p:blipFill>
+          <a:blip r:embed="rId2"/>
+          <a:stretch>
+            <a:fillRect/>
+          </a:stretch>
+        </p:blipFill>
+        <p:spPr>
+          <a:xfrm>
+            <a:off x="1287749" y="1008291"/>
+            <a:ext cx="6568501" cy="5049001"/>
+          </a:xfrm>
+          <a:prstGeom prst="rect">
+            <a:avLst/>
+          </a:prstGeom>
+        </p:spPr>
+      </p:pic>
       <p:sp>
         <p:nvSpPr>
           <p:cNvPr id="2" name="Title 1"/>
@@ -40859,6 +41435,440 @@
           <a:p>
             <a:r>
               <a:rPr lang="en-US" dirty="0" smtClean="0"/>
+              <a:t>Persist coalescing</a:t>
+            </a:r>
+            <a:endParaRPr lang="en-US" dirty="0"/>
+          </a:p>
+        </p:txBody>
+      </p:sp>
+      <p:sp>
+        <p:nvSpPr>
+          <p:cNvPr id="4" name="Slide Number Placeholder 3"/>
+          <p:cNvSpPr>
+            <a:spLocks noGrp="1"/>
+          </p:cNvSpPr>
+          <p:nvPr>
+            <p:ph type="sldNum" sz="quarter" idx="4"/>
+          </p:nvPr>
+        </p:nvSpPr>
+        <p:spPr/>
+        <p:txBody>
+          <a:bodyPr/>
+          <a:lstStyle/>
+          <a:p>
+            <a:fld id="{24EAD923-3004-4A31-84C7-9B440B785588}" type="slidenum">
+              <a:rPr lang="en-US" smtClean="0"/>
+              <a:pPr/>
+              <a:t>46</a:t>
+            </a:fld>
+            <a:endParaRPr lang="en-US" dirty="0"/>
+          </a:p>
+        </p:txBody>
+      </p:sp>
+      <p:sp>
+        <p:nvSpPr>
+          <p:cNvPr id="6" name="TextBox 5"/>
+          <p:cNvSpPr txBox="1"/>
+          <p:nvPr/>
+        </p:nvSpPr>
+        <p:spPr>
+          <a:xfrm>
+            <a:off x="364040" y="5991671"/>
+            <a:ext cx="8416086" cy="461665"/>
+          </a:xfrm>
+          <a:prstGeom prst="rect">
+            <a:avLst/>
+          </a:prstGeom>
+          <a:noFill/>
+        </p:spPr>
+        <p:txBody>
+          <a:bodyPr wrap="none" rtlCol="0">
+            <a:spAutoFit/>
+          </a:bodyPr>
+          <a:lstStyle/>
+          <a:p>
+            <a:r>
+              <a:rPr lang="en-US" sz="2400" b="0" i="1" dirty="0" smtClean="0">
+                <a:solidFill>
+                  <a:srgbClr val="FF0909"/>
+                </a:solidFill>
+              </a:rPr>
+              <a:t>Larger atomic persists improve concurrency for strict models</a:t>
+            </a:r>
+            <a:endParaRPr lang="en-US" sz="2400" b="0" i="1" dirty="0">
+              <a:solidFill>
+                <a:srgbClr val="FF0909"/>
+              </a:solidFill>
+            </a:endParaRPr>
+          </a:p>
+        </p:txBody>
+      </p:sp>
+    </p:spTree>
+    <p:extLst>
+      <p:ext uri="{BB962C8B-B14F-4D97-AF65-F5344CB8AC3E}">
+        <p14:creationId xmlns:p14="http://schemas.microsoft.com/office/powerpoint/2010/main" val="2754177823"/>
+      </p:ext>
+    </p:extLst>
+  </p:cSld>
+  <p:clrMapOvr>
+    <a:masterClrMapping/>
+  </p:clrMapOvr>
+  <p:timing>
+    <p:tnLst>
+      <p:par>
+        <p:cTn id="1" dur="indefinite" restart="never" nodeType="tmRoot">
+          <p:childTnLst>
+            <p:seq concurrent="1" nextAc="seek">
+              <p:cTn id="2" dur="indefinite" nodeType="mainSeq">
+                <p:childTnLst>
+                  <p:par>
+                    <p:cTn id="3" fill="hold">
+                      <p:stCondLst>
+                        <p:cond delay="indefinite"/>
+                      </p:stCondLst>
+                      <p:childTnLst>
+                        <p:par>
+                          <p:cTn id="4" fill="hold">
+                            <p:stCondLst>
+                              <p:cond delay="0"/>
+                            </p:stCondLst>
+                            <p:childTnLst>
+                              <p:par>
+                                <p:cTn id="5" presetID="1" presetClass="entr" presetSubtype="0" fill="hold" grpId="0" nodeType="clickEffect">
+                                  <p:stCondLst>
+                                    <p:cond delay="0"/>
+                                  </p:stCondLst>
+                                  <p:childTnLst>
+                                    <p:set>
+                                      <p:cBhvr>
+                                        <p:cTn id="6" dur="1" fill="hold">
+                                          <p:stCondLst>
+                                            <p:cond delay="0"/>
+                                          </p:stCondLst>
+                                        </p:cTn>
+                                        <p:tgtEl>
+                                          <p:spTgt spid="6"/>
+                                        </p:tgtEl>
+                                        <p:attrNameLst>
+                                          <p:attrName>style.visibility</p:attrName>
+                                        </p:attrNameLst>
+                                      </p:cBhvr>
+                                      <p:to>
+                                        <p:strVal val="visible"/>
+                                      </p:to>
+                                    </p:set>
+                                  </p:childTnLst>
+                                </p:cTn>
+                              </p:par>
+                            </p:childTnLst>
+                          </p:cTn>
+                        </p:par>
+                      </p:childTnLst>
+                    </p:cTn>
+                  </p:par>
+                </p:childTnLst>
+              </p:cTn>
+              <p:prevCondLst>
+                <p:cond evt="onPrev" delay="0">
+                  <p:tgtEl>
+                    <p:sldTgt/>
+                  </p:tgtEl>
+                </p:cond>
+              </p:prevCondLst>
+              <p:nextCondLst>
+                <p:cond evt="onNext" delay="0">
+                  <p:tgtEl>
+                    <p:sldTgt/>
+                  </p:tgtEl>
+                </p:cond>
+              </p:nextCondLst>
+            </p:seq>
+          </p:childTnLst>
+        </p:cTn>
+      </p:par>
+    </p:tnLst>
+    <p:bldLst>
+      <p:bldP spid="6" grpId="0"/>
+    </p:bldLst>
+  </p:timing>
+</p:sld>
+</file>
+
+<file path=ppt/slides/slide47.xml><?xml version="1.0" encoding="utf-8"?>
+<p:sld xmlns:a="http://schemas.openxmlformats.org/drawingml/2006/main" xmlns:r="http://schemas.openxmlformats.org/officeDocument/2006/relationships" xmlns:p="http://schemas.openxmlformats.org/presentationml/2006/main">
+  <p:cSld>
+    <p:spTree>
+      <p:nvGrpSpPr>
+        <p:cNvPr id="1" name=""/>
+        <p:cNvGrpSpPr/>
+        <p:nvPr/>
+      </p:nvGrpSpPr>
+      <p:grpSpPr>
+        <a:xfrm>
+          <a:off x="0" y="0"/>
+          <a:ext cx="0" cy="0"/>
+          <a:chOff x="0" y="0"/>
+          <a:chExt cx="0" cy="0"/>
+        </a:xfrm>
+      </p:grpSpPr>
+      <p:pic>
+        <p:nvPicPr>
+          <p:cNvPr id="5" name="Picture 4"/>
+          <p:cNvPicPr>
+            <a:picLocks noChangeAspect="1"/>
+          </p:cNvPicPr>
+          <p:nvPr/>
+        </p:nvPicPr>
+        <p:blipFill>
+          <a:blip r:embed="rId2"/>
+          <a:stretch>
+            <a:fillRect/>
+          </a:stretch>
+        </p:blipFill>
+        <p:spPr>
+          <a:xfrm>
+            <a:off x="1276874" y="1008291"/>
+            <a:ext cx="6590251" cy="5049001"/>
+          </a:xfrm>
+          <a:prstGeom prst="rect">
+            <a:avLst/>
+          </a:prstGeom>
+        </p:spPr>
+      </p:pic>
+      <p:sp>
+        <p:nvSpPr>
+          <p:cNvPr id="2" name="Title 1"/>
+          <p:cNvSpPr>
+            <a:spLocks noGrp="1"/>
+          </p:cNvSpPr>
+          <p:nvPr>
+            <p:ph type="title"/>
+          </p:nvPr>
+        </p:nvSpPr>
+        <p:spPr/>
+        <p:txBody>
+          <a:bodyPr/>
+          <a:lstStyle/>
+          <a:p>
+            <a:r>
+              <a:rPr lang="en-US" dirty="0" smtClean="0"/>
+              <a:t>Persistent false sharing</a:t>
+            </a:r>
+            <a:endParaRPr lang="en-US" dirty="0"/>
+          </a:p>
+        </p:txBody>
+      </p:sp>
+      <p:sp>
+        <p:nvSpPr>
+          <p:cNvPr id="4" name="Slide Number Placeholder 3"/>
+          <p:cNvSpPr>
+            <a:spLocks noGrp="1"/>
+          </p:cNvSpPr>
+          <p:nvPr>
+            <p:ph type="sldNum" sz="quarter" idx="4"/>
+          </p:nvPr>
+        </p:nvSpPr>
+        <p:spPr/>
+        <p:txBody>
+          <a:bodyPr/>
+          <a:lstStyle/>
+          <a:p>
+            <a:fld id="{24EAD923-3004-4A31-84C7-9B440B785588}" type="slidenum">
+              <a:rPr lang="en-US" smtClean="0"/>
+              <a:pPr/>
+              <a:t>47</a:t>
+            </a:fld>
+            <a:endParaRPr lang="en-US" dirty="0"/>
+          </a:p>
+        </p:txBody>
+      </p:sp>
+      <p:sp>
+        <p:nvSpPr>
+          <p:cNvPr id="6" name="TextBox 5"/>
+          <p:cNvSpPr txBox="1"/>
+          <p:nvPr/>
+        </p:nvSpPr>
+        <p:spPr>
+          <a:xfrm>
+            <a:off x="832131" y="5991671"/>
+            <a:ext cx="7479933" cy="461665"/>
+          </a:xfrm>
+          <a:prstGeom prst="rect">
+            <a:avLst/>
+          </a:prstGeom>
+          <a:noFill/>
+        </p:spPr>
+        <p:txBody>
+          <a:bodyPr wrap="none" rtlCol="0">
+            <a:spAutoFit/>
+          </a:bodyPr>
+          <a:lstStyle/>
+          <a:p>
+            <a:r>
+              <a:rPr lang="en-US" sz="2400" b="0" i="1" dirty="0" smtClean="0">
+                <a:solidFill>
+                  <a:srgbClr val="FF0909"/>
+                </a:solidFill>
+              </a:rPr>
+              <a:t>Coarse dependence tracking reintroduces constraints</a:t>
+            </a:r>
+            <a:endParaRPr lang="en-US" sz="2400" b="0" i="1" dirty="0">
+              <a:solidFill>
+                <a:srgbClr val="FF0909"/>
+              </a:solidFill>
+            </a:endParaRPr>
+          </a:p>
+        </p:txBody>
+      </p:sp>
+      <p:pic>
+        <p:nvPicPr>
+          <p:cNvPr id="7" name="Picture 6"/>
+          <p:cNvPicPr>
+            <a:picLocks noChangeAspect="1"/>
+          </p:cNvPicPr>
+          <p:nvPr/>
+        </p:nvPicPr>
+        <p:blipFill>
+          <a:blip r:embed="rId3"/>
+          <a:stretch>
+            <a:fillRect/>
+          </a:stretch>
+        </p:blipFill>
+        <p:spPr>
+          <a:xfrm>
+            <a:off x="6605067" y="3065854"/>
+            <a:ext cx="2544750" cy="1773667"/>
+          </a:xfrm>
+          <a:prstGeom prst="rect">
+            <a:avLst/>
+          </a:prstGeom>
+        </p:spPr>
+      </p:pic>
+    </p:spTree>
+    <p:extLst>
+      <p:ext uri="{BB962C8B-B14F-4D97-AF65-F5344CB8AC3E}">
+        <p14:creationId xmlns:p14="http://schemas.microsoft.com/office/powerpoint/2010/main" val="3111378132"/>
+      </p:ext>
+    </p:extLst>
+  </p:cSld>
+  <p:clrMapOvr>
+    <a:masterClrMapping/>
+  </p:clrMapOvr>
+  <p:timing>
+    <p:tnLst>
+      <p:par>
+        <p:cTn id="1" dur="indefinite" restart="never" nodeType="tmRoot">
+          <p:childTnLst>
+            <p:seq concurrent="1" nextAc="seek">
+              <p:cTn id="2" dur="indefinite" nodeType="mainSeq">
+                <p:childTnLst>
+                  <p:par>
+                    <p:cTn id="3" fill="hold">
+                      <p:stCondLst>
+                        <p:cond delay="indefinite"/>
+                      </p:stCondLst>
+                      <p:childTnLst>
+                        <p:par>
+                          <p:cTn id="4" fill="hold">
+                            <p:stCondLst>
+                              <p:cond delay="0"/>
+                            </p:stCondLst>
+                            <p:childTnLst>
+                              <p:par>
+                                <p:cTn id="5" presetID="1" presetClass="entr" presetSubtype="0" fill="hold" grpId="0" nodeType="clickEffect">
+                                  <p:stCondLst>
+                                    <p:cond delay="0"/>
+                                  </p:stCondLst>
+                                  <p:childTnLst>
+                                    <p:set>
+                                      <p:cBhvr>
+                                        <p:cTn id="6" dur="1" fill="hold">
+                                          <p:stCondLst>
+                                            <p:cond delay="0"/>
+                                          </p:stCondLst>
+                                        </p:cTn>
+                                        <p:tgtEl>
+                                          <p:spTgt spid="6"/>
+                                        </p:tgtEl>
+                                        <p:attrNameLst>
+                                          <p:attrName>style.visibility</p:attrName>
+                                        </p:attrNameLst>
+                                      </p:cBhvr>
+                                      <p:to>
+                                        <p:strVal val="visible"/>
+                                      </p:to>
+                                    </p:set>
+                                  </p:childTnLst>
+                                </p:cTn>
+                              </p:par>
+                            </p:childTnLst>
+                          </p:cTn>
+                        </p:par>
+                      </p:childTnLst>
+                    </p:cTn>
+                  </p:par>
+                </p:childTnLst>
+              </p:cTn>
+              <p:prevCondLst>
+                <p:cond evt="onPrev" delay="0">
+                  <p:tgtEl>
+                    <p:sldTgt/>
+                  </p:tgtEl>
+                </p:cond>
+              </p:prevCondLst>
+              <p:nextCondLst>
+                <p:cond evt="onNext" delay="0">
+                  <p:tgtEl>
+                    <p:sldTgt/>
+                  </p:tgtEl>
+                </p:cond>
+              </p:nextCondLst>
+            </p:seq>
+          </p:childTnLst>
+        </p:cTn>
+      </p:par>
+    </p:tnLst>
+    <p:bldLst>
+      <p:bldP spid="6" grpId="0"/>
+    </p:bldLst>
+  </p:timing>
+</p:sld>
+</file>
+
+<file path=ppt/slides/slide48.xml><?xml version="1.0" encoding="utf-8"?>
+<p:sld xmlns:a="http://schemas.openxmlformats.org/drawingml/2006/main" xmlns:r="http://schemas.openxmlformats.org/officeDocument/2006/relationships" xmlns:p="http://schemas.openxmlformats.org/presentationml/2006/main">
+  <p:cSld>
+    <p:spTree>
+      <p:nvGrpSpPr>
+        <p:cNvPr id="1" name=""/>
+        <p:cNvGrpSpPr/>
+        <p:nvPr/>
+      </p:nvGrpSpPr>
+      <p:grpSpPr>
+        <a:xfrm>
+          <a:off x="0" y="0"/>
+          <a:ext cx="0" cy="0"/>
+          <a:chOff x="0" y="0"/>
+          <a:chExt cx="0" cy="0"/>
+        </a:xfrm>
+      </p:grpSpPr>
+      <p:sp>
+        <p:nvSpPr>
+          <p:cNvPr id="2" name="Title 1"/>
+          <p:cNvSpPr>
+            <a:spLocks noGrp="1"/>
+          </p:cNvSpPr>
+          <p:nvPr>
+            <p:ph type="title"/>
+          </p:nvPr>
+        </p:nvSpPr>
+        <p:spPr/>
+        <p:txBody>
+          <a:bodyPr/>
+          <a:lstStyle/>
+          <a:p>
+            <a:r>
+              <a:rPr lang="en-US" dirty="0" smtClean="0"/>
               <a:t>Conclusion</a:t>
             </a:r>
             <a:endParaRPr lang="en-US" dirty="0"/>
@@ -40882,31 +41892,51 @@
           <a:p>
             <a:r>
               <a:rPr lang="en-US" dirty="0" smtClean="0"/>
-              <a:t>Recovery requires constrained persist order</a:t>
-            </a:r>
+              <a:t>Must order persists, but over-constraining hurts performance (resembles consistency)</a:t>
+            </a:r>
+            <a:endParaRPr lang="en-US" dirty="0" smtClean="0"/>
           </a:p>
           <a:p>
             <a:r>
               <a:rPr lang="en-US" dirty="0" smtClean="0"/>
-              <a:t>Over-constraining persists limits throughput</a:t>
-            </a:r>
-          </a:p>
-          <a:p>
+              <a:t>Memory </a:t>
+            </a:r>
             <a:r>
               <a:rPr lang="en-US" dirty="0" smtClean="0"/>
-              <a:t>This tradeoff resembles memory consistency</a:t>
-            </a:r>
-          </a:p>
-          <a:p>
+              <a:t>persistency </a:t>
+            </a:r>
             <a:r>
               <a:rPr lang="en-US" dirty="0" smtClean="0"/>
-              <a:t>Memory persistency builds on consistency to enforce persist order where necessary and increase persist concurrency elsewhere</a:t>
+              <a:t>builds on consistency to enforce persist order</a:t>
             </a:r>
           </a:p>
           <a:p>
             <a:r>
               <a:rPr lang="en-US" dirty="0" smtClean="0"/>
-              <a:t>Memory persistency achieves instruction execution rate with recovery correctness</a:t>
+              <a:t>Persistency may be relaxed, de-coupling store and persist order constraints</a:t>
+            </a:r>
+            <a:endParaRPr lang="en-US" dirty="0" smtClean="0"/>
+          </a:p>
+          <a:p>
+            <a:r>
+              <a:rPr lang="en-US" dirty="0" smtClean="0"/>
+              <a:t>Relaxed </a:t>
+            </a:r>
+            <a:r>
+              <a:rPr lang="en-US" dirty="0" smtClean="0"/>
+              <a:t>persistency </a:t>
+            </a:r>
+            <a:r>
+              <a:rPr lang="en-US" dirty="0" smtClean="0"/>
+              <a:t>enables</a:t>
+            </a:r>
+            <a:r>
+              <a:rPr lang="en-US" dirty="0" smtClean="0"/>
+              <a:t> </a:t>
+            </a:r>
+            <a:r>
+              <a:rPr lang="en-US" dirty="0" smtClean="0"/>
+              <a:t>instruction execution rate with recovery correctness</a:t>
             </a:r>
             <a:endParaRPr lang="en-US" dirty="0"/>
           </a:p>
@@ -40930,7 +41960,7 @@
             <a:fld id="{24EAD923-3004-4A31-84C7-9B440B785588}" type="slidenum">
               <a:rPr lang="en-US" smtClean="0"/>
               <a:pPr/>
-              <a:t>44</a:t>
+              <a:t>48</a:t>
             </a:fld>
             <a:endParaRPr lang="en-US" dirty="0"/>
           </a:p>
@@ -40956,7 +41986,2225 @@
 </p:sld>
 </file>
 
-<file path=ppt/slides/slide45.xml><?xml version="1.0" encoding="utf-8"?>
+<file path=ppt/slides/slide49.xml><?xml version="1.0" encoding="utf-8"?>
+<p:sld xmlns:a="http://schemas.openxmlformats.org/drawingml/2006/main" xmlns:r="http://schemas.openxmlformats.org/officeDocument/2006/relationships" xmlns:p="http://schemas.openxmlformats.org/presentationml/2006/main">
+  <p:cSld>
+    <p:spTree>
+      <p:nvGrpSpPr>
+        <p:cNvPr id="1" name=""/>
+        <p:cNvGrpSpPr/>
+        <p:nvPr/>
+      </p:nvGrpSpPr>
+      <p:grpSpPr>
+        <a:xfrm>
+          <a:off x="0" y="0"/>
+          <a:ext cx="0" cy="0"/>
+          <a:chOff x="0" y="0"/>
+          <a:chExt cx="0" cy="0"/>
+        </a:xfrm>
+      </p:grpSpPr>
+      <p:sp>
+        <p:nvSpPr>
+          <p:cNvPr id="2" name="Title 1"/>
+          <p:cNvSpPr>
+            <a:spLocks noGrp="1"/>
+          </p:cNvSpPr>
+          <p:nvPr>
+            <p:ph type="title"/>
+          </p:nvPr>
+        </p:nvSpPr>
+        <p:spPr/>
+        <p:txBody>
+          <a:bodyPr/>
+          <a:lstStyle/>
+          <a:p>
+            <a:r>
+              <a:rPr lang="en-US" dirty="0" smtClean="0"/>
+              <a:t>Thank You!</a:t>
+            </a:r>
+            <a:endParaRPr lang="en-US" dirty="0"/>
+          </a:p>
+        </p:txBody>
+      </p:sp>
+      <p:sp>
+        <p:nvSpPr>
+          <p:cNvPr id="3" name="Content Placeholder 2"/>
+          <p:cNvSpPr>
+            <a:spLocks noGrp="1"/>
+          </p:cNvSpPr>
+          <p:nvPr>
+            <p:ph idx="1"/>
+          </p:nvPr>
+        </p:nvSpPr>
+        <p:spPr/>
+        <p:txBody>
+          <a:bodyPr/>
+          <a:lstStyle/>
+          <a:p>
+            <a:r>
+              <a:rPr lang="en-US" dirty="0" smtClean="0"/>
+              <a:t>Thanks to my family, friends, Tom, committee, collaborators, and all of you</a:t>
+            </a:r>
+            <a:endParaRPr lang="en-US" dirty="0"/>
+          </a:p>
+        </p:txBody>
+      </p:sp>
+      <p:sp>
+        <p:nvSpPr>
+          <p:cNvPr id="4" name="Slide Number Placeholder 3"/>
+          <p:cNvSpPr>
+            <a:spLocks noGrp="1"/>
+          </p:cNvSpPr>
+          <p:nvPr>
+            <p:ph type="sldNum" sz="quarter" idx="4"/>
+          </p:nvPr>
+        </p:nvSpPr>
+        <p:spPr/>
+        <p:txBody>
+          <a:bodyPr/>
+          <a:lstStyle/>
+          <a:p>
+            <a:fld id="{24EAD923-3004-4A31-84C7-9B440B785588}" type="slidenum">
+              <a:rPr lang="en-US" smtClean="0"/>
+              <a:pPr/>
+              <a:t>49</a:t>
+            </a:fld>
+            <a:endParaRPr lang="en-US" dirty="0"/>
+          </a:p>
+        </p:txBody>
+      </p:sp>
+    </p:spTree>
+    <p:extLst>
+      <p:ext uri="{BB962C8B-B14F-4D97-AF65-F5344CB8AC3E}">
+        <p14:creationId xmlns:p14="http://schemas.microsoft.com/office/powerpoint/2010/main" val="3093339349"/>
+      </p:ext>
+    </p:extLst>
+  </p:cSld>
+  <p:clrMapOvr>
+    <a:masterClrMapping/>
+  </p:clrMapOvr>
+  <p:timing>
+    <p:tnLst>
+      <p:par>
+        <p:cTn id="1" dur="indefinite" restart="never" nodeType="tmRoot"/>
+      </p:par>
+    </p:tnLst>
+  </p:timing>
+</p:sld>
+</file>
+
+<file path=ppt/slides/slide5.xml><?xml version="1.0" encoding="utf-8"?>
+<p:sld xmlns:a="http://schemas.openxmlformats.org/drawingml/2006/main" xmlns:r="http://schemas.openxmlformats.org/officeDocument/2006/relationships" xmlns:p="http://schemas.openxmlformats.org/presentationml/2006/main">
+  <p:cSld>
+    <p:spTree>
+      <p:nvGrpSpPr>
+        <p:cNvPr id="1" name=""/>
+        <p:cNvGrpSpPr/>
+        <p:nvPr/>
+      </p:nvGrpSpPr>
+      <p:grpSpPr>
+        <a:xfrm>
+          <a:off x="0" y="0"/>
+          <a:ext cx="0" cy="0"/>
+          <a:chOff x="0" y="0"/>
+          <a:chExt cx="0" cy="0"/>
+        </a:xfrm>
+      </p:grpSpPr>
+      <p:sp>
+        <p:nvSpPr>
+          <p:cNvPr id="2" name="Title 1"/>
+          <p:cNvSpPr>
+            <a:spLocks noGrp="1"/>
+          </p:cNvSpPr>
+          <p:nvPr>
+            <p:ph type="title"/>
+          </p:nvPr>
+        </p:nvSpPr>
+        <p:spPr/>
+        <p:txBody>
+          <a:bodyPr/>
+          <a:lstStyle/>
+          <a:p>
+            <a:r>
+              <a:rPr lang="en-US" dirty="0" smtClean="0"/>
+              <a:t>Memory persistency</a:t>
+            </a:r>
+            <a:endParaRPr lang="en-US" dirty="0"/>
+          </a:p>
+        </p:txBody>
+      </p:sp>
+      <p:sp>
+        <p:nvSpPr>
+          <p:cNvPr id="3" name="Content Placeholder 2"/>
+          <p:cNvSpPr>
+            <a:spLocks noGrp="1"/>
+          </p:cNvSpPr>
+          <p:nvPr>
+            <p:ph idx="1"/>
+          </p:nvPr>
+        </p:nvSpPr>
+        <p:spPr/>
+        <p:txBody>
+          <a:bodyPr/>
+          <a:lstStyle/>
+          <a:p>
+            <a:r>
+              <a:rPr lang="en-US" dirty="0" smtClean="0"/>
+              <a:t>Build on memory consistency, providing models to constrain NVRAM write order</a:t>
+            </a:r>
+          </a:p>
+          <a:p>
+            <a:r>
+              <a:rPr lang="en-US" dirty="0" smtClean="0"/>
+              <a:t>Relax persistency to improve write concurrency, increasing throughput</a:t>
+            </a:r>
+          </a:p>
+          <a:p>
+            <a:r>
+              <a:rPr lang="en-US" dirty="0" smtClean="0"/>
+              <a:t>This project:</a:t>
+            </a:r>
+            <a:r>
+              <a:rPr lang="en-US" baseline="0" dirty="0" smtClean="0"/>
+              <a:t> focus on models (interface), rather than implementations</a:t>
+            </a:r>
+            <a:endParaRPr lang="en-US" dirty="0" smtClean="0"/>
+          </a:p>
+        </p:txBody>
+      </p:sp>
+      <p:sp>
+        <p:nvSpPr>
+          <p:cNvPr id="4" name="Slide Number Placeholder 3"/>
+          <p:cNvSpPr>
+            <a:spLocks noGrp="1"/>
+          </p:cNvSpPr>
+          <p:nvPr>
+            <p:ph type="sldNum" sz="quarter" idx="4"/>
+          </p:nvPr>
+        </p:nvSpPr>
+        <p:spPr/>
+        <p:txBody>
+          <a:bodyPr/>
+          <a:lstStyle/>
+          <a:p>
+            <a:fld id="{24EAD923-3004-4A31-84C7-9B440B785588}" type="slidenum">
+              <a:rPr lang="en-US" smtClean="0"/>
+              <a:pPr/>
+              <a:t>5</a:t>
+            </a:fld>
+            <a:endParaRPr lang="en-US" dirty="0"/>
+          </a:p>
+        </p:txBody>
+      </p:sp>
+    </p:spTree>
+    <p:extLst>
+      <p:ext uri="{BB962C8B-B14F-4D97-AF65-F5344CB8AC3E}">
+        <p14:creationId xmlns:p14="http://schemas.microsoft.com/office/powerpoint/2010/main" val="759113488"/>
+      </p:ext>
+    </p:extLst>
+  </p:cSld>
+  <p:clrMapOvr>
+    <a:masterClrMapping/>
+  </p:clrMapOvr>
+  <p:timing>
+    <p:tnLst>
+      <p:par>
+        <p:cTn id="1" dur="indefinite" restart="never" nodeType="tmRoot"/>
+      </p:par>
+    </p:tnLst>
+  </p:timing>
+</p:sld>
+</file>
+
+<file path=ppt/slides/slide50.xml><?xml version="1.0" encoding="utf-8"?>
+<p:sld xmlns:a="http://schemas.openxmlformats.org/drawingml/2006/main" xmlns:r="http://schemas.openxmlformats.org/officeDocument/2006/relationships" xmlns:p="http://schemas.openxmlformats.org/presentationml/2006/main">
+  <p:cSld>
+    <p:spTree>
+      <p:nvGrpSpPr>
+        <p:cNvPr id="1" name=""/>
+        <p:cNvGrpSpPr/>
+        <p:nvPr/>
+      </p:nvGrpSpPr>
+      <p:grpSpPr>
+        <a:xfrm>
+          <a:off x="0" y="0"/>
+          <a:ext cx="0" cy="0"/>
+          <a:chOff x="0" y="0"/>
+          <a:chExt cx="0" cy="0"/>
+        </a:xfrm>
+      </p:grpSpPr>
+      <p:sp>
+        <p:nvSpPr>
+          <p:cNvPr id="2" name="Title 1"/>
+          <p:cNvSpPr>
+            <a:spLocks noGrp="1"/>
+          </p:cNvSpPr>
+          <p:nvPr>
+            <p:ph type="title"/>
+          </p:nvPr>
+        </p:nvSpPr>
+        <p:spPr/>
+        <p:txBody>
+          <a:bodyPr/>
+          <a:lstStyle/>
+          <a:p>
+            <a:r>
+              <a:rPr lang="en-US" dirty="0" smtClean="0"/>
+              <a:t>Backup Slides</a:t>
+            </a:r>
+            <a:endParaRPr lang="en-US" dirty="0"/>
+          </a:p>
+        </p:txBody>
+      </p:sp>
+      <p:sp>
+        <p:nvSpPr>
+          <p:cNvPr id="3" name="Content Placeholder 2"/>
+          <p:cNvSpPr>
+            <a:spLocks noGrp="1"/>
+          </p:cNvSpPr>
+          <p:nvPr>
+            <p:ph idx="1"/>
+          </p:nvPr>
+        </p:nvSpPr>
+        <p:spPr/>
+        <p:txBody>
+          <a:bodyPr/>
+          <a:lstStyle/>
+          <a:p>
+            <a:r>
+              <a:rPr lang="en-US" dirty="0" smtClean="0">
+                <a:hlinkClick r:id="rId2" action="ppaction://hlinksldjump"/>
+              </a:rPr>
+              <a:t>Defining order of persists to same address</a:t>
+            </a:r>
+            <a:endParaRPr lang="en-US" dirty="0" smtClean="0"/>
+          </a:p>
+          <a:p>
+            <a:r>
+              <a:rPr lang="en-US" dirty="0" smtClean="0">
+                <a:hlinkClick r:id="rId3" action="ppaction://hlinksldjump"/>
+              </a:rPr>
+              <a:t>Relaxed persistency, all queues</a:t>
+            </a:r>
+            <a:endParaRPr lang="en-US" dirty="0" smtClean="0"/>
+          </a:p>
+          <a:p>
+            <a:r>
+              <a:rPr lang="en-US" dirty="0" smtClean="0">
+                <a:hlinkClick r:id="rId4" action="ppaction://hlinksldjump"/>
+              </a:rPr>
+              <a:t>Effect of latency on CWL, 8 threads</a:t>
+            </a:r>
+            <a:endParaRPr lang="en-US" dirty="0" smtClean="0"/>
+          </a:p>
+        </p:txBody>
+      </p:sp>
+      <p:sp>
+        <p:nvSpPr>
+          <p:cNvPr id="4" name="Slide Number Placeholder 3"/>
+          <p:cNvSpPr>
+            <a:spLocks noGrp="1"/>
+          </p:cNvSpPr>
+          <p:nvPr>
+            <p:ph type="sldNum" sz="quarter" idx="4"/>
+          </p:nvPr>
+        </p:nvSpPr>
+        <p:spPr/>
+        <p:txBody>
+          <a:bodyPr/>
+          <a:lstStyle/>
+          <a:p>
+            <a:fld id="{24EAD923-3004-4A31-84C7-9B440B785588}" type="slidenum">
+              <a:rPr lang="en-US" smtClean="0"/>
+              <a:pPr/>
+              <a:t>50</a:t>
+            </a:fld>
+            <a:endParaRPr lang="en-US" dirty="0"/>
+          </a:p>
+        </p:txBody>
+      </p:sp>
+    </p:spTree>
+    <p:extLst>
+      <p:ext uri="{BB962C8B-B14F-4D97-AF65-F5344CB8AC3E}">
+        <p14:creationId xmlns:p14="http://schemas.microsoft.com/office/powerpoint/2010/main" val="913657507"/>
+      </p:ext>
+    </p:extLst>
+  </p:cSld>
+  <p:clrMapOvr>
+    <a:masterClrMapping/>
+  </p:clrMapOvr>
+  <p:timing>
+    <p:tnLst>
+      <p:par>
+        <p:cTn id="1" dur="indefinite" restart="never" nodeType="tmRoot"/>
+      </p:par>
+    </p:tnLst>
+  </p:timing>
+</p:sld>
+</file>
+
+<file path=ppt/slides/slide51.xml><?xml version="1.0" encoding="utf-8"?>
+<p:sld xmlns:a="http://schemas.openxmlformats.org/drawingml/2006/main" xmlns:r="http://schemas.openxmlformats.org/officeDocument/2006/relationships" xmlns:p="http://schemas.openxmlformats.org/presentationml/2006/main">
+  <p:cSld>
+    <p:spTree>
+      <p:nvGrpSpPr>
+        <p:cNvPr id="1" name=""/>
+        <p:cNvGrpSpPr/>
+        <p:nvPr/>
+      </p:nvGrpSpPr>
+      <p:grpSpPr>
+        <a:xfrm>
+          <a:off x="0" y="0"/>
+          <a:ext cx="0" cy="0"/>
+          <a:chOff x="0" y="0"/>
+          <a:chExt cx="0" cy="0"/>
+        </a:xfrm>
+      </p:grpSpPr>
+      <p:sp>
+        <p:nvSpPr>
+          <p:cNvPr id="2" name="Title 1"/>
+          <p:cNvSpPr>
+            <a:spLocks noGrp="1"/>
+          </p:cNvSpPr>
+          <p:nvPr>
+            <p:ph type="title"/>
+          </p:nvPr>
+        </p:nvSpPr>
+        <p:spPr/>
+        <p:txBody>
+          <a:bodyPr/>
+          <a:lstStyle/>
+          <a:p>
+            <a:r>
+              <a:rPr lang="en-US" dirty="0" smtClean="0"/>
+              <a:t>Persists to same address</a:t>
+            </a:r>
+            <a:endParaRPr lang="en-US" dirty="0"/>
+          </a:p>
+        </p:txBody>
+      </p:sp>
+      <p:sp>
+        <p:nvSpPr>
+          <p:cNvPr id="3" name="Content Placeholder 2"/>
+          <p:cNvSpPr>
+            <a:spLocks noGrp="1"/>
+          </p:cNvSpPr>
+          <p:nvPr>
+            <p:ph idx="1"/>
+          </p:nvPr>
+        </p:nvSpPr>
+        <p:spPr/>
+        <p:txBody>
+          <a:bodyPr/>
+          <a:lstStyle/>
+          <a:p>
+            <a:r>
+              <a:rPr lang="en-US" dirty="0" smtClean="0"/>
+              <a:t>Strict persistency relies on consistency model to define order or persists to same address</a:t>
+            </a:r>
+          </a:p>
+          <a:p>
+            <a:pPr lvl="1"/>
+            <a:r>
+              <a:rPr lang="en-US" dirty="0" smtClean="0"/>
+              <a:t>Often relies on cache coherence guarantees</a:t>
+            </a:r>
+          </a:p>
+          <a:p>
+            <a:r>
+              <a:rPr lang="en-US" dirty="0" smtClean="0"/>
+              <a:t>Relaxed consistency/relaxed persistency allows:</a:t>
+            </a:r>
+          </a:p>
+          <a:p>
+            <a:pPr lvl="1"/>
+            <a:r>
+              <a:rPr lang="en-US" dirty="0" smtClean="0"/>
+              <a:t>Store visibility to reorder across persist barrier</a:t>
+            </a:r>
+          </a:p>
+          <a:p>
+            <a:pPr lvl="1"/>
+            <a:r>
+              <a:rPr lang="en-US" dirty="0" smtClean="0"/>
+              <a:t>Persists to reorder across store barrier</a:t>
+            </a:r>
+          </a:p>
+          <a:p>
+            <a:r>
+              <a:rPr lang="en-US" dirty="0" smtClean="0"/>
+              <a:t>May violate cache coherence persist ordering</a:t>
+            </a:r>
+            <a:endParaRPr lang="en-US" dirty="0"/>
+          </a:p>
+        </p:txBody>
+      </p:sp>
+      <p:sp>
+        <p:nvSpPr>
+          <p:cNvPr id="4" name="Slide Number Placeholder 3"/>
+          <p:cNvSpPr>
+            <a:spLocks noGrp="1"/>
+          </p:cNvSpPr>
+          <p:nvPr>
+            <p:ph type="sldNum" sz="quarter" idx="4"/>
+          </p:nvPr>
+        </p:nvSpPr>
+        <p:spPr/>
+        <p:txBody>
+          <a:bodyPr/>
+          <a:lstStyle/>
+          <a:p>
+            <a:fld id="{24EAD923-3004-4A31-84C7-9B440B785588}" type="slidenum">
+              <a:rPr lang="en-US" smtClean="0"/>
+              <a:pPr/>
+              <a:t>51</a:t>
+            </a:fld>
+            <a:endParaRPr lang="en-US" dirty="0"/>
+          </a:p>
+        </p:txBody>
+      </p:sp>
+    </p:spTree>
+    <p:extLst>
+      <p:ext uri="{BB962C8B-B14F-4D97-AF65-F5344CB8AC3E}">
+        <p14:creationId xmlns:p14="http://schemas.microsoft.com/office/powerpoint/2010/main" val="2396509682"/>
+      </p:ext>
+    </p:extLst>
+  </p:cSld>
+  <p:clrMapOvr>
+    <a:masterClrMapping/>
+  </p:clrMapOvr>
+  <p:timing>
+    <p:tnLst>
+      <p:par>
+        <p:cTn id="1" dur="indefinite" restart="never" nodeType="tmRoot"/>
+      </p:par>
+    </p:tnLst>
+  </p:timing>
+</p:sld>
+</file>
+
+<file path=ppt/slides/slide52.xml><?xml version="1.0" encoding="utf-8"?>
+<p:sld xmlns:a="http://schemas.openxmlformats.org/drawingml/2006/main" xmlns:r="http://schemas.openxmlformats.org/officeDocument/2006/relationships" xmlns:p="http://schemas.openxmlformats.org/presentationml/2006/main">
+  <p:cSld>
+    <p:spTree>
+      <p:nvGrpSpPr>
+        <p:cNvPr id="1" name=""/>
+        <p:cNvGrpSpPr/>
+        <p:nvPr/>
+      </p:nvGrpSpPr>
+      <p:grpSpPr>
+        <a:xfrm>
+          <a:off x="0" y="0"/>
+          <a:ext cx="0" cy="0"/>
+          <a:chOff x="0" y="0"/>
+          <a:chExt cx="0" cy="0"/>
+        </a:xfrm>
+      </p:grpSpPr>
+      <p:sp>
+        <p:nvSpPr>
+          <p:cNvPr id="2" name="Title 1"/>
+          <p:cNvSpPr>
+            <a:spLocks noGrp="1"/>
+          </p:cNvSpPr>
+          <p:nvPr>
+            <p:ph type="title"/>
+          </p:nvPr>
+        </p:nvSpPr>
+        <p:spPr/>
+        <p:txBody>
+          <a:bodyPr/>
+          <a:lstStyle/>
+          <a:p>
+            <a:r>
+              <a:rPr lang="en-US" dirty="0" smtClean="0"/>
+              <a:t>Persists to same address</a:t>
+            </a:r>
+            <a:endParaRPr lang="en-US" dirty="0"/>
+          </a:p>
+        </p:txBody>
+      </p:sp>
+      <p:sp>
+        <p:nvSpPr>
+          <p:cNvPr id="4" name="Slide Number Placeholder 3"/>
+          <p:cNvSpPr>
+            <a:spLocks noGrp="1"/>
+          </p:cNvSpPr>
+          <p:nvPr>
+            <p:ph type="sldNum" sz="quarter" idx="4"/>
+          </p:nvPr>
+        </p:nvSpPr>
+        <p:spPr/>
+        <p:txBody>
+          <a:bodyPr/>
+          <a:lstStyle/>
+          <a:p>
+            <a:fld id="{24EAD923-3004-4A31-84C7-9B440B785588}" type="slidenum">
+              <a:rPr lang="en-US" smtClean="0"/>
+              <a:pPr/>
+              <a:t>52</a:t>
+            </a:fld>
+            <a:endParaRPr lang="en-US" dirty="0"/>
+          </a:p>
+        </p:txBody>
+      </p:sp>
+      <p:sp>
+        <p:nvSpPr>
+          <p:cNvPr id="7" name="TextBox 6"/>
+          <p:cNvSpPr txBox="1"/>
+          <p:nvPr/>
+        </p:nvSpPr>
+        <p:spPr>
+          <a:xfrm>
+            <a:off x="1075449" y="4257092"/>
+            <a:ext cx="3136511" cy="707886"/>
+          </a:xfrm>
+          <a:prstGeom prst="rect">
+            <a:avLst/>
+          </a:prstGeom>
+          <a:noFill/>
+        </p:spPr>
+        <p:txBody>
+          <a:bodyPr wrap="square" rtlCol="0">
+            <a:spAutoFit/>
+          </a:bodyPr>
+          <a:lstStyle/>
+          <a:p>
+            <a:pPr algn="l"/>
+            <a:r>
+              <a:rPr lang="en-US" b="0" dirty="0" smtClean="0"/>
+              <a:t>Thread 1’s stores reorder around the barrier</a:t>
+            </a:r>
+            <a:endParaRPr lang="en-US" b="0" dirty="0"/>
+          </a:p>
+        </p:txBody>
+      </p:sp>
+      <p:sp>
+        <p:nvSpPr>
+          <p:cNvPr id="12" name="TextBox 11"/>
+          <p:cNvSpPr txBox="1"/>
+          <p:nvPr/>
+        </p:nvSpPr>
+        <p:spPr>
+          <a:xfrm>
+            <a:off x="5004049" y="4257092"/>
+            <a:ext cx="4139951" cy="1015663"/>
+          </a:xfrm>
+          <a:prstGeom prst="rect">
+            <a:avLst/>
+          </a:prstGeom>
+          <a:noFill/>
+        </p:spPr>
+        <p:txBody>
+          <a:bodyPr wrap="square" rtlCol="0">
+            <a:spAutoFit/>
+          </a:bodyPr>
+          <a:lstStyle/>
+          <a:p>
+            <a:pPr algn="l"/>
+            <a:r>
+              <a:rPr lang="en-US" b="0" dirty="0" smtClean="0"/>
+              <a:t>Persist ordering dependences shown for barriers and cache coherence order</a:t>
+            </a:r>
+            <a:endParaRPr lang="en-US" b="0" dirty="0"/>
+          </a:p>
+        </p:txBody>
+      </p:sp>
+      <p:sp>
+        <p:nvSpPr>
+          <p:cNvPr id="13" name="TextBox 12"/>
+          <p:cNvSpPr txBox="1"/>
+          <p:nvPr/>
+        </p:nvSpPr>
+        <p:spPr>
+          <a:xfrm>
+            <a:off x="1850858" y="5991671"/>
+            <a:ext cx="5442517" cy="461665"/>
+          </a:xfrm>
+          <a:prstGeom prst="rect">
+            <a:avLst/>
+          </a:prstGeom>
+          <a:noFill/>
+        </p:spPr>
+        <p:txBody>
+          <a:bodyPr wrap="none" rtlCol="0">
+            <a:spAutoFit/>
+          </a:bodyPr>
+          <a:lstStyle/>
+          <a:p>
+            <a:r>
+              <a:rPr lang="en-US" sz="2400" b="0" i="1" dirty="0" smtClean="0">
+                <a:solidFill>
+                  <a:srgbClr val="FF0909"/>
+                </a:solidFill>
+              </a:rPr>
+              <a:t>Dependence cycle cannot be enforced</a:t>
+            </a:r>
+            <a:endParaRPr lang="en-US" sz="2400" b="0" i="1" dirty="0">
+              <a:solidFill>
+                <a:srgbClr val="FF0909"/>
+              </a:solidFill>
+            </a:endParaRPr>
+          </a:p>
+        </p:txBody>
+      </p:sp>
+      <p:sp>
+        <p:nvSpPr>
+          <p:cNvPr id="5" name="TextBox 4"/>
+          <p:cNvSpPr txBox="1"/>
+          <p:nvPr/>
+        </p:nvSpPr>
+        <p:spPr>
+          <a:xfrm>
+            <a:off x="2765120" y="1520788"/>
+            <a:ext cx="1338828" cy="2246769"/>
+          </a:xfrm>
+          <a:prstGeom prst="rect">
+            <a:avLst/>
+          </a:prstGeom>
+          <a:noFill/>
+        </p:spPr>
+        <p:txBody>
+          <a:bodyPr wrap="none" rtlCol="0">
+            <a:spAutoFit/>
+          </a:bodyPr>
+          <a:lstStyle/>
+          <a:p>
+            <a:pPr algn="l"/>
+            <a:r>
+              <a:rPr lang="en-US" dirty="0" smtClean="0"/>
+              <a:t>Thread 1:</a:t>
+            </a:r>
+          </a:p>
+          <a:p>
+            <a:pPr algn="l"/>
+            <a:endParaRPr lang="en-US" b="0" dirty="0" smtClean="0"/>
+          </a:p>
+          <a:p>
+            <a:pPr algn="l"/>
+            <a:r>
+              <a:rPr lang="en-US" b="0" dirty="0" smtClean="0"/>
+              <a:t>Persist A</a:t>
+            </a:r>
+          </a:p>
+          <a:p>
+            <a:pPr algn="l"/>
+            <a:endParaRPr lang="en-US" b="0" dirty="0" smtClean="0"/>
+          </a:p>
+          <a:p>
+            <a:pPr algn="l"/>
+            <a:r>
+              <a:rPr lang="en-US" b="0" dirty="0" smtClean="0"/>
+              <a:t>Barrier</a:t>
+            </a:r>
+          </a:p>
+          <a:p>
+            <a:pPr algn="l"/>
+            <a:endParaRPr lang="en-US" b="0" dirty="0" smtClean="0"/>
+          </a:p>
+          <a:p>
+            <a:pPr algn="l"/>
+            <a:r>
+              <a:rPr lang="en-US" b="0" dirty="0" smtClean="0"/>
+              <a:t>Persist B</a:t>
+            </a:r>
+            <a:endParaRPr lang="en-US" dirty="0"/>
+          </a:p>
+        </p:txBody>
+      </p:sp>
+      <p:sp>
+        <p:nvSpPr>
+          <p:cNvPr id="6" name="TextBox 5"/>
+          <p:cNvSpPr txBox="1"/>
+          <p:nvPr/>
+        </p:nvSpPr>
+        <p:spPr>
+          <a:xfrm>
+            <a:off x="5256076" y="1520788"/>
+            <a:ext cx="1338828" cy="2246769"/>
+          </a:xfrm>
+          <a:prstGeom prst="rect">
+            <a:avLst/>
+          </a:prstGeom>
+          <a:noFill/>
+        </p:spPr>
+        <p:txBody>
+          <a:bodyPr wrap="none" rtlCol="0">
+            <a:spAutoFit/>
+          </a:bodyPr>
+          <a:lstStyle/>
+          <a:p>
+            <a:pPr algn="l"/>
+            <a:r>
+              <a:rPr lang="en-US" dirty="0" smtClean="0"/>
+              <a:t>Thread 2:</a:t>
+            </a:r>
+          </a:p>
+          <a:p>
+            <a:pPr algn="l"/>
+            <a:endParaRPr lang="en-US" b="0" dirty="0" smtClean="0"/>
+          </a:p>
+          <a:p>
+            <a:pPr algn="l"/>
+            <a:r>
+              <a:rPr lang="en-US" b="0" dirty="0" smtClean="0"/>
+              <a:t>Persist B</a:t>
+            </a:r>
+          </a:p>
+          <a:p>
+            <a:pPr algn="l"/>
+            <a:endParaRPr lang="en-US" b="0" dirty="0" smtClean="0"/>
+          </a:p>
+          <a:p>
+            <a:pPr algn="l"/>
+            <a:r>
+              <a:rPr lang="en-US" b="0" dirty="0" smtClean="0"/>
+              <a:t>Barrier</a:t>
+            </a:r>
+          </a:p>
+          <a:p>
+            <a:pPr algn="l"/>
+            <a:endParaRPr lang="en-US" b="0" dirty="0" smtClean="0"/>
+          </a:p>
+          <a:p>
+            <a:pPr algn="l"/>
+            <a:r>
+              <a:rPr lang="en-US" b="0" dirty="0" smtClean="0"/>
+              <a:t>Persist A</a:t>
+            </a:r>
+            <a:endParaRPr lang="en-US" dirty="0"/>
+          </a:p>
+        </p:txBody>
+      </p:sp>
+      <p:sp>
+        <p:nvSpPr>
+          <p:cNvPr id="8" name="Curved Right Arrow 7"/>
+          <p:cNvSpPr/>
+          <p:nvPr/>
+        </p:nvSpPr>
+        <p:spPr bwMode="auto">
+          <a:xfrm>
+            <a:off x="2123728" y="2276872"/>
+            <a:ext cx="504056" cy="1368152"/>
+          </a:xfrm>
+          <a:prstGeom prst="curvedRightArrow">
+            <a:avLst/>
+          </a:prstGeom>
+          <a:solidFill>
+            <a:schemeClr val="tx1"/>
+          </a:solidFill>
+          <a:ln w="9525" cap="flat" cmpd="sng" algn="ctr">
+            <a:solidFill>
+              <a:schemeClr val="tx1"/>
+            </a:solidFill>
+            <a:prstDash val="solid"/>
+            <a:round/>
+            <a:headEnd type="none" w="med" len="med"/>
+            <a:tailEnd type="none" w="med" len="med"/>
+          </a:ln>
+          <a:effectLst/>
+        </p:spPr>
+        <p:txBody>
+          <a:bodyPr vert="horz" wrap="square" lIns="91440" tIns="45720" rIns="91440" bIns="45720" numCol="1" rtlCol="0" anchor="t" anchorCtr="0" compatLnSpc="1">
+            <a:prstTxWarp prst="textNoShape">
+              <a:avLst/>
+            </a:prstTxWarp>
+          </a:bodyPr>
+          <a:lstStyle/>
+          <a:p>
+            <a:pPr marL="0" marR="0" indent="0" algn="l" defTabSz="914400" rtl="0" eaLnBrk="0" fontAlgn="base" latinLnBrk="0" hangingPunct="0">
+              <a:lnSpc>
+                <a:spcPct val="100000"/>
+              </a:lnSpc>
+              <a:spcBef>
+                <a:spcPct val="0"/>
+              </a:spcBef>
+              <a:spcAft>
+                <a:spcPct val="0"/>
+              </a:spcAft>
+              <a:buClrTx/>
+              <a:buSzTx/>
+              <a:buFontTx/>
+              <a:buNone/>
+              <a:tabLst/>
+            </a:pPr>
+            <a:endParaRPr kumimoji="0" lang="en-US" sz="2400" b="0" i="0" u="none" strike="noStrike" cap="none" normalizeH="0" baseline="0" smtClean="0">
+              <a:ln>
+                <a:noFill/>
+              </a:ln>
+              <a:solidFill>
+                <a:schemeClr val="tx1"/>
+              </a:solidFill>
+              <a:effectLst/>
+              <a:latin typeface="Arial" charset="0"/>
+              <a:ea typeface="ＭＳ Ｐゴシック" charset="-128"/>
+            </a:endParaRPr>
+          </a:p>
+        </p:txBody>
+      </p:sp>
+      <p:sp>
+        <p:nvSpPr>
+          <p:cNvPr id="9" name="Curved Right Arrow 8"/>
+          <p:cNvSpPr/>
+          <p:nvPr/>
+        </p:nvSpPr>
+        <p:spPr bwMode="auto">
+          <a:xfrm flipH="1">
+            <a:off x="6516216" y="2276872"/>
+            <a:ext cx="504056" cy="1368152"/>
+          </a:xfrm>
+          <a:prstGeom prst="curvedRightArrow">
+            <a:avLst/>
+          </a:prstGeom>
+          <a:solidFill>
+            <a:schemeClr val="tx1"/>
+          </a:solidFill>
+          <a:ln w="9525" cap="flat" cmpd="sng" algn="ctr">
+            <a:solidFill>
+              <a:schemeClr val="tx1"/>
+            </a:solidFill>
+            <a:prstDash val="solid"/>
+            <a:round/>
+            <a:headEnd type="none" w="med" len="med"/>
+            <a:tailEnd type="none" w="med" len="med"/>
+          </a:ln>
+          <a:effectLst/>
+        </p:spPr>
+        <p:txBody>
+          <a:bodyPr vert="horz" wrap="square" lIns="91440" tIns="45720" rIns="91440" bIns="45720" numCol="1" rtlCol="0" anchor="t" anchorCtr="0" compatLnSpc="1">
+            <a:prstTxWarp prst="textNoShape">
+              <a:avLst/>
+            </a:prstTxWarp>
+          </a:bodyPr>
+          <a:lstStyle/>
+          <a:p>
+            <a:pPr marL="0" marR="0" indent="0" algn="l" defTabSz="914400" rtl="0" eaLnBrk="0" fontAlgn="base" latinLnBrk="0" hangingPunct="0">
+              <a:lnSpc>
+                <a:spcPct val="100000"/>
+              </a:lnSpc>
+              <a:spcBef>
+                <a:spcPct val="0"/>
+              </a:spcBef>
+              <a:spcAft>
+                <a:spcPct val="0"/>
+              </a:spcAft>
+              <a:buClrTx/>
+              <a:buSzTx/>
+              <a:buFontTx/>
+              <a:buNone/>
+              <a:tabLst/>
+            </a:pPr>
+            <a:endParaRPr kumimoji="0" lang="en-US" sz="2400" b="0" i="0" u="none" strike="noStrike" cap="none" normalizeH="0" baseline="0" smtClean="0">
+              <a:ln>
+                <a:noFill/>
+              </a:ln>
+              <a:solidFill>
+                <a:schemeClr val="tx1"/>
+              </a:solidFill>
+              <a:effectLst/>
+              <a:latin typeface="Arial" charset="0"/>
+              <a:ea typeface="ＭＳ Ｐゴシック" charset="-128"/>
+            </a:endParaRPr>
+          </a:p>
+        </p:txBody>
+      </p:sp>
+      <p:sp>
+        <p:nvSpPr>
+          <p:cNvPr id="11" name="Right Arrow 10"/>
+          <p:cNvSpPr/>
+          <p:nvPr/>
+        </p:nvSpPr>
+        <p:spPr bwMode="auto">
+          <a:xfrm rot="13689831">
+            <a:off x="3868024" y="2767176"/>
+            <a:ext cx="1332148" cy="252028"/>
+          </a:xfrm>
+          <a:prstGeom prst="rightArrow">
+            <a:avLst/>
+          </a:prstGeom>
+          <a:solidFill>
+            <a:schemeClr val="tx1"/>
+          </a:solidFill>
+          <a:ln w="9525" cap="flat" cmpd="sng" algn="ctr">
+            <a:solidFill>
+              <a:schemeClr val="tx1"/>
+            </a:solidFill>
+            <a:prstDash val="solid"/>
+            <a:round/>
+            <a:headEnd type="none" w="med" len="med"/>
+            <a:tailEnd type="none" w="med" len="med"/>
+          </a:ln>
+          <a:effectLst/>
+        </p:spPr>
+        <p:txBody>
+          <a:bodyPr vert="horz" wrap="square" lIns="91440" tIns="45720" rIns="91440" bIns="45720" numCol="1" rtlCol="0" anchor="t" anchorCtr="0" compatLnSpc="1">
+            <a:prstTxWarp prst="textNoShape">
+              <a:avLst/>
+            </a:prstTxWarp>
+          </a:bodyPr>
+          <a:lstStyle/>
+          <a:p>
+            <a:pPr marL="0" marR="0" indent="0" algn="l" defTabSz="914400" rtl="0" eaLnBrk="0" fontAlgn="base" latinLnBrk="0" hangingPunct="0">
+              <a:lnSpc>
+                <a:spcPct val="100000"/>
+              </a:lnSpc>
+              <a:spcBef>
+                <a:spcPct val="0"/>
+              </a:spcBef>
+              <a:spcAft>
+                <a:spcPct val="0"/>
+              </a:spcAft>
+              <a:buClrTx/>
+              <a:buSzTx/>
+              <a:buFontTx/>
+              <a:buNone/>
+              <a:tabLst/>
+            </a:pPr>
+            <a:endParaRPr kumimoji="0" lang="en-US" sz="2400" b="0" i="0" u="none" strike="noStrike" cap="none" normalizeH="0" baseline="0" smtClean="0">
+              <a:ln>
+                <a:noFill/>
+              </a:ln>
+              <a:solidFill>
+                <a:schemeClr val="tx1"/>
+              </a:solidFill>
+              <a:effectLst/>
+              <a:latin typeface="Arial" charset="0"/>
+              <a:ea typeface="ＭＳ Ｐゴシック" charset="-128"/>
+            </a:endParaRPr>
+          </a:p>
+        </p:txBody>
+      </p:sp>
+      <p:sp>
+        <p:nvSpPr>
+          <p:cNvPr id="14" name="Right Arrow 13"/>
+          <p:cNvSpPr/>
+          <p:nvPr/>
+        </p:nvSpPr>
+        <p:spPr bwMode="auto">
+          <a:xfrm rot="7910169" flipH="1">
+            <a:off x="4020424" y="2767176"/>
+            <a:ext cx="1332148" cy="252028"/>
+          </a:xfrm>
+          <a:prstGeom prst="rightArrow">
+            <a:avLst/>
+          </a:prstGeom>
+          <a:solidFill>
+            <a:schemeClr val="tx1"/>
+          </a:solidFill>
+          <a:ln w="9525" cap="flat" cmpd="sng" algn="ctr">
+            <a:solidFill>
+              <a:schemeClr val="tx1"/>
+            </a:solidFill>
+            <a:prstDash val="solid"/>
+            <a:round/>
+            <a:headEnd type="none" w="med" len="med"/>
+            <a:tailEnd type="none" w="med" len="med"/>
+          </a:ln>
+          <a:effectLst/>
+        </p:spPr>
+        <p:txBody>
+          <a:bodyPr vert="horz" wrap="square" lIns="91440" tIns="45720" rIns="91440" bIns="45720" numCol="1" rtlCol="0" anchor="t" anchorCtr="0" compatLnSpc="1">
+            <a:prstTxWarp prst="textNoShape">
+              <a:avLst/>
+            </a:prstTxWarp>
+          </a:bodyPr>
+          <a:lstStyle/>
+          <a:p>
+            <a:pPr marL="0" marR="0" indent="0" algn="l" defTabSz="914400" rtl="0" eaLnBrk="0" fontAlgn="base" latinLnBrk="0" hangingPunct="0">
+              <a:lnSpc>
+                <a:spcPct val="100000"/>
+              </a:lnSpc>
+              <a:spcBef>
+                <a:spcPct val="0"/>
+              </a:spcBef>
+              <a:spcAft>
+                <a:spcPct val="0"/>
+              </a:spcAft>
+              <a:buClrTx/>
+              <a:buSzTx/>
+              <a:buFontTx/>
+              <a:buNone/>
+              <a:tabLst/>
+            </a:pPr>
+            <a:endParaRPr kumimoji="0" lang="en-US" sz="2400" b="0" i="0" u="none" strike="noStrike" cap="none" normalizeH="0" baseline="0" smtClean="0">
+              <a:ln>
+                <a:noFill/>
+              </a:ln>
+              <a:solidFill>
+                <a:schemeClr val="tx1"/>
+              </a:solidFill>
+              <a:effectLst/>
+              <a:latin typeface="Arial" charset="0"/>
+              <a:ea typeface="ＭＳ Ｐゴシック" charset="-128"/>
+            </a:endParaRPr>
+          </a:p>
+        </p:txBody>
+      </p:sp>
+    </p:spTree>
+    <p:extLst>
+      <p:ext uri="{BB962C8B-B14F-4D97-AF65-F5344CB8AC3E}">
+        <p14:creationId xmlns:p14="http://schemas.microsoft.com/office/powerpoint/2010/main" val="274768230"/>
+      </p:ext>
+    </p:extLst>
+  </p:cSld>
+  <p:clrMapOvr>
+    <a:masterClrMapping/>
+  </p:clrMapOvr>
+  <p:timing>
+    <p:tnLst>
+      <p:par>
+        <p:cTn id="1" dur="indefinite" restart="never" nodeType="tmRoot">
+          <p:childTnLst>
+            <p:seq concurrent="1" nextAc="seek">
+              <p:cTn id="2" dur="indefinite" nodeType="mainSeq">
+                <p:childTnLst>
+                  <p:par>
+                    <p:cTn id="3" fill="hold">
+                      <p:stCondLst>
+                        <p:cond delay="indefinite"/>
+                      </p:stCondLst>
+                      <p:childTnLst>
+                        <p:par>
+                          <p:cTn id="4" fill="hold">
+                            <p:stCondLst>
+                              <p:cond delay="0"/>
+                            </p:stCondLst>
+                            <p:childTnLst>
+                              <p:par>
+                                <p:cTn id="5" presetID="1" presetClass="entr" presetSubtype="0" fill="hold" grpId="0" nodeType="clickEffect">
+                                  <p:stCondLst>
+                                    <p:cond delay="0"/>
+                                  </p:stCondLst>
+                                  <p:childTnLst>
+                                    <p:set>
+                                      <p:cBhvr>
+                                        <p:cTn id="6" dur="1" fill="hold">
+                                          <p:stCondLst>
+                                            <p:cond delay="0"/>
+                                          </p:stCondLst>
+                                        </p:cTn>
+                                        <p:tgtEl>
+                                          <p:spTgt spid="9"/>
+                                        </p:tgtEl>
+                                        <p:attrNameLst>
+                                          <p:attrName>style.visibility</p:attrName>
+                                        </p:attrNameLst>
+                                      </p:cBhvr>
+                                      <p:to>
+                                        <p:strVal val="visible"/>
+                                      </p:to>
+                                    </p:set>
+                                  </p:childTnLst>
+                                </p:cTn>
+                              </p:par>
+                              <p:par>
+                                <p:cTn id="7" presetID="1" presetClass="entr" presetSubtype="0" fill="hold" grpId="0" nodeType="withEffect">
+                                  <p:stCondLst>
+                                    <p:cond delay="0"/>
+                                  </p:stCondLst>
+                                  <p:childTnLst>
+                                    <p:set>
+                                      <p:cBhvr>
+                                        <p:cTn id="8" dur="1" fill="hold">
+                                          <p:stCondLst>
+                                            <p:cond delay="0"/>
+                                          </p:stCondLst>
+                                        </p:cTn>
+                                        <p:tgtEl>
+                                          <p:spTgt spid="14"/>
+                                        </p:tgtEl>
+                                        <p:attrNameLst>
+                                          <p:attrName>style.visibility</p:attrName>
+                                        </p:attrNameLst>
+                                      </p:cBhvr>
+                                      <p:to>
+                                        <p:strVal val="visible"/>
+                                      </p:to>
+                                    </p:set>
+                                  </p:childTnLst>
+                                </p:cTn>
+                              </p:par>
+                              <p:par>
+                                <p:cTn id="9" presetID="1" presetClass="entr" presetSubtype="0" fill="hold" grpId="0" nodeType="withEffect">
+                                  <p:stCondLst>
+                                    <p:cond delay="0"/>
+                                  </p:stCondLst>
+                                  <p:childTnLst>
+                                    <p:set>
+                                      <p:cBhvr>
+                                        <p:cTn id="10" dur="1" fill="hold">
+                                          <p:stCondLst>
+                                            <p:cond delay="0"/>
+                                          </p:stCondLst>
+                                        </p:cTn>
+                                        <p:tgtEl>
+                                          <p:spTgt spid="11"/>
+                                        </p:tgtEl>
+                                        <p:attrNameLst>
+                                          <p:attrName>style.visibility</p:attrName>
+                                        </p:attrNameLst>
+                                      </p:cBhvr>
+                                      <p:to>
+                                        <p:strVal val="visible"/>
+                                      </p:to>
+                                    </p:set>
+                                  </p:childTnLst>
+                                </p:cTn>
+                              </p:par>
+                              <p:par>
+                                <p:cTn id="11" presetID="1" presetClass="entr" presetSubtype="0" fill="hold" grpId="0" nodeType="withEffect">
+                                  <p:stCondLst>
+                                    <p:cond delay="0"/>
+                                  </p:stCondLst>
+                                  <p:childTnLst>
+                                    <p:set>
+                                      <p:cBhvr>
+                                        <p:cTn id="12" dur="1" fill="hold">
+                                          <p:stCondLst>
+                                            <p:cond delay="0"/>
+                                          </p:stCondLst>
+                                        </p:cTn>
+                                        <p:tgtEl>
+                                          <p:spTgt spid="8"/>
+                                        </p:tgtEl>
+                                        <p:attrNameLst>
+                                          <p:attrName>style.visibility</p:attrName>
+                                        </p:attrNameLst>
+                                      </p:cBhvr>
+                                      <p:to>
+                                        <p:strVal val="visible"/>
+                                      </p:to>
+                                    </p:set>
+                                  </p:childTnLst>
+                                </p:cTn>
+                              </p:par>
+                              <p:par>
+                                <p:cTn id="13" presetID="1" presetClass="entr" presetSubtype="0" fill="hold" grpId="0" nodeType="withEffect">
+                                  <p:stCondLst>
+                                    <p:cond delay="0"/>
+                                  </p:stCondLst>
+                                  <p:childTnLst>
+                                    <p:set>
+                                      <p:cBhvr>
+                                        <p:cTn id="14" dur="1" fill="hold">
+                                          <p:stCondLst>
+                                            <p:cond delay="0"/>
+                                          </p:stCondLst>
+                                        </p:cTn>
+                                        <p:tgtEl>
+                                          <p:spTgt spid="12"/>
+                                        </p:tgtEl>
+                                        <p:attrNameLst>
+                                          <p:attrName>style.visibility</p:attrName>
+                                        </p:attrNameLst>
+                                      </p:cBhvr>
+                                      <p:to>
+                                        <p:strVal val="visible"/>
+                                      </p:to>
+                                    </p:set>
+                                  </p:childTnLst>
+                                </p:cTn>
+                              </p:par>
+                            </p:childTnLst>
+                          </p:cTn>
+                        </p:par>
+                      </p:childTnLst>
+                    </p:cTn>
+                  </p:par>
+                  <p:par>
+                    <p:cTn id="15" fill="hold">
+                      <p:stCondLst>
+                        <p:cond delay="indefinite"/>
+                      </p:stCondLst>
+                      <p:childTnLst>
+                        <p:par>
+                          <p:cTn id="16" fill="hold">
+                            <p:stCondLst>
+                              <p:cond delay="0"/>
+                            </p:stCondLst>
+                            <p:childTnLst>
+                              <p:par>
+                                <p:cTn id="17" presetID="1" presetClass="entr" presetSubtype="0" fill="hold" grpId="0" nodeType="clickEffect">
+                                  <p:stCondLst>
+                                    <p:cond delay="0"/>
+                                  </p:stCondLst>
+                                  <p:childTnLst>
+                                    <p:set>
+                                      <p:cBhvr>
+                                        <p:cTn id="18" dur="1" fill="hold">
+                                          <p:stCondLst>
+                                            <p:cond delay="0"/>
+                                          </p:stCondLst>
+                                        </p:cTn>
+                                        <p:tgtEl>
+                                          <p:spTgt spid="13"/>
+                                        </p:tgtEl>
+                                        <p:attrNameLst>
+                                          <p:attrName>style.visibility</p:attrName>
+                                        </p:attrNameLst>
+                                      </p:cBhvr>
+                                      <p:to>
+                                        <p:strVal val="visible"/>
+                                      </p:to>
+                                    </p:set>
+                                  </p:childTnLst>
+                                </p:cTn>
+                              </p:par>
+                            </p:childTnLst>
+                          </p:cTn>
+                        </p:par>
+                      </p:childTnLst>
+                    </p:cTn>
+                  </p:par>
+                </p:childTnLst>
+              </p:cTn>
+              <p:prevCondLst>
+                <p:cond evt="onPrev" delay="0">
+                  <p:tgtEl>
+                    <p:sldTgt/>
+                  </p:tgtEl>
+                </p:cond>
+              </p:prevCondLst>
+              <p:nextCondLst>
+                <p:cond evt="onNext" delay="0">
+                  <p:tgtEl>
+                    <p:sldTgt/>
+                  </p:tgtEl>
+                </p:cond>
+              </p:nextCondLst>
+            </p:seq>
+          </p:childTnLst>
+        </p:cTn>
+      </p:par>
+    </p:tnLst>
+    <p:bldLst>
+      <p:bldP spid="12" grpId="0"/>
+      <p:bldP spid="13" grpId="0"/>
+      <p:bldP spid="8" grpId="0" animBg="1"/>
+      <p:bldP spid="9" grpId="0" animBg="1"/>
+      <p:bldP spid="11" grpId="0" animBg="1"/>
+      <p:bldP spid="14" grpId="0" animBg="1"/>
+    </p:bldLst>
+  </p:timing>
+</p:sld>
+</file>
+
+<file path=ppt/slides/slide53.xml><?xml version="1.0" encoding="utf-8"?>
+<p:sld xmlns:a="http://schemas.openxmlformats.org/drawingml/2006/main" xmlns:r="http://schemas.openxmlformats.org/officeDocument/2006/relationships" xmlns:p="http://schemas.openxmlformats.org/presentationml/2006/main">
+  <p:cSld>
+    <p:spTree>
+      <p:nvGrpSpPr>
+        <p:cNvPr id="1" name=""/>
+        <p:cNvGrpSpPr/>
+        <p:nvPr/>
+      </p:nvGrpSpPr>
+      <p:grpSpPr>
+        <a:xfrm>
+          <a:off x="0" y="0"/>
+          <a:ext cx="0" cy="0"/>
+          <a:chOff x="0" y="0"/>
+          <a:chExt cx="0" cy="0"/>
+        </a:xfrm>
+      </p:grpSpPr>
+      <p:sp>
+        <p:nvSpPr>
+          <p:cNvPr id="2" name="Title 1"/>
+          <p:cNvSpPr>
+            <a:spLocks noGrp="1"/>
+          </p:cNvSpPr>
+          <p:nvPr>
+            <p:ph type="title"/>
+          </p:nvPr>
+        </p:nvSpPr>
+        <p:spPr/>
+        <p:txBody>
+          <a:bodyPr/>
+          <a:lstStyle/>
+          <a:p>
+            <a:r>
+              <a:rPr lang="en-US" dirty="0" smtClean="0"/>
+              <a:t>Persists to same address</a:t>
+            </a:r>
+            <a:endParaRPr lang="en-US" dirty="0"/>
+          </a:p>
+        </p:txBody>
+      </p:sp>
+      <p:sp>
+        <p:nvSpPr>
+          <p:cNvPr id="3" name="Content Placeholder 2"/>
+          <p:cNvSpPr>
+            <a:spLocks noGrp="1"/>
+          </p:cNvSpPr>
+          <p:nvPr>
+            <p:ph idx="1"/>
+          </p:nvPr>
+        </p:nvSpPr>
+        <p:spPr/>
+        <p:txBody>
+          <a:bodyPr/>
+          <a:lstStyle/>
+          <a:p>
+            <a:r>
+              <a:rPr lang="en-US" dirty="0" smtClean="0"/>
+              <a:t>Resolve by:</a:t>
+            </a:r>
+          </a:p>
+          <a:p>
+            <a:pPr lvl="1"/>
+            <a:r>
+              <a:rPr lang="en-US" dirty="0" smtClean="0"/>
+              <a:t>Relying on strict persistency</a:t>
+            </a:r>
+          </a:p>
+          <a:p>
+            <a:pPr lvl="1"/>
+            <a:r>
+              <a:rPr lang="en-US" dirty="0" smtClean="0"/>
+              <a:t>Preventing stores from reordering around persist barriers</a:t>
+            </a:r>
+          </a:p>
+          <a:p>
+            <a:pPr lvl="1"/>
+            <a:r>
+              <a:rPr lang="en-US" dirty="0" smtClean="0"/>
+              <a:t>Defining additional synchronization to prevent such situations</a:t>
+            </a:r>
+          </a:p>
+          <a:p>
+            <a:pPr lvl="2"/>
+            <a:r>
+              <a:rPr lang="en-US" dirty="0" smtClean="0"/>
+              <a:t>Interaction between consistency barriers and persist barriers</a:t>
+            </a:r>
+          </a:p>
+        </p:txBody>
+      </p:sp>
+      <p:sp>
+        <p:nvSpPr>
+          <p:cNvPr id="4" name="Slide Number Placeholder 3"/>
+          <p:cNvSpPr>
+            <a:spLocks noGrp="1"/>
+          </p:cNvSpPr>
+          <p:nvPr>
+            <p:ph type="sldNum" sz="quarter" idx="4"/>
+          </p:nvPr>
+        </p:nvSpPr>
+        <p:spPr/>
+        <p:txBody>
+          <a:bodyPr/>
+          <a:lstStyle/>
+          <a:p>
+            <a:fld id="{24EAD923-3004-4A31-84C7-9B440B785588}" type="slidenum">
+              <a:rPr lang="en-US" smtClean="0"/>
+              <a:pPr/>
+              <a:t>53</a:t>
+            </a:fld>
+            <a:endParaRPr lang="en-US" dirty="0"/>
+          </a:p>
+        </p:txBody>
+      </p:sp>
+    </p:spTree>
+    <p:extLst>
+      <p:ext uri="{BB962C8B-B14F-4D97-AF65-F5344CB8AC3E}">
+        <p14:creationId xmlns:p14="http://schemas.microsoft.com/office/powerpoint/2010/main" val="4227488363"/>
+      </p:ext>
+    </p:extLst>
+  </p:cSld>
+  <p:clrMapOvr>
+    <a:masterClrMapping/>
+  </p:clrMapOvr>
+  <p:timing>
+    <p:tnLst>
+      <p:par>
+        <p:cTn id="1" dur="indefinite" restart="never" nodeType="tmRoot"/>
+      </p:par>
+    </p:tnLst>
+  </p:timing>
+</p:sld>
+</file>
+
+<file path=ppt/slides/slide54.xml><?xml version="1.0" encoding="utf-8"?>
+<p:sld xmlns:a="http://schemas.openxmlformats.org/drawingml/2006/main" xmlns:r="http://schemas.openxmlformats.org/officeDocument/2006/relationships" xmlns:p="http://schemas.openxmlformats.org/presentationml/2006/main">
+  <p:cSld>
+    <p:spTree>
+      <p:nvGrpSpPr>
+        <p:cNvPr id="1" name=""/>
+        <p:cNvGrpSpPr/>
+        <p:nvPr/>
+      </p:nvGrpSpPr>
+      <p:grpSpPr>
+        <a:xfrm>
+          <a:off x="0" y="0"/>
+          <a:ext cx="0" cy="0"/>
+          <a:chOff x="0" y="0"/>
+          <a:chExt cx="0" cy="0"/>
+        </a:xfrm>
+      </p:grpSpPr>
+      <p:pic>
+        <p:nvPicPr>
+          <p:cNvPr id="7" name="Picture 6"/>
+          <p:cNvPicPr>
+            <a:picLocks noChangeAspect="1"/>
+          </p:cNvPicPr>
+          <p:nvPr/>
+        </p:nvPicPr>
+        <p:blipFill>
+          <a:blip r:embed="rId2"/>
+          <a:stretch>
+            <a:fillRect/>
+          </a:stretch>
+        </p:blipFill>
+        <p:spPr>
+          <a:xfrm>
+            <a:off x="1331249" y="1008291"/>
+            <a:ext cx="6481501" cy="5049001"/>
+          </a:xfrm>
+          <a:prstGeom prst="rect">
+            <a:avLst/>
+          </a:prstGeom>
+        </p:spPr>
+      </p:pic>
+      <p:sp>
+        <p:nvSpPr>
+          <p:cNvPr id="2" name="Title 1"/>
+          <p:cNvSpPr>
+            <a:spLocks noGrp="1"/>
+          </p:cNvSpPr>
+          <p:nvPr>
+            <p:ph type="title"/>
+          </p:nvPr>
+        </p:nvSpPr>
+        <p:spPr/>
+        <p:txBody>
+          <a:bodyPr/>
+          <a:lstStyle/>
+          <a:p>
+            <a:r>
+              <a:rPr lang="en-US" dirty="0" smtClean="0"/>
+              <a:t>All queues, 1 thread</a:t>
+            </a:r>
+            <a:endParaRPr lang="en-US" dirty="0"/>
+          </a:p>
+        </p:txBody>
+      </p:sp>
+      <p:sp>
+        <p:nvSpPr>
+          <p:cNvPr id="4" name="Slide Number Placeholder 3"/>
+          <p:cNvSpPr>
+            <a:spLocks noGrp="1"/>
+          </p:cNvSpPr>
+          <p:nvPr>
+            <p:ph type="sldNum" sz="quarter" idx="4"/>
+          </p:nvPr>
+        </p:nvSpPr>
+        <p:spPr/>
+        <p:txBody>
+          <a:bodyPr/>
+          <a:lstStyle/>
+          <a:p>
+            <a:fld id="{24EAD923-3004-4A31-84C7-9B440B785588}" type="slidenum">
+              <a:rPr lang="en-US" smtClean="0"/>
+              <a:pPr/>
+              <a:t>54</a:t>
+            </a:fld>
+            <a:endParaRPr lang="en-US" dirty="0"/>
+          </a:p>
+        </p:txBody>
+      </p:sp>
+      <p:sp>
+        <p:nvSpPr>
+          <p:cNvPr id="6" name="TextBox 5"/>
+          <p:cNvSpPr txBox="1"/>
+          <p:nvPr/>
+        </p:nvSpPr>
+        <p:spPr>
+          <a:xfrm>
+            <a:off x="650271" y="5991671"/>
+            <a:ext cx="7843622" cy="461665"/>
+          </a:xfrm>
+          <a:prstGeom prst="rect">
+            <a:avLst/>
+          </a:prstGeom>
+          <a:noFill/>
+        </p:spPr>
+        <p:txBody>
+          <a:bodyPr wrap="none" rtlCol="0">
+            <a:spAutoFit/>
+          </a:bodyPr>
+          <a:lstStyle/>
+          <a:p>
+            <a:r>
+              <a:rPr lang="en-US" sz="2400" b="0" i="1" dirty="0" smtClean="0">
+                <a:solidFill>
+                  <a:srgbClr val="FF0909"/>
+                </a:solidFill>
+              </a:rPr>
+              <a:t>Varied</a:t>
+            </a:r>
+            <a:r>
+              <a:rPr lang="en-US" sz="2400" b="0" i="1" dirty="0" smtClean="0">
+                <a:solidFill>
+                  <a:srgbClr val="FF0909"/>
+                </a:solidFill>
+              </a:rPr>
+              <a:t> volatile performance.  Require strand persistency</a:t>
+            </a:r>
+            <a:endParaRPr lang="en-US" sz="2400" b="0" i="1" dirty="0">
+              <a:solidFill>
+                <a:srgbClr val="FF0909"/>
+              </a:solidFill>
+            </a:endParaRPr>
+          </a:p>
+        </p:txBody>
+      </p:sp>
+    </p:spTree>
+    <p:extLst>
+      <p:ext uri="{BB962C8B-B14F-4D97-AF65-F5344CB8AC3E}">
+        <p14:creationId xmlns:p14="http://schemas.microsoft.com/office/powerpoint/2010/main" val="3415238127"/>
+      </p:ext>
+    </p:extLst>
+  </p:cSld>
+  <p:clrMapOvr>
+    <a:masterClrMapping/>
+  </p:clrMapOvr>
+  <p:timing>
+    <p:tnLst>
+      <p:par>
+        <p:cTn id="1" dur="indefinite" restart="never" nodeType="tmRoot">
+          <p:childTnLst>
+            <p:seq concurrent="1" nextAc="seek">
+              <p:cTn id="2" dur="indefinite" nodeType="mainSeq">
+                <p:childTnLst>
+                  <p:par>
+                    <p:cTn id="3" fill="hold">
+                      <p:stCondLst>
+                        <p:cond delay="indefinite"/>
+                      </p:stCondLst>
+                      <p:childTnLst>
+                        <p:par>
+                          <p:cTn id="4" fill="hold">
+                            <p:stCondLst>
+                              <p:cond delay="0"/>
+                            </p:stCondLst>
+                            <p:childTnLst>
+                              <p:par>
+                                <p:cTn id="5" presetID="1" presetClass="entr" presetSubtype="0" fill="hold" grpId="0" nodeType="clickEffect">
+                                  <p:stCondLst>
+                                    <p:cond delay="0"/>
+                                  </p:stCondLst>
+                                  <p:childTnLst>
+                                    <p:set>
+                                      <p:cBhvr>
+                                        <p:cTn id="6" dur="1" fill="hold">
+                                          <p:stCondLst>
+                                            <p:cond delay="0"/>
+                                          </p:stCondLst>
+                                        </p:cTn>
+                                        <p:tgtEl>
+                                          <p:spTgt spid="6"/>
+                                        </p:tgtEl>
+                                        <p:attrNameLst>
+                                          <p:attrName>style.visibility</p:attrName>
+                                        </p:attrNameLst>
+                                      </p:cBhvr>
+                                      <p:to>
+                                        <p:strVal val="visible"/>
+                                      </p:to>
+                                    </p:set>
+                                  </p:childTnLst>
+                                </p:cTn>
+                              </p:par>
+                            </p:childTnLst>
+                          </p:cTn>
+                        </p:par>
+                      </p:childTnLst>
+                    </p:cTn>
+                  </p:par>
+                </p:childTnLst>
+              </p:cTn>
+              <p:prevCondLst>
+                <p:cond evt="onPrev" delay="0">
+                  <p:tgtEl>
+                    <p:sldTgt/>
+                  </p:tgtEl>
+                </p:cond>
+              </p:prevCondLst>
+              <p:nextCondLst>
+                <p:cond evt="onNext" delay="0">
+                  <p:tgtEl>
+                    <p:sldTgt/>
+                  </p:tgtEl>
+                </p:cond>
+              </p:nextCondLst>
+            </p:seq>
+          </p:childTnLst>
+        </p:cTn>
+      </p:par>
+    </p:tnLst>
+    <p:bldLst>
+      <p:bldP spid="6" grpId="0"/>
+    </p:bldLst>
+  </p:timing>
+</p:sld>
+</file>
+
+<file path=ppt/slides/slide55.xml><?xml version="1.0" encoding="utf-8"?>
+<p:sld xmlns:a="http://schemas.openxmlformats.org/drawingml/2006/main" xmlns:r="http://schemas.openxmlformats.org/officeDocument/2006/relationships" xmlns:p="http://schemas.openxmlformats.org/presentationml/2006/main">
+  <p:cSld>
+    <p:spTree>
+      <p:nvGrpSpPr>
+        <p:cNvPr id="1" name=""/>
+        <p:cNvGrpSpPr/>
+        <p:nvPr/>
+      </p:nvGrpSpPr>
+      <p:grpSpPr>
+        <a:xfrm>
+          <a:off x="0" y="0"/>
+          <a:ext cx="0" cy="0"/>
+          <a:chOff x="0" y="0"/>
+          <a:chExt cx="0" cy="0"/>
+        </a:xfrm>
+      </p:grpSpPr>
+      <p:pic>
+        <p:nvPicPr>
+          <p:cNvPr id="7" name="Picture 6"/>
+          <p:cNvPicPr>
+            <a:picLocks noChangeAspect="1"/>
+          </p:cNvPicPr>
+          <p:nvPr/>
+        </p:nvPicPr>
+        <p:blipFill>
+          <a:blip r:embed="rId2"/>
+          <a:stretch>
+            <a:fillRect/>
+          </a:stretch>
+        </p:blipFill>
+        <p:spPr>
+          <a:xfrm>
+            <a:off x="1331249" y="1008291"/>
+            <a:ext cx="6481501" cy="5049001"/>
+          </a:xfrm>
+          <a:prstGeom prst="rect">
+            <a:avLst/>
+          </a:prstGeom>
+        </p:spPr>
+      </p:pic>
+      <p:sp>
+        <p:nvSpPr>
+          <p:cNvPr id="2" name="Title 1"/>
+          <p:cNvSpPr>
+            <a:spLocks noGrp="1"/>
+          </p:cNvSpPr>
+          <p:nvPr>
+            <p:ph type="title"/>
+          </p:nvPr>
+        </p:nvSpPr>
+        <p:spPr/>
+        <p:txBody>
+          <a:bodyPr/>
+          <a:lstStyle/>
+          <a:p>
+            <a:r>
+              <a:rPr lang="en-US" dirty="0" smtClean="0"/>
+              <a:t>All queues, 8 threads</a:t>
+            </a:r>
+            <a:endParaRPr lang="en-US" dirty="0"/>
+          </a:p>
+        </p:txBody>
+      </p:sp>
+      <p:sp>
+        <p:nvSpPr>
+          <p:cNvPr id="4" name="Slide Number Placeholder 3"/>
+          <p:cNvSpPr>
+            <a:spLocks noGrp="1"/>
+          </p:cNvSpPr>
+          <p:nvPr>
+            <p:ph type="sldNum" sz="quarter" idx="4"/>
+          </p:nvPr>
+        </p:nvSpPr>
+        <p:spPr/>
+        <p:txBody>
+          <a:bodyPr/>
+          <a:lstStyle/>
+          <a:p>
+            <a:fld id="{24EAD923-3004-4A31-84C7-9B440B785588}" type="slidenum">
+              <a:rPr lang="en-US" smtClean="0"/>
+              <a:pPr/>
+              <a:t>55</a:t>
+            </a:fld>
+            <a:endParaRPr lang="en-US" dirty="0"/>
+          </a:p>
+        </p:txBody>
+      </p:sp>
+      <p:sp>
+        <p:nvSpPr>
+          <p:cNvPr id="6" name="TextBox 5"/>
+          <p:cNvSpPr txBox="1"/>
+          <p:nvPr/>
+        </p:nvSpPr>
+        <p:spPr>
+          <a:xfrm>
+            <a:off x="177491" y="5991671"/>
+            <a:ext cx="8789201" cy="461665"/>
+          </a:xfrm>
+          <a:prstGeom prst="rect">
+            <a:avLst/>
+          </a:prstGeom>
+          <a:noFill/>
+        </p:spPr>
+        <p:txBody>
+          <a:bodyPr wrap="none" rtlCol="0">
+            <a:spAutoFit/>
+          </a:bodyPr>
+          <a:lstStyle/>
+          <a:p>
+            <a:r>
+              <a:rPr lang="en-US" sz="2400" b="0" i="1" dirty="0" smtClean="0">
+                <a:solidFill>
+                  <a:srgbClr val="FF0909"/>
+                </a:solidFill>
+              </a:rPr>
+              <a:t>Multi-threading improves persist concurrency.  Epochs sufficient</a:t>
+            </a:r>
+            <a:endParaRPr lang="en-US" sz="2400" b="0" i="1" dirty="0">
+              <a:solidFill>
+                <a:srgbClr val="FF0909"/>
+              </a:solidFill>
+            </a:endParaRPr>
+          </a:p>
+        </p:txBody>
+      </p:sp>
+    </p:spTree>
+    <p:extLst>
+      <p:ext uri="{BB962C8B-B14F-4D97-AF65-F5344CB8AC3E}">
+        <p14:creationId xmlns:p14="http://schemas.microsoft.com/office/powerpoint/2010/main" val="2054951909"/>
+      </p:ext>
+    </p:extLst>
+  </p:cSld>
+  <p:clrMapOvr>
+    <a:masterClrMapping/>
+  </p:clrMapOvr>
+  <p:timing>
+    <p:tnLst>
+      <p:par>
+        <p:cTn id="1" dur="indefinite" restart="never" nodeType="tmRoot">
+          <p:childTnLst>
+            <p:seq concurrent="1" nextAc="seek">
+              <p:cTn id="2" dur="indefinite" nodeType="mainSeq">
+                <p:childTnLst>
+                  <p:par>
+                    <p:cTn id="3" fill="hold">
+                      <p:stCondLst>
+                        <p:cond delay="indefinite"/>
+                      </p:stCondLst>
+                      <p:childTnLst>
+                        <p:par>
+                          <p:cTn id="4" fill="hold">
+                            <p:stCondLst>
+                              <p:cond delay="0"/>
+                            </p:stCondLst>
+                            <p:childTnLst>
+                              <p:par>
+                                <p:cTn id="5" presetID="1" presetClass="entr" presetSubtype="0" fill="hold" grpId="0" nodeType="clickEffect">
+                                  <p:stCondLst>
+                                    <p:cond delay="0"/>
+                                  </p:stCondLst>
+                                  <p:childTnLst>
+                                    <p:set>
+                                      <p:cBhvr>
+                                        <p:cTn id="6" dur="1" fill="hold">
+                                          <p:stCondLst>
+                                            <p:cond delay="0"/>
+                                          </p:stCondLst>
+                                        </p:cTn>
+                                        <p:tgtEl>
+                                          <p:spTgt spid="6"/>
+                                        </p:tgtEl>
+                                        <p:attrNameLst>
+                                          <p:attrName>style.visibility</p:attrName>
+                                        </p:attrNameLst>
+                                      </p:cBhvr>
+                                      <p:to>
+                                        <p:strVal val="visible"/>
+                                      </p:to>
+                                    </p:set>
+                                  </p:childTnLst>
+                                </p:cTn>
+                              </p:par>
+                            </p:childTnLst>
+                          </p:cTn>
+                        </p:par>
+                      </p:childTnLst>
+                    </p:cTn>
+                  </p:par>
+                </p:childTnLst>
+              </p:cTn>
+              <p:prevCondLst>
+                <p:cond evt="onPrev" delay="0">
+                  <p:tgtEl>
+                    <p:sldTgt/>
+                  </p:tgtEl>
+                </p:cond>
+              </p:prevCondLst>
+              <p:nextCondLst>
+                <p:cond evt="onNext" delay="0">
+                  <p:tgtEl>
+                    <p:sldTgt/>
+                  </p:tgtEl>
+                </p:cond>
+              </p:nextCondLst>
+            </p:seq>
+          </p:childTnLst>
+        </p:cTn>
+      </p:par>
+    </p:tnLst>
+    <p:bldLst>
+      <p:bldP spid="6" grpId="0"/>
+    </p:bldLst>
+  </p:timing>
+</p:sld>
+</file>
+
+<file path=ppt/slides/slide56.xml><?xml version="1.0" encoding="utf-8"?>
+<p:sld xmlns:a="http://schemas.openxmlformats.org/drawingml/2006/main" xmlns:r="http://schemas.openxmlformats.org/officeDocument/2006/relationships" xmlns:p="http://schemas.openxmlformats.org/presentationml/2006/main">
+  <p:cSld>
+    <p:spTree>
+      <p:nvGrpSpPr>
+        <p:cNvPr id="1" name=""/>
+        <p:cNvGrpSpPr/>
+        <p:nvPr/>
+      </p:nvGrpSpPr>
+      <p:grpSpPr>
+        <a:xfrm>
+          <a:off x="0" y="0"/>
+          <a:ext cx="0" cy="0"/>
+          <a:chOff x="0" y="0"/>
+          <a:chExt cx="0" cy="0"/>
+        </a:xfrm>
+      </p:grpSpPr>
+      <p:pic>
+        <p:nvPicPr>
+          <p:cNvPr id="5" name="Picture 4"/>
+          <p:cNvPicPr>
+            <a:picLocks noChangeAspect="1"/>
+          </p:cNvPicPr>
+          <p:nvPr/>
+        </p:nvPicPr>
+        <p:blipFill>
+          <a:blip r:embed="rId2"/>
+          <a:stretch>
+            <a:fillRect/>
+          </a:stretch>
+        </p:blipFill>
+        <p:spPr>
+          <a:xfrm>
+            <a:off x="994124" y="1008291"/>
+            <a:ext cx="7155751" cy="5049001"/>
+          </a:xfrm>
+          <a:prstGeom prst="rect">
+            <a:avLst/>
+          </a:prstGeom>
+        </p:spPr>
+      </p:pic>
+      <p:sp>
+        <p:nvSpPr>
+          <p:cNvPr id="2" name="Title 1"/>
+          <p:cNvSpPr>
+            <a:spLocks noGrp="1"/>
+          </p:cNvSpPr>
+          <p:nvPr>
+            <p:ph type="title"/>
+          </p:nvPr>
+        </p:nvSpPr>
+        <p:spPr/>
+        <p:txBody>
+          <a:bodyPr/>
+          <a:lstStyle/>
+          <a:p>
+            <a:r>
+              <a:rPr lang="en-US" dirty="0" smtClean="0"/>
+              <a:t>Latency, CWL 8 threads</a:t>
+            </a:r>
+            <a:endParaRPr lang="en-US" dirty="0"/>
+          </a:p>
+        </p:txBody>
+      </p:sp>
+      <p:sp>
+        <p:nvSpPr>
+          <p:cNvPr id="4" name="Slide Number Placeholder 3"/>
+          <p:cNvSpPr>
+            <a:spLocks noGrp="1"/>
+          </p:cNvSpPr>
+          <p:nvPr>
+            <p:ph type="sldNum" sz="quarter" idx="4"/>
+          </p:nvPr>
+        </p:nvSpPr>
+        <p:spPr/>
+        <p:txBody>
+          <a:bodyPr/>
+          <a:lstStyle/>
+          <a:p>
+            <a:fld id="{24EAD923-3004-4A31-84C7-9B440B785588}" type="slidenum">
+              <a:rPr lang="en-US" smtClean="0"/>
+              <a:pPr/>
+              <a:t>56</a:t>
+            </a:fld>
+            <a:endParaRPr lang="en-US" dirty="0"/>
+          </a:p>
+        </p:txBody>
+      </p:sp>
+      <p:sp>
+        <p:nvSpPr>
+          <p:cNvPr id="6" name="TextBox 5"/>
+          <p:cNvSpPr txBox="1"/>
+          <p:nvPr/>
+        </p:nvSpPr>
+        <p:spPr>
+          <a:xfrm>
+            <a:off x="2143398" y="5991671"/>
+            <a:ext cx="4857420" cy="461665"/>
+          </a:xfrm>
+          <a:prstGeom prst="rect">
+            <a:avLst/>
+          </a:prstGeom>
+          <a:noFill/>
+        </p:spPr>
+        <p:txBody>
+          <a:bodyPr wrap="none" rtlCol="0">
+            <a:spAutoFit/>
+          </a:bodyPr>
+          <a:lstStyle/>
+          <a:p>
+            <a:r>
+              <a:rPr lang="en-US" sz="2400" b="0" i="1" dirty="0" smtClean="0">
+                <a:solidFill>
+                  <a:srgbClr val="FF0909"/>
+                </a:solidFill>
+              </a:rPr>
+              <a:t>Epoch persistency likely sufficient </a:t>
+            </a:r>
+            <a:endParaRPr lang="en-US" sz="2400" b="0" i="1" dirty="0">
+              <a:solidFill>
+                <a:srgbClr val="FF0909"/>
+              </a:solidFill>
+            </a:endParaRPr>
+          </a:p>
+        </p:txBody>
+      </p:sp>
+      <p:sp>
+        <p:nvSpPr>
+          <p:cNvPr id="7" name="TextBox 6"/>
+          <p:cNvSpPr txBox="1"/>
+          <p:nvPr/>
+        </p:nvSpPr>
+        <p:spPr>
+          <a:xfrm>
+            <a:off x="2627784" y="2776862"/>
+            <a:ext cx="740908" cy="400110"/>
+          </a:xfrm>
+          <a:prstGeom prst="rect">
+            <a:avLst/>
+          </a:prstGeom>
+          <a:noFill/>
+        </p:spPr>
+        <p:txBody>
+          <a:bodyPr wrap="none" rtlCol="0">
+            <a:spAutoFit/>
+          </a:bodyPr>
+          <a:lstStyle/>
+          <a:p>
+            <a:pPr algn="l"/>
+            <a:r>
+              <a:rPr lang="en-US" b="0" dirty="0" smtClean="0"/>
+              <a:t>28ns</a:t>
+            </a:r>
+            <a:endParaRPr lang="en-US" b="0" dirty="0"/>
+          </a:p>
+        </p:txBody>
+      </p:sp>
+      <p:sp>
+        <p:nvSpPr>
+          <p:cNvPr id="8" name="TextBox 7"/>
+          <p:cNvSpPr txBox="1"/>
+          <p:nvPr/>
+        </p:nvSpPr>
+        <p:spPr>
+          <a:xfrm>
+            <a:off x="4968044" y="2776862"/>
+            <a:ext cx="816249" cy="400110"/>
+          </a:xfrm>
+          <a:prstGeom prst="rect">
+            <a:avLst/>
+          </a:prstGeom>
+          <a:noFill/>
+        </p:spPr>
+        <p:txBody>
+          <a:bodyPr wrap="none" rtlCol="0">
+            <a:spAutoFit/>
+          </a:bodyPr>
+          <a:lstStyle/>
+          <a:p>
+            <a:pPr algn="l"/>
+            <a:r>
+              <a:rPr lang="en-US" b="0" dirty="0" smtClean="0"/>
+              <a:t>1.6µs</a:t>
+            </a:r>
+            <a:endParaRPr lang="en-US" b="0" dirty="0"/>
+          </a:p>
+        </p:txBody>
+      </p:sp>
+      <p:sp>
+        <p:nvSpPr>
+          <p:cNvPr id="9" name="TextBox 8"/>
+          <p:cNvSpPr txBox="1"/>
+          <p:nvPr/>
+        </p:nvSpPr>
+        <p:spPr>
+          <a:xfrm>
+            <a:off x="6120172" y="2776862"/>
+            <a:ext cx="958917" cy="400110"/>
+          </a:xfrm>
+          <a:prstGeom prst="rect">
+            <a:avLst/>
+          </a:prstGeom>
+          <a:noFill/>
+        </p:spPr>
+        <p:txBody>
+          <a:bodyPr wrap="none" rtlCol="0">
+            <a:spAutoFit/>
+          </a:bodyPr>
+          <a:lstStyle/>
+          <a:p>
+            <a:pPr algn="l"/>
+            <a:r>
+              <a:rPr lang="en-US" b="0" dirty="0" smtClean="0"/>
+              <a:t>10.5µs</a:t>
+            </a:r>
+            <a:endParaRPr lang="en-US" b="0" dirty="0"/>
+          </a:p>
+        </p:txBody>
+      </p:sp>
+      <p:sp>
+        <p:nvSpPr>
+          <p:cNvPr id="10" name="TextBox 9"/>
+          <p:cNvSpPr txBox="1"/>
+          <p:nvPr/>
+        </p:nvSpPr>
+        <p:spPr>
+          <a:xfrm>
+            <a:off x="6948264" y="1916832"/>
+            <a:ext cx="2335465" cy="720080"/>
+          </a:xfrm>
+          <a:prstGeom prst="rect">
+            <a:avLst/>
+          </a:prstGeom>
+          <a:noFill/>
+        </p:spPr>
+        <p:txBody>
+          <a:bodyPr wrap="square" rtlCol="0">
+            <a:spAutoFit/>
+          </a:bodyPr>
+          <a:lstStyle/>
+          <a:p>
+            <a:pPr algn="l"/>
+            <a:r>
+              <a:rPr lang="en-US" b="0" dirty="0" smtClean="0"/>
+              <a:t>PER-free: 202ns (not shown)</a:t>
+            </a:r>
+          </a:p>
+        </p:txBody>
+      </p:sp>
+    </p:spTree>
+    <p:extLst>
+      <p:ext uri="{BB962C8B-B14F-4D97-AF65-F5344CB8AC3E}">
+        <p14:creationId xmlns:p14="http://schemas.microsoft.com/office/powerpoint/2010/main" val="3571477338"/>
+      </p:ext>
+    </p:extLst>
+  </p:cSld>
+  <p:clrMapOvr>
+    <a:masterClrMapping/>
+  </p:clrMapOvr>
+  <p:timing>
+    <p:tnLst>
+      <p:par>
+        <p:cTn id="1" dur="indefinite" restart="never" nodeType="tmRoot">
+          <p:childTnLst>
+            <p:seq concurrent="1" nextAc="seek">
+              <p:cTn id="2" dur="indefinite" nodeType="mainSeq">
+                <p:childTnLst>
+                  <p:par>
+                    <p:cTn id="3" fill="hold">
+                      <p:stCondLst>
+                        <p:cond delay="indefinite"/>
+                      </p:stCondLst>
+                      <p:childTnLst>
+                        <p:par>
+                          <p:cTn id="4" fill="hold">
+                            <p:stCondLst>
+                              <p:cond delay="0"/>
+                            </p:stCondLst>
+                            <p:childTnLst>
+                              <p:par>
+                                <p:cTn id="5" presetID="1" presetClass="entr" presetSubtype="0" fill="hold" grpId="0" nodeType="clickEffect">
+                                  <p:stCondLst>
+                                    <p:cond delay="0"/>
+                                  </p:stCondLst>
+                                  <p:childTnLst>
+                                    <p:set>
+                                      <p:cBhvr>
+                                        <p:cTn id="6" dur="1" fill="hold">
+                                          <p:stCondLst>
+                                            <p:cond delay="0"/>
+                                          </p:stCondLst>
+                                        </p:cTn>
+                                        <p:tgtEl>
+                                          <p:spTgt spid="6"/>
+                                        </p:tgtEl>
+                                        <p:attrNameLst>
+                                          <p:attrName>style.visibility</p:attrName>
+                                        </p:attrNameLst>
+                                      </p:cBhvr>
+                                      <p:to>
+                                        <p:strVal val="visible"/>
+                                      </p:to>
+                                    </p:set>
+                                  </p:childTnLst>
+                                </p:cTn>
+                              </p:par>
+                            </p:childTnLst>
+                          </p:cTn>
+                        </p:par>
+                      </p:childTnLst>
+                    </p:cTn>
+                  </p:par>
+                </p:childTnLst>
+              </p:cTn>
+              <p:prevCondLst>
+                <p:cond evt="onPrev" delay="0">
+                  <p:tgtEl>
+                    <p:sldTgt/>
+                  </p:tgtEl>
+                </p:cond>
+              </p:prevCondLst>
+              <p:nextCondLst>
+                <p:cond evt="onNext" delay="0">
+                  <p:tgtEl>
+                    <p:sldTgt/>
+                  </p:tgtEl>
+                </p:cond>
+              </p:nextCondLst>
+            </p:seq>
+          </p:childTnLst>
+        </p:cTn>
+      </p:par>
+    </p:tnLst>
+    <p:bldLst>
+      <p:bldP spid="6" grpId="0"/>
+    </p:bldLst>
+  </p:timing>
+</p:sld>
+</file>
+
+<file path=ppt/slides/slide57.xml><?xml version="1.0" encoding="utf-8"?>
 <p:sld xmlns:a="http://schemas.openxmlformats.org/drawingml/2006/main" xmlns:r="http://schemas.openxmlformats.org/officeDocument/2006/relationships" xmlns:p="http://schemas.openxmlformats.org/presentationml/2006/main">
   <p:cSld>
     <p:spTree>
@@ -41188,7 +44436,7 @@
             <a:fld id="{24EAD923-3004-4A31-84C7-9B440B785588}" type="slidenum">
               <a:rPr lang="en-US" smtClean="0"/>
               <a:pPr/>
-              <a:t>45</a:t>
+              <a:t>57</a:t>
             </a:fld>
             <a:endParaRPr lang="en-US" dirty="0"/>
           </a:p>
@@ -42869,129 +46117,6 @@
     <p:extLst>
       <p:ext uri="{BB962C8B-B14F-4D97-AF65-F5344CB8AC3E}">
         <p14:creationId xmlns:p14="http://schemas.microsoft.com/office/powerpoint/2010/main" val="2591381500"/>
-      </p:ext>
-    </p:extLst>
-  </p:cSld>
-  <p:clrMapOvr>
-    <a:masterClrMapping/>
-  </p:clrMapOvr>
-  <p:timing>
-    <p:tnLst>
-      <p:par>
-        <p:cTn id="1" dur="indefinite" restart="never" nodeType="tmRoot"/>
-      </p:par>
-    </p:tnLst>
-  </p:timing>
-</p:sld>
-</file>
-
-<file path=ppt/slides/slide5.xml><?xml version="1.0" encoding="utf-8"?>
-<p:sld xmlns:a="http://schemas.openxmlformats.org/drawingml/2006/main" xmlns:r="http://schemas.openxmlformats.org/officeDocument/2006/relationships" xmlns:p="http://schemas.openxmlformats.org/presentationml/2006/main">
-  <p:cSld>
-    <p:spTree>
-      <p:nvGrpSpPr>
-        <p:cNvPr id="1" name=""/>
-        <p:cNvGrpSpPr/>
-        <p:nvPr/>
-      </p:nvGrpSpPr>
-      <p:grpSpPr>
-        <a:xfrm>
-          <a:off x="0" y="0"/>
-          <a:ext cx="0" cy="0"/>
-          <a:chOff x="0" y="0"/>
-          <a:chExt cx="0" cy="0"/>
-        </a:xfrm>
-      </p:grpSpPr>
-      <p:sp>
-        <p:nvSpPr>
-          <p:cNvPr id="2" name="Title 1"/>
-          <p:cNvSpPr>
-            <a:spLocks noGrp="1"/>
-          </p:cNvSpPr>
-          <p:nvPr>
-            <p:ph type="title"/>
-          </p:nvPr>
-        </p:nvSpPr>
-        <p:spPr/>
-        <p:txBody>
-          <a:bodyPr/>
-          <a:lstStyle/>
-          <a:p>
-            <a:r>
-              <a:rPr lang="en-US" dirty="0" smtClean="0"/>
-              <a:t>Memory persistency</a:t>
-            </a:r>
-            <a:endParaRPr lang="en-US" dirty="0"/>
-          </a:p>
-        </p:txBody>
-      </p:sp>
-      <p:sp>
-        <p:nvSpPr>
-          <p:cNvPr id="3" name="Content Placeholder 2"/>
-          <p:cNvSpPr>
-            <a:spLocks noGrp="1"/>
-          </p:cNvSpPr>
-          <p:nvPr>
-            <p:ph idx="1"/>
-          </p:nvPr>
-        </p:nvSpPr>
-        <p:spPr/>
-        <p:txBody>
-          <a:bodyPr/>
-          <a:lstStyle/>
-          <a:p>
-            <a:r>
-              <a:rPr lang="en-US" dirty="0" smtClean="0"/>
-              <a:t>Build on memory consistency, providing models to constrain NVRAM write order</a:t>
-            </a:r>
-          </a:p>
-          <a:p>
-            <a:r>
-              <a:rPr lang="en-US" dirty="0" smtClean="0"/>
-              <a:t>Relax persistency to improve write concurrency, increasing throughput</a:t>
-            </a:r>
-          </a:p>
-          <a:p>
-            <a:r>
-              <a:rPr lang="en-US" dirty="0" smtClean="0"/>
-              <a:t>This project:</a:t>
-            </a:r>
-            <a:r>
-              <a:rPr lang="en-US" baseline="0" dirty="0" smtClean="0"/>
-              <a:t> focus on models (interface), rather than implementations</a:t>
-            </a:r>
-            <a:endParaRPr lang="en-US" dirty="0" smtClean="0"/>
-          </a:p>
-        </p:txBody>
-      </p:sp>
-      <p:sp>
-        <p:nvSpPr>
-          <p:cNvPr id="4" name="Slide Number Placeholder 3"/>
-          <p:cNvSpPr>
-            <a:spLocks noGrp="1"/>
-          </p:cNvSpPr>
-          <p:nvPr>
-            <p:ph type="sldNum" sz="quarter" idx="4"/>
-          </p:nvPr>
-        </p:nvSpPr>
-        <p:spPr/>
-        <p:txBody>
-          <a:bodyPr/>
-          <a:lstStyle/>
-          <a:p>
-            <a:fld id="{24EAD923-3004-4A31-84C7-9B440B785588}" type="slidenum">
-              <a:rPr lang="en-US" smtClean="0"/>
-              <a:pPr/>
-              <a:t>5</a:t>
-            </a:fld>
-            <a:endParaRPr lang="en-US" dirty="0"/>
-          </a:p>
-        </p:txBody>
-      </p:sp>
-    </p:spTree>
-    <p:extLst>
-      <p:ext uri="{BB962C8B-B14F-4D97-AF65-F5344CB8AC3E}">
-        <p14:creationId xmlns:p14="http://schemas.microsoft.com/office/powerpoint/2010/main" val="759113488"/>
       </p:ext>
     </p:extLst>
   </p:cSld>

</xml_diff>

<commit_message>
epoch persistency is relaxed persistency+RMO ordering
</commit_message>
<xml_diff>
--- a/proposal/defense.pptx
+++ b/proposal/defense.pptx
@@ -46,8 +46,8 @@
     <p:sldId id="1193" r:id="rId34"/>
     <p:sldId id="1191" r:id="rId35"/>
     <p:sldId id="1192" r:id="rId36"/>
-    <p:sldId id="1160" r:id="rId37"/>
-    <p:sldId id="1167" r:id="rId38"/>
+    <p:sldId id="1167" r:id="rId37"/>
+    <p:sldId id="1194" r:id="rId38"/>
     <p:sldId id="1156" r:id="rId39"/>
     <p:sldId id="1157" r:id="rId40"/>
     <p:sldId id="1158" r:id="rId41"/>
@@ -17153,30 +17153,38 @@
             </a:r>
             <a:r>
               <a:rPr lang="en-US" i="1" dirty="0" smtClean="0"/>
-              <a:t>persist epochs.</a:t>
-            </a:r>
-          </a:p>
-          <a:p>
+              <a:t>persist </a:t>
+            </a:r>
+            <a:r>
+              <a:rPr lang="en-US" i="1" dirty="0" smtClean="0"/>
+              <a:t>epochs</a:t>
+            </a:r>
             <a:r>
               <a:rPr lang="en-US" dirty="0" smtClean="0"/>
-              <a:t>Persists within each epoch are concurrent</a:t>
-            </a:r>
+              <a:t>, ordering persists</a:t>
+            </a:r>
+            <a:endParaRPr lang="en-US" i="1" dirty="0" smtClean="0"/>
           </a:p>
           <a:p>
             <a:r>
               <a:rPr lang="en-US" dirty="0" smtClean="0"/>
-              <a:t>Data sharing continues to observer SC</a:t>
-            </a:r>
-          </a:p>
-          <a:p>
+              <a:t>Data </a:t>
+            </a:r>
             <a:r>
               <a:rPr lang="en-US" dirty="0" smtClean="0"/>
-              <a:t>Determining persist order between threads can get tricky</a:t>
-            </a:r>
-            <a:endParaRPr lang="en-US" dirty="0"/>
-          </a:p>
-          <a:p>
-            <a:endParaRPr lang="en-US" dirty="0"/>
+              <a:t>sharing continues to observer </a:t>
+            </a:r>
+            <a:r>
+              <a:rPr lang="en-US" dirty="0" smtClean="0"/>
+              <a:t>SC</a:t>
+            </a:r>
+          </a:p>
+          <a:p>
+            <a:r>
+              <a:rPr lang="en-US" dirty="0" smtClean="0"/>
+              <a:t>Persist order resembles RMO, persist barrier acts as a full memory barrier</a:t>
+            </a:r>
+            <a:endParaRPr lang="en-US" dirty="0" smtClean="0"/>
           </a:p>
         </p:txBody>
       </p:sp>
@@ -24816,8 +24824,20 @@
             <a:pPr lvl="1"/>
             <a:r>
               <a:rPr lang="en-US" dirty="0" smtClean="0"/>
-              <a:t>This is the “persistent memory stream” of execution, differs from volatile stream</a:t>
-            </a:r>
+              <a:t>This is the “persistent memory stream” of execution, differs from volatile </a:t>
+            </a:r>
+            <a:r>
+              <a:rPr lang="en-US" dirty="0" smtClean="0"/>
+              <a:t>stream</a:t>
+            </a:r>
+          </a:p>
+          <a:p>
+            <a:pPr lvl="1"/>
+            <a:r>
+              <a:rPr lang="en-US" dirty="0" smtClean="0"/>
+              <a:t>Persistent stream removes constraints from the volatile stream</a:t>
+            </a:r>
+            <a:endParaRPr lang="en-US" dirty="0" smtClean="0"/>
           </a:p>
           <a:p>
             <a:pPr lvl="1"/>
@@ -24935,13 +24955,21 @@
           <a:p>
             <a:r>
               <a:rPr lang="en-US" dirty="0" smtClean="0"/>
-              <a:t>All memory events from same thread separated by barrier</a:t>
-            </a:r>
-          </a:p>
-          <a:p>
+              <a:t>Rule 1: All </a:t>
+            </a:r>
+            <a:r>
+              <a:rPr lang="en-US" dirty="0" smtClean="0"/>
+              <a:t>memory events from same thread separated by barrier</a:t>
+            </a:r>
+          </a:p>
+          <a:p>
+            <a:r>
+              <a:rPr lang="en-US" dirty="0" smtClean="0"/>
+              <a:t>Rule 2: Consider </a:t>
+            </a:r>
             <a:r>
               <a:rPr lang="en-US" dirty="0"/>
-              <a:t>Consider race (</a:t>
+              <a:t>race (</a:t>
             </a:r>
             <a:r>
               <a:rPr lang="en-US" i="1" dirty="0"/>
@@ -24973,47 +25001,40 @@
             </a:r>
             <a:r>
               <a:rPr lang="en-US" dirty="0"/>
-              <a:t>are memory events to same address, at least one a store/persist, and they are adjacent under some serialized order (SC).  Event E is after </a:t>
-            </a:r>
-            <a:r>
-              <a:rPr lang="en-US" i="1" dirty="0"/>
-              <a:t>x </a:t>
-            </a:r>
-            <a:r>
-              <a:rPr lang="en-US" dirty="0"/>
-              <a:t>if </a:t>
-            </a:r>
-            <a:r>
-              <a:rPr lang="en-US" i="1" dirty="0"/>
+              <a:t>are memory events to same address, at least one a store/persist, and they are adjacent under some serialized order (SC).  </a:t>
+            </a:r>
+            <a:r>
+              <a:rPr lang="en-US" i="1" dirty="0" smtClean="0"/>
+              <a:t>x</a:t>
+            </a:r>
+            <a:r>
+              <a:rPr lang="en-US" dirty="0" smtClean="0"/>
+              <a:t> before </a:t>
+            </a:r>
+            <a:r>
+              <a:rPr lang="en-US" i="1" dirty="0" smtClean="0"/>
               <a:t>y</a:t>
             </a:r>
             <a:r>
-              <a:rPr lang="en-US" dirty="0"/>
-              <a:t> is on E’s thread and in an epoch prior to </a:t>
-            </a:r>
-            <a:r>
               <a:rPr lang="en-US" dirty="0" smtClean="0"/>
-              <a:t>E’s</a:t>
+              <a:t>.</a:t>
             </a:r>
             <a:endParaRPr lang="en-US" i="1" dirty="0" smtClean="0"/>
           </a:p>
           <a:p>
             <a:r>
               <a:rPr lang="en-US" dirty="0" smtClean="0"/>
-              <a:t>All persists to same address ordered by CC</a:t>
-            </a:r>
-          </a:p>
-          <a:p>
+              <a:t>Concurrent </a:t>
+            </a:r>
             <a:r>
               <a:rPr lang="en-US" dirty="0" smtClean="0"/>
-              <a:t>Transitivity applies</a:t>
-            </a:r>
-          </a:p>
-          <a:p>
+              <a:t>if not </a:t>
+            </a:r>
             <a:r>
               <a:rPr lang="en-US" dirty="0" smtClean="0"/>
-              <a:t>Concurrent if not ordered</a:t>
-            </a:r>
+              <a:t>ordered (transitivity applies)</a:t>
+            </a:r>
+            <a:endParaRPr lang="en-US" dirty="0" smtClean="0"/>
           </a:p>
         </p:txBody>
       </p:sp>
@@ -25150,7 +25171,15 @@
             <a:pPr lvl="1"/>
             <a:r>
               <a:rPr lang="en-US" dirty="0"/>
-              <a:t>C before F (rule 2)</a:t>
+              <a:t>C before </a:t>
+            </a:r>
+            <a:r>
+              <a:rPr lang="en-US" dirty="0" smtClean="0"/>
+              <a:t>D </a:t>
+            </a:r>
+            <a:r>
+              <a:rPr lang="en-US" dirty="0"/>
+              <a:t>(rule 2)</a:t>
             </a:r>
           </a:p>
           <a:p>
@@ -25161,26 +25190,9 @@
             </a:r>
             <a:r>
               <a:rPr lang="en-US" dirty="0" smtClean="0"/>
-              <a:t>A before F</a:t>
-            </a:r>
-          </a:p>
-          <a:p>
-            <a:pPr lvl="1"/>
-            <a:r>
-              <a:rPr lang="en-US" dirty="0" smtClean="0"/>
-              <a:t>C before D if both C, D persists (rule 3)</a:t>
-            </a:r>
-          </a:p>
-          <a:p>
-            <a:pPr lvl="2"/>
-            <a:r>
-              <a:rPr lang="en-US" dirty="0"/>
-              <a:t>Transitivity: A </a:t>
-            </a:r>
-            <a:r>
-              <a:rPr lang="en-US" dirty="0" smtClean="0"/>
-              <a:t>before D, C before F</a:t>
-            </a:r>
+              <a:t>A before D, C before F, A before F</a:t>
+            </a:r>
+            <a:endParaRPr lang="en-US" dirty="0" smtClean="0"/>
           </a:p>
         </p:txBody>
       </p:sp>
@@ -25262,154 +25274,9 @@
           <a:p>
             <a:r>
               <a:rPr lang="en-US" dirty="0" smtClean="0"/>
-              <a:t>Epoch persistency ordering with PER</a:t>
+              <a:t>PER persist ordering</a:t>
             </a:r>
             <a:endParaRPr lang="en-US" dirty="0"/>
-          </a:p>
-        </p:txBody>
-      </p:sp>
-      <p:sp>
-        <p:nvSpPr>
-          <p:cNvPr id="3" name="Content Placeholder 2"/>
-          <p:cNvSpPr>
-            <a:spLocks noGrp="1"/>
-          </p:cNvSpPr>
-          <p:nvPr>
-            <p:ph idx="1"/>
-          </p:nvPr>
-        </p:nvSpPr>
-        <p:spPr>
-          <a:xfrm>
-            <a:off x="457200" y="1410741"/>
-            <a:ext cx="8229600" cy="4754563"/>
-          </a:xfrm>
-        </p:spPr>
-        <p:txBody>
-          <a:bodyPr/>
-          <a:lstStyle/>
-          <a:p>
-            <a:r>
-              <a:rPr lang="en-US" dirty="0" smtClean="0"/>
-              <a:t>Persist </a:t>
-            </a:r>
-            <a:r>
-              <a:rPr lang="en-US" i="1" dirty="0" smtClean="0"/>
-              <a:t>A</a:t>
-            </a:r>
-            <a:r>
-              <a:rPr lang="en-US" dirty="0" smtClean="0"/>
-              <a:t> ordered before persist </a:t>
-            </a:r>
-            <a:r>
-              <a:rPr lang="en-US" i="1" dirty="0" smtClean="0"/>
-              <a:t>B</a:t>
-            </a:r>
-            <a:r>
-              <a:rPr lang="en-US" dirty="0" smtClean="0"/>
-              <a:t> if:</a:t>
-            </a:r>
-          </a:p>
-          <a:p>
-            <a:pPr lvl="1"/>
-            <a:r>
-              <a:rPr lang="en-US" dirty="0" smtClean="0"/>
-              <a:t>Same thread, </a:t>
-            </a:r>
-            <a:r>
-              <a:rPr lang="en-US" i="1" dirty="0" smtClean="0"/>
-              <a:t>A</a:t>
-            </a:r>
-            <a:r>
-              <a:rPr lang="en-US" dirty="0" smtClean="0"/>
-              <a:t> in earlier epoch than </a:t>
-            </a:r>
-            <a:r>
-              <a:rPr lang="en-US" i="1" dirty="0" smtClean="0"/>
-              <a:t>B</a:t>
-            </a:r>
-          </a:p>
-          <a:p>
-            <a:pPr lvl="1"/>
-            <a:r>
-              <a:rPr lang="en-US" dirty="0" smtClean="0"/>
-              <a:t>Or </a:t>
-            </a:r>
-            <a:r>
-              <a:rPr lang="en-US" i="1" dirty="0" smtClean="0"/>
-              <a:t>A</a:t>
-            </a:r>
-            <a:r>
-              <a:rPr lang="en-US" dirty="0" smtClean="0"/>
-              <a:t> is implied by cache coherence event on </a:t>
-            </a:r>
-            <a:r>
-              <a:rPr lang="en-US" i="1" dirty="0" smtClean="0"/>
-              <a:t>B</a:t>
-            </a:r>
-            <a:r>
-              <a:rPr lang="en-US" dirty="0" smtClean="0"/>
-              <a:t>’s thread in epoch prior to </a:t>
-            </a:r>
-            <a:r>
-              <a:rPr lang="en-US" i="1" dirty="0" smtClean="0"/>
-              <a:t>B</a:t>
-            </a:r>
-            <a:r>
-              <a:rPr lang="en-US" dirty="0" smtClean="0"/>
-              <a:t>’s</a:t>
-            </a:r>
-          </a:p>
-          <a:p>
-            <a:pPr lvl="1"/>
-            <a:r>
-              <a:rPr lang="en-US" dirty="0" smtClean="0"/>
-              <a:t>Or </a:t>
-            </a:r>
-            <a:r>
-              <a:rPr lang="en-US" i="1" dirty="0" smtClean="0"/>
-              <a:t>A</a:t>
-            </a:r>
-            <a:r>
-              <a:rPr lang="en-US" dirty="0" smtClean="0"/>
-              <a:t> and </a:t>
-            </a:r>
-            <a:r>
-              <a:rPr lang="en-US" i="1" dirty="0" smtClean="0"/>
-              <a:t>B</a:t>
-            </a:r>
-            <a:r>
-              <a:rPr lang="en-US" dirty="0" smtClean="0"/>
-              <a:t> persist to the same address and </a:t>
-            </a:r>
-            <a:r>
-              <a:rPr lang="en-US" i="1" dirty="0" smtClean="0"/>
-              <a:t>B</a:t>
-            </a:r>
-            <a:r>
-              <a:rPr lang="en-US" dirty="0" smtClean="0"/>
-              <a:t>’s store is observed after </a:t>
-            </a:r>
-            <a:r>
-              <a:rPr lang="en-US" i="1" dirty="0" smtClean="0"/>
-              <a:t>A</a:t>
-            </a:r>
-            <a:r>
-              <a:rPr lang="en-US" dirty="0" smtClean="0"/>
-              <a:t>’s by cache coherence</a:t>
-            </a:r>
-          </a:p>
-          <a:p>
-            <a:pPr lvl="1"/>
-            <a:r>
-              <a:rPr lang="en-US" dirty="0" smtClean="0"/>
-              <a:t>Transitivity using any previous rules</a:t>
-            </a:r>
-          </a:p>
-          <a:p>
-            <a:r>
-              <a:rPr lang="en-US" dirty="0" smtClean="0"/>
-              <a:t>Otherwise concurrent</a:t>
-            </a:r>
           </a:p>
         </p:txBody>
       </p:sp>
@@ -25432,90 +25299,6 @@
               <a:rPr lang="en-US" smtClean="0"/>
               <a:pPr/>
               <a:t>35</a:t>
-            </a:fld>
-            <a:endParaRPr lang="en-US" dirty="0"/>
-          </a:p>
-        </p:txBody>
-      </p:sp>
-    </p:spTree>
-    <p:extLst>
-      <p:ext uri="{BB962C8B-B14F-4D97-AF65-F5344CB8AC3E}">
-        <p14:creationId xmlns:p14="http://schemas.microsoft.com/office/powerpoint/2010/main" val="1080198995"/>
-      </p:ext>
-    </p:extLst>
-  </p:cSld>
-  <p:clrMapOvr>
-    <a:masterClrMapping/>
-  </p:clrMapOvr>
-  <p:timing>
-    <p:tnLst>
-      <p:par>
-        <p:cTn id="1" dur="indefinite" restart="never" nodeType="tmRoot"/>
-      </p:par>
-    </p:tnLst>
-  </p:timing>
-</p:sld>
-</file>
-
-<file path=ppt/slides/slide36.xml><?xml version="1.0" encoding="utf-8"?>
-<p:sld xmlns:a="http://schemas.openxmlformats.org/drawingml/2006/main" xmlns:r="http://schemas.openxmlformats.org/officeDocument/2006/relationships" xmlns:p="http://schemas.openxmlformats.org/presentationml/2006/main">
-  <p:cSld>
-    <p:spTree>
-      <p:nvGrpSpPr>
-        <p:cNvPr id="1" name=""/>
-        <p:cNvGrpSpPr/>
-        <p:nvPr/>
-      </p:nvGrpSpPr>
-      <p:grpSpPr>
-        <a:xfrm>
-          <a:off x="0" y="0"/>
-          <a:ext cx="0" cy="0"/>
-          <a:chOff x="0" y="0"/>
-          <a:chExt cx="0" cy="0"/>
-        </a:xfrm>
-      </p:grpSpPr>
-      <p:sp>
-        <p:nvSpPr>
-          <p:cNvPr id="2" name="Title 1"/>
-          <p:cNvSpPr>
-            <a:spLocks noGrp="1"/>
-          </p:cNvSpPr>
-          <p:nvPr>
-            <p:ph type="title"/>
-          </p:nvPr>
-        </p:nvSpPr>
-        <p:spPr/>
-        <p:txBody>
-          <a:bodyPr/>
-          <a:lstStyle/>
-          <a:p>
-            <a:r>
-              <a:rPr lang="en-US" dirty="0" smtClean="0"/>
-              <a:t>PER persist ordering</a:t>
-            </a:r>
-            <a:endParaRPr lang="en-US" dirty="0"/>
-          </a:p>
-        </p:txBody>
-      </p:sp>
-      <p:sp>
-        <p:nvSpPr>
-          <p:cNvPr id="4" name="Slide Number Placeholder 3"/>
-          <p:cNvSpPr>
-            <a:spLocks noGrp="1"/>
-          </p:cNvSpPr>
-          <p:nvPr>
-            <p:ph type="sldNum" sz="quarter" idx="4"/>
-          </p:nvPr>
-        </p:nvSpPr>
-        <p:spPr/>
-        <p:txBody>
-          <a:bodyPr/>
-          <a:lstStyle/>
-          <a:p>
-            <a:fld id="{24EAD923-3004-4A31-84C7-9B440B785588}" type="slidenum">
-              <a:rPr lang="en-US" smtClean="0"/>
-              <a:pPr/>
-              <a:t>36</a:t>
             </a:fld>
             <a:endParaRPr lang="en-US" dirty="0"/>
           </a:p>
@@ -26046,12 +25829,8 @@
               <a:p>
                 <a:pPr algn="l"/>
                 <a:r>
-                  <a:rPr lang="en-US" b="0" smtClean="0"/>
-                  <a:t>load C </a:t>
-                </a:r>
-                <a:r>
                   <a:rPr lang="en-US" b="0" dirty="0" smtClean="0"/>
-                  <a:t>before E</a:t>
+                  <a:t>load C before E</a:t>
                 </a:r>
               </a:p>
               <a:p>
@@ -26064,12 +25843,12 @@
               <a:p>
                 <a:pPr algn="l"/>
                 <a:r>
-                  <a:rPr lang="en-US" b="0" i="1" dirty="0" smtClean="0"/>
-                  <a:t>Not </a:t>
+                  <a:rPr lang="en-US" b="0" dirty="0" smtClean="0"/>
+                  <a:t>A </a:t>
                 </a:r>
                 <a:r>
                   <a:rPr lang="en-US" b="0" dirty="0" smtClean="0"/>
-                  <a:t>A before C’</a:t>
+                  <a:t>before C’</a:t>
                 </a:r>
                 <a:endParaRPr lang="en-US" i="1" dirty="0"/>
               </a:p>
@@ -26761,6 +26540,132 @@
     <p:bldLst>
       <p:bldP spid="25" grpId="0"/>
     </p:bldLst>
+  </p:timing>
+</p:sld>
+</file>
+
+<file path=ppt/slides/slide36.xml><?xml version="1.0" encoding="utf-8"?>
+<p:sld xmlns:a="http://schemas.openxmlformats.org/drawingml/2006/main" xmlns:r="http://schemas.openxmlformats.org/officeDocument/2006/relationships" xmlns:p="http://schemas.openxmlformats.org/presentationml/2006/main">
+  <p:cSld>
+    <p:spTree>
+      <p:nvGrpSpPr>
+        <p:cNvPr id="1" name=""/>
+        <p:cNvGrpSpPr/>
+        <p:nvPr/>
+      </p:nvGrpSpPr>
+      <p:grpSpPr>
+        <a:xfrm>
+          <a:off x="0" y="0"/>
+          <a:ext cx="0" cy="0"/>
+          <a:chOff x="0" y="0"/>
+          <a:chExt cx="0" cy="0"/>
+        </a:xfrm>
+      </p:grpSpPr>
+      <p:sp>
+        <p:nvSpPr>
+          <p:cNvPr id="2" name="Title 1"/>
+          <p:cNvSpPr>
+            <a:spLocks noGrp="1"/>
+          </p:cNvSpPr>
+          <p:nvPr>
+            <p:ph type="title"/>
+          </p:nvPr>
+        </p:nvSpPr>
+        <p:spPr/>
+        <p:txBody>
+          <a:bodyPr/>
+          <a:lstStyle/>
+          <a:p>
+            <a:r>
+              <a:rPr lang="en-US" dirty="0" smtClean="0"/>
+              <a:t>Persistent RMO ordering?</a:t>
+            </a:r>
+            <a:endParaRPr lang="en-US" dirty="0"/>
+          </a:p>
+        </p:txBody>
+      </p:sp>
+      <p:sp>
+        <p:nvSpPr>
+          <p:cNvPr id="3" name="Content Placeholder 2"/>
+          <p:cNvSpPr>
+            <a:spLocks noGrp="1"/>
+          </p:cNvSpPr>
+          <p:nvPr>
+            <p:ph idx="1"/>
+          </p:nvPr>
+        </p:nvSpPr>
+        <p:spPr/>
+        <p:txBody>
+          <a:bodyPr/>
+          <a:lstStyle/>
+          <a:p>
+            <a:r>
+              <a:rPr lang="en-US" dirty="0" smtClean="0"/>
+              <a:t>Compare to RMO, where persist barrier is a full memory barrier</a:t>
+            </a:r>
+          </a:p>
+          <a:p>
+            <a:r>
+              <a:rPr lang="en-US" dirty="0" smtClean="0"/>
+              <a:t>Provides the same potential persist reordering, but will always observe </a:t>
+            </a:r>
+            <a:r>
+              <a:rPr lang="en-US" i="1" dirty="0" smtClean="0"/>
+              <a:t>values</a:t>
+            </a:r>
+            <a:r>
+              <a:rPr lang="en-US" dirty="0" smtClean="0"/>
+              <a:t> of SC.</a:t>
+            </a:r>
+          </a:p>
+          <a:p>
+            <a:r>
+              <a:rPr lang="en-US" dirty="0" smtClean="0"/>
+              <a:t>Is there a more general model here that allows the 4 different barriers to enforce persist order while only allowing synchronization/states of SC?</a:t>
+            </a:r>
+          </a:p>
+        </p:txBody>
+      </p:sp>
+      <p:sp>
+        <p:nvSpPr>
+          <p:cNvPr id="4" name="Slide Number Placeholder 3"/>
+          <p:cNvSpPr>
+            <a:spLocks noGrp="1"/>
+          </p:cNvSpPr>
+          <p:nvPr>
+            <p:ph type="sldNum" sz="quarter" idx="4"/>
+          </p:nvPr>
+        </p:nvSpPr>
+        <p:spPr/>
+        <p:txBody>
+          <a:bodyPr/>
+          <a:lstStyle/>
+          <a:p>
+            <a:fld id="{24EAD923-3004-4A31-84C7-9B440B785588}" type="slidenum">
+              <a:rPr lang="en-US" smtClean="0"/>
+              <a:pPr/>
+              <a:t>36</a:t>
+            </a:fld>
+            <a:endParaRPr lang="en-US" dirty="0"/>
+          </a:p>
+        </p:txBody>
+      </p:sp>
+    </p:spTree>
+    <p:extLst>
+      <p:ext uri="{BB962C8B-B14F-4D97-AF65-F5344CB8AC3E}">
+        <p14:creationId xmlns:p14="http://schemas.microsoft.com/office/powerpoint/2010/main" val="2105028517"/>
+      </p:ext>
+    </p:extLst>
+  </p:cSld>
+  <p:clrMapOvr>
+    <a:masterClrMapping/>
+  </p:clrMapOvr>
+  <p:timing>
+    <p:tnLst>
+      <p:par>
+        <p:cTn id="1" dur="indefinite" restart="never" nodeType="tmRoot"/>
+      </p:par>
+    </p:tnLst>
   </p:timing>
 </p:sld>
 </file>

</xml_diff>